<commit_message>
Comments and word update
</commit_message>
<xml_diff>
--- a/Word/Diagrams/chapter9/chap 9.figures.pptx
+++ b/Word/Diagrams/chapter9/chap 9.figures.pptx
@@ -5,10 +5,11 @@
     <p:sldMasterId id="2147483660" r:id="rId1"/>
   </p:sldMasterIdLst>
   <p:notesMasterIdLst>
-    <p:notesMasterId r:id="rId3"/>
+    <p:notesMasterId r:id="rId4"/>
   </p:notesMasterIdLst>
   <p:sldIdLst>
     <p:sldId id="304" r:id="rId2"/>
+    <p:sldId id="305" r:id="rId3"/>
   </p:sldIdLst>
   <p:sldSz cx="9144000" cy="6858000" type="screen4x3"/>
   <p:notesSz cx="6858000" cy="9144000"/>
@@ -209,7 +210,7 @@
             <a:fld id="{9CCF083D-F2BC-4786-8C77-844DFCD3515B}" type="datetimeFigureOut">
               <a:rPr lang="zh-TW" altLang="en-US" smtClean="0"/>
               <a:pPr/>
-              <a:t>2021/6/10</a:t>
+              <a:t>2021/6/13</a:t>
             </a:fld>
             <a:endParaRPr lang="zh-TW" altLang="en-US"/>
           </a:p>
@@ -673,7 +674,7 @@
             <a:fld id="{E3D07B0C-BD95-41BE-BB3E-AC75822DF381}" type="datetimeFigureOut">
               <a:rPr lang="en-US" smtClean="0"/>
               <a:pPr/>
-              <a:t>6/10/2021</a:t>
+              <a:t>6/13/2021</a:t>
             </a:fld>
             <a:endParaRPr lang="en-US" dirty="0"/>
           </a:p>
@@ -838,7 +839,7 @@
             <a:fld id="{E3D07B0C-BD95-41BE-BB3E-AC75822DF381}" type="datetimeFigureOut">
               <a:rPr lang="en-US" smtClean="0"/>
               <a:pPr/>
-              <a:t>6/10/2021</a:t>
+              <a:t>6/13/2021</a:t>
             </a:fld>
             <a:endParaRPr lang="en-US" dirty="0"/>
           </a:p>
@@ -1014,7 +1015,7 @@
             <a:fld id="{E3D07B0C-BD95-41BE-BB3E-AC75822DF381}" type="datetimeFigureOut">
               <a:rPr lang="en-US" smtClean="0"/>
               <a:pPr/>
-              <a:t>6/10/2021</a:t>
+              <a:t>6/13/2021</a:t>
             </a:fld>
             <a:endParaRPr lang="en-US" dirty="0"/>
           </a:p>
@@ -1179,7 +1180,7 @@
             <a:fld id="{E3D07B0C-BD95-41BE-BB3E-AC75822DF381}" type="datetimeFigureOut">
               <a:rPr lang="en-US" smtClean="0"/>
               <a:pPr/>
-              <a:t>6/10/2021</a:t>
+              <a:t>6/13/2021</a:t>
             </a:fld>
             <a:endParaRPr lang="en-US" dirty="0"/>
           </a:p>
@@ -1422,7 +1423,7 @@
             <a:fld id="{E3D07B0C-BD95-41BE-BB3E-AC75822DF381}" type="datetimeFigureOut">
               <a:rPr lang="en-US" smtClean="0"/>
               <a:pPr/>
-              <a:t>6/10/2021</a:t>
+              <a:t>6/13/2021</a:t>
             </a:fld>
             <a:endParaRPr lang="en-US" dirty="0"/>
           </a:p>
@@ -1706,7 +1707,7 @@
             <a:fld id="{E3D07B0C-BD95-41BE-BB3E-AC75822DF381}" type="datetimeFigureOut">
               <a:rPr lang="en-US" smtClean="0"/>
               <a:pPr/>
-              <a:t>6/10/2021</a:t>
+              <a:t>6/13/2021</a:t>
             </a:fld>
             <a:endParaRPr lang="en-US" dirty="0"/>
           </a:p>
@@ -2135,7 +2136,7 @@
             <a:fld id="{E3D07B0C-BD95-41BE-BB3E-AC75822DF381}" type="datetimeFigureOut">
               <a:rPr lang="en-US" smtClean="0"/>
               <a:pPr/>
-              <a:t>6/10/2021</a:t>
+              <a:t>6/13/2021</a:t>
             </a:fld>
             <a:endParaRPr lang="en-US" dirty="0"/>
           </a:p>
@@ -2249,7 +2250,7 @@
             <a:fld id="{E3D07B0C-BD95-41BE-BB3E-AC75822DF381}" type="datetimeFigureOut">
               <a:rPr lang="en-US" smtClean="0"/>
               <a:pPr/>
-              <a:t>6/10/2021</a:t>
+              <a:t>6/13/2021</a:t>
             </a:fld>
             <a:endParaRPr lang="en-US" dirty="0"/>
           </a:p>
@@ -2341,7 +2342,7 @@
             <a:fld id="{E3D07B0C-BD95-41BE-BB3E-AC75822DF381}" type="datetimeFigureOut">
               <a:rPr lang="en-US" smtClean="0"/>
               <a:pPr/>
-              <a:t>6/10/2021</a:t>
+              <a:t>6/13/2021</a:t>
             </a:fld>
             <a:endParaRPr lang="en-US" dirty="0"/>
           </a:p>
@@ -2532,7 +2533,7 @@
             <a:fld id="{E3D07B0C-BD95-41BE-BB3E-AC75822DF381}" type="datetimeFigureOut">
               <a:rPr lang="en-US" smtClean="0"/>
               <a:pPr/>
-              <a:t>6/10/2021</a:t>
+              <a:t>6/13/2021</a:t>
             </a:fld>
             <a:endParaRPr lang="en-US" dirty="0"/>
           </a:p>
@@ -2850,7 +2851,7 @@
             <a:fld id="{E3D07B0C-BD95-41BE-BB3E-AC75822DF381}" type="datetimeFigureOut">
               <a:rPr lang="en-US" smtClean="0"/>
               <a:pPr/>
-              <a:t>6/10/2021</a:t>
+              <a:t>6/13/2021</a:t>
             </a:fld>
             <a:endParaRPr lang="en-US" dirty="0"/>
           </a:p>
@@ -3232,7 +3233,7 @@
             <a:fld id="{E3D07B0C-BD95-41BE-BB3E-AC75822DF381}" type="datetimeFigureOut">
               <a:rPr lang="en-US" smtClean="0"/>
               <a:pPr/>
-              <a:t>6/10/2021</a:t>
+              <a:t>6/13/2021</a:t>
             </a:fld>
             <a:endParaRPr lang="en-US" dirty="0"/>
           </a:p>
@@ -4867,6 +4868,1830 @@
     <p:extLst>
       <p:ext uri="{BB962C8B-B14F-4D97-AF65-F5344CB8AC3E}">
         <p14:creationId xmlns:p14="http://schemas.microsoft.com/office/powerpoint/2010/main" val="3972070070"/>
+      </p:ext>
+    </p:extLst>
+  </p:cSld>
+  <p:clrMapOvr>
+    <a:masterClrMapping/>
+  </p:clrMapOvr>
+</p:sld>
+</file>
+
+<file path=ppt/slides/slide2.xml><?xml version="1.0" encoding="utf-8"?>
+<p:sld xmlns:a="http://schemas.openxmlformats.org/drawingml/2006/main" xmlns:r="http://schemas.openxmlformats.org/officeDocument/2006/relationships" xmlns:p="http://schemas.openxmlformats.org/presentationml/2006/main">
+  <p:cSld>
+    <p:spTree>
+      <p:nvGrpSpPr>
+        <p:cNvPr id="1" name=""/>
+        <p:cNvGrpSpPr/>
+        <p:nvPr/>
+      </p:nvGrpSpPr>
+      <p:grpSpPr>
+        <a:xfrm>
+          <a:off x="0" y="0"/>
+          <a:ext cx="0" cy="0"/>
+          <a:chOff x="0" y="0"/>
+          <a:chExt cx="0" cy="0"/>
+        </a:xfrm>
+      </p:grpSpPr>
+      <p:sp>
+        <p:nvSpPr>
+          <p:cNvPr id="2" name="Rectangle 1">
+            <a:extLst>
+              <a:ext uri="{FF2B5EF4-FFF2-40B4-BE49-F238E27FC236}">
+                <a16:creationId xmlns:a16="http://schemas.microsoft.com/office/drawing/2014/main" id="{EB8882E5-958E-4CFB-A842-782165B455EA}"/>
+              </a:ext>
+            </a:extLst>
+          </p:cNvPr>
+          <p:cNvSpPr/>
+          <p:nvPr/>
+        </p:nvSpPr>
+        <p:spPr>
+          <a:xfrm>
+            <a:off x="1676400" y="1974675"/>
+            <a:ext cx="4267200" cy="2324099"/>
+          </a:xfrm>
+          <a:prstGeom prst="rect">
+            <a:avLst/>
+          </a:prstGeom>
+          <a:noFill/>
+          <a:ln w="9525">
+            <a:prstDash val="sysDash"/>
+          </a:ln>
+        </p:spPr>
+        <p:style>
+          <a:lnRef idx="2">
+            <a:schemeClr val="accent1">
+              <a:shade val="50000"/>
+            </a:schemeClr>
+          </a:lnRef>
+          <a:fillRef idx="1">
+            <a:schemeClr val="accent1"/>
+          </a:fillRef>
+          <a:effectRef idx="0">
+            <a:schemeClr val="accent1"/>
+          </a:effectRef>
+          <a:fontRef idx="minor">
+            <a:schemeClr val="lt1"/>
+          </a:fontRef>
+        </p:style>
+        <p:txBody>
+          <a:bodyPr rtlCol="0" anchor="ctr"/>
+          <a:lstStyle/>
+          <a:p>
+            <a:pPr algn="ctr"/>
+            <a:endParaRPr lang="en-US" sz="800"/>
+          </a:p>
+        </p:txBody>
+      </p:sp>
+      <p:sp>
+        <p:nvSpPr>
+          <p:cNvPr id="4" name="TextBox 3">
+            <a:extLst>
+              <a:ext uri="{FF2B5EF4-FFF2-40B4-BE49-F238E27FC236}">
+                <a16:creationId xmlns:a16="http://schemas.microsoft.com/office/drawing/2014/main" id="{4D4D587B-C2B2-4A79-9EEC-081B53BD20A2}"/>
+              </a:ext>
+            </a:extLst>
+          </p:cNvPr>
+          <p:cNvSpPr txBox="1"/>
+          <p:nvPr/>
+        </p:nvSpPr>
+        <p:spPr>
+          <a:xfrm>
+            <a:off x="3903354" y="2485893"/>
+            <a:ext cx="105798" cy="230832"/>
+          </a:xfrm>
+          <a:prstGeom prst="rect">
+            <a:avLst/>
+          </a:prstGeom>
+          <a:noFill/>
+        </p:spPr>
+        <p:txBody>
+          <a:bodyPr wrap="none" lIns="0" rIns="0" rtlCol="0">
+            <a:spAutoFit/>
+          </a:bodyPr>
+          <a:lstStyle/>
+          <a:p>
+            <a:r>
+              <a:rPr lang="en-US" altLang="zh-CN" sz="900" dirty="0"/>
+              <a:t>c1</a:t>
+            </a:r>
+            <a:endParaRPr lang="zh-CN" altLang="en-US" sz="900" dirty="0"/>
+          </a:p>
+        </p:txBody>
+      </p:sp>
+      <p:sp>
+        <p:nvSpPr>
+          <p:cNvPr id="5" name="TextBox 4">
+            <a:extLst>
+              <a:ext uri="{FF2B5EF4-FFF2-40B4-BE49-F238E27FC236}">
+                <a16:creationId xmlns:a16="http://schemas.microsoft.com/office/drawing/2014/main" id="{ADA11600-75FA-4BDE-A5BF-6D6309DA810A}"/>
+              </a:ext>
+            </a:extLst>
+          </p:cNvPr>
+          <p:cNvSpPr txBox="1"/>
+          <p:nvPr/>
+        </p:nvSpPr>
+        <p:spPr>
+          <a:xfrm>
+            <a:off x="3540772" y="2856840"/>
+            <a:ext cx="97784" cy="230832"/>
+          </a:xfrm>
+          <a:prstGeom prst="rect">
+            <a:avLst/>
+          </a:prstGeom>
+          <a:noFill/>
+        </p:spPr>
+        <p:txBody>
+          <a:bodyPr wrap="none" lIns="0" rIns="0" rtlCol="0">
+            <a:spAutoFit/>
+          </a:bodyPr>
+          <a:lstStyle/>
+          <a:p>
+            <a:r>
+              <a:rPr lang="en-US" altLang="zh-CN" sz="900" dirty="0"/>
+              <a:t>r1</a:t>
+            </a:r>
+            <a:endParaRPr lang="zh-CN" altLang="en-US" sz="900" dirty="0"/>
+          </a:p>
+        </p:txBody>
+      </p:sp>
+      <p:cxnSp>
+        <p:nvCxnSpPr>
+          <p:cNvPr id="6" name="直接箭头连接符 5">
+            <a:extLst>
+              <a:ext uri="{FF2B5EF4-FFF2-40B4-BE49-F238E27FC236}">
+                <a16:creationId xmlns:a16="http://schemas.microsoft.com/office/drawing/2014/main" id="{F24CC412-E532-4383-A6D6-20B40AA377CC}"/>
+              </a:ext>
+            </a:extLst>
+          </p:cNvPr>
+          <p:cNvCxnSpPr>
+            <a:stCxn id="7" idx="4"/>
+          </p:cNvCxnSpPr>
+          <p:nvPr/>
+        </p:nvCxnSpPr>
+        <p:spPr>
+          <a:xfrm>
+            <a:off x="3960239" y="2858047"/>
+            <a:ext cx="0" cy="110258"/>
+          </a:xfrm>
+          <a:prstGeom prst="straightConnector1">
+            <a:avLst/>
+          </a:prstGeom>
+          <a:ln w="9525">
+            <a:solidFill>
+              <a:schemeClr val="tx1"/>
+            </a:solidFill>
+            <a:headEnd w="sm" len="sm"/>
+            <a:tailEnd type="triangle" w="sm" len="sm"/>
+          </a:ln>
+        </p:spPr>
+        <p:style>
+          <a:lnRef idx="1">
+            <a:schemeClr val="accent1"/>
+          </a:lnRef>
+          <a:fillRef idx="0">
+            <a:schemeClr val="accent1"/>
+          </a:fillRef>
+          <a:effectRef idx="0">
+            <a:schemeClr val="accent1"/>
+          </a:effectRef>
+          <a:fontRef idx="minor">
+            <a:schemeClr val="tx1"/>
+          </a:fontRef>
+        </p:style>
+      </p:cxnSp>
+      <p:sp>
+        <p:nvSpPr>
+          <p:cNvPr id="7" name="椭圆 12">
+            <a:extLst>
+              <a:ext uri="{FF2B5EF4-FFF2-40B4-BE49-F238E27FC236}">
+                <a16:creationId xmlns:a16="http://schemas.microsoft.com/office/drawing/2014/main" id="{05D580DA-E635-4722-BD82-A9DB48F7D41D}"/>
+              </a:ext>
+            </a:extLst>
+          </p:cNvPr>
+          <p:cNvSpPr/>
+          <p:nvPr/>
+        </p:nvSpPr>
+        <p:spPr>
+          <a:xfrm>
+            <a:off x="3942239" y="2822047"/>
+            <a:ext cx="36000" cy="36000"/>
+          </a:xfrm>
+          <a:prstGeom prst="ellipse">
+            <a:avLst/>
+          </a:prstGeom>
+          <a:solidFill>
+            <a:schemeClr val="tx1"/>
+          </a:solidFill>
+          <a:ln>
+            <a:noFill/>
+          </a:ln>
+        </p:spPr>
+        <p:style>
+          <a:lnRef idx="2">
+            <a:schemeClr val="accent1">
+              <a:shade val="50000"/>
+            </a:schemeClr>
+          </a:lnRef>
+          <a:fillRef idx="1">
+            <a:schemeClr val="accent1"/>
+          </a:fillRef>
+          <a:effectRef idx="0">
+            <a:schemeClr val="accent1"/>
+          </a:effectRef>
+          <a:fontRef idx="minor">
+            <a:schemeClr val="lt1"/>
+          </a:fontRef>
+        </p:style>
+        <p:txBody>
+          <a:bodyPr rtlCol="0" anchor="ctr"/>
+          <a:lstStyle/>
+          <a:p>
+            <a:pPr algn="ctr"/>
+            <a:endParaRPr lang="zh-CN" altLang="en-US"/>
+          </a:p>
+        </p:txBody>
+      </p:sp>
+      <p:sp>
+        <p:nvSpPr>
+          <p:cNvPr id="8" name="TextBox 7">
+            <a:extLst>
+              <a:ext uri="{FF2B5EF4-FFF2-40B4-BE49-F238E27FC236}">
+                <a16:creationId xmlns:a16="http://schemas.microsoft.com/office/drawing/2014/main" id="{9192073E-DD37-4578-9027-570FEF892025}"/>
+              </a:ext>
+            </a:extLst>
+          </p:cNvPr>
+          <p:cNvSpPr txBox="1"/>
+          <p:nvPr/>
+        </p:nvSpPr>
+        <p:spPr>
+          <a:xfrm>
+            <a:off x="4987567" y="2607395"/>
+            <a:ext cx="310983" cy="215444"/>
+          </a:xfrm>
+          <a:prstGeom prst="rect">
+            <a:avLst/>
+          </a:prstGeom>
+          <a:noFill/>
+        </p:spPr>
+        <p:txBody>
+          <a:bodyPr wrap="none" lIns="0" rIns="0" rtlCol="0">
+            <a:spAutoFit/>
+          </a:bodyPr>
+          <a:lstStyle/>
+          <a:p>
+            <a:r>
+              <a:rPr lang="en-US" altLang="zh-CN" sz="800" dirty="0"/>
+              <a:t>Normal</a:t>
+            </a:r>
+            <a:endParaRPr lang="zh-CN" altLang="en-US" sz="800" dirty="0"/>
+          </a:p>
+        </p:txBody>
+      </p:sp>
+      <p:cxnSp>
+        <p:nvCxnSpPr>
+          <p:cNvPr id="9" name="曲线连接符 14">
+            <a:extLst>
+              <a:ext uri="{FF2B5EF4-FFF2-40B4-BE49-F238E27FC236}">
+                <a16:creationId xmlns:a16="http://schemas.microsoft.com/office/drawing/2014/main" id="{B892252F-0CA7-4E3C-BA16-07868A901544}"/>
+              </a:ext>
+            </a:extLst>
+          </p:cNvPr>
+          <p:cNvCxnSpPr/>
+          <p:nvPr/>
+        </p:nvCxnSpPr>
+        <p:spPr>
+          <a:xfrm flipV="1">
+            <a:off x="4310021" y="2579966"/>
+            <a:ext cx="623043" cy="174387"/>
+          </a:xfrm>
+          <a:prstGeom prst="bentConnector3">
+            <a:avLst>
+              <a:gd name="adj1" fmla="val -832"/>
+            </a:avLst>
+          </a:prstGeom>
+          <a:ln w="6350" cmpd="sng">
+            <a:solidFill>
+              <a:schemeClr val="tx1"/>
+            </a:solidFill>
+            <a:prstDash val="sysDot"/>
+            <a:tailEnd type="arrow" w="sm" len="sm"/>
+          </a:ln>
+        </p:spPr>
+        <p:style>
+          <a:lnRef idx="1">
+            <a:schemeClr val="accent1"/>
+          </a:lnRef>
+          <a:fillRef idx="0">
+            <a:schemeClr val="accent1"/>
+          </a:fillRef>
+          <a:effectRef idx="0">
+            <a:schemeClr val="accent1"/>
+          </a:effectRef>
+          <a:fontRef idx="minor">
+            <a:schemeClr val="tx1"/>
+          </a:fontRef>
+        </p:style>
+      </p:cxnSp>
+      <p:cxnSp>
+        <p:nvCxnSpPr>
+          <p:cNvPr id="10" name="直接连接符 62">
+            <a:extLst>
+              <a:ext uri="{FF2B5EF4-FFF2-40B4-BE49-F238E27FC236}">
+                <a16:creationId xmlns:a16="http://schemas.microsoft.com/office/drawing/2014/main" id="{FE1E1A7E-535D-4F6F-A52A-66DA84381F15}"/>
+              </a:ext>
+            </a:extLst>
+          </p:cNvPr>
+          <p:cNvCxnSpPr/>
+          <p:nvPr/>
+        </p:nvCxnSpPr>
+        <p:spPr>
+          <a:xfrm>
+            <a:off x="3966587" y="2968305"/>
+            <a:ext cx="640080" cy="0"/>
+          </a:xfrm>
+          <a:prstGeom prst="line">
+            <a:avLst/>
+          </a:prstGeom>
+          <a:ln w="6350">
+            <a:solidFill>
+              <a:schemeClr val="tx1"/>
+            </a:solidFill>
+            <a:prstDash val="dash"/>
+          </a:ln>
+        </p:spPr>
+        <p:style>
+          <a:lnRef idx="1">
+            <a:schemeClr val="accent1"/>
+          </a:lnRef>
+          <a:fillRef idx="0">
+            <a:schemeClr val="accent1"/>
+          </a:fillRef>
+          <a:effectRef idx="0">
+            <a:schemeClr val="accent1"/>
+          </a:effectRef>
+          <a:fontRef idx="minor">
+            <a:schemeClr val="tx1"/>
+          </a:fontRef>
+        </p:style>
+      </p:cxnSp>
+      <p:cxnSp>
+        <p:nvCxnSpPr>
+          <p:cNvPr id="11" name="直接连接符 64">
+            <a:extLst>
+              <a:ext uri="{FF2B5EF4-FFF2-40B4-BE49-F238E27FC236}">
+                <a16:creationId xmlns:a16="http://schemas.microsoft.com/office/drawing/2014/main" id="{5DC7D2A0-138C-4F86-9382-8615376D9CDA}"/>
+              </a:ext>
+            </a:extLst>
+          </p:cNvPr>
+          <p:cNvCxnSpPr/>
+          <p:nvPr/>
+        </p:nvCxnSpPr>
+        <p:spPr>
+          <a:xfrm>
+            <a:off x="3966587" y="2837649"/>
+            <a:ext cx="640080" cy="0"/>
+          </a:xfrm>
+          <a:prstGeom prst="line">
+            <a:avLst/>
+          </a:prstGeom>
+          <a:ln w="6350">
+            <a:solidFill>
+              <a:schemeClr val="tx1"/>
+            </a:solidFill>
+            <a:prstDash val="dash"/>
+          </a:ln>
+        </p:spPr>
+        <p:style>
+          <a:lnRef idx="1">
+            <a:schemeClr val="accent1"/>
+          </a:lnRef>
+          <a:fillRef idx="0">
+            <a:schemeClr val="accent1"/>
+          </a:fillRef>
+          <a:effectRef idx="0">
+            <a:schemeClr val="accent1"/>
+          </a:effectRef>
+          <a:fontRef idx="minor">
+            <a:schemeClr val="tx1"/>
+          </a:fontRef>
+        </p:style>
+      </p:cxnSp>
+      <p:sp>
+        <p:nvSpPr>
+          <p:cNvPr id="12" name="TextBox 11">
+            <a:extLst>
+              <a:ext uri="{FF2B5EF4-FFF2-40B4-BE49-F238E27FC236}">
+                <a16:creationId xmlns:a16="http://schemas.microsoft.com/office/drawing/2014/main" id="{A451027A-D6E3-4AC1-A678-87664902D5A8}"/>
+              </a:ext>
+            </a:extLst>
+          </p:cNvPr>
+          <p:cNvSpPr txBox="1"/>
+          <p:nvPr/>
+        </p:nvSpPr>
+        <p:spPr>
+          <a:xfrm>
+            <a:off x="4987567" y="2783785"/>
+            <a:ext cx="256480" cy="215444"/>
+          </a:xfrm>
+          <a:prstGeom prst="rect">
+            <a:avLst/>
+          </a:prstGeom>
+          <a:noFill/>
+        </p:spPr>
+        <p:txBody>
+          <a:bodyPr wrap="none" lIns="0" rIns="0" rtlCol="0">
+            <a:spAutoFit/>
+          </a:bodyPr>
+          <a:lstStyle/>
+          <a:p>
+            <a:r>
+              <a:rPr lang="en-US" altLang="zh-CN" sz="800" dirty="0"/>
+              <a:t>Depth</a:t>
+            </a:r>
+            <a:endParaRPr lang="zh-CN" altLang="en-US" sz="800" dirty="0"/>
+          </a:p>
+        </p:txBody>
+      </p:sp>
+      <p:sp>
+        <p:nvSpPr>
+          <p:cNvPr id="13" name="矩形 2">
+            <a:extLst>
+              <a:ext uri="{FF2B5EF4-FFF2-40B4-BE49-F238E27FC236}">
+                <a16:creationId xmlns:a16="http://schemas.microsoft.com/office/drawing/2014/main" id="{A87D4C47-4FC5-484B-B613-33DE4D8CB887}"/>
+              </a:ext>
+            </a:extLst>
+          </p:cNvPr>
+          <p:cNvSpPr/>
+          <p:nvPr/>
+        </p:nvSpPr>
+        <p:spPr>
+          <a:xfrm>
+            <a:off x="3460718" y="2837649"/>
+            <a:ext cx="999042" cy="806786"/>
+          </a:xfrm>
+          <a:prstGeom prst="rect">
+            <a:avLst/>
+          </a:prstGeom>
+          <a:noFill/>
+          <a:ln w="12700">
+            <a:solidFill>
+              <a:schemeClr val="tx1"/>
+            </a:solidFill>
+          </a:ln>
+        </p:spPr>
+        <p:style>
+          <a:lnRef idx="2">
+            <a:schemeClr val="accent1">
+              <a:shade val="50000"/>
+            </a:schemeClr>
+          </a:lnRef>
+          <a:fillRef idx="1">
+            <a:schemeClr val="accent1"/>
+          </a:fillRef>
+          <a:effectRef idx="0">
+            <a:schemeClr val="accent1"/>
+          </a:effectRef>
+          <a:fontRef idx="minor">
+            <a:schemeClr val="lt1"/>
+          </a:fontRef>
+        </p:style>
+        <p:txBody>
+          <a:bodyPr rtlCol="0" anchor="ctr"/>
+          <a:lstStyle/>
+          <a:p>
+            <a:pPr algn="ctr"/>
+            <a:endParaRPr lang="zh-CN" altLang="en-US"/>
+          </a:p>
+        </p:txBody>
+      </p:sp>
+      <p:sp>
+        <p:nvSpPr>
+          <p:cNvPr id="14" name="椭圆 25">
+            <a:extLst>
+              <a:ext uri="{FF2B5EF4-FFF2-40B4-BE49-F238E27FC236}">
+                <a16:creationId xmlns:a16="http://schemas.microsoft.com/office/drawing/2014/main" id="{DAC5C954-FD26-468D-A90F-7069923BABFA}"/>
+              </a:ext>
+            </a:extLst>
+          </p:cNvPr>
+          <p:cNvSpPr/>
+          <p:nvPr/>
+        </p:nvSpPr>
+        <p:spPr>
+          <a:xfrm>
+            <a:off x="3942239" y="2950305"/>
+            <a:ext cx="36000" cy="36000"/>
+          </a:xfrm>
+          <a:prstGeom prst="ellipse">
+            <a:avLst/>
+          </a:prstGeom>
+          <a:solidFill>
+            <a:schemeClr val="tx1"/>
+          </a:solidFill>
+          <a:ln>
+            <a:noFill/>
+          </a:ln>
+        </p:spPr>
+        <p:style>
+          <a:lnRef idx="2">
+            <a:schemeClr val="accent1">
+              <a:shade val="50000"/>
+            </a:schemeClr>
+          </a:lnRef>
+          <a:fillRef idx="1">
+            <a:schemeClr val="accent1"/>
+          </a:fillRef>
+          <a:effectRef idx="0">
+            <a:schemeClr val="accent1"/>
+          </a:effectRef>
+          <a:fontRef idx="minor">
+            <a:schemeClr val="lt1"/>
+          </a:fontRef>
+        </p:style>
+        <p:txBody>
+          <a:bodyPr rtlCol="0" anchor="ctr"/>
+          <a:lstStyle/>
+          <a:p>
+            <a:pPr algn="ctr"/>
+            <a:endParaRPr lang="zh-CN" altLang="en-US"/>
+          </a:p>
+        </p:txBody>
+      </p:sp>
+      <p:sp>
+        <p:nvSpPr>
+          <p:cNvPr id="15" name="TextBox 14">
+            <a:extLst>
+              <a:ext uri="{FF2B5EF4-FFF2-40B4-BE49-F238E27FC236}">
+                <a16:creationId xmlns:a16="http://schemas.microsoft.com/office/drawing/2014/main" id="{89F3A4F0-487F-4585-B20C-DE2EF3427637}"/>
+              </a:ext>
+            </a:extLst>
+          </p:cNvPr>
+          <p:cNvSpPr txBox="1"/>
+          <p:nvPr/>
+        </p:nvSpPr>
+        <p:spPr>
+          <a:xfrm>
+            <a:off x="4987567" y="2995287"/>
+            <a:ext cx="158698" cy="215444"/>
+          </a:xfrm>
+          <a:prstGeom prst="rect">
+            <a:avLst/>
+          </a:prstGeom>
+          <a:noFill/>
+        </p:spPr>
+        <p:txBody>
+          <a:bodyPr wrap="none" lIns="0" rIns="0" rtlCol="0">
+            <a:spAutoFit/>
+          </a:bodyPr>
+          <a:lstStyle/>
+          <a:p>
+            <a:r>
+              <a:rPr lang="en-US" altLang="zh-CN" sz="800" dirty="0"/>
+              <a:t>End</a:t>
+            </a:r>
+            <a:endParaRPr lang="zh-CN" altLang="en-US" sz="800" dirty="0"/>
+          </a:p>
+        </p:txBody>
+      </p:sp>
+      <p:cxnSp>
+        <p:nvCxnSpPr>
+          <p:cNvPr id="16" name="直接箭头连接符 36">
+            <a:extLst>
+              <a:ext uri="{FF2B5EF4-FFF2-40B4-BE49-F238E27FC236}">
+                <a16:creationId xmlns:a16="http://schemas.microsoft.com/office/drawing/2014/main" id="{2055DA3C-6482-44D7-9565-FC209400F69F}"/>
+              </a:ext>
+            </a:extLst>
+          </p:cNvPr>
+          <p:cNvCxnSpPr/>
+          <p:nvPr/>
+        </p:nvCxnSpPr>
+        <p:spPr>
+          <a:xfrm flipV="1">
+            <a:off x="3459662" y="3487663"/>
+            <a:ext cx="160894" cy="160994"/>
+          </a:xfrm>
+          <a:prstGeom prst="straightConnector1">
+            <a:avLst/>
+          </a:prstGeom>
+          <a:ln w="9525">
+            <a:solidFill>
+              <a:schemeClr val="tx1"/>
+            </a:solidFill>
+            <a:headEnd w="sm" len="sm"/>
+            <a:tailEnd type="triangle" w="sm" len="sm"/>
+          </a:ln>
+        </p:spPr>
+        <p:style>
+          <a:lnRef idx="1">
+            <a:schemeClr val="accent1"/>
+          </a:lnRef>
+          <a:fillRef idx="0">
+            <a:schemeClr val="accent1"/>
+          </a:fillRef>
+          <a:effectRef idx="0">
+            <a:schemeClr val="accent1"/>
+          </a:effectRef>
+          <a:fontRef idx="minor">
+            <a:schemeClr val="tx1"/>
+          </a:fontRef>
+        </p:style>
+      </p:cxnSp>
+      <p:sp>
+        <p:nvSpPr>
+          <p:cNvPr id="17" name="TextBox 16">
+            <a:extLst>
+              <a:ext uri="{FF2B5EF4-FFF2-40B4-BE49-F238E27FC236}">
+                <a16:creationId xmlns:a16="http://schemas.microsoft.com/office/drawing/2014/main" id="{4897BC1D-649C-4F1D-BEF3-AD4FAA107850}"/>
+              </a:ext>
+            </a:extLst>
+          </p:cNvPr>
+          <p:cNvSpPr txBox="1"/>
+          <p:nvPr/>
+        </p:nvSpPr>
+        <p:spPr>
+          <a:xfrm>
+            <a:off x="3309281" y="3810000"/>
+            <a:ext cx="105798" cy="230832"/>
+          </a:xfrm>
+          <a:prstGeom prst="rect">
+            <a:avLst/>
+          </a:prstGeom>
+          <a:noFill/>
+        </p:spPr>
+        <p:txBody>
+          <a:bodyPr wrap="none" lIns="0" rIns="0" rtlCol="0">
+            <a:spAutoFit/>
+          </a:bodyPr>
+          <a:lstStyle/>
+          <a:p>
+            <a:r>
+              <a:rPr lang="en-US" altLang="zh-CN" sz="900" dirty="0"/>
+              <a:t>c2</a:t>
+            </a:r>
+            <a:endParaRPr lang="zh-CN" altLang="en-US" sz="900" dirty="0"/>
+          </a:p>
+        </p:txBody>
+      </p:sp>
+      <p:sp>
+        <p:nvSpPr>
+          <p:cNvPr id="18" name="椭圆 53">
+            <a:extLst>
+              <a:ext uri="{FF2B5EF4-FFF2-40B4-BE49-F238E27FC236}">
+                <a16:creationId xmlns:a16="http://schemas.microsoft.com/office/drawing/2014/main" id="{9A2BCB88-AE2C-4381-9683-9F0FD1D53625}"/>
+              </a:ext>
+            </a:extLst>
+          </p:cNvPr>
+          <p:cNvSpPr/>
+          <p:nvPr/>
+        </p:nvSpPr>
+        <p:spPr>
+          <a:xfrm>
+            <a:off x="3442717" y="3626435"/>
+            <a:ext cx="36000" cy="36000"/>
+          </a:xfrm>
+          <a:prstGeom prst="ellipse">
+            <a:avLst/>
+          </a:prstGeom>
+          <a:solidFill>
+            <a:schemeClr val="tx1"/>
+          </a:solidFill>
+          <a:ln>
+            <a:noFill/>
+          </a:ln>
+        </p:spPr>
+        <p:style>
+          <a:lnRef idx="2">
+            <a:schemeClr val="accent1">
+              <a:shade val="50000"/>
+            </a:schemeClr>
+          </a:lnRef>
+          <a:fillRef idx="1">
+            <a:schemeClr val="accent1"/>
+          </a:fillRef>
+          <a:effectRef idx="0">
+            <a:schemeClr val="accent1"/>
+          </a:effectRef>
+          <a:fontRef idx="minor">
+            <a:schemeClr val="lt1"/>
+          </a:fontRef>
+        </p:style>
+        <p:txBody>
+          <a:bodyPr rtlCol="0" anchor="ctr"/>
+          <a:lstStyle/>
+          <a:p>
+            <a:pPr algn="ctr"/>
+            <a:endParaRPr lang="zh-CN" altLang="en-US"/>
+          </a:p>
+        </p:txBody>
+      </p:sp>
+      <p:sp>
+        <p:nvSpPr>
+          <p:cNvPr id="19" name="椭圆 54">
+            <a:extLst>
+              <a:ext uri="{FF2B5EF4-FFF2-40B4-BE49-F238E27FC236}">
+                <a16:creationId xmlns:a16="http://schemas.microsoft.com/office/drawing/2014/main" id="{58E1C866-9664-4601-A534-E935C0FD2A1A}"/>
+              </a:ext>
+            </a:extLst>
+          </p:cNvPr>
+          <p:cNvSpPr/>
+          <p:nvPr/>
+        </p:nvSpPr>
+        <p:spPr>
+          <a:xfrm>
+            <a:off x="3602556" y="3469663"/>
+            <a:ext cx="36000" cy="36000"/>
+          </a:xfrm>
+          <a:prstGeom prst="ellipse">
+            <a:avLst/>
+          </a:prstGeom>
+          <a:solidFill>
+            <a:schemeClr val="tx1"/>
+          </a:solidFill>
+          <a:ln>
+            <a:noFill/>
+          </a:ln>
+        </p:spPr>
+        <p:style>
+          <a:lnRef idx="2">
+            <a:schemeClr val="accent1">
+              <a:shade val="50000"/>
+            </a:schemeClr>
+          </a:lnRef>
+          <a:fillRef idx="1">
+            <a:schemeClr val="accent1"/>
+          </a:fillRef>
+          <a:effectRef idx="0">
+            <a:schemeClr val="accent1"/>
+          </a:effectRef>
+          <a:fontRef idx="minor">
+            <a:schemeClr val="lt1"/>
+          </a:fontRef>
+        </p:style>
+        <p:txBody>
+          <a:bodyPr rtlCol="0" anchor="ctr"/>
+          <a:lstStyle/>
+          <a:p>
+            <a:pPr algn="ctr"/>
+            <a:endParaRPr lang="zh-CN" altLang="en-US"/>
+          </a:p>
+        </p:txBody>
+      </p:sp>
+      <p:sp>
+        <p:nvSpPr>
+          <p:cNvPr id="20" name="TextBox 19">
+            <a:extLst>
+              <a:ext uri="{FF2B5EF4-FFF2-40B4-BE49-F238E27FC236}">
+                <a16:creationId xmlns:a16="http://schemas.microsoft.com/office/drawing/2014/main" id="{2F48BA93-14CA-435B-9DCE-AF6FD633B419}"/>
+              </a:ext>
+            </a:extLst>
+          </p:cNvPr>
+          <p:cNvSpPr txBox="1"/>
+          <p:nvPr/>
+        </p:nvSpPr>
+        <p:spPr>
+          <a:xfrm>
+            <a:off x="2167951" y="3172225"/>
+            <a:ext cx="256480" cy="215444"/>
+          </a:xfrm>
+          <a:prstGeom prst="rect">
+            <a:avLst/>
+          </a:prstGeom>
+          <a:noFill/>
+        </p:spPr>
+        <p:txBody>
+          <a:bodyPr wrap="none" lIns="0" rIns="0" rtlCol="0">
+            <a:spAutoFit/>
+          </a:bodyPr>
+          <a:lstStyle/>
+          <a:p>
+            <a:r>
+              <a:rPr lang="en-US" altLang="zh-CN" sz="800" dirty="0"/>
+              <a:t>Depth</a:t>
+            </a:r>
+            <a:endParaRPr lang="zh-CN" altLang="en-US" sz="800" dirty="0"/>
+          </a:p>
+        </p:txBody>
+      </p:sp>
+      <p:cxnSp>
+        <p:nvCxnSpPr>
+          <p:cNvPr id="21" name="曲线连接符 57">
+            <a:extLst>
+              <a:ext uri="{FF2B5EF4-FFF2-40B4-BE49-F238E27FC236}">
+                <a16:creationId xmlns:a16="http://schemas.microsoft.com/office/drawing/2014/main" id="{DC4E1035-C869-4FAF-A716-733A9BE78014}"/>
+              </a:ext>
+            </a:extLst>
+          </p:cNvPr>
+          <p:cNvCxnSpPr/>
+          <p:nvPr/>
+        </p:nvCxnSpPr>
+        <p:spPr>
+          <a:xfrm rot="16200000" flipH="1">
+            <a:off x="4380066" y="2548478"/>
+            <a:ext cx="133173" cy="972826"/>
+          </a:xfrm>
+          <a:prstGeom prst="bentConnector2">
+            <a:avLst/>
+          </a:prstGeom>
+          <a:ln w="6350" cmpd="sng">
+            <a:solidFill>
+              <a:schemeClr val="tx1"/>
+            </a:solidFill>
+            <a:prstDash val="sysDot"/>
+            <a:tailEnd type="arrow" w="sm" len="sm"/>
+          </a:ln>
+        </p:spPr>
+        <p:style>
+          <a:lnRef idx="1">
+            <a:schemeClr val="accent1"/>
+          </a:lnRef>
+          <a:fillRef idx="0">
+            <a:schemeClr val="accent1"/>
+          </a:fillRef>
+          <a:effectRef idx="0">
+            <a:schemeClr val="accent1"/>
+          </a:effectRef>
+          <a:fontRef idx="minor">
+            <a:schemeClr val="tx1"/>
+          </a:fontRef>
+        </p:style>
+      </p:cxnSp>
+      <p:cxnSp>
+        <p:nvCxnSpPr>
+          <p:cNvPr id="22" name="曲线连接符 63">
+            <a:extLst>
+              <a:ext uri="{FF2B5EF4-FFF2-40B4-BE49-F238E27FC236}">
+                <a16:creationId xmlns:a16="http://schemas.microsoft.com/office/drawing/2014/main" id="{153AF9EB-133C-479A-8B26-11F59502B66B}"/>
+              </a:ext>
+            </a:extLst>
+          </p:cNvPr>
+          <p:cNvCxnSpPr/>
+          <p:nvPr/>
+        </p:nvCxnSpPr>
+        <p:spPr>
+          <a:xfrm flipV="1">
+            <a:off x="3960242" y="2714913"/>
+            <a:ext cx="972822" cy="174724"/>
+          </a:xfrm>
+          <a:prstGeom prst="bentConnector3">
+            <a:avLst>
+              <a:gd name="adj1" fmla="val 43636"/>
+            </a:avLst>
+          </a:prstGeom>
+          <a:ln w="6350" cmpd="sng">
+            <a:solidFill>
+              <a:schemeClr val="tx1"/>
+            </a:solidFill>
+            <a:prstDash val="sysDot"/>
+            <a:tailEnd type="arrow" w="sm" len="sm"/>
+          </a:ln>
+        </p:spPr>
+        <p:style>
+          <a:lnRef idx="1">
+            <a:schemeClr val="accent1"/>
+          </a:lnRef>
+          <a:fillRef idx="0">
+            <a:schemeClr val="accent1"/>
+          </a:fillRef>
+          <a:effectRef idx="0">
+            <a:schemeClr val="accent1"/>
+          </a:effectRef>
+          <a:fontRef idx="minor">
+            <a:schemeClr val="tx1"/>
+          </a:fontRef>
+        </p:style>
+      </p:cxnSp>
+      <p:sp>
+        <p:nvSpPr>
+          <p:cNvPr id="23" name="TextBox 22">
+            <a:extLst>
+              <a:ext uri="{FF2B5EF4-FFF2-40B4-BE49-F238E27FC236}">
+                <a16:creationId xmlns:a16="http://schemas.microsoft.com/office/drawing/2014/main" id="{A153B6E5-D186-48CD-8D6D-E90498FC0E37}"/>
+              </a:ext>
+            </a:extLst>
+          </p:cNvPr>
+          <p:cNvSpPr txBox="1"/>
+          <p:nvPr/>
+        </p:nvSpPr>
+        <p:spPr>
+          <a:xfrm>
+            <a:off x="2218516" y="3527184"/>
+            <a:ext cx="198772" cy="215444"/>
+          </a:xfrm>
+          <a:prstGeom prst="rect">
+            <a:avLst/>
+          </a:prstGeom>
+          <a:noFill/>
+        </p:spPr>
+        <p:txBody>
+          <a:bodyPr wrap="none" lIns="0" rIns="0" rtlCol="0">
+            <a:spAutoFit/>
+          </a:bodyPr>
+          <a:lstStyle/>
+          <a:p>
+            <a:r>
+              <a:rPr lang="en-US" altLang="zh-CN" sz="800" dirty="0"/>
+              <a:t>Start</a:t>
+            </a:r>
+            <a:endParaRPr lang="zh-CN" altLang="en-US" sz="800" dirty="0"/>
+          </a:p>
+        </p:txBody>
+      </p:sp>
+      <p:sp>
+        <p:nvSpPr>
+          <p:cNvPr id="24" name="TextBox 23">
+            <a:extLst>
+              <a:ext uri="{FF2B5EF4-FFF2-40B4-BE49-F238E27FC236}">
+                <a16:creationId xmlns:a16="http://schemas.microsoft.com/office/drawing/2014/main" id="{F671D058-0C6D-4108-9D6C-80A0B3281DFD}"/>
+              </a:ext>
+            </a:extLst>
+          </p:cNvPr>
+          <p:cNvSpPr txBox="1"/>
+          <p:nvPr/>
+        </p:nvSpPr>
+        <p:spPr>
+          <a:xfrm>
+            <a:off x="2106305" y="3415194"/>
+            <a:ext cx="310983" cy="215444"/>
+          </a:xfrm>
+          <a:prstGeom prst="rect">
+            <a:avLst/>
+          </a:prstGeom>
+          <a:noFill/>
+        </p:spPr>
+        <p:txBody>
+          <a:bodyPr wrap="none" lIns="0" rIns="0" rtlCol="0">
+            <a:spAutoFit/>
+          </a:bodyPr>
+          <a:lstStyle/>
+          <a:p>
+            <a:r>
+              <a:rPr lang="en-US" altLang="zh-CN" sz="800" dirty="0"/>
+              <a:t>Normal</a:t>
+            </a:r>
+            <a:endParaRPr lang="zh-CN" altLang="en-US" sz="800" dirty="0"/>
+          </a:p>
+        </p:txBody>
+      </p:sp>
+      <p:sp>
+        <p:nvSpPr>
+          <p:cNvPr id="25" name="TextBox 24">
+            <a:extLst>
+              <a:ext uri="{FF2B5EF4-FFF2-40B4-BE49-F238E27FC236}">
+                <a16:creationId xmlns:a16="http://schemas.microsoft.com/office/drawing/2014/main" id="{1556854E-D85B-4C93-B6BA-0E38E8CA8BC1}"/>
+              </a:ext>
+            </a:extLst>
+          </p:cNvPr>
+          <p:cNvSpPr txBox="1"/>
+          <p:nvPr/>
+        </p:nvSpPr>
+        <p:spPr>
+          <a:xfrm>
+            <a:off x="2258590" y="3029034"/>
+            <a:ext cx="158698" cy="215444"/>
+          </a:xfrm>
+          <a:prstGeom prst="rect">
+            <a:avLst/>
+          </a:prstGeom>
+          <a:noFill/>
+        </p:spPr>
+        <p:txBody>
+          <a:bodyPr wrap="none" lIns="0" rIns="0" rtlCol="0">
+            <a:spAutoFit/>
+          </a:bodyPr>
+          <a:lstStyle/>
+          <a:p>
+            <a:r>
+              <a:rPr lang="en-US" altLang="zh-CN" sz="800" dirty="0"/>
+              <a:t>End</a:t>
+            </a:r>
+            <a:endParaRPr lang="zh-CN" altLang="en-US" sz="800" dirty="0"/>
+          </a:p>
+        </p:txBody>
+      </p:sp>
+      <p:cxnSp>
+        <p:nvCxnSpPr>
+          <p:cNvPr id="26" name="Elbow Connector 58">
+            <a:extLst>
+              <a:ext uri="{FF2B5EF4-FFF2-40B4-BE49-F238E27FC236}">
+                <a16:creationId xmlns:a16="http://schemas.microsoft.com/office/drawing/2014/main" id="{E90A6D53-B008-46F5-A716-77287E3AA91E}"/>
+              </a:ext>
+            </a:extLst>
+          </p:cNvPr>
+          <p:cNvCxnSpPr>
+            <a:stCxn id="7" idx="0"/>
+          </p:cNvCxnSpPr>
+          <p:nvPr/>
+        </p:nvCxnSpPr>
+        <p:spPr>
+          <a:xfrm rot="5400000" flipH="1" flipV="1">
+            <a:off x="4103395" y="2615421"/>
+            <a:ext cx="63471" cy="349782"/>
+          </a:xfrm>
+          <a:prstGeom prst="bentConnector2">
+            <a:avLst/>
+          </a:prstGeom>
+          <a:ln w="6350">
+            <a:solidFill>
+              <a:schemeClr val="tx1"/>
+            </a:solidFill>
+            <a:prstDash val="sysDot"/>
+            <a:tailEnd type="none" w="sm" len="sm"/>
+          </a:ln>
+        </p:spPr>
+        <p:style>
+          <a:lnRef idx="1">
+            <a:schemeClr val="accent1"/>
+          </a:lnRef>
+          <a:fillRef idx="0">
+            <a:schemeClr val="accent1"/>
+          </a:fillRef>
+          <a:effectRef idx="0">
+            <a:schemeClr val="accent1"/>
+          </a:effectRef>
+          <a:fontRef idx="minor">
+            <a:schemeClr val="tx1"/>
+          </a:fontRef>
+        </p:style>
+      </p:cxnSp>
+      <p:cxnSp>
+        <p:nvCxnSpPr>
+          <p:cNvPr id="27" name="Straight Arrow Connector 26">
+            <a:extLst>
+              <a:ext uri="{FF2B5EF4-FFF2-40B4-BE49-F238E27FC236}">
+                <a16:creationId xmlns:a16="http://schemas.microsoft.com/office/drawing/2014/main" id="{15AE8A07-0BFB-4B34-BDAD-E34E6633A3F7}"/>
+              </a:ext>
+            </a:extLst>
+          </p:cNvPr>
+          <p:cNvCxnSpPr/>
+          <p:nvPr/>
+        </p:nvCxnSpPr>
+        <p:spPr>
+          <a:xfrm>
+            <a:off x="4658744" y="2900474"/>
+            <a:ext cx="274320" cy="0"/>
+          </a:xfrm>
+          <a:prstGeom prst="straightConnector1">
+            <a:avLst/>
+          </a:prstGeom>
+          <a:ln w="6350">
+            <a:solidFill>
+              <a:schemeClr val="tx1"/>
+            </a:solidFill>
+            <a:prstDash val="sysDot"/>
+            <a:tailEnd type="arrow" w="sm" len="sm"/>
+          </a:ln>
+        </p:spPr>
+        <p:style>
+          <a:lnRef idx="1">
+            <a:schemeClr val="accent1"/>
+          </a:lnRef>
+          <a:fillRef idx="0">
+            <a:schemeClr val="accent1"/>
+          </a:fillRef>
+          <a:effectRef idx="0">
+            <a:schemeClr val="accent1"/>
+          </a:effectRef>
+          <a:fontRef idx="minor">
+            <a:schemeClr val="tx1"/>
+          </a:fontRef>
+        </p:style>
+      </p:cxnSp>
+      <p:cxnSp>
+        <p:nvCxnSpPr>
+          <p:cNvPr id="28" name="Straight Arrow Connector 27">
+            <a:extLst>
+              <a:ext uri="{FF2B5EF4-FFF2-40B4-BE49-F238E27FC236}">
+                <a16:creationId xmlns:a16="http://schemas.microsoft.com/office/drawing/2014/main" id="{E9A70E9F-DC98-4BB5-A178-6A768781BDA2}"/>
+              </a:ext>
+            </a:extLst>
+          </p:cNvPr>
+          <p:cNvCxnSpPr/>
+          <p:nvPr/>
+        </p:nvCxnSpPr>
+        <p:spPr>
+          <a:xfrm flipH="1">
+            <a:off x="2469489" y="3526631"/>
+            <a:ext cx="1114292" cy="3429"/>
+          </a:xfrm>
+          <a:prstGeom prst="straightConnector1">
+            <a:avLst/>
+          </a:prstGeom>
+          <a:ln w="6350">
+            <a:solidFill>
+              <a:schemeClr val="tx1"/>
+            </a:solidFill>
+            <a:prstDash val="sysDot"/>
+            <a:tailEnd type="arrow" w="sm" len="sm"/>
+          </a:ln>
+        </p:spPr>
+        <p:style>
+          <a:lnRef idx="1">
+            <a:schemeClr val="accent1"/>
+          </a:lnRef>
+          <a:fillRef idx="0">
+            <a:schemeClr val="accent1"/>
+          </a:fillRef>
+          <a:effectRef idx="0">
+            <a:schemeClr val="accent1"/>
+          </a:effectRef>
+          <a:fontRef idx="minor">
+            <a:schemeClr val="tx1"/>
+          </a:fontRef>
+        </p:style>
+      </p:cxnSp>
+      <p:cxnSp>
+        <p:nvCxnSpPr>
+          <p:cNvPr id="29" name="Elbow Connector 159">
+            <a:extLst>
+              <a:ext uri="{FF2B5EF4-FFF2-40B4-BE49-F238E27FC236}">
+                <a16:creationId xmlns:a16="http://schemas.microsoft.com/office/drawing/2014/main" id="{E7152AC5-BFFB-44A2-A401-5D6B5C47D429}"/>
+              </a:ext>
+            </a:extLst>
+          </p:cNvPr>
+          <p:cNvCxnSpPr>
+            <a:stCxn id="19" idx="0"/>
+          </p:cNvCxnSpPr>
+          <p:nvPr/>
+        </p:nvCxnSpPr>
+        <p:spPr>
+          <a:xfrm rot="16200000" flipV="1">
+            <a:off x="2880014" y="2729120"/>
+            <a:ext cx="330019" cy="1151067"/>
+          </a:xfrm>
+          <a:prstGeom prst="bentConnector2">
+            <a:avLst/>
+          </a:prstGeom>
+          <a:ln w="6350">
+            <a:solidFill>
+              <a:schemeClr val="tx1"/>
+            </a:solidFill>
+            <a:prstDash val="sysDot"/>
+            <a:tailEnd type="arrow" w="sm" len="sm"/>
+          </a:ln>
+        </p:spPr>
+        <p:style>
+          <a:lnRef idx="1">
+            <a:schemeClr val="accent1"/>
+          </a:lnRef>
+          <a:fillRef idx="0">
+            <a:schemeClr val="accent1"/>
+          </a:fillRef>
+          <a:effectRef idx="0">
+            <a:schemeClr val="accent1"/>
+          </a:effectRef>
+          <a:fontRef idx="minor">
+            <a:schemeClr val="tx1"/>
+          </a:fontRef>
+        </p:style>
+      </p:cxnSp>
+      <p:cxnSp>
+        <p:nvCxnSpPr>
+          <p:cNvPr id="30" name="Straight Arrow Connector 29">
+            <a:extLst>
+              <a:ext uri="{FF2B5EF4-FFF2-40B4-BE49-F238E27FC236}">
+                <a16:creationId xmlns:a16="http://schemas.microsoft.com/office/drawing/2014/main" id="{F360A038-9E46-44BB-8BB2-2B865AFB3344}"/>
+              </a:ext>
+            </a:extLst>
+          </p:cNvPr>
+          <p:cNvCxnSpPr/>
+          <p:nvPr/>
+        </p:nvCxnSpPr>
+        <p:spPr>
+          <a:xfrm flipH="1" flipV="1">
+            <a:off x="2466663" y="3276233"/>
+            <a:ext cx="768096" cy="0"/>
+          </a:xfrm>
+          <a:prstGeom prst="straightConnector1">
+            <a:avLst/>
+          </a:prstGeom>
+          <a:ln w="6350">
+            <a:solidFill>
+              <a:schemeClr val="tx1"/>
+            </a:solidFill>
+            <a:prstDash val="sysDot"/>
+            <a:tailEnd type="arrow" w="sm" len="sm"/>
+          </a:ln>
+        </p:spPr>
+        <p:style>
+          <a:lnRef idx="1">
+            <a:schemeClr val="accent1"/>
+          </a:lnRef>
+          <a:fillRef idx="0">
+            <a:schemeClr val="accent1"/>
+          </a:fillRef>
+          <a:effectRef idx="0">
+            <a:schemeClr val="accent1"/>
+          </a:effectRef>
+          <a:fontRef idx="minor">
+            <a:schemeClr val="tx1"/>
+          </a:fontRef>
+        </p:style>
+      </p:cxnSp>
+      <p:sp>
+        <p:nvSpPr>
+          <p:cNvPr id="31" name="TextBox 30">
+            <a:extLst>
+              <a:ext uri="{FF2B5EF4-FFF2-40B4-BE49-F238E27FC236}">
+                <a16:creationId xmlns:a16="http://schemas.microsoft.com/office/drawing/2014/main" id="{CF509C40-D393-4AA1-952F-B1B538D31C8C}"/>
+              </a:ext>
+            </a:extLst>
+          </p:cNvPr>
+          <p:cNvSpPr txBox="1"/>
+          <p:nvPr/>
+        </p:nvSpPr>
+        <p:spPr>
+          <a:xfrm>
+            <a:off x="4987567" y="2459139"/>
+            <a:ext cx="198772" cy="215444"/>
+          </a:xfrm>
+          <a:prstGeom prst="rect">
+            <a:avLst/>
+          </a:prstGeom>
+          <a:noFill/>
+        </p:spPr>
+        <p:txBody>
+          <a:bodyPr wrap="none" lIns="0" rIns="0" rtlCol="0">
+            <a:spAutoFit/>
+          </a:bodyPr>
+          <a:lstStyle/>
+          <a:p>
+            <a:r>
+              <a:rPr lang="en-US" altLang="zh-CN" sz="800" dirty="0"/>
+              <a:t>Start</a:t>
+            </a:r>
+            <a:endParaRPr lang="zh-CN" altLang="en-US" sz="800" dirty="0"/>
+          </a:p>
+        </p:txBody>
+      </p:sp>
+      <p:sp>
+        <p:nvSpPr>
+          <p:cNvPr id="32" name="Right Brace 31">
+            <a:extLst>
+              <a:ext uri="{FF2B5EF4-FFF2-40B4-BE49-F238E27FC236}">
+                <a16:creationId xmlns:a16="http://schemas.microsoft.com/office/drawing/2014/main" id="{2A4F11B8-896D-4D98-B697-EECBFD8A8368}"/>
+              </a:ext>
+            </a:extLst>
+          </p:cNvPr>
+          <p:cNvSpPr/>
+          <p:nvPr/>
+        </p:nvSpPr>
+        <p:spPr>
+          <a:xfrm rot="-5400000">
+            <a:off x="4598683" y="2841229"/>
+            <a:ext cx="45719" cy="128016"/>
+          </a:xfrm>
+          <a:prstGeom prst="rightBrace">
+            <a:avLst>
+              <a:gd name="adj1" fmla="val 147059"/>
+              <a:gd name="adj2" fmla="val 50000"/>
+            </a:avLst>
+          </a:prstGeom>
+          <a:ln w="6350">
+            <a:solidFill>
+              <a:schemeClr val="tx1"/>
+            </a:solidFill>
+          </a:ln>
+          <a:scene3d>
+            <a:camera prst="orthographicFront">
+              <a:rot lat="0" lon="0" rev="16200000"/>
+            </a:camera>
+            <a:lightRig rig="threePt" dir="t"/>
+          </a:scene3d>
+        </p:spPr>
+        <p:style>
+          <a:lnRef idx="1">
+            <a:schemeClr val="accent1"/>
+          </a:lnRef>
+          <a:fillRef idx="0">
+            <a:schemeClr val="accent1"/>
+          </a:fillRef>
+          <a:effectRef idx="0">
+            <a:schemeClr val="accent1"/>
+          </a:effectRef>
+          <a:fontRef idx="minor">
+            <a:schemeClr val="tx1"/>
+          </a:fontRef>
+        </p:style>
+        <p:txBody>
+          <a:bodyPr rtlCol="0" anchor="ctr"/>
+          <a:lstStyle/>
+          <a:p>
+            <a:pPr algn="ctr"/>
+            <a:endParaRPr lang="en-US"/>
+          </a:p>
+        </p:txBody>
+      </p:sp>
+      <p:sp>
+        <p:nvSpPr>
+          <p:cNvPr id="33" name="Right Brace 32">
+            <a:extLst>
+              <a:ext uri="{FF2B5EF4-FFF2-40B4-BE49-F238E27FC236}">
+                <a16:creationId xmlns:a16="http://schemas.microsoft.com/office/drawing/2014/main" id="{F3CF90A6-9C41-40AC-BF7B-942377B3091A}"/>
+              </a:ext>
+            </a:extLst>
+          </p:cNvPr>
+          <p:cNvSpPr/>
+          <p:nvPr/>
+        </p:nvSpPr>
+        <p:spPr>
+          <a:xfrm rot="8040000">
+            <a:off x="3235158" y="3184386"/>
+            <a:ext cx="45719" cy="228600"/>
+          </a:xfrm>
+          <a:prstGeom prst="rightBrace">
+            <a:avLst>
+              <a:gd name="adj1" fmla="val 147059"/>
+              <a:gd name="adj2" fmla="val 50000"/>
+            </a:avLst>
+          </a:prstGeom>
+          <a:ln w="6350">
+            <a:solidFill>
+              <a:schemeClr val="tx1"/>
+            </a:solidFill>
+          </a:ln>
+          <a:scene3d>
+            <a:camera prst="orthographicFront">
+              <a:rot lat="0" lon="0" rev="16200000"/>
+            </a:camera>
+            <a:lightRig rig="threePt" dir="t"/>
+          </a:scene3d>
+        </p:spPr>
+        <p:style>
+          <a:lnRef idx="1">
+            <a:schemeClr val="accent1"/>
+          </a:lnRef>
+          <a:fillRef idx="0">
+            <a:schemeClr val="accent1"/>
+          </a:fillRef>
+          <a:effectRef idx="0">
+            <a:schemeClr val="accent1"/>
+          </a:effectRef>
+          <a:fontRef idx="minor">
+            <a:schemeClr val="tx1"/>
+          </a:fontRef>
+        </p:style>
+        <p:txBody>
+          <a:bodyPr rtlCol="0" anchor="ctr"/>
+          <a:lstStyle/>
+          <a:p>
+            <a:pPr algn="ctr"/>
+            <a:endParaRPr lang="en-US"/>
+          </a:p>
+        </p:txBody>
+      </p:sp>
+      <p:cxnSp>
+        <p:nvCxnSpPr>
+          <p:cNvPr id="34" name="直接连接符 51">
+            <a:extLst>
+              <a:ext uri="{FF2B5EF4-FFF2-40B4-BE49-F238E27FC236}">
+                <a16:creationId xmlns:a16="http://schemas.microsoft.com/office/drawing/2014/main" id="{8E2A7B04-DC31-4AAE-9B9D-F405EA3A70F7}"/>
+              </a:ext>
+            </a:extLst>
+          </p:cNvPr>
+          <p:cNvCxnSpPr/>
+          <p:nvPr/>
+        </p:nvCxnSpPr>
+        <p:spPr>
+          <a:xfrm>
+            <a:off x="3350419" y="3228975"/>
+            <a:ext cx="263619" cy="249691"/>
+          </a:xfrm>
+          <a:prstGeom prst="line">
+            <a:avLst/>
+          </a:prstGeom>
+          <a:ln w="6350">
+            <a:solidFill>
+              <a:schemeClr val="tx1"/>
+            </a:solidFill>
+            <a:prstDash val="dash"/>
+          </a:ln>
+        </p:spPr>
+        <p:style>
+          <a:lnRef idx="1">
+            <a:schemeClr val="accent1"/>
+          </a:lnRef>
+          <a:fillRef idx="0">
+            <a:schemeClr val="accent1"/>
+          </a:fillRef>
+          <a:effectRef idx="0">
+            <a:schemeClr val="accent1"/>
+          </a:effectRef>
+          <a:fontRef idx="minor">
+            <a:schemeClr val="tx1"/>
+          </a:fontRef>
+        </p:style>
+      </p:cxnSp>
+      <p:sp>
+        <p:nvSpPr>
+          <p:cNvPr id="35" name="Oval 34">
+            <a:extLst>
+              <a:ext uri="{FF2B5EF4-FFF2-40B4-BE49-F238E27FC236}">
+                <a16:creationId xmlns:a16="http://schemas.microsoft.com/office/drawing/2014/main" id="{6C3C55B6-CA85-4B4D-9CB3-0692CA9E13F3}"/>
+              </a:ext>
+            </a:extLst>
+          </p:cNvPr>
+          <p:cNvSpPr>
+            <a:spLocks noChangeAspect="1"/>
+          </p:cNvSpPr>
+          <p:nvPr/>
+        </p:nvSpPr>
+        <p:spPr>
+          <a:xfrm>
+            <a:off x="2996420" y="3382410"/>
+            <a:ext cx="731520" cy="731520"/>
+          </a:xfrm>
+          <a:prstGeom prst="ellipse">
+            <a:avLst/>
+          </a:prstGeom>
+          <a:noFill/>
+          <a:ln w="12700">
+            <a:solidFill>
+              <a:schemeClr val="tx1"/>
+            </a:solidFill>
+          </a:ln>
+        </p:spPr>
+        <p:style>
+          <a:lnRef idx="2">
+            <a:schemeClr val="accent1">
+              <a:shade val="50000"/>
+            </a:schemeClr>
+          </a:lnRef>
+          <a:fillRef idx="1">
+            <a:schemeClr val="accent1"/>
+          </a:fillRef>
+          <a:effectRef idx="0">
+            <a:schemeClr val="accent1"/>
+          </a:effectRef>
+          <a:fontRef idx="minor">
+            <a:schemeClr val="lt1"/>
+          </a:fontRef>
+        </p:style>
+        <p:txBody>
+          <a:bodyPr rtlCol="0" anchor="ctr"/>
+          <a:lstStyle/>
+          <a:p>
+            <a:pPr algn="ctr"/>
+            <a:endParaRPr lang="en-US"/>
+          </a:p>
+        </p:txBody>
+      </p:sp>
+      <p:sp>
+        <p:nvSpPr>
+          <p:cNvPr id="36" name="椭圆 54">
+            <a:extLst>
+              <a:ext uri="{FF2B5EF4-FFF2-40B4-BE49-F238E27FC236}">
+                <a16:creationId xmlns:a16="http://schemas.microsoft.com/office/drawing/2014/main" id="{8C7A4C8E-F809-471B-9F56-9241B388E3DA}"/>
+              </a:ext>
+            </a:extLst>
+          </p:cNvPr>
+          <p:cNvSpPr>
+            <a:spLocks noChangeAspect="1"/>
+          </p:cNvSpPr>
+          <p:nvPr/>
+        </p:nvSpPr>
+        <p:spPr>
+          <a:xfrm>
+            <a:off x="3348464" y="3734454"/>
+            <a:ext cx="27432" cy="27432"/>
+          </a:xfrm>
+          <a:prstGeom prst="ellipse">
+            <a:avLst/>
+          </a:prstGeom>
+          <a:solidFill>
+            <a:schemeClr val="tx1"/>
+          </a:solidFill>
+          <a:ln>
+            <a:noFill/>
+          </a:ln>
+        </p:spPr>
+        <p:style>
+          <a:lnRef idx="2">
+            <a:schemeClr val="accent1">
+              <a:shade val="50000"/>
+            </a:schemeClr>
+          </a:lnRef>
+          <a:fillRef idx="1">
+            <a:schemeClr val="accent1"/>
+          </a:fillRef>
+          <a:effectRef idx="0">
+            <a:schemeClr val="accent1"/>
+          </a:effectRef>
+          <a:fontRef idx="minor">
+            <a:schemeClr val="lt1"/>
+          </a:fontRef>
+        </p:style>
+        <p:txBody>
+          <a:bodyPr rtlCol="0" anchor="ctr"/>
+          <a:lstStyle/>
+          <a:p>
+            <a:pPr algn="ctr"/>
+            <a:endParaRPr lang="zh-CN" altLang="en-US"/>
+          </a:p>
+        </p:txBody>
+      </p:sp>
+      <p:sp>
+        <p:nvSpPr>
+          <p:cNvPr id="37" name="Oval 36">
+            <a:extLst>
+              <a:ext uri="{FF2B5EF4-FFF2-40B4-BE49-F238E27FC236}">
+                <a16:creationId xmlns:a16="http://schemas.microsoft.com/office/drawing/2014/main" id="{7582BD40-04DE-424B-95E2-94E472939584}"/>
+              </a:ext>
+            </a:extLst>
+          </p:cNvPr>
+          <p:cNvSpPr>
+            <a:spLocks noChangeAspect="1"/>
+          </p:cNvSpPr>
+          <p:nvPr/>
+        </p:nvSpPr>
+        <p:spPr>
+          <a:xfrm>
+            <a:off x="3704793" y="2463453"/>
+            <a:ext cx="502920" cy="502920"/>
+          </a:xfrm>
+          <a:prstGeom prst="ellipse">
+            <a:avLst/>
+          </a:prstGeom>
+          <a:noFill/>
+          <a:ln w="12700">
+            <a:solidFill>
+              <a:schemeClr val="tx1"/>
+            </a:solidFill>
+          </a:ln>
+        </p:spPr>
+        <p:style>
+          <a:lnRef idx="2">
+            <a:schemeClr val="accent1">
+              <a:shade val="50000"/>
+            </a:schemeClr>
+          </a:lnRef>
+          <a:fillRef idx="1">
+            <a:schemeClr val="accent1"/>
+          </a:fillRef>
+          <a:effectRef idx="0">
+            <a:schemeClr val="accent1"/>
+          </a:effectRef>
+          <a:fontRef idx="minor">
+            <a:schemeClr val="lt1"/>
+          </a:fontRef>
+        </p:style>
+        <p:txBody>
+          <a:bodyPr rtlCol="0" anchor="ctr"/>
+          <a:lstStyle/>
+          <a:p>
+            <a:pPr algn="ctr"/>
+            <a:endParaRPr lang="en-US"/>
+          </a:p>
+        </p:txBody>
+      </p:sp>
+      <p:sp>
+        <p:nvSpPr>
+          <p:cNvPr id="38" name="椭圆 54">
+            <a:extLst>
+              <a:ext uri="{FF2B5EF4-FFF2-40B4-BE49-F238E27FC236}">
+                <a16:creationId xmlns:a16="http://schemas.microsoft.com/office/drawing/2014/main" id="{5D10EFFE-4626-48D9-A671-820FFFB6C029}"/>
+              </a:ext>
+            </a:extLst>
+          </p:cNvPr>
+          <p:cNvSpPr>
+            <a:spLocks noChangeAspect="1"/>
+          </p:cNvSpPr>
+          <p:nvPr/>
+        </p:nvSpPr>
+        <p:spPr>
+          <a:xfrm>
+            <a:off x="3942537" y="2701197"/>
+            <a:ext cx="27432" cy="27432"/>
+          </a:xfrm>
+          <a:prstGeom prst="ellipse">
+            <a:avLst/>
+          </a:prstGeom>
+          <a:solidFill>
+            <a:schemeClr val="tx1"/>
+          </a:solidFill>
+          <a:ln>
+            <a:noFill/>
+          </a:ln>
+        </p:spPr>
+        <p:style>
+          <a:lnRef idx="2">
+            <a:schemeClr val="accent1">
+              <a:shade val="50000"/>
+            </a:schemeClr>
+          </a:lnRef>
+          <a:fillRef idx="1">
+            <a:schemeClr val="accent1"/>
+          </a:fillRef>
+          <a:effectRef idx="0">
+            <a:schemeClr val="accent1"/>
+          </a:effectRef>
+          <a:fontRef idx="minor">
+            <a:schemeClr val="lt1"/>
+          </a:fontRef>
+        </p:style>
+        <p:txBody>
+          <a:bodyPr rtlCol="0" anchor="ctr"/>
+          <a:lstStyle/>
+          <a:p>
+            <a:pPr algn="ctr"/>
+            <a:endParaRPr lang="zh-CN" altLang="en-US"/>
+          </a:p>
+        </p:txBody>
+      </p:sp>
+      <p:cxnSp>
+        <p:nvCxnSpPr>
+          <p:cNvPr id="39" name="Straight Arrow Connector 38">
+            <a:extLst>
+              <a:ext uri="{FF2B5EF4-FFF2-40B4-BE49-F238E27FC236}">
+                <a16:creationId xmlns:a16="http://schemas.microsoft.com/office/drawing/2014/main" id="{7983FBCE-C394-4687-A30E-5B8110B77CDB}"/>
+              </a:ext>
+            </a:extLst>
+          </p:cNvPr>
+          <p:cNvCxnSpPr/>
+          <p:nvPr/>
+        </p:nvCxnSpPr>
+        <p:spPr>
+          <a:xfrm flipH="1">
+            <a:off x="2471872" y="3643313"/>
+            <a:ext cx="973797" cy="1046"/>
+          </a:xfrm>
+          <a:prstGeom prst="straightConnector1">
+            <a:avLst/>
+          </a:prstGeom>
+          <a:ln w="6350">
+            <a:solidFill>
+              <a:schemeClr val="tx1"/>
+            </a:solidFill>
+            <a:prstDash val="sysDot"/>
+            <a:tailEnd type="arrow" w="sm" len="sm"/>
+          </a:ln>
+        </p:spPr>
+        <p:style>
+          <a:lnRef idx="1">
+            <a:schemeClr val="accent1"/>
+          </a:lnRef>
+          <a:fillRef idx="0">
+            <a:schemeClr val="accent1"/>
+          </a:fillRef>
+          <a:effectRef idx="0">
+            <a:schemeClr val="accent1"/>
+          </a:effectRef>
+          <a:fontRef idx="minor">
+            <a:schemeClr val="tx1"/>
+          </a:fontRef>
+        </p:style>
+      </p:cxnSp>
+      <p:cxnSp>
+        <p:nvCxnSpPr>
+          <p:cNvPr id="40" name="直接连接符 51">
+            <a:extLst>
+              <a:ext uri="{FF2B5EF4-FFF2-40B4-BE49-F238E27FC236}">
+                <a16:creationId xmlns:a16="http://schemas.microsoft.com/office/drawing/2014/main" id="{1407682C-72E5-47E7-887B-527CB13E069E}"/>
+              </a:ext>
+            </a:extLst>
+          </p:cNvPr>
+          <p:cNvCxnSpPr/>
+          <p:nvPr/>
+        </p:nvCxnSpPr>
+        <p:spPr>
+          <a:xfrm>
+            <a:off x="3188494" y="3395663"/>
+            <a:ext cx="263619" cy="249691"/>
+          </a:xfrm>
+          <a:prstGeom prst="line">
+            <a:avLst/>
+          </a:prstGeom>
+          <a:ln w="6350">
+            <a:solidFill>
+              <a:schemeClr val="tx1"/>
+            </a:solidFill>
+            <a:prstDash val="dash"/>
+          </a:ln>
+        </p:spPr>
+        <p:style>
+          <a:lnRef idx="1">
+            <a:schemeClr val="accent1"/>
+          </a:lnRef>
+          <a:fillRef idx="0">
+            <a:schemeClr val="accent1"/>
+          </a:fillRef>
+          <a:effectRef idx="0">
+            <a:schemeClr val="accent1"/>
+          </a:effectRef>
+          <a:fontRef idx="minor">
+            <a:schemeClr val="tx1"/>
+          </a:fontRef>
+        </p:style>
+      </p:cxnSp>
+      <mc:AlternateContent xmlns:mc="http://schemas.openxmlformats.org/markup-compatibility/2006">
+        <mc:Choice xmlns:a14="http://schemas.microsoft.com/office/drawing/2010/main" Requires="a14">
+          <p:sp>
+            <p:nvSpPr>
+              <p:cNvPr id="41" name="TextBox 40">
+                <a:extLst>
+                  <a:ext uri="{FF2B5EF4-FFF2-40B4-BE49-F238E27FC236}">
+                    <a16:creationId xmlns:a16="http://schemas.microsoft.com/office/drawing/2014/main" id="{6B281A28-F58A-48FF-B09E-4CC8DF693622}"/>
+                  </a:ext>
+                </a:extLst>
+              </p:cNvPr>
+              <p:cNvSpPr txBox="1"/>
+              <p:nvPr/>
+            </p:nvSpPr>
+            <p:spPr>
+              <a:xfrm>
+                <a:off x="2819400" y="4445951"/>
+                <a:ext cx="2259849" cy="584775"/>
+              </a:xfrm>
+              <a:prstGeom prst="rect">
+                <a:avLst/>
+              </a:prstGeom>
+              <a:noFill/>
+            </p:spPr>
+            <p:txBody>
+              <a:bodyPr wrap="none" lIns="0" rIns="0" rtlCol="0">
+                <a:spAutoFit/>
+              </a:bodyPr>
+              <a:lstStyle/>
+              <a:p>
+                <a:pPr/>
+                <a14:m>
+                  <m:oMathPara xmlns:m="http://schemas.openxmlformats.org/officeDocument/2006/math">
+                    <m:oMathParaPr>
+                      <m:jc m:val="left"/>
+                    </m:oMathParaPr>
+                    <m:oMath xmlns:m="http://schemas.openxmlformats.org/officeDocument/2006/math">
+                      <m:r>
+                        <m:rPr>
+                          <m:sty m:val="p"/>
+                        </m:rPr>
+                        <a:rPr lang="en-US" altLang="zh-CN" sz="3200" b="0" i="0" smtClean="0">
+                          <a:latin typeface="Cambria Math" panose="02040503050406030204" pitchFamily="18" charset="0"/>
+                        </a:rPr>
+                        <m:t>Figure</m:t>
+                      </m:r>
+                      <m:r>
+                        <a:rPr lang="en-US" altLang="zh-CN" sz="3200" b="0" i="0" smtClean="0">
+                          <a:latin typeface="Cambria Math" panose="02040503050406030204" pitchFamily="18" charset="0"/>
+                        </a:rPr>
+                        <m:t> 9−3</m:t>
+                      </m:r>
+                    </m:oMath>
+                  </m:oMathPara>
+                </a14:m>
+                <a:endParaRPr sz="3200" dirty="0"/>
+              </a:p>
+            </p:txBody>
+          </p:sp>
+        </mc:Choice>
+        <mc:Fallback>
+          <p:sp>
+            <p:nvSpPr>
+              <p:cNvPr id="41" name="TextBox 40">
+                <a:extLst>
+                  <a:ext uri="{FF2B5EF4-FFF2-40B4-BE49-F238E27FC236}">
+                    <a16:creationId xmlns:a16="http://schemas.microsoft.com/office/drawing/2014/main" id="{6B281A28-F58A-48FF-B09E-4CC8DF693622}"/>
+                  </a:ext>
+                </a:extLst>
+              </p:cNvPr>
+              <p:cNvSpPr txBox="1">
+                <a:spLocks noRot="1" noChangeAspect="1" noMove="1" noResize="1" noEditPoints="1" noAdjustHandles="1" noChangeArrowheads="1" noChangeShapeType="1" noTextEdit="1"/>
+              </p:cNvSpPr>
+              <p:nvPr/>
+            </p:nvSpPr>
+            <p:spPr>
+              <a:xfrm>
+                <a:off x="2819400" y="4445951"/>
+                <a:ext cx="2259849" cy="584775"/>
+              </a:xfrm>
+              <a:prstGeom prst="rect">
+                <a:avLst/>
+              </a:prstGeom>
+              <a:blipFill>
+                <a:blip r:embed="rId2"/>
+                <a:stretch>
+                  <a:fillRect/>
+                </a:stretch>
+              </a:blipFill>
+            </p:spPr>
+            <p:txBody>
+              <a:bodyPr/>
+              <a:lstStyle/>
+              <a:p>
+                <a:r>
+                  <a:rPr lang="en-US">
+                    <a:noFill/>
+                  </a:rPr>
+                  <a:t> </a:t>
+                </a:r>
+              </a:p>
+            </p:txBody>
+          </p:sp>
+        </mc:Fallback>
+      </mc:AlternateContent>
+    </p:spTree>
+    <p:extLst>
+      <p:ext uri="{BB962C8B-B14F-4D97-AF65-F5344CB8AC3E}">
+        <p14:creationId xmlns:p14="http://schemas.microsoft.com/office/powerpoint/2010/main" val="2859792798"/>
       </p:ext>
     </p:extLst>
   </p:cSld>

</xml_diff>

<commit_message>
Comments and figure update
</commit_message>
<xml_diff>
--- a/Word/Diagrams/chapter9/chap 9.figures.pptx
+++ b/Word/Diagrams/chapter9/chap 9.figures.pptx
@@ -5,11 +5,12 @@
     <p:sldMasterId id="2147483660" r:id="rId1"/>
   </p:sldMasterIdLst>
   <p:notesMasterIdLst>
-    <p:notesMasterId r:id="rId4"/>
+    <p:notesMasterId r:id="rId5"/>
   </p:notesMasterIdLst>
   <p:sldIdLst>
-    <p:sldId id="304" r:id="rId2"/>
-    <p:sldId id="305" r:id="rId3"/>
+    <p:sldId id="306" r:id="rId2"/>
+    <p:sldId id="304" r:id="rId3"/>
+    <p:sldId id="305" r:id="rId4"/>
   </p:sldIdLst>
   <p:sldSz cx="9144000" cy="6858000" type="screen4x3"/>
   <p:notesSz cx="6858000" cy="9144000"/>
@@ -3540,6 +3541,1376 @@
 </file>
 
 <file path=ppt/slides/slide1.xml><?xml version="1.0" encoding="utf-8"?>
+<p:sld xmlns:a="http://schemas.openxmlformats.org/drawingml/2006/main" xmlns:r="http://schemas.openxmlformats.org/officeDocument/2006/relationships" xmlns:p="http://schemas.openxmlformats.org/presentationml/2006/main">
+  <p:cSld>
+    <p:spTree>
+      <p:nvGrpSpPr>
+        <p:cNvPr id="1" name=""/>
+        <p:cNvGrpSpPr/>
+        <p:nvPr/>
+      </p:nvGrpSpPr>
+      <p:grpSpPr>
+        <a:xfrm>
+          <a:off x="0" y="0"/>
+          <a:ext cx="0" cy="0"/>
+          <a:chOff x="0" y="0"/>
+          <a:chExt cx="0" cy="0"/>
+        </a:xfrm>
+      </p:grpSpPr>
+      <p:sp>
+        <p:nvSpPr>
+          <p:cNvPr id="2" name="Rectangle 1">
+            <a:extLst>
+              <a:ext uri="{FF2B5EF4-FFF2-40B4-BE49-F238E27FC236}">
+                <a16:creationId xmlns:a16="http://schemas.microsoft.com/office/drawing/2014/main" id="{2CBB8EEB-1A09-4615-B61E-F862E7766A21}"/>
+              </a:ext>
+            </a:extLst>
+          </p:cNvPr>
+          <p:cNvSpPr/>
+          <p:nvPr/>
+        </p:nvSpPr>
+        <p:spPr>
+          <a:xfrm>
+            <a:off x="1676400" y="1974675"/>
+            <a:ext cx="4267200" cy="2324099"/>
+          </a:xfrm>
+          <a:prstGeom prst="rect">
+            <a:avLst/>
+          </a:prstGeom>
+          <a:noFill/>
+          <a:ln w="9525">
+            <a:prstDash val="sysDash"/>
+          </a:ln>
+        </p:spPr>
+        <p:style>
+          <a:lnRef idx="2">
+            <a:schemeClr val="accent1">
+              <a:shade val="50000"/>
+            </a:schemeClr>
+          </a:lnRef>
+          <a:fillRef idx="1">
+            <a:schemeClr val="accent1"/>
+          </a:fillRef>
+          <a:effectRef idx="0">
+            <a:schemeClr val="accent1"/>
+          </a:effectRef>
+          <a:fontRef idx="minor">
+            <a:schemeClr val="lt1"/>
+          </a:fontRef>
+        </p:style>
+        <p:txBody>
+          <a:bodyPr rtlCol="0" anchor="ctr"/>
+          <a:lstStyle/>
+          <a:p>
+            <a:pPr algn="ctr"/>
+            <a:endParaRPr lang="en-US" sz="800"/>
+          </a:p>
+        </p:txBody>
+      </p:sp>
+      <p:sp>
+        <p:nvSpPr>
+          <p:cNvPr id="3" name="TextBox 2">
+            <a:extLst>
+              <a:ext uri="{FF2B5EF4-FFF2-40B4-BE49-F238E27FC236}">
+                <a16:creationId xmlns:a16="http://schemas.microsoft.com/office/drawing/2014/main" id="{755CC65D-C0A1-415E-9A65-B89F76673A35}"/>
+              </a:ext>
+            </a:extLst>
+          </p:cNvPr>
+          <p:cNvSpPr txBox="1"/>
+          <p:nvPr/>
+        </p:nvSpPr>
+        <p:spPr>
+          <a:xfrm>
+            <a:off x="2953968" y="4724400"/>
+            <a:ext cx="2125158" cy="338554"/>
+          </a:xfrm>
+          <a:prstGeom prst="rect">
+            <a:avLst/>
+          </a:prstGeom>
+          <a:noFill/>
+          <a:ln>
+            <a:noFill/>
+          </a:ln>
+        </p:spPr>
+        <p:txBody>
+          <a:bodyPr wrap="square" lIns="0" rIns="0" rtlCol="0">
+            <a:spAutoFit/>
+          </a:bodyPr>
+          <a:lstStyle/>
+          <a:p>
+            <a:r>
+              <a:rPr lang="en-US" altLang="zh-TW" sz="1600" dirty="0"/>
+              <a:t>Figure 9-2</a:t>
+            </a:r>
+          </a:p>
+        </p:txBody>
+      </p:sp>
+      <p:sp>
+        <p:nvSpPr>
+          <p:cNvPr id="4" name="同心圆 36">
+            <a:extLst>
+              <a:ext uri="{FF2B5EF4-FFF2-40B4-BE49-F238E27FC236}">
+                <a16:creationId xmlns:a16="http://schemas.microsoft.com/office/drawing/2014/main" id="{D53CB4F1-27E8-46E9-8B7D-180BFE7DE5CF}"/>
+              </a:ext>
+            </a:extLst>
+          </p:cNvPr>
+          <p:cNvSpPr/>
+          <p:nvPr/>
+        </p:nvSpPr>
+        <p:spPr>
+          <a:xfrm>
+            <a:off x="3744366" y="3018541"/>
+            <a:ext cx="504000" cy="503854"/>
+          </a:xfrm>
+          <a:prstGeom prst="donut">
+            <a:avLst>
+              <a:gd name="adj" fmla="val 48659"/>
+            </a:avLst>
+          </a:prstGeom>
+          <a:solidFill>
+            <a:schemeClr val="bg1"/>
+          </a:solidFill>
+          <a:ln w="12700">
+            <a:solidFill>
+              <a:schemeClr val="tx1"/>
+            </a:solidFill>
+          </a:ln>
+        </p:spPr>
+        <p:style>
+          <a:lnRef idx="2">
+            <a:schemeClr val="accent1">
+              <a:shade val="50000"/>
+            </a:schemeClr>
+          </a:lnRef>
+          <a:fillRef idx="1">
+            <a:schemeClr val="accent1"/>
+          </a:fillRef>
+          <a:effectRef idx="0">
+            <a:schemeClr val="accent1"/>
+          </a:effectRef>
+          <a:fontRef idx="minor">
+            <a:schemeClr val="lt1"/>
+          </a:fontRef>
+        </p:style>
+        <p:txBody>
+          <a:bodyPr rtlCol="0" anchor="ctr"/>
+          <a:lstStyle/>
+          <a:p>
+            <a:pPr algn="ctr"/>
+            <a:endParaRPr lang="zh-CN" altLang="en-US" dirty="0">
+              <a:solidFill>
+                <a:schemeClr val="tx1"/>
+              </a:solidFill>
+            </a:endParaRPr>
+          </a:p>
+        </p:txBody>
+      </p:sp>
+      <p:sp>
+        <p:nvSpPr>
+          <p:cNvPr id="5" name="同心圆 8">
+            <a:extLst>
+              <a:ext uri="{FF2B5EF4-FFF2-40B4-BE49-F238E27FC236}">
+                <a16:creationId xmlns:a16="http://schemas.microsoft.com/office/drawing/2014/main" id="{4C190744-BB0E-4D23-8180-FBF93DBBEB7F}"/>
+              </a:ext>
+            </a:extLst>
+          </p:cNvPr>
+          <p:cNvSpPr/>
+          <p:nvPr/>
+        </p:nvSpPr>
+        <p:spPr>
+          <a:xfrm>
+            <a:off x="2322262" y="3018541"/>
+            <a:ext cx="504000" cy="503854"/>
+          </a:xfrm>
+          <a:prstGeom prst="donut">
+            <a:avLst>
+              <a:gd name="adj" fmla="val 48659"/>
+            </a:avLst>
+          </a:prstGeom>
+          <a:solidFill>
+            <a:schemeClr val="bg1"/>
+          </a:solidFill>
+          <a:ln w="12700">
+            <a:solidFill>
+              <a:schemeClr val="tx1"/>
+            </a:solidFill>
+          </a:ln>
+        </p:spPr>
+        <p:style>
+          <a:lnRef idx="2">
+            <a:schemeClr val="accent1">
+              <a:shade val="50000"/>
+            </a:schemeClr>
+          </a:lnRef>
+          <a:fillRef idx="1">
+            <a:schemeClr val="accent1"/>
+          </a:fillRef>
+          <a:effectRef idx="0">
+            <a:schemeClr val="accent1"/>
+          </a:effectRef>
+          <a:fontRef idx="minor">
+            <a:schemeClr val="lt1"/>
+          </a:fontRef>
+        </p:style>
+        <p:txBody>
+          <a:bodyPr rtlCol="0" anchor="ctr"/>
+          <a:lstStyle/>
+          <a:p>
+            <a:pPr algn="ctr"/>
+            <a:endParaRPr lang="zh-CN" altLang="en-US" dirty="0">
+              <a:solidFill>
+                <a:schemeClr val="tx1"/>
+              </a:solidFill>
+            </a:endParaRPr>
+          </a:p>
+        </p:txBody>
+      </p:sp>
+      <p:sp>
+        <p:nvSpPr>
+          <p:cNvPr id="6" name="同心圆 20">
+            <a:extLst>
+              <a:ext uri="{FF2B5EF4-FFF2-40B4-BE49-F238E27FC236}">
+                <a16:creationId xmlns:a16="http://schemas.microsoft.com/office/drawing/2014/main" id="{B6FC61DC-489F-4B8F-8097-AF0AB9EC2061}"/>
+              </a:ext>
+            </a:extLst>
+          </p:cNvPr>
+          <p:cNvSpPr/>
+          <p:nvPr/>
+        </p:nvSpPr>
+        <p:spPr>
+          <a:xfrm>
+            <a:off x="2978662" y="3018541"/>
+            <a:ext cx="504000" cy="503854"/>
+          </a:xfrm>
+          <a:prstGeom prst="donut">
+            <a:avLst>
+              <a:gd name="adj" fmla="val 48659"/>
+            </a:avLst>
+          </a:prstGeom>
+          <a:solidFill>
+            <a:schemeClr val="bg1"/>
+          </a:solidFill>
+          <a:ln w="12700">
+            <a:solidFill>
+              <a:schemeClr val="tx1"/>
+            </a:solidFill>
+          </a:ln>
+        </p:spPr>
+        <p:style>
+          <a:lnRef idx="2">
+            <a:schemeClr val="accent1">
+              <a:shade val="50000"/>
+            </a:schemeClr>
+          </a:lnRef>
+          <a:fillRef idx="1">
+            <a:schemeClr val="accent1"/>
+          </a:fillRef>
+          <a:effectRef idx="0">
+            <a:schemeClr val="accent1"/>
+          </a:effectRef>
+          <a:fontRef idx="minor">
+            <a:schemeClr val="lt1"/>
+          </a:fontRef>
+        </p:style>
+        <p:txBody>
+          <a:bodyPr rtlCol="0" anchor="ctr"/>
+          <a:lstStyle/>
+          <a:p>
+            <a:pPr algn="ctr"/>
+            <a:endParaRPr lang="zh-CN" altLang="en-US">
+              <a:solidFill>
+                <a:schemeClr val="tx1"/>
+              </a:solidFill>
+            </a:endParaRPr>
+          </a:p>
+        </p:txBody>
+      </p:sp>
+      <p:cxnSp>
+        <p:nvCxnSpPr>
+          <p:cNvPr id="7" name="直接箭头连接符 32">
+            <a:extLst>
+              <a:ext uri="{FF2B5EF4-FFF2-40B4-BE49-F238E27FC236}">
+                <a16:creationId xmlns:a16="http://schemas.microsoft.com/office/drawing/2014/main" id="{197B24EF-2007-4EEE-8BEC-746D74FFCC91}"/>
+              </a:ext>
+            </a:extLst>
+          </p:cNvPr>
+          <p:cNvCxnSpPr/>
+          <p:nvPr/>
+        </p:nvCxnSpPr>
+        <p:spPr>
+          <a:xfrm flipH="1" flipV="1">
+            <a:off x="2574262" y="3522395"/>
+            <a:ext cx="671626" cy="8554"/>
+          </a:xfrm>
+          <a:prstGeom prst="straightConnector1">
+            <a:avLst/>
+          </a:prstGeom>
+          <a:ln w="6350">
+            <a:solidFill>
+              <a:schemeClr val="tx1"/>
+            </a:solidFill>
+            <a:headEnd type="triangle" w="sm" len="sm"/>
+            <a:tailEnd type="triangle" w="sm" len="sm"/>
+          </a:ln>
+        </p:spPr>
+        <p:style>
+          <a:lnRef idx="1">
+            <a:schemeClr val="accent1"/>
+          </a:lnRef>
+          <a:fillRef idx="0">
+            <a:schemeClr val="accent1"/>
+          </a:fillRef>
+          <a:effectRef idx="0">
+            <a:schemeClr val="accent1"/>
+          </a:effectRef>
+          <a:fontRef idx="minor">
+            <a:schemeClr val="tx1"/>
+          </a:fontRef>
+        </p:style>
+      </p:cxnSp>
+      <p:sp>
+        <p:nvSpPr>
+          <p:cNvPr id="8" name="TextBox 7">
+            <a:extLst>
+              <a:ext uri="{FF2B5EF4-FFF2-40B4-BE49-F238E27FC236}">
+                <a16:creationId xmlns:a16="http://schemas.microsoft.com/office/drawing/2014/main" id="{5E6107DF-F3ED-45FA-98A3-9B27F0DA97AB}"/>
+              </a:ext>
+            </a:extLst>
+          </p:cNvPr>
+          <p:cNvSpPr txBox="1"/>
+          <p:nvPr/>
+        </p:nvSpPr>
+        <p:spPr>
+          <a:xfrm>
+            <a:off x="2846135" y="3490025"/>
+            <a:ext cx="152286" cy="215444"/>
+          </a:xfrm>
+          <a:prstGeom prst="rect">
+            <a:avLst/>
+          </a:prstGeom>
+          <a:noFill/>
+        </p:spPr>
+        <p:txBody>
+          <a:bodyPr wrap="none" lIns="0" rIns="0" rtlCol="0">
+            <a:spAutoFit/>
+          </a:bodyPr>
+          <a:lstStyle/>
+          <a:p>
+            <a:r>
+              <a:rPr lang="en-US" altLang="zh-CN" sz="800" dirty="0" err="1"/>
+              <a:t>dist</a:t>
+            </a:r>
+            <a:endParaRPr lang="zh-CN" altLang="en-US" sz="800" dirty="0"/>
+          </a:p>
+        </p:txBody>
+      </p:sp>
+      <p:sp>
+        <p:nvSpPr>
+          <p:cNvPr id="9" name="TextBox 8">
+            <a:extLst>
+              <a:ext uri="{FF2B5EF4-FFF2-40B4-BE49-F238E27FC236}">
+                <a16:creationId xmlns:a16="http://schemas.microsoft.com/office/drawing/2014/main" id="{EC9473ED-1420-4D00-929B-933B24DB3538}"/>
+              </a:ext>
+            </a:extLst>
+          </p:cNvPr>
+          <p:cNvSpPr txBox="1"/>
+          <p:nvPr/>
+        </p:nvSpPr>
+        <p:spPr>
+          <a:xfrm>
+            <a:off x="2393908" y="3848215"/>
+            <a:ext cx="1123706" cy="215444"/>
+          </a:xfrm>
+          <a:prstGeom prst="rect">
+            <a:avLst/>
+          </a:prstGeom>
+          <a:noFill/>
+        </p:spPr>
+        <p:txBody>
+          <a:bodyPr wrap="none" lIns="0" rIns="0" rtlCol="0">
+            <a:spAutoFit/>
+          </a:bodyPr>
+          <a:lstStyle/>
+          <a:p>
+            <a:r>
+              <a:rPr lang="en-US" altLang="zh-CN" sz="800" dirty="0"/>
+              <a:t>(a) No collision (</a:t>
+            </a:r>
+            <a:r>
+              <a:rPr lang="en-US" altLang="zh-CN" sz="800" dirty="0" err="1"/>
+              <a:t>dist</a:t>
+            </a:r>
+            <a:r>
+              <a:rPr lang="en-US" altLang="zh-CN" sz="800" dirty="0"/>
+              <a:t>&gt;</a:t>
+            </a:r>
+            <a:r>
+              <a:rPr lang="en-US" altLang="zh-CN" sz="800" dirty="0" err="1"/>
+              <a:t>rSum</a:t>
+            </a:r>
+            <a:r>
+              <a:rPr lang="en-US" altLang="zh-CN" sz="800" dirty="0"/>
+              <a:t>)</a:t>
+            </a:r>
+            <a:endParaRPr lang="zh-CN" altLang="en-US" sz="800" dirty="0"/>
+          </a:p>
+        </p:txBody>
+      </p:sp>
+      <p:sp>
+        <p:nvSpPr>
+          <p:cNvPr id="10" name="同心圆 37">
+            <a:extLst>
+              <a:ext uri="{FF2B5EF4-FFF2-40B4-BE49-F238E27FC236}">
+                <a16:creationId xmlns:a16="http://schemas.microsoft.com/office/drawing/2014/main" id="{FC239550-EA35-4214-AC96-6303ED2F5C2C}"/>
+              </a:ext>
+            </a:extLst>
+          </p:cNvPr>
+          <p:cNvSpPr/>
+          <p:nvPr/>
+        </p:nvSpPr>
+        <p:spPr>
+          <a:xfrm>
+            <a:off x="4188399" y="3018541"/>
+            <a:ext cx="504000" cy="503854"/>
+          </a:xfrm>
+          <a:prstGeom prst="donut">
+            <a:avLst>
+              <a:gd name="adj" fmla="val 48659"/>
+            </a:avLst>
+          </a:prstGeom>
+          <a:noFill/>
+          <a:ln w="12700">
+            <a:solidFill>
+              <a:schemeClr val="tx1"/>
+            </a:solidFill>
+          </a:ln>
+        </p:spPr>
+        <p:style>
+          <a:lnRef idx="2">
+            <a:schemeClr val="accent1">
+              <a:shade val="50000"/>
+            </a:schemeClr>
+          </a:lnRef>
+          <a:fillRef idx="1">
+            <a:schemeClr val="accent1"/>
+          </a:fillRef>
+          <a:effectRef idx="0">
+            <a:schemeClr val="accent1"/>
+          </a:effectRef>
+          <a:fontRef idx="minor">
+            <a:schemeClr val="lt1"/>
+          </a:fontRef>
+        </p:style>
+        <p:txBody>
+          <a:bodyPr rtlCol="0" anchor="ctr"/>
+          <a:lstStyle/>
+          <a:p>
+            <a:pPr algn="ctr"/>
+            <a:endParaRPr lang="zh-CN" altLang="en-US">
+              <a:solidFill>
+                <a:schemeClr val="tx1"/>
+              </a:solidFill>
+            </a:endParaRPr>
+          </a:p>
+        </p:txBody>
+      </p:sp>
+      <p:sp>
+        <p:nvSpPr>
+          <p:cNvPr id="11" name="TextBox 10">
+            <a:extLst>
+              <a:ext uri="{FF2B5EF4-FFF2-40B4-BE49-F238E27FC236}">
+                <a16:creationId xmlns:a16="http://schemas.microsoft.com/office/drawing/2014/main" id="{DE5D4C59-E5D2-4652-BC9A-ACE9747EC580}"/>
+              </a:ext>
+            </a:extLst>
+          </p:cNvPr>
+          <p:cNvSpPr txBox="1"/>
+          <p:nvPr/>
+        </p:nvSpPr>
+        <p:spPr>
+          <a:xfrm>
+            <a:off x="4078674" y="2332865"/>
+            <a:ext cx="86562" cy="215444"/>
+          </a:xfrm>
+          <a:prstGeom prst="rect">
+            <a:avLst/>
+          </a:prstGeom>
+          <a:noFill/>
+        </p:spPr>
+        <p:txBody>
+          <a:bodyPr wrap="none" lIns="0" rIns="0" rtlCol="0">
+            <a:spAutoFit/>
+          </a:bodyPr>
+          <a:lstStyle/>
+          <a:p>
+            <a:r>
+              <a:rPr lang="en-US" altLang="zh-CN" sz="800" dirty="0"/>
+              <a:t>r1</a:t>
+            </a:r>
+            <a:endParaRPr lang="zh-CN" altLang="en-US" sz="800" dirty="0"/>
+          </a:p>
+        </p:txBody>
+      </p:sp>
+      <p:cxnSp>
+        <p:nvCxnSpPr>
+          <p:cNvPr id="12" name="直接箭头连接符 42">
+            <a:extLst>
+              <a:ext uri="{FF2B5EF4-FFF2-40B4-BE49-F238E27FC236}">
+                <a16:creationId xmlns:a16="http://schemas.microsoft.com/office/drawing/2014/main" id="{CD0110B8-B44E-4326-BDF2-89D4F7BAB6C3}"/>
+              </a:ext>
+            </a:extLst>
+          </p:cNvPr>
+          <p:cNvCxnSpPr/>
+          <p:nvPr/>
+        </p:nvCxnSpPr>
+        <p:spPr>
+          <a:xfrm flipH="1">
+            <a:off x="3996366" y="3522395"/>
+            <a:ext cx="444033" cy="0"/>
+          </a:xfrm>
+          <a:prstGeom prst="straightConnector1">
+            <a:avLst/>
+          </a:prstGeom>
+          <a:ln w="6350">
+            <a:solidFill>
+              <a:schemeClr val="tx1"/>
+            </a:solidFill>
+            <a:headEnd type="triangle" w="sm" len="sm"/>
+            <a:tailEnd type="triangle" w="sm" len="sm"/>
+          </a:ln>
+        </p:spPr>
+        <p:style>
+          <a:lnRef idx="1">
+            <a:schemeClr val="accent1"/>
+          </a:lnRef>
+          <a:fillRef idx="0">
+            <a:schemeClr val="accent1"/>
+          </a:fillRef>
+          <a:effectRef idx="0">
+            <a:schemeClr val="accent1"/>
+          </a:effectRef>
+          <a:fontRef idx="minor">
+            <a:schemeClr val="tx1"/>
+          </a:fontRef>
+        </p:style>
+      </p:cxnSp>
+      <p:sp>
+        <p:nvSpPr>
+          <p:cNvPr id="13" name="TextBox 12">
+            <a:extLst>
+              <a:ext uri="{FF2B5EF4-FFF2-40B4-BE49-F238E27FC236}">
+                <a16:creationId xmlns:a16="http://schemas.microsoft.com/office/drawing/2014/main" id="{27DCBC0B-8DF7-43A2-90AC-C670544366A5}"/>
+              </a:ext>
+            </a:extLst>
+          </p:cNvPr>
+          <p:cNvSpPr txBox="1"/>
+          <p:nvPr/>
+        </p:nvSpPr>
+        <p:spPr>
+          <a:xfrm>
+            <a:off x="4152216" y="3490025"/>
+            <a:ext cx="152286" cy="215444"/>
+          </a:xfrm>
+          <a:prstGeom prst="rect">
+            <a:avLst/>
+          </a:prstGeom>
+          <a:noFill/>
+        </p:spPr>
+        <p:txBody>
+          <a:bodyPr wrap="none" lIns="0" rIns="0" rtlCol="0">
+            <a:spAutoFit/>
+          </a:bodyPr>
+          <a:lstStyle/>
+          <a:p>
+            <a:r>
+              <a:rPr lang="en-US" altLang="zh-CN" sz="800" dirty="0" err="1"/>
+              <a:t>dist</a:t>
+            </a:r>
+            <a:endParaRPr lang="zh-CN" altLang="en-US" sz="800" dirty="0"/>
+          </a:p>
+        </p:txBody>
+      </p:sp>
+      <p:sp>
+        <p:nvSpPr>
+          <p:cNvPr id="14" name="TextBox 13">
+            <a:extLst>
+              <a:ext uri="{FF2B5EF4-FFF2-40B4-BE49-F238E27FC236}">
+                <a16:creationId xmlns:a16="http://schemas.microsoft.com/office/drawing/2014/main" id="{F79F6B3F-1630-43FF-B13D-692B2B811C03}"/>
+              </a:ext>
+            </a:extLst>
+          </p:cNvPr>
+          <p:cNvSpPr txBox="1"/>
+          <p:nvPr/>
+        </p:nvSpPr>
+        <p:spPr>
+          <a:xfrm>
+            <a:off x="3765767" y="3848215"/>
+            <a:ext cx="997068" cy="215444"/>
+          </a:xfrm>
+          <a:prstGeom prst="rect">
+            <a:avLst/>
+          </a:prstGeom>
+          <a:noFill/>
+        </p:spPr>
+        <p:txBody>
+          <a:bodyPr wrap="none" lIns="0" rIns="0" rtlCol="0">
+            <a:spAutoFit/>
+          </a:bodyPr>
+          <a:lstStyle/>
+          <a:p>
+            <a:r>
+              <a:rPr lang="en-US" altLang="zh-CN" sz="800" dirty="0"/>
+              <a:t>(b) Collision (</a:t>
+            </a:r>
+            <a:r>
+              <a:rPr lang="en-US" altLang="zh-CN" sz="800" dirty="0" err="1"/>
+              <a:t>dist</a:t>
+            </a:r>
+            <a:r>
+              <a:rPr lang="en-US" altLang="zh-CN" sz="800" dirty="0"/>
+              <a:t>&lt;</a:t>
+            </a:r>
+            <a:r>
+              <a:rPr lang="en-US" altLang="zh-CN" sz="800" dirty="0" err="1"/>
+              <a:t>rSum</a:t>
+            </a:r>
+            <a:r>
+              <a:rPr lang="en-US" altLang="zh-CN" sz="800" dirty="0"/>
+              <a:t>)</a:t>
+            </a:r>
+            <a:endParaRPr lang="zh-CN" altLang="en-US" sz="800" dirty="0"/>
+          </a:p>
+        </p:txBody>
+      </p:sp>
+      <p:cxnSp>
+        <p:nvCxnSpPr>
+          <p:cNvPr id="15" name="Straight Connector 14">
+            <a:extLst>
+              <a:ext uri="{FF2B5EF4-FFF2-40B4-BE49-F238E27FC236}">
+                <a16:creationId xmlns:a16="http://schemas.microsoft.com/office/drawing/2014/main" id="{7A822451-91DE-41D7-8C70-AF17432CAFA5}"/>
+              </a:ext>
+            </a:extLst>
+          </p:cNvPr>
+          <p:cNvCxnSpPr/>
+          <p:nvPr/>
+        </p:nvCxnSpPr>
+        <p:spPr>
+          <a:xfrm>
+            <a:off x="4440399" y="2811411"/>
+            <a:ext cx="0" cy="457200"/>
+          </a:xfrm>
+          <a:prstGeom prst="line">
+            <a:avLst/>
+          </a:prstGeom>
+          <a:ln w="6350">
+            <a:solidFill>
+              <a:schemeClr val="tx1"/>
+            </a:solidFill>
+            <a:prstDash val="dash"/>
+          </a:ln>
+        </p:spPr>
+        <p:style>
+          <a:lnRef idx="1">
+            <a:schemeClr val="accent1"/>
+          </a:lnRef>
+          <a:fillRef idx="0">
+            <a:schemeClr val="accent1"/>
+          </a:fillRef>
+          <a:effectRef idx="0">
+            <a:schemeClr val="accent1"/>
+          </a:effectRef>
+          <a:fontRef idx="minor">
+            <a:schemeClr val="tx1"/>
+          </a:fontRef>
+        </p:style>
+      </p:cxnSp>
+      <p:cxnSp>
+        <p:nvCxnSpPr>
+          <p:cNvPr id="16" name="Straight Connector 15">
+            <a:extLst>
+              <a:ext uri="{FF2B5EF4-FFF2-40B4-BE49-F238E27FC236}">
+                <a16:creationId xmlns:a16="http://schemas.microsoft.com/office/drawing/2014/main" id="{39DF9D48-E408-4ECC-99FB-E5D7312C76F6}"/>
+              </a:ext>
+            </a:extLst>
+          </p:cNvPr>
+          <p:cNvCxnSpPr/>
+          <p:nvPr/>
+        </p:nvCxnSpPr>
+        <p:spPr>
+          <a:xfrm>
+            <a:off x="4192835" y="2811411"/>
+            <a:ext cx="0" cy="457200"/>
+          </a:xfrm>
+          <a:prstGeom prst="line">
+            <a:avLst/>
+          </a:prstGeom>
+          <a:ln w="6350">
+            <a:solidFill>
+              <a:schemeClr val="tx1"/>
+            </a:solidFill>
+            <a:prstDash val="dash"/>
+          </a:ln>
+        </p:spPr>
+        <p:style>
+          <a:lnRef idx="1">
+            <a:schemeClr val="accent1"/>
+          </a:lnRef>
+          <a:fillRef idx="0">
+            <a:schemeClr val="accent1"/>
+          </a:fillRef>
+          <a:effectRef idx="0">
+            <a:schemeClr val="accent1"/>
+          </a:effectRef>
+          <a:fontRef idx="minor">
+            <a:schemeClr val="tx1"/>
+          </a:fontRef>
+        </p:style>
+      </p:cxnSp>
+      <p:cxnSp>
+        <p:nvCxnSpPr>
+          <p:cNvPr id="17" name="Straight Connector 16">
+            <a:extLst>
+              <a:ext uri="{FF2B5EF4-FFF2-40B4-BE49-F238E27FC236}">
+                <a16:creationId xmlns:a16="http://schemas.microsoft.com/office/drawing/2014/main" id="{60974AA1-04B7-4C89-95AA-80482AC36C28}"/>
+              </a:ext>
+            </a:extLst>
+          </p:cNvPr>
+          <p:cNvCxnSpPr/>
+          <p:nvPr/>
+        </p:nvCxnSpPr>
+        <p:spPr>
+          <a:xfrm>
+            <a:off x="4244939" y="2546459"/>
+            <a:ext cx="0" cy="731520"/>
+          </a:xfrm>
+          <a:prstGeom prst="line">
+            <a:avLst/>
+          </a:prstGeom>
+          <a:ln w="6350">
+            <a:solidFill>
+              <a:schemeClr val="tx1"/>
+            </a:solidFill>
+            <a:prstDash val="dash"/>
+          </a:ln>
+        </p:spPr>
+        <p:style>
+          <a:lnRef idx="1">
+            <a:schemeClr val="accent1"/>
+          </a:lnRef>
+          <a:fillRef idx="0">
+            <a:schemeClr val="accent1"/>
+          </a:fillRef>
+          <a:effectRef idx="0">
+            <a:schemeClr val="accent1"/>
+          </a:effectRef>
+          <a:fontRef idx="minor">
+            <a:schemeClr val="tx1"/>
+          </a:fontRef>
+        </p:style>
+      </p:cxnSp>
+      <p:cxnSp>
+        <p:nvCxnSpPr>
+          <p:cNvPr id="18" name="Straight Connector 17">
+            <a:extLst>
+              <a:ext uri="{FF2B5EF4-FFF2-40B4-BE49-F238E27FC236}">
+                <a16:creationId xmlns:a16="http://schemas.microsoft.com/office/drawing/2014/main" id="{29875AE9-E54C-4972-A4D9-A84B7860A0D1}"/>
+              </a:ext>
+            </a:extLst>
+          </p:cNvPr>
+          <p:cNvCxnSpPr/>
+          <p:nvPr/>
+        </p:nvCxnSpPr>
+        <p:spPr>
+          <a:xfrm>
+            <a:off x="3992939" y="2546459"/>
+            <a:ext cx="0" cy="731520"/>
+          </a:xfrm>
+          <a:prstGeom prst="line">
+            <a:avLst/>
+          </a:prstGeom>
+          <a:ln w="6350">
+            <a:solidFill>
+              <a:schemeClr val="tx1"/>
+            </a:solidFill>
+            <a:prstDash val="dash"/>
+          </a:ln>
+        </p:spPr>
+        <p:style>
+          <a:lnRef idx="1">
+            <a:schemeClr val="accent1"/>
+          </a:lnRef>
+          <a:fillRef idx="0">
+            <a:schemeClr val="accent1"/>
+          </a:fillRef>
+          <a:effectRef idx="0">
+            <a:schemeClr val="accent1"/>
+          </a:effectRef>
+          <a:fontRef idx="minor">
+            <a:schemeClr val="tx1"/>
+          </a:fontRef>
+        </p:style>
+      </p:cxnSp>
+      <p:sp>
+        <p:nvSpPr>
+          <p:cNvPr id="19" name="Right Brace 18">
+            <a:extLst>
+              <a:ext uri="{FF2B5EF4-FFF2-40B4-BE49-F238E27FC236}">
+                <a16:creationId xmlns:a16="http://schemas.microsoft.com/office/drawing/2014/main" id="{1DC7A156-0602-41DB-AA7E-4ED9241D14A9}"/>
+              </a:ext>
+            </a:extLst>
+          </p:cNvPr>
+          <p:cNvSpPr/>
+          <p:nvPr/>
+        </p:nvSpPr>
+        <p:spPr>
+          <a:xfrm rot="10800000">
+            <a:off x="4100313" y="2408100"/>
+            <a:ext cx="46101" cy="246888"/>
+          </a:xfrm>
+          <a:prstGeom prst="rightBrace">
+            <a:avLst>
+              <a:gd name="adj1" fmla="val 147059"/>
+              <a:gd name="adj2" fmla="val 50000"/>
+            </a:avLst>
+          </a:prstGeom>
+          <a:ln w="6350">
+            <a:solidFill>
+              <a:schemeClr val="tx1"/>
+            </a:solidFill>
+          </a:ln>
+          <a:scene3d>
+            <a:camera prst="orthographicFront">
+              <a:rot lat="0" lon="0" rev="16200000"/>
+            </a:camera>
+            <a:lightRig rig="threePt" dir="t"/>
+          </a:scene3d>
+        </p:spPr>
+        <p:style>
+          <a:lnRef idx="1">
+            <a:schemeClr val="accent1"/>
+          </a:lnRef>
+          <a:fillRef idx="0">
+            <a:schemeClr val="accent1"/>
+          </a:fillRef>
+          <a:effectRef idx="0">
+            <a:schemeClr val="accent1"/>
+          </a:effectRef>
+          <a:fontRef idx="minor">
+            <a:schemeClr val="tx1"/>
+          </a:fontRef>
+        </p:style>
+        <p:txBody>
+          <a:bodyPr rtlCol="0" anchor="ctr"/>
+          <a:lstStyle/>
+          <a:p>
+            <a:pPr algn="ctr"/>
+            <a:endParaRPr lang="en-US"/>
+          </a:p>
+        </p:txBody>
+      </p:sp>
+      <p:sp>
+        <p:nvSpPr>
+          <p:cNvPr id="20" name="TextBox 19">
+            <a:extLst>
+              <a:ext uri="{FF2B5EF4-FFF2-40B4-BE49-F238E27FC236}">
+                <a16:creationId xmlns:a16="http://schemas.microsoft.com/office/drawing/2014/main" id="{B664F767-AFE7-44C7-9C6E-99B19961D6AA}"/>
+              </a:ext>
+            </a:extLst>
+          </p:cNvPr>
+          <p:cNvSpPr txBox="1"/>
+          <p:nvPr/>
+        </p:nvSpPr>
+        <p:spPr>
+          <a:xfrm>
+            <a:off x="4279202" y="2579315"/>
+            <a:ext cx="86562" cy="215444"/>
+          </a:xfrm>
+          <a:prstGeom prst="rect">
+            <a:avLst/>
+          </a:prstGeom>
+          <a:noFill/>
+        </p:spPr>
+        <p:txBody>
+          <a:bodyPr wrap="none" lIns="0" rIns="0" rtlCol="0">
+            <a:spAutoFit/>
+          </a:bodyPr>
+          <a:lstStyle/>
+          <a:p>
+            <a:r>
+              <a:rPr lang="en-US" altLang="zh-CN" sz="800" dirty="0"/>
+              <a:t>r2</a:t>
+            </a:r>
+            <a:endParaRPr lang="zh-CN" altLang="en-US" sz="800" dirty="0"/>
+          </a:p>
+        </p:txBody>
+      </p:sp>
+      <p:sp>
+        <p:nvSpPr>
+          <p:cNvPr id="21" name="Right Brace 20">
+            <a:extLst>
+              <a:ext uri="{FF2B5EF4-FFF2-40B4-BE49-F238E27FC236}">
+                <a16:creationId xmlns:a16="http://schemas.microsoft.com/office/drawing/2014/main" id="{400B6243-9243-4C18-9667-3EB19C9FB9DF}"/>
+              </a:ext>
+            </a:extLst>
+          </p:cNvPr>
+          <p:cNvSpPr/>
+          <p:nvPr/>
+        </p:nvSpPr>
+        <p:spPr>
+          <a:xfrm rot="10800000">
+            <a:off x="4299433" y="2660148"/>
+            <a:ext cx="46101" cy="246888"/>
+          </a:xfrm>
+          <a:prstGeom prst="rightBrace">
+            <a:avLst>
+              <a:gd name="adj1" fmla="val 147059"/>
+              <a:gd name="adj2" fmla="val 50000"/>
+            </a:avLst>
+          </a:prstGeom>
+          <a:ln w="6350">
+            <a:solidFill>
+              <a:schemeClr val="tx1"/>
+            </a:solidFill>
+          </a:ln>
+          <a:scene3d>
+            <a:camera prst="orthographicFront">
+              <a:rot lat="0" lon="0" rev="16200000"/>
+            </a:camera>
+            <a:lightRig rig="threePt" dir="t"/>
+          </a:scene3d>
+        </p:spPr>
+        <p:style>
+          <a:lnRef idx="1">
+            <a:schemeClr val="accent1"/>
+          </a:lnRef>
+          <a:fillRef idx="0">
+            <a:schemeClr val="accent1"/>
+          </a:fillRef>
+          <a:effectRef idx="0">
+            <a:schemeClr val="accent1"/>
+          </a:effectRef>
+          <a:fontRef idx="minor">
+            <a:schemeClr val="tx1"/>
+          </a:fontRef>
+        </p:style>
+        <p:txBody>
+          <a:bodyPr rtlCol="0" anchor="ctr"/>
+          <a:lstStyle/>
+          <a:p>
+            <a:pPr algn="ctr"/>
+            <a:endParaRPr lang="en-US"/>
+          </a:p>
+        </p:txBody>
+      </p:sp>
+      <p:sp>
+        <p:nvSpPr>
+          <p:cNvPr id="22" name="TextBox 21">
+            <a:extLst>
+              <a:ext uri="{FF2B5EF4-FFF2-40B4-BE49-F238E27FC236}">
+                <a16:creationId xmlns:a16="http://schemas.microsoft.com/office/drawing/2014/main" id="{0D0B6E98-5D25-4764-9D9D-A7E39BF77BDF}"/>
+              </a:ext>
+            </a:extLst>
+          </p:cNvPr>
+          <p:cNvSpPr txBox="1"/>
+          <p:nvPr/>
+        </p:nvSpPr>
+        <p:spPr>
+          <a:xfrm>
+            <a:off x="2663722" y="2332865"/>
+            <a:ext cx="86562" cy="215444"/>
+          </a:xfrm>
+          <a:prstGeom prst="rect">
+            <a:avLst/>
+          </a:prstGeom>
+          <a:noFill/>
+        </p:spPr>
+        <p:txBody>
+          <a:bodyPr wrap="none" lIns="0" rIns="0" rtlCol="0">
+            <a:spAutoFit/>
+          </a:bodyPr>
+          <a:lstStyle/>
+          <a:p>
+            <a:r>
+              <a:rPr lang="en-US" altLang="zh-CN" sz="800" dirty="0"/>
+              <a:t>r1</a:t>
+            </a:r>
+            <a:endParaRPr lang="zh-CN" altLang="en-US" sz="800" dirty="0"/>
+          </a:p>
+        </p:txBody>
+      </p:sp>
+      <p:cxnSp>
+        <p:nvCxnSpPr>
+          <p:cNvPr id="23" name="Straight Connector 22">
+            <a:extLst>
+              <a:ext uri="{FF2B5EF4-FFF2-40B4-BE49-F238E27FC236}">
+                <a16:creationId xmlns:a16="http://schemas.microsoft.com/office/drawing/2014/main" id="{3C5542E7-43FF-4684-B269-756D6DFF06E0}"/>
+              </a:ext>
+            </a:extLst>
+          </p:cNvPr>
+          <p:cNvCxnSpPr/>
+          <p:nvPr/>
+        </p:nvCxnSpPr>
+        <p:spPr>
+          <a:xfrm>
+            <a:off x="3233549" y="2806534"/>
+            <a:ext cx="0" cy="457200"/>
+          </a:xfrm>
+          <a:prstGeom prst="line">
+            <a:avLst/>
+          </a:prstGeom>
+          <a:ln w="6350">
+            <a:solidFill>
+              <a:schemeClr val="tx1"/>
+            </a:solidFill>
+            <a:prstDash val="dash"/>
+          </a:ln>
+        </p:spPr>
+        <p:style>
+          <a:lnRef idx="1">
+            <a:schemeClr val="accent1"/>
+          </a:lnRef>
+          <a:fillRef idx="0">
+            <a:schemeClr val="accent1"/>
+          </a:fillRef>
+          <a:effectRef idx="0">
+            <a:schemeClr val="accent1"/>
+          </a:effectRef>
+          <a:fontRef idx="minor">
+            <a:schemeClr val="tx1"/>
+          </a:fontRef>
+        </p:style>
+      </p:cxnSp>
+      <p:cxnSp>
+        <p:nvCxnSpPr>
+          <p:cNvPr id="24" name="Straight Connector 23">
+            <a:extLst>
+              <a:ext uri="{FF2B5EF4-FFF2-40B4-BE49-F238E27FC236}">
+                <a16:creationId xmlns:a16="http://schemas.microsoft.com/office/drawing/2014/main" id="{96ED4EF0-C76A-4A48-A1FD-602B9C0CB58D}"/>
+              </a:ext>
+            </a:extLst>
+          </p:cNvPr>
+          <p:cNvCxnSpPr/>
+          <p:nvPr/>
+        </p:nvCxnSpPr>
+        <p:spPr>
+          <a:xfrm>
+            <a:off x="2985985" y="2806534"/>
+            <a:ext cx="0" cy="457200"/>
+          </a:xfrm>
+          <a:prstGeom prst="line">
+            <a:avLst/>
+          </a:prstGeom>
+          <a:ln w="6350">
+            <a:solidFill>
+              <a:schemeClr val="tx1"/>
+            </a:solidFill>
+            <a:prstDash val="dash"/>
+          </a:ln>
+        </p:spPr>
+        <p:style>
+          <a:lnRef idx="1">
+            <a:schemeClr val="accent1"/>
+          </a:lnRef>
+          <a:fillRef idx="0">
+            <a:schemeClr val="accent1"/>
+          </a:fillRef>
+          <a:effectRef idx="0">
+            <a:schemeClr val="accent1"/>
+          </a:effectRef>
+          <a:fontRef idx="minor">
+            <a:schemeClr val="tx1"/>
+          </a:fontRef>
+        </p:style>
+      </p:cxnSp>
+      <p:cxnSp>
+        <p:nvCxnSpPr>
+          <p:cNvPr id="25" name="Straight Connector 24">
+            <a:extLst>
+              <a:ext uri="{FF2B5EF4-FFF2-40B4-BE49-F238E27FC236}">
+                <a16:creationId xmlns:a16="http://schemas.microsoft.com/office/drawing/2014/main" id="{1E660422-CEEF-4E12-B281-BBAFB8126D14}"/>
+              </a:ext>
+            </a:extLst>
+          </p:cNvPr>
+          <p:cNvCxnSpPr/>
+          <p:nvPr/>
+        </p:nvCxnSpPr>
+        <p:spPr>
+          <a:xfrm>
+            <a:off x="2824222" y="2544180"/>
+            <a:ext cx="0" cy="731520"/>
+          </a:xfrm>
+          <a:prstGeom prst="line">
+            <a:avLst/>
+          </a:prstGeom>
+          <a:ln w="6350">
+            <a:solidFill>
+              <a:schemeClr val="tx1"/>
+            </a:solidFill>
+            <a:prstDash val="dash"/>
+          </a:ln>
+        </p:spPr>
+        <p:style>
+          <a:lnRef idx="1">
+            <a:schemeClr val="accent1"/>
+          </a:lnRef>
+          <a:fillRef idx="0">
+            <a:schemeClr val="accent1"/>
+          </a:fillRef>
+          <a:effectRef idx="0">
+            <a:schemeClr val="accent1"/>
+          </a:effectRef>
+          <a:fontRef idx="minor">
+            <a:schemeClr val="tx1"/>
+          </a:fontRef>
+        </p:style>
+      </p:cxnSp>
+      <p:cxnSp>
+        <p:nvCxnSpPr>
+          <p:cNvPr id="26" name="Straight Connector 25">
+            <a:extLst>
+              <a:ext uri="{FF2B5EF4-FFF2-40B4-BE49-F238E27FC236}">
+                <a16:creationId xmlns:a16="http://schemas.microsoft.com/office/drawing/2014/main" id="{8C9787D7-8521-4511-8F1E-018224575440}"/>
+              </a:ext>
+            </a:extLst>
+          </p:cNvPr>
+          <p:cNvCxnSpPr/>
+          <p:nvPr/>
+        </p:nvCxnSpPr>
+        <p:spPr>
+          <a:xfrm>
+            <a:off x="2572222" y="2544180"/>
+            <a:ext cx="0" cy="731520"/>
+          </a:xfrm>
+          <a:prstGeom prst="line">
+            <a:avLst/>
+          </a:prstGeom>
+          <a:ln w="6350">
+            <a:solidFill>
+              <a:schemeClr val="tx1"/>
+            </a:solidFill>
+            <a:prstDash val="dash"/>
+          </a:ln>
+        </p:spPr>
+        <p:style>
+          <a:lnRef idx="1">
+            <a:schemeClr val="accent1"/>
+          </a:lnRef>
+          <a:fillRef idx="0">
+            <a:schemeClr val="accent1"/>
+          </a:fillRef>
+          <a:effectRef idx="0">
+            <a:schemeClr val="accent1"/>
+          </a:effectRef>
+          <a:fontRef idx="minor">
+            <a:schemeClr val="tx1"/>
+          </a:fontRef>
+        </p:style>
+      </p:cxnSp>
+      <p:sp>
+        <p:nvSpPr>
+          <p:cNvPr id="27" name="Right Brace 26">
+            <a:extLst>
+              <a:ext uri="{FF2B5EF4-FFF2-40B4-BE49-F238E27FC236}">
+                <a16:creationId xmlns:a16="http://schemas.microsoft.com/office/drawing/2014/main" id="{F4BA4FE1-C15E-4431-875A-05B518EC96B9}"/>
+              </a:ext>
+            </a:extLst>
+          </p:cNvPr>
+          <p:cNvSpPr/>
+          <p:nvPr/>
+        </p:nvSpPr>
+        <p:spPr>
+          <a:xfrm rot="10800000">
+            <a:off x="2679596" y="2405821"/>
+            <a:ext cx="46101" cy="246888"/>
+          </a:xfrm>
+          <a:prstGeom prst="rightBrace">
+            <a:avLst>
+              <a:gd name="adj1" fmla="val 147059"/>
+              <a:gd name="adj2" fmla="val 50000"/>
+            </a:avLst>
+          </a:prstGeom>
+          <a:ln w="6350">
+            <a:solidFill>
+              <a:schemeClr val="tx1"/>
+            </a:solidFill>
+          </a:ln>
+          <a:scene3d>
+            <a:camera prst="orthographicFront">
+              <a:rot lat="0" lon="0" rev="16200000"/>
+            </a:camera>
+            <a:lightRig rig="threePt" dir="t"/>
+          </a:scene3d>
+        </p:spPr>
+        <p:style>
+          <a:lnRef idx="1">
+            <a:schemeClr val="accent1"/>
+          </a:lnRef>
+          <a:fillRef idx="0">
+            <a:schemeClr val="accent1"/>
+          </a:fillRef>
+          <a:effectRef idx="0">
+            <a:schemeClr val="accent1"/>
+          </a:effectRef>
+          <a:fontRef idx="minor">
+            <a:schemeClr val="tx1"/>
+          </a:fontRef>
+        </p:style>
+        <p:txBody>
+          <a:bodyPr rtlCol="0" anchor="ctr"/>
+          <a:lstStyle/>
+          <a:p>
+            <a:pPr algn="ctr"/>
+            <a:endParaRPr lang="en-US"/>
+          </a:p>
+        </p:txBody>
+      </p:sp>
+      <p:sp>
+        <p:nvSpPr>
+          <p:cNvPr id="28" name="TextBox 27">
+            <a:extLst>
+              <a:ext uri="{FF2B5EF4-FFF2-40B4-BE49-F238E27FC236}">
+                <a16:creationId xmlns:a16="http://schemas.microsoft.com/office/drawing/2014/main" id="{2F730095-2668-48A1-BBA7-9D2024B08144}"/>
+              </a:ext>
+            </a:extLst>
+          </p:cNvPr>
+          <p:cNvSpPr txBox="1"/>
+          <p:nvPr/>
+        </p:nvSpPr>
+        <p:spPr>
+          <a:xfrm>
+            <a:off x="3072796" y="2579315"/>
+            <a:ext cx="86562" cy="215444"/>
+          </a:xfrm>
+          <a:prstGeom prst="rect">
+            <a:avLst/>
+          </a:prstGeom>
+          <a:noFill/>
+        </p:spPr>
+        <p:txBody>
+          <a:bodyPr wrap="none" lIns="0" rIns="0" rtlCol="0">
+            <a:spAutoFit/>
+          </a:bodyPr>
+          <a:lstStyle/>
+          <a:p>
+            <a:r>
+              <a:rPr lang="en-US" altLang="zh-CN" sz="800" dirty="0"/>
+              <a:t>r2</a:t>
+            </a:r>
+            <a:endParaRPr lang="zh-CN" altLang="en-US" sz="800" dirty="0"/>
+          </a:p>
+        </p:txBody>
+      </p:sp>
+      <p:sp>
+        <p:nvSpPr>
+          <p:cNvPr id="29" name="Right Brace 28">
+            <a:extLst>
+              <a:ext uri="{FF2B5EF4-FFF2-40B4-BE49-F238E27FC236}">
+                <a16:creationId xmlns:a16="http://schemas.microsoft.com/office/drawing/2014/main" id="{D07A72FD-1E19-4DD9-8ED7-77BF1D097781}"/>
+              </a:ext>
+            </a:extLst>
+          </p:cNvPr>
+          <p:cNvSpPr/>
+          <p:nvPr/>
+        </p:nvSpPr>
+        <p:spPr>
+          <a:xfrm rot="10800000">
+            <a:off x="3092583" y="2655271"/>
+            <a:ext cx="46101" cy="246888"/>
+          </a:xfrm>
+          <a:prstGeom prst="rightBrace">
+            <a:avLst>
+              <a:gd name="adj1" fmla="val 147059"/>
+              <a:gd name="adj2" fmla="val 50000"/>
+            </a:avLst>
+          </a:prstGeom>
+          <a:ln w="6350">
+            <a:solidFill>
+              <a:schemeClr val="tx1"/>
+            </a:solidFill>
+          </a:ln>
+          <a:scene3d>
+            <a:camera prst="orthographicFront">
+              <a:rot lat="0" lon="0" rev="16200000"/>
+            </a:camera>
+            <a:lightRig rig="threePt" dir="t"/>
+          </a:scene3d>
+        </p:spPr>
+        <p:style>
+          <a:lnRef idx="1">
+            <a:schemeClr val="accent1"/>
+          </a:lnRef>
+          <a:fillRef idx="0">
+            <a:schemeClr val="accent1"/>
+          </a:fillRef>
+          <a:effectRef idx="0">
+            <a:schemeClr val="accent1"/>
+          </a:effectRef>
+          <a:fontRef idx="minor">
+            <a:schemeClr val="tx1"/>
+          </a:fontRef>
+        </p:style>
+        <p:txBody>
+          <a:bodyPr rtlCol="0" anchor="ctr"/>
+          <a:lstStyle/>
+          <a:p>
+            <a:pPr algn="ctr"/>
+            <a:endParaRPr lang="en-US"/>
+          </a:p>
+        </p:txBody>
+      </p:sp>
+      <p:sp>
+        <p:nvSpPr>
+          <p:cNvPr id="30" name="TextBox 29">
+            <a:extLst>
+              <a:ext uri="{FF2B5EF4-FFF2-40B4-BE49-F238E27FC236}">
+                <a16:creationId xmlns:a16="http://schemas.microsoft.com/office/drawing/2014/main" id="{AD3C17E8-46B8-49D7-A188-5387334CD23F}"/>
+              </a:ext>
+            </a:extLst>
+          </p:cNvPr>
+          <p:cNvSpPr txBox="1"/>
+          <p:nvPr/>
+        </p:nvSpPr>
+        <p:spPr>
+          <a:xfrm>
+            <a:off x="3386855" y="3656374"/>
+            <a:ext cx="538609" cy="215444"/>
+          </a:xfrm>
+          <a:prstGeom prst="rect">
+            <a:avLst/>
+          </a:prstGeom>
+          <a:noFill/>
+        </p:spPr>
+        <p:txBody>
+          <a:bodyPr wrap="none" lIns="0" rIns="0" rtlCol="0">
+            <a:spAutoFit/>
+          </a:bodyPr>
+          <a:lstStyle/>
+          <a:p>
+            <a:r>
+              <a:rPr lang="en-US" altLang="zh-CN" sz="800" dirty="0" err="1"/>
+              <a:t>rSum</a:t>
+            </a:r>
+            <a:r>
+              <a:rPr lang="en-US" altLang="zh-CN" sz="800" dirty="0"/>
+              <a:t> = r1+r2</a:t>
+            </a:r>
+            <a:endParaRPr lang="zh-CN" altLang="en-US" sz="800" dirty="0"/>
+          </a:p>
+        </p:txBody>
+      </p:sp>
+    </p:spTree>
+    <p:extLst>
+      <p:ext uri="{BB962C8B-B14F-4D97-AF65-F5344CB8AC3E}">
+        <p14:creationId xmlns:p14="http://schemas.microsoft.com/office/powerpoint/2010/main" val="2798051584"/>
+      </p:ext>
+    </p:extLst>
+  </p:cSld>
+  <p:clrMapOvr>
+    <a:masterClrMapping/>
+  </p:clrMapOvr>
+</p:sld>
+</file>
+
+<file path=ppt/slides/slide2.xml><?xml version="1.0" encoding="utf-8"?>
 <p:sld xmlns:a="http://schemas.openxmlformats.org/drawingml/2006/main" xmlns:r="http://schemas.openxmlformats.org/officeDocument/2006/relationships" xmlns:p="http://schemas.openxmlformats.org/presentationml/2006/main">
   <p:cSld>
     <p:spTree>
@@ -4759,8 +6130,8 @@
           </a:p>
         </p:txBody>
       </p:sp>
-      <mc:AlternateContent xmlns:mc="http://schemas.openxmlformats.org/markup-compatibility/2006" xmlns:a14="http://schemas.microsoft.com/office/drawing/2010/main">
-        <mc:Choice Requires="a14">
+      <mc:AlternateContent xmlns:mc="http://schemas.openxmlformats.org/markup-compatibility/2006">
+        <mc:Choice xmlns:a14="http://schemas.microsoft.com/office/drawing/2010/main" Requires="a14">
           <p:sp>
             <p:nvSpPr>
               <p:cNvPr id="23" name="TextBox 22">
@@ -4809,7 +6180,7 @@
                         <a:rPr lang="en-US" altLang="zh-CN" sz="3200" b="0" i="0" smtClean="0">
                           <a:latin typeface="Cambria Math" panose="02040503050406030204" pitchFamily="18" charset="0"/>
                         </a:rPr>
-                        <m:t> 9−2</m:t>
+                        <m:t> 9−3</m:t>
                       </m:r>
                     </m:oMath>
                   </m:oMathPara>
@@ -4819,7 +6190,7 @@
             </p:txBody>
           </p:sp>
         </mc:Choice>
-        <mc:Fallback xmlns="">
+        <mc:Fallback>
           <p:sp>
             <p:nvSpPr>
               <p:cNvPr id="23" name="TextBox 22">
@@ -4877,7 +6248,7 @@
 </p:sld>
 </file>
 
-<file path=ppt/slides/slide2.xml><?xml version="1.0" encoding="utf-8"?>
+<file path=ppt/slides/slide3.xml><?xml version="1.0" encoding="utf-8"?>
 <p:sld xmlns:a="http://schemas.openxmlformats.org/drawingml/2006/main" xmlns:r="http://schemas.openxmlformats.org/officeDocument/2006/relationships" xmlns:p="http://schemas.openxmlformats.org/presentationml/2006/main">
   <p:cSld>
     <p:spTree>

</xml_diff>

<commit_message>
9,.4 update. Variable name update
</commit_message>
<xml_diff>
--- a/Word/Diagrams/chapter9/chap 9.figures.pptx
+++ b/Word/Diagrams/chapter9/chap 9.figures.pptx
@@ -5,7 +5,7 @@
     <p:sldMasterId id="2147483660" r:id="rId1"/>
   </p:sldMasterIdLst>
   <p:notesMasterIdLst>
-    <p:notesMasterId r:id="rId15"/>
+    <p:notesMasterId r:id="rId16"/>
   </p:notesMasterIdLst>
   <p:sldIdLst>
     <p:sldId id="306" r:id="rId2"/>
@@ -20,7 +20,8 @@
     <p:sldId id="313" r:id="rId11"/>
     <p:sldId id="314" r:id="rId12"/>
     <p:sldId id="315" r:id="rId13"/>
-    <p:sldId id="316" r:id="rId14"/>
+    <p:sldId id="317" r:id="rId14"/>
+    <p:sldId id="316" r:id="rId15"/>
   </p:sldIdLst>
   <p:sldSz cx="9144000" cy="6858000" type="screen4x3"/>
   <p:notesSz cx="6858000" cy="9144000"/>
@@ -9949,10 +9950,10 @@
       </p:grpSpPr>
       <p:sp>
         <p:nvSpPr>
-          <p:cNvPr id="3" name="Rectangle 2">
-            <a:extLst>
-              <a:ext uri="{FF2B5EF4-FFF2-40B4-BE49-F238E27FC236}">
-                <a16:creationId xmlns:a16="http://schemas.microsoft.com/office/drawing/2014/main" id="{3540B538-F299-475B-8E49-13281C86F7AA}"/>
+          <p:cNvPr id="2" name="Rectangle 1">
+            <a:extLst>
+              <a:ext uri="{FF2B5EF4-FFF2-40B4-BE49-F238E27FC236}">
+                <a16:creationId xmlns:a16="http://schemas.microsoft.com/office/drawing/2014/main" id="{5B6BA032-5F5C-4C10-BD98-913B1132F2D0}"/>
               </a:ext>
             </a:extLst>
           </p:cNvPr>
@@ -9961,7 +9962,7 @@
         </p:nvSpPr>
         <p:spPr>
           <a:xfrm>
-            <a:off x="1756683" y="1831033"/>
+            <a:off x="1264662" y="1937121"/>
             <a:ext cx="4267200" cy="2324099"/>
           </a:xfrm>
           <a:prstGeom prst="rect">
@@ -9999,10 +10000,10 @@
       </p:sp>
       <p:sp>
         <p:nvSpPr>
-          <p:cNvPr id="4" name="TextBox 3">
-            <a:extLst>
-              <a:ext uri="{FF2B5EF4-FFF2-40B4-BE49-F238E27FC236}">
-                <a16:creationId xmlns:a16="http://schemas.microsoft.com/office/drawing/2014/main" id="{DECCB791-C196-4BE6-9771-4CA1B51A3212}"/>
+          <p:cNvPr id="3" name="TextBox 2">
+            <a:extLst>
+              <a:ext uri="{FF2B5EF4-FFF2-40B4-BE49-F238E27FC236}">
+                <a16:creationId xmlns:a16="http://schemas.microsoft.com/office/drawing/2014/main" id="{432E62B7-46F0-4E7E-9FB9-FE36A11DD8C7}"/>
               </a:ext>
             </a:extLst>
           </p:cNvPr>
@@ -10029,14 +10030,1761 @@
           <a:lstStyle/>
           <a:p>
             <a:r>
-              <a:rPr lang="en-US" altLang="zh-CN" sz="1600"/>
+              <a:rPr lang="en-US" altLang="zh-CN" sz="1600" dirty="0"/>
+              <a:t>Figure 9-17</a:t>
+            </a:r>
+            <a:endParaRPr lang="en-US" altLang="zh-TW" sz="1600" dirty="0"/>
+          </a:p>
+        </p:txBody>
+      </p:sp>
+      <p:grpSp>
+        <p:nvGrpSpPr>
+          <p:cNvPr id="4" name="Group 3">
+            <a:extLst>
+              <a:ext uri="{FF2B5EF4-FFF2-40B4-BE49-F238E27FC236}">
+                <a16:creationId xmlns:a16="http://schemas.microsoft.com/office/drawing/2014/main" id="{508EE9CC-0D09-4B3D-BC56-6D013793C176}"/>
+              </a:ext>
+            </a:extLst>
+          </p:cNvPr>
+          <p:cNvGrpSpPr/>
+          <p:nvPr/>
+        </p:nvGrpSpPr>
+        <p:grpSpPr>
+          <a:xfrm>
+            <a:off x="1854615" y="2438243"/>
+            <a:ext cx="910254" cy="1692237"/>
+            <a:chOff x="2405252" y="2438243"/>
+            <a:chExt cx="910254" cy="1692237"/>
+          </a:xfrm>
+        </p:grpSpPr>
+        <p:grpSp>
+          <p:nvGrpSpPr>
+            <p:cNvPr id="5" name="Group 4">
+              <a:extLst>
+                <a:ext uri="{FF2B5EF4-FFF2-40B4-BE49-F238E27FC236}">
+                  <a16:creationId xmlns:a16="http://schemas.microsoft.com/office/drawing/2014/main" id="{2C6BA98A-6CE6-4DD5-8164-618D0EBA2808}"/>
+                </a:ext>
+              </a:extLst>
+            </p:cNvPr>
+            <p:cNvGrpSpPr/>
+            <p:nvPr/>
+          </p:nvGrpSpPr>
+          <p:grpSpPr>
+            <a:xfrm rot="2700000">
+              <a:off x="2192940" y="3270540"/>
+              <a:ext cx="1234441" cy="485440"/>
+              <a:chOff x="2468879" y="2791160"/>
+              <a:chExt cx="1234441" cy="485440"/>
+            </a:xfrm>
+          </p:grpSpPr>
+          <p:sp>
+            <p:nvSpPr>
+              <p:cNvPr id="16" name="Flowchart: Or 15">
+                <a:extLst>
+                  <a:ext uri="{FF2B5EF4-FFF2-40B4-BE49-F238E27FC236}">
+                    <a16:creationId xmlns:a16="http://schemas.microsoft.com/office/drawing/2014/main" id="{C7C66D7A-FE9C-46B3-AB31-C5EBDDB1C0ED}"/>
+                  </a:ext>
+                </a:extLst>
+              </p:cNvPr>
+              <p:cNvSpPr>
+                <a:spLocks noChangeAspect="1"/>
+              </p:cNvSpPr>
+              <p:nvPr/>
+            </p:nvSpPr>
+            <p:spPr>
+              <a:xfrm>
+                <a:off x="2713574" y="2791160"/>
+                <a:ext cx="45719" cy="48409"/>
+              </a:xfrm>
+              <a:prstGeom prst="flowChartOr">
+                <a:avLst/>
+              </a:prstGeom>
+              <a:solidFill>
+                <a:schemeClr val="tx1"/>
+              </a:solidFill>
+              <a:ln w="6350">
+                <a:solidFill>
+                  <a:schemeClr val="tx1"/>
+                </a:solidFill>
+              </a:ln>
+            </p:spPr>
+            <p:style>
+              <a:lnRef idx="2">
+                <a:schemeClr val="accent1">
+                  <a:shade val="50000"/>
+                </a:schemeClr>
+              </a:lnRef>
+              <a:fillRef idx="1">
+                <a:schemeClr val="accent1"/>
+              </a:fillRef>
+              <a:effectRef idx="0">
+                <a:schemeClr val="accent1"/>
+              </a:effectRef>
+              <a:fontRef idx="minor">
+                <a:schemeClr val="lt1"/>
+              </a:fontRef>
+            </p:style>
+            <p:txBody>
+              <a:bodyPr rtlCol="0" anchor="ctr"/>
+              <a:lstStyle/>
+              <a:p>
+                <a:pPr algn="ctr"/>
+                <a:endParaRPr lang="en-US"/>
+              </a:p>
+            </p:txBody>
+          </p:sp>
+          <p:grpSp>
+            <p:nvGrpSpPr>
+              <p:cNvPr id="17" name="Group 16">
+                <a:extLst>
+                  <a:ext uri="{FF2B5EF4-FFF2-40B4-BE49-F238E27FC236}">
+                    <a16:creationId xmlns:a16="http://schemas.microsoft.com/office/drawing/2014/main" id="{E9834DA7-8C47-4867-A79E-0D167DACE3DD}"/>
+                  </a:ext>
+                </a:extLst>
+              </p:cNvPr>
+              <p:cNvGrpSpPr/>
+              <p:nvPr/>
+            </p:nvGrpSpPr>
+            <p:grpSpPr>
+              <a:xfrm>
+                <a:off x="2468879" y="2819400"/>
+                <a:ext cx="1234441" cy="457200"/>
+                <a:chOff x="2468879" y="2819400"/>
+                <a:chExt cx="1234441" cy="457200"/>
+              </a:xfrm>
+            </p:grpSpPr>
+            <p:sp>
+              <p:nvSpPr>
+                <p:cNvPr id="18" name="Rectangle 17">
+                  <a:extLst>
+                    <a:ext uri="{FF2B5EF4-FFF2-40B4-BE49-F238E27FC236}">
+                      <a16:creationId xmlns:a16="http://schemas.microsoft.com/office/drawing/2014/main" id="{163F5D23-48BB-4519-968A-EF3AD5B325D1}"/>
+                    </a:ext>
+                  </a:extLst>
+                </p:cNvPr>
+                <p:cNvSpPr/>
+                <p:nvPr/>
+              </p:nvSpPr>
+              <p:spPr>
+                <a:xfrm>
+                  <a:off x="2736054" y="2819400"/>
+                  <a:ext cx="685800" cy="457200"/>
+                </a:xfrm>
+                <a:prstGeom prst="rect">
+                  <a:avLst/>
+                </a:prstGeom>
+                <a:noFill/>
+                <a:ln w="12700">
+                  <a:solidFill>
+                    <a:schemeClr val="tx1"/>
+                  </a:solidFill>
+                </a:ln>
+              </p:spPr>
+              <p:style>
+                <a:lnRef idx="2">
+                  <a:schemeClr val="accent1">
+                    <a:shade val="50000"/>
+                  </a:schemeClr>
+                </a:lnRef>
+                <a:fillRef idx="1">
+                  <a:schemeClr val="accent1"/>
+                </a:fillRef>
+                <a:effectRef idx="0">
+                  <a:schemeClr val="accent1"/>
+                </a:effectRef>
+                <a:fontRef idx="minor">
+                  <a:schemeClr val="lt1"/>
+                </a:fontRef>
+              </p:style>
+              <p:txBody>
+                <a:bodyPr rtlCol="0" anchor="ctr"/>
+                <a:lstStyle/>
+                <a:p>
+                  <a:pPr algn="ctr"/>
+                  <a:endParaRPr lang="en-US"/>
+                </a:p>
+              </p:txBody>
+            </p:sp>
+            <p:cxnSp>
+              <p:nvCxnSpPr>
+                <p:cNvPr id="19" name="Straight Connector 18">
+                  <a:extLst>
+                    <a:ext uri="{FF2B5EF4-FFF2-40B4-BE49-F238E27FC236}">
+                      <a16:creationId xmlns:a16="http://schemas.microsoft.com/office/drawing/2014/main" id="{E4B2AB2D-13FE-421D-9CED-2291A049A938}"/>
+                    </a:ext>
+                  </a:extLst>
+                </p:cNvPr>
+                <p:cNvCxnSpPr/>
+                <p:nvPr/>
+              </p:nvCxnSpPr>
+              <p:spPr>
+                <a:xfrm>
+                  <a:off x="3429000" y="2819400"/>
+                  <a:ext cx="274320" cy="0"/>
+                </a:xfrm>
+                <a:prstGeom prst="line">
+                  <a:avLst/>
+                </a:prstGeom>
+                <a:ln w="6350">
+                  <a:solidFill>
+                    <a:schemeClr val="tx1"/>
+                  </a:solidFill>
+                  <a:prstDash val="dash"/>
+                </a:ln>
+              </p:spPr>
+              <p:style>
+                <a:lnRef idx="1">
+                  <a:schemeClr val="accent1"/>
+                </a:lnRef>
+                <a:fillRef idx="0">
+                  <a:schemeClr val="accent1"/>
+                </a:fillRef>
+                <a:effectRef idx="0">
+                  <a:schemeClr val="accent1"/>
+                </a:effectRef>
+                <a:fontRef idx="minor">
+                  <a:schemeClr val="tx1"/>
+                </a:fontRef>
+              </p:style>
+            </p:cxnSp>
+            <p:cxnSp>
+              <p:nvCxnSpPr>
+                <p:cNvPr id="20" name="Straight Connector 19">
+                  <a:extLst>
+                    <a:ext uri="{FF2B5EF4-FFF2-40B4-BE49-F238E27FC236}">
+                      <a16:creationId xmlns:a16="http://schemas.microsoft.com/office/drawing/2014/main" id="{F3C0C127-0F50-4C6F-9A8A-018CDB7B106A}"/>
+                    </a:ext>
+                  </a:extLst>
+                </p:cNvPr>
+                <p:cNvCxnSpPr/>
+                <p:nvPr/>
+              </p:nvCxnSpPr>
+              <p:spPr>
+                <a:xfrm>
+                  <a:off x="2468879" y="2819400"/>
+                  <a:ext cx="274320" cy="0"/>
+                </a:xfrm>
+                <a:prstGeom prst="line">
+                  <a:avLst/>
+                </a:prstGeom>
+                <a:ln w="6350">
+                  <a:solidFill>
+                    <a:schemeClr val="tx1"/>
+                  </a:solidFill>
+                  <a:prstDash val="dash"/>
+                </a:ln>
+              </p:spPr>
+              <p:style>
+                <a:lnRef idx="1">
+                  <a:schemeClr val="accent1"/>
+                </a:lnRef>
+                <a:fillRef idx="0">
+                  <a:schemeClr val="accent1"/>
+                </a:fillRef>
+                <a:effectRef idx="0">
+                  <a:schemeClr val="accent1"/>
+                </a:effectRef>
+                <a:fontRef idx="minor">
+                  <a:schemeClr val="tx1"/>
+                </a:fontRef>
+              </p:style>
+            </p:cxnSp>
+          </p:grpSp>
+        </p:grpSp>
+        <p:grpSp>
+          <p:nvGrpSpPr>
+            <p:cNvPr id="6" name="Group 5">
+              <a:extLst>
+                <a:ext uri="{FF2B5EF4-FFF2-40B4-BE49-F238E27FC236}">
+                  <a16:creationId xmlns:a16="http://schemas.microsoft.com/office/drawing/2014/main" id="{1E0BEF55-3F67-4B4E-8D42-10D9ECFC65A5}"/>
+                </a:ext>
+              </a:extLst>
+            </p:cNvPr>
+            <p:cNvGrpSpPr/>
+            <p:nvPr/>
+          </p:nvGrpSpPr>
+          <p:grpSpPr>
+            <a:xfrm>
+              <a:off x="2405252" y="2438243"/>
+              <a:ext cx="822960" cy="822960"/>
+              <a:chOff x="2120815" y="2616887"/>
+              <a:chExt cx="822960" cy="822960"/>
+            </a:xfrm>
+          </p:grpSpPr>
+          <p:sp>
+            <p:nvSpPr>
+              <p:cNvPr id="14" name="Flowchart: Or 13">
+                <a:extLst>
+                  <a:ext uri="{FF2B5EF4-FFF2-40B4-BE49-F238E27FC236}">
+                    <a16:creationId xmlns:a16="http://schemas.microsoft.com/office/drawing/2014/main" id="{5EC85E6E-E25D-4B94-B3B5-C1DD0BB4FCFF}"/>
+                  </a:ext>
+                </a:extLst>
+              </p:cNvPr>
+              <p:cNvSpPr>
+                <a:spLocks noChangeAspect="1"/>
+              </p:cNvSpPr>
+              <p:nvPr/>
+            </p:nvSpPr>
+            <p:spPr>
+              <a:xfrm>
+                <a:off x="2505764" y="3005507"/>
+                <a:ext cx="43180" cy="45720"/>
+              </a:xfrm>
+              <a:prstGeom prst="flowChartOr">
+                <a:avLst/>
+              </a:prstGeom>
+              <a:solidFill>
+                <a:schemeClr val="tx1"/>
+              </a:solidFill>
+              <a:ln w="6350">
+                <a:solidFill>
+                  <a:schemeClr val="tx1"/>
+                </a:solidFill>
+              </a:ln>
+            </p:spPr>
+            <p:style>
+              <a:lnRef idx="2">
+                <a:schemeClr val="accent1">
+                  <a:shade val="50000"/>
+                </a:schemeClr>
+              </a:lnRef>
+              <a:fillRef idx="1">
+                <a:schemeClr val="accent1"/>
+              </a:fillRef>
+              <a:effectRef idx="0">
+                <a:schemeClr val="accent1"/>
+              </a:effectRef>
+              <a:fontRef idx="minor">
+                <a:schemeClr val="lt1"/>
+              </a:fontRef>
+            </p:style>
+            <p:txBody>
+              <a:bodyPr rtlCol="0" anchor="ctr"/>
+              <a:lstStyle/>
+              <a:p>
+                <a:pPr algn="ctr"/>
+                <a:endParaRPr lang="en-US"/>
+              </a:p>
+            </p:txBody>
+          </p:sp>
+          <p:sp>
+            <p:nvSpPr>
+              <p:cNvPr id="15" name="Oval 14">
+                <a:extLst>
+                  <a:ext uri="{FF2B5EF4-FFF2-40B4-BE49-F238E27FC236}">
+                    <a16:creationId xmlns:a16="http://schemas.microsoft.com/office/drawing/2014/main" id="{B3F4593E-8FCB-4D46-84C7-A319852F8209}"/>
+                  </a:ext>
+                </a:extLst>
+              </p:cNvPr>
+              <p:cNvSpPr>
+                <a:spLocks noChangeAspect="1"/>
+              </p:cNvSpPr>
+              <p:nvPr/>
+            </p:nvSpPr>
+            <p:spPr>
+              <a:xfrm>
+                <a:off x="2120815" y="2616887"/>
+                <a:ext cx="822960" cy="822960"/>
+              </a:xfrm>
+              <a:prstGeom prst="ellipse">
+                <a:avLst/>
+              </a:prstGeom>
+              <a:noFill/>
+              <a:ln w="12700">
+                <a:solidFill>
+                  <a:schemeClr val="tx1"/>
+                </a:solidFill>
+              </a:ln>
+            </p:spPr>
+            <p:style>
+              <a:lnRef idx="2">
+                <a:schemeClr val="accent1">
+                  <a:shade val="50000"/>
+                </a:schemeClr>
+              </a:lnRef>
+              <a:fillRef idx="1">
+                <a:schemeClr val="accent1"/>
+              </a:fillRef>
+              <a:effectRef idx="0">
+                <a:schemeClr val="accent1"/>
+              </a:effectRef>
+              <a:fontRef idx="minor">
+                <a:schemeClr val="lt1"/>
+              </a:fontRef>
+            </p:style>
+            <p:txBody>
+              <a:bodyPr rtlCol="0" anchor="ctr"/>
+              <a:lstStyle/>
+              <a:p>
+                <a:pPr algn="ctr"/>
+                <a:endParaRPr lang="en-US"/>
+              </a:p>
+            </p:txBody>
+          </p:sp>
+        </p:grpSp>
+        <p:sp>
+          <p:nvSpPr>
+            <p:cNvPr id="7" name="TextBox 6">
+              <a:extLst>
+                <a:ext uri="{FF2B5EF4-FFF2-40B4-BE49-F238E27FC236}">
+                  <a16:creationId xmlns:a16="http://schemas.microsoft.com/office/drawing/2014/main" id="{22BBB3D5-D707-4F12-AD30-921BBC7D7A5C}"/>
+                </a:ext>
+              </a:extLst>
+            </p:cNvPr>
+            <p:cNvSpPr txBox="1"/>
+            <p:nvPr/>
+          </p:nvSpPr>
+          <p:spPr>
+            <a:xfrm>
+              <a:off x="2615341" y="2609316"/>
+              <a:ext cx="535403" cy="215444"/>
+            </a:xfrm>
+            <a:prstGeom prst="rect">
+              <a:avLst/>
+            </a:prstGeom>
+            <a:noFill/>
+          </p:spPr>
+          <p:txBody>
+            <a:bodyPr wrap="none" lIns="0" rIns="0" rtlCol="0">
+              <a:spAutoFit/>
+            </a:bodyPr>
+            <a:lstStyle/>
+            <a:p>
+              <a:r>
+                <a:rPr lang="en-US" altLang="zh-TW" sz="800" dirty="0"/>
+                <a:t>Circle Center</a:t>
+              </a:r>
+              <a:endParaRPr lang="zh-TW" altLang="en-US" sz="800" baseline="-25000" dirty="0"/>
+            </a:p>
+          </p:txBody>
+        </p:sp>
+        <p:cxnSp>
+          <p:nvCxnSpPr>
+            <p:cNvPr id="8" name="Straight Arrow Connector 7">
+              <a:extLst>
+                <a:ext uri="{FF2B5EF4-FFF2-40B4-BE49-F238E27FC236}">
+                  <a16:creationId xmlns:a16="http://schemas.microsoft.com/office/drawing/2014/main" id="{2D1C0F4D-5619-4192-BE2E-5D1417607CBE}"/>
+                </a:ext>
+              </a:extLst>
+            </p:cNvPr>
+            <p:cNvCxnSpPr/>
+            <p:nvPr/>
+          </p:nvCxnSpPr>
+          <p:spPr>
+            <a:xfrm rot="2700000">
+              <a:off x="2981290" y="3420870"/>
+              <a:ext cx="228600" cy="0"/>
+            </a:xfrm>
+            <a:prstGeom prst="straightConnector1">
+              <a:avLst/>
+            </a:prstGeom>
+            <a:ln w="6350">
+              <a:solidFill>
+                <a:schemeClr val="tx1"/>
+              </a:solidFill>
+              <a:headEnd w="sm" len="sm"/>
+              <a:tailEnd type="triangle" w="sm" len="sm"/>
+            </a:ln>
+          </p:spPr>
+          <p:style>
+            <a:lnRef idx="1">
+              <a:schemeClr val="accent1"/>
+            </a:lnRef>
+            <a:fillRef idx="0">
+              <a:schemeClr val="accent1"/>
+            </a:fillRef>
+            <a:effectRef idx="0">
+              <a:schemeClr val="accent1"/>
+            </a:effectRef>
+            <a:fontRef idx="minor">
+              <a:schemeClr val="tx1"/>
+            </a:fontRef>
+          </p:style>
+        </p:cxnSp>
+        <mc:AlternateContent xmlns:mc="http://schemas.openxmlformats.org/markup-compatibility/2006" xmlns:a14="http://schemas.microsoft.com/office/drawing/2010/main">
+          <mc:Choice Requires="a14">
+            <p:sp>
+              <p:nvSpPr>
+                <p:cNvPr id="9" name="TextBox 8">
+                  <a:extLst>
+                    <a:ext uri="{FF2B5EF4-FFF2-40B4-BE49-F238E27FC236}">
+                      <a16:creationId xmlns:a16="http://schemas.microsoft.com/office/drawing/2014/main" id="{182B8F00-8261-4651-8C43-28AE7CBFDD5C}"/>
+                    </a:ext>
+                  </a:extLst>
+                </p:cNvPr>
+                <p:cNvSpPr txBox="1">
+                  <a:spLocks noChangeAspect="1"/>
+                </p:cNvSpPr>
+                <p:nvPr/>
+              </p:nvSpPr>
+              <p:spPr>
+                <a:xfrm>
+                  <a:off x="3105569" y="3229614"/>
+                  <a:ext cx="125996" cy="230256"/>
+                </a:xfrm>
+                <a:prstGeom prst="rect">
+                  <a:avLst/>
+                </a:prstGeom>
+                <a:noFill/>
+                <a:ln>
+                  <a:noFill/>
+                </a:ln>
+              </p:spPr>
+              <p:txBody>
+                <a:bodyPr wrap="square" lIns="0" rIns="0" rtlCol="0">
+                  <a:spAutoFit/>
+                </a:bodyPr>
+                <a:lstStyle/>
+                <a:p>
+                  <a14:m>
+                    <m:oMath xmlns:m="http://schemas.openxmlformats.org/officeDocument/2006/math">
+                      <m:acc>
+                        <m:accPr>
+                          <m:chr m:val="⃑"/>
+                          <m:ctrlPr>
+                            <a:rPr lang="en-US" altLang="zh-TW" sz="800" b="0" i="1" smtClean="0">
+                              <a:latin typeface="Cambria Math" panose="02040503050406030204" pitchFamily="18" charset="0"/>
+                            </a:rPr>
+                          </m:ctrlPr>
+                        </m:accPr>
+                        <m:e>
+                          <m:r>
+                            <a:rPr lang="en-US" altLang="zh-TW" sz="800" b="0" i="1" smtClean="0">
+                              <a:latin typeface="Cambria Math" panose="02040503050406030204" pitchFamily="18" charset="0"/>
+                            </a:rPr>
+                            <m:t>𝑉</m:t>
+                          </m:r>
+                        </m:e>
+                      </m:acc>
+                    </m:oMath>
+                  </a14:m>
+                  <a:r>
+                    <a:rPr lang="en-US" altLang="zh-TW" sz="800" baseline="-25000" dirty="0"/>
+                    <a:t>2</a:t>
+                  </a:r>
+                  <a:endParaRPr lang="zh-TW" altLang="en-US" sz="800" baseline="-25000" dirty="0"/>
+                </a:p>
+              </p:txBody>
+            </p:sp>
+          </mc:Choice>
+          <mc:Fallback xmlns="">
+            <p:sp>
+              <p:nvSpPr>
+                <p:cNvPr id="24" name="TextBox 23"/>
+                <p:cNvSpPr txBox="1">
+                  <a:spLocks noRot="1" noChangeAspect="1" noMove="1" noResize="1" noEditPoints="1" noAdjustHandles="1" noChangeArrowheads="1" noChangeShapeType="1" noTextEdit="1"/>
+                </p:cNvSpPr>
+                <p:nvPr/>
+              </p:nvSpPr>
+              <p:spPr>
+                <a:xfrm>
+                  <a:off x="3105569" y="3229614"/>
+                  <a:ext cx="125996" cy="230256"/>
+                </a:xfrm>
+                <a:prstGeom prst="rect">
+                  <a:avLst/>
+                </a:prstGeom>
+                <a:blipFill rotWithShape="0">
+                  <a:blip r:embed="rId2" cstate="print"/>
+                  <a:stretch>
+                    <a:fillRect l="-28571" r="-14286" b="-2632"/>
+                  </a:stretch>
+                </a:blipFill>
+                <a:ln>
+                  <a:noFill/>
+                </a:ln>
+              </p:spPr>
+              <p:txBody>
+                <a:bodyPr/>
+                <a:lstStyle/>
+                <a:p>
+                  <a:r>
+                    <a:rPr lang="en-US">
+                      <a:noFill/>
+                    </a:rPr>
+                    <a:t> </a:t>
+                  </a:r>
+                </a:p>
+              </p:txBody>
+            </p:sp>
+          </mc:Fallback>
+        </mc:AlternateContent>
+        <p:cxnSp>
+          <p:nvCxnSpPr>
+            <p:cNvPr id="10" name="Straight Arrow Connector 9">
+              <a:extLst>
+                <a:ext uri="{FF2B5EF4-FFF2-40B4-BE49-F238E27FC236}">
+                  <a16:creationId xmlns:a16="http://schemas.microsoft.com/office/drawing/2014/main" id="{A1D5A33D-A165-4FDE-A04E-15C55D94BDAB}"/>
+                </a:ext>
+              </a:extLst>
+            </p:cNvPr>
+            <p:cNvCxnSpPr/>
+            <p:nvPr/>
+          </p:nvCxnSpPr>
+          <p:spPr>
+            <a:xfrm rot="1200000" flipV="1">
+              <a:off x="2765511" y="2864157"/>
+              <a:ext cx="0" cy="228600"/>
+            </a:xfrm>
+            <a:prstGeom prst="straightConnector1">
+              <a:avLst/>
+            </a:prstGeom>
+            <a:ln w="6350">
+              <a:solidFill>
+                <a:schemeClr val="tx1"/>
+              </a:solidFill>
+              <a:prstDash val="solid"/>
+              <a:tailEnd type="triangle" w="sm" len="sm"/>
+            </a:ln>
+          </p:spPr>
+          <p:style>
+            <a:lnRef idx="1">
+              <a:schemeClr val="accent1"/>
+            </a:lnRef>
+            <a:fillRef idx="0">
+              <a:schemeClr val="accent1"/>
+            </a:fillRef>
+            <a:effectRef idx="0">
+              <a:schemeClr val="accent1"/>
+            </a:effectRef>
+            <a:fontRef idx="minor">
+              <a:schemeClr val="tx1"/>
+            </a:fontRef>
+          </p:style>
+        </p:cxnSp>
+        <p:cxnSp>
+          <p:nvCxnSpPr>
+            <p:cNvPr id="11" name="Straight Connector 10">
+              <a:extLst>
+                <a:ext uri="{FF2B5EF4-FFF2-40B4-BE49-F238E27FC236}">
+                  <a16:creationId xmlns:a16="http://schemas.microsoft.com/office/drawing/2014/main" id="{2DB3FE51-A505-4678-A35B-39CC1801DF1A}"/>
+                </a:ext>
+              </a:extLst>
+            </p:cNvPr>
+            <p:cNvCxnSpPr/>
+            <p:nvPr/>
+          </p:nvCxnSpPr>
+          <p:spPr>
+            <a:xfrm rot="8100000">
+              <a:off x="3178346" y="3552357"/>
+              <a:ext cx="137160" cy="0"/>
+            </a:xfrm>
+            <a:prstGeom prst="line">
+              <a:avLst/>
+            </a:prstGeom>
+            <a:ln w="6350">
+              <a:solidFill>
+                <a:schemeClr val="tx1"/>
+              </a:solidFill>
+              <a:prstDash val="dash"/>
+            </a:ln>
+          </p:spPr>
+          <p:style>
+            <a:lnRef idx="1">
+              <a:schemeClr val="accent1"/>
+            </a:lnRef>
+            <a:fillRef idx="0">
+              <a:schemeClr val="accent1"/>
+            </a:fillRef>
+            <a:effectRef idx="0">
+              <a:schemeClr val="accent1"/>
+            </a:effectRef>
+            <a:fontRef idx="minor">
+              <a:schemeClr val="tx1"/>
+            </a:fontRef>
+          </p:style>
+        </p:cxnSp>
+        <p:cxnSp>
+          <p:nvCxnSpPr>
+            <p:cNvPr id="12" name="Straight Connector 11">
+              <a:extLst>
+                <a:ext uri="{FF2B5EF4-FFF2-40B4-BE49-F238E27FC236}">
+                  <a16:creationId xmlns:a16="http://schemas.microsoft.com/office/drawing/2014/main" id="{79A13A42-B467-499B-9C00-F2041540396D}"/>
+                </a:ext>
+              </a:extLst>
+            </p:cNvPr>
+            <p:cNvCxnSpPr/>
+            <p:nvPr/>
+          </p:nvCxnSpPr>
+          <p:spPr>
+            <a:xfrm rot="8100000">
+              <a:off x="2701687" y="3059637"/>
+              <a:ext cx="137160" cy="0"/>
+            </a:xfrm>
+            <a:prstGeom prst="line">
+              <a:avLst/>
+            </a:prstGeom>
+            <a:ln w="6350">
+              <a:solidFill>
+                <a:schemeClr val="tx1"/>
+              </a:solidFill>
+              <a:prstDash val="dash"/>
+            </a:ln>
+          </p:spPr>
+          <p:style>
+            <a:lnRef idx="1">
+              <a:schemeClr val="accent1"/>
+            </a:lnRef>
+            <a:fillRef idx="0">
+              <a:schemeClr val="accent1"/>
+            </a:fillRef>
+            <a:effectRef idx="0">
+              <a:schemeClr val="accent1"/>
+            </a:effectRef>
+            <a:fontRef idx="minor">
+              <a:schemeClr val="tx1"/>
+            </a:fontRef>
+          </p:style>
+        </p:cxnSp>
+        <mc:AlternateContent xmlns:mc="http://schemas.openxmlformats.org/markup-compatibility/2006">
+          <mc:Choice xmlns:a14="http://schemas.microsoft.com/office/drawing/2010/main" Requires="a14">
+            <p:sp>
+              <p:nvSpPr>
+                <p:cNvPr id="13" name="TextBox 12">
+                  <a:extLst>
+                    <a:ext uri="{FF2B5EF4-FFF2-40B4-BE49-F238E27FC236}">
+                      <a16:creationId xmlns:a16="http://schemas.microsoft.com/office/drawing/2014/main" id="{19F7D08C-979A-4B9E-BBAA-107F4B5E3956}"/>
+                    </a:ext>
+                  </a:extLst>
+                </p:cNvPr>
+                <p:cNvSpPr txBox="1">
+                  <a:spLocks noChangeAspect="1"/>
+                </p:cNvSpPr>
+                <p:nvPr/>
+              </p:nvSpPr>
+              <p:spPr>
+                <a:xfrm>
+                  <a:off x="2626379" y="2791889"/>
+                  <a:ext cx="125996" cy="230256"/>
+                </a:xfrm>
+                <a:prstGeom prst="rect">
+                  <a:avLst/>
+                </a:prstGeom>
+                <a:noFill/>
+                <a:ln>
+                  <a:noFill/>
+                </a:ln>
+              </p:spPr>
+              <p:txBody>
+                <a:bodyPr wrap="square" lIns="0" rIns="0" rtlCol="0">
+                  <a:spAutoFit/>
+                </a:bodyPr>
+                <a:lstStyle/>
+                <a:p>
+                  <a14:m>
+                    <m:oMath xmlns:m="http://schemas.openxmlformats.org/officeDocument/2006/math">
+                      <m:acc>
+                        <m:accPr>
+                          <m:chr m:val="⃑"/>
+                          <m:ctrlPr>
+                            <a:rPr lang="en-US" altLang="zh-TW" sz="800" b="0" i="1" smtClean="0">
+                              <a:latin typeface="Cambria Math" panose="02040503050406030204" pitchFamily="18" charset="0"/>
+                            </a:rPr>
+                          </m:ctrlPr>
+                        </m:accPr>
+                        <m:e>
+                          <m:r>
+                            <a:rPr lang="en-US" altLang="zh-TW" sz="800" b="0" i="1" smtClean="0">
+                              <a:latin typeface="Cambria Math" panose="02040503050406030204" pitchFamily="18" charset="0"/>
+                            </a:rPr>
+                            <m:t>𝑉</m:t>
+                          </m:r>
+                        </m:e>
+                      </m:acc>
+                    </m:oMath>
+                  </a14:m>
+                  <a:r>
+                    <a:rPr lang="en-US" altLang="zh-TW" sz="800" baseline="-25000" dirty="0"/>
+                    <a:t>1</a:t>
+                  </a:r>
+                  <a:endParaRPr lang="zh-TW" altLang="en-US" sz="800" baseline="-25000" dirty="0"/>
+                </a:p>
+              </p:txBody>
+            </p:sp>
+          </mc:Choice>
+          <mc:Fallback>
+            <p:sp>
+              <p:nvSpPr>
+                <p:cNvPr id="13" name="TextBox 12">
+                  <a:extLst>
+                    <a:ext uri="{FF2B5EF4-FFF2-40B4-BE49-F238E27FC236}">
+                      <a16:creationId xmlns:a16="http://schemas.microsoft.com/office/drawing/2014/main" id="{19F7D08C-979A-4B9E-BBAA-107F4B5E3956}"/>
+                    </a:ext>
+                  </a:extLst>
+                </p:cNvPr>
+                <p:cNvSpPr txBox="1">
+                  <a:spLocks noRot="1" noChangeAspect="1" noMove="1" noResize="1" noEditPoints="1" noAdjustHandles="1" noChangeArrowheads="1" noChangeShapeType="1" noTextEdit="1"/>
+                </p:cNvSpPr>
+                <p:nvPr/>
+              </p:nvSpPr>
+              <p:spPr>
+                <a:xfrm>
+                  <a:off x="2626379" y="2791889"/>
+                  <a:ext cx="125996" cy="230256"/>
+                </a:xfrm>
+                <a:prstGeom prst="rect">
+                  <a:avLst/>
+                </a:prstGeom>
+                <a:blipFill>
+                  <a:blip r:embed="rId3"/>
+                  <a:stretch>
+                    <a:fillRect l="-30000" r="-20000" b="-2632"/>
+                  </a:stretch>
+                </a:blipFill>
+                <a:ln>
+                  <a:noFill/>
+                </a:ln>
+              </p:spPr>
+              <p:txBody>
+                <a:bodyPr/>
+                <a:lstStyle/>
+                <a:p>
+                  <a:r>
+                    <a:rPr lang="en-US">
+                      <a:noFill/>
+                    </a:rPr>
+                    <a:t> </a:t>
+                  </a:r>
+                </a:p>
+              </p:txBody>
+            </p:sp>
+          </mc:Fallback>
+        </mc:AlternateContent>
+      </p:grpSp>
+      <p:grpSp>
+        <p:nvGrpSpPr>
+          <p:cNvPr id="21" name="Group 20">
+            <a:extLst>
+              <a:ext uri="{FF2B5EF4-FFF2-40B4-BE49-F238E27FC236}">
+                <a16:creationId xmlns:a16="http://schemas.microsoft.com/office/drawing/2014/main" id="{D3C33343-37D1-456C-900D-F1D133A5F363}"/>
+              </a:ext>
+            </a:extLst>
+          </p:cNvPr>
+          <p:cNvGrpSpPr/>
+          <p:nvPr/>
+        </p:nvGrpSpPr>
+        <p:grpSpPr>
+          <a:xfrm>
+            <a:off x="3202174" y="2438243"/>
+            <a:ext cx="1975138" cy="1692237"/>
+            <a:chOff x="3612024" y="2438243"/>
+            <a:chExt cx="1975138" cy="1692237"/>
+          </a:xfrm>
+        </p:grpSpPr>
+        <p:sp>
+          <p:nvSpPr>
+            <p:cNvPr id="22" name="TextBox 21">
+              <a:extLst>
+                <a:ext uri="{FF2B5EF4-FFF2-40B4-BE49-F238E27FC236}">
+                  <a16:creationId xmlns:a16="http://schemas.microsoft.com/office/drawing/2014/main" id="{B8A36140-AEDE-42BA-963D-5CF977112E5E}"/>
+                </a:ext>
+              </a:extLst>
+            </p:cNvPr>
+            <p:cNvSpPr txBox="1"/>
+            <p:nvPr/>
+          </p:nvSpPr>
+          <p:spPr>
+            <a:xfrm>
+              <a:off x="4492033" y="3206624"/>
+              <a:ext cx="637995" cy="215444"/>
+            </a:xfrm>
+            <a:prstGeom prst="rect">
+              <a:avLst/>
+            </a:prstGeom>
+            <a:noFill/>
+          </p:spPr>
+          <p:txBody>
+            <a:bodyPr wrap="none" lIns="0" rIns="0" rtlCol="0">
+              <a:spAutoFit/>
+            </a:bodyPr>
+            <a:lstStyle/>
+            <a:p>
+              <a:r>
+                <a:rPr lang="en-US" altLang="zh-TW" sz="800" dirty="0"/>
+                <a:t>dist = v1.length</a:t>
+              </a:r>
+              <a:endParaRPr lang="zh-TW" altLang="en-US" sz="800" baseline="-25000" dirty="0"/>
+            </a:p>
+          </p:txBody>
+        </p:sp>
+        <p:sp>
+          <p:nvSpPr>
+            <p:cNvPr id="23" name="Right Brace 22">
+              <a:extLst>
+                <a:ext uri="{FF2B5EF4-FFF2-40B4-BE49-F238E27FC236}">
+                  <a16:creationId xmlns:a16="http://schemas.microsoft.com/office/drawing/2014/main" id="{2E21E01C-7532-4689-A8E6-19B006C31F6E}"/>
+                </a:ext>
+              </a:extLst>
+            </p:cNvPr>
+            <p:cNvSpPr/>
+            <p:nvPr/>
+          </p:nvSpPr>
+          <p:spPr>
+            <a:xfrm rot="1200000">
+              <a:off x="5227434" y="3328790"/>
+              <a:ext cx="46101" cy="393192"/>
+            </a:xfrm>
+            <a:prstGeom prst="rightBrace">
+              <a:avLst>
+                <a:gd name="adj1" fmla="val 147059"/>
+                <a:gd name="adj2" fmla="val 50000"/>
+              </a:avLst>
+            </a:prstGeom>
+            <a:ln w="9525">
+              <a:solidFill>
+                <a:schemeClr val="tx1"/>
+              </a:solidFill>
+            </a:ln>
+          </p:spPr>
+          <p:style>
+            <a:lnRef idx="1">
+              <a:schemeClr val="accent1"/>
+            </a:lnRef>
+            <a:fillRef idx="0">
+              <a:schemeClr val="accent1"/>
+            </a:fillRef>
+            <a:effectRef idx="0">
+              <a:schemeClr val="accent1"/>
+            </a:effectRef>
+            <a:fontRef idx="minor">
+              <a:schemeClr val="tx1"/>
+            </a:fontRef>
+          </p:style>
+          <p:txBody>
+            <a:bodyPr rtlCol="0" anchor="ctr"/>
+            <a:lstStyle/>
+            <a:p>
+              <a:pPr algn="ctr"/>
+              <a:endParaRPr lang="en-US"/>
+            </a:p>
+          </p:txBody>
+        </p:sp>
+        <p:cxnSp>
+          <p:nvCxnSpPr>
+            <p:cNvPr id="24" name="Straight Connector 23">
+              <a:extLst>
+                <a:ext uri="{FF2B5EF4-FFF2-40B4-BE49-F238E27FC236}">
+                  <a16:creationId xmlns:a16="http://schemas.microsoft.com/office/drawing/2014/main" id="{C0B8F81A-6A95-44A4-A12D-FCAB0E7B8731}"/>
+                </a:ext>
+              </a:extLst>
+            </p:cNvPr>
+            <p:cNvCxnSpPr/>
+            <p:nvPr/>
+          </p:nvCxnSpPr>
+          <p:spPr>
+            <a:xfrm rot="1200000">
+              <a:off x="3970013" y="3105607"/>
+              <a:ext cx="1371600" cy="0"/>
+            </a:xfrm>
+            <a:prstGeom prst="line">
+              <a:avLst/>
+            </a:prstGeom>
+            <a:ln w="6350">
+              <a:solidFill>
+                <a:schemeClr val="tx1"/>
+              </a:solidFill>
+              <a:prstDash val="dash"/>
+            </a:ln>
+          </p:spPr>
+          <p:style>
+            <a:lnRef idx="1">
+              <a:schemeClr val="accent1"/>
+            </a:lnRef>
+            <a:fillRef idx="0">
+              <a:schemeClr val="accent1"/>
+            </a:fillRef>
+            <a:effectRef idx="0">
+              <a:schemeClr val="accent1"/>
+            </a:effectRef>
+            <a:fontRef idx="minor">
+              <a:schemeClr val="tx1"/>
+            </a:fontRef>
+          </p:style>
+        </p:cxnSp>
+        <p:cxnSp>
+          <p:nvCxnSpPr>
+            <p:cNvPr id="25" name="Straight Connector 24">
+              <a:extLst>
+                <a:ext uri="{FF2B5EF4-FFF2-40B4-BE49-F238E27FC236}">
+                  <a16:creationId xmlns:a16="http://schemas.microsoft.com/office/drawing/2014/main" id="{0B2F3E85-831A-488C-9B6A-299C0214EC8E}"/>
+                </a:ext>
+              </a:extLst>
+            </p:cNvPr>
+            <p:cNvCxnSpPr/>
+            <p:nvPr/>
+          </p:nvCxnSpPr>
+          <p:spPr>
+            <a:xfrm rot="1200000">
+              <a:off x="3917793" y="3181097"/>
+              <a:ext cx="548640" cy="0"/>
+            </a:xfrm>
+            <a:prstGeom prst="line">
+              <a:avLst/>
+            </a:prstGeom>
+            <a:ln w="6350">
+              <a:solidFill>
+                <a:schemeClr val="tx1"/>
+              </a:solidFill>
+              <a:prstDash val="dash"/>
+            </a:ln>
+          </p:spPr>
+          <p:style>
+            <a:lnRef idx="1">
+              <a:schemeClr val="accent1"/>
+            </a:lnRef>
+            <a:fillRef idx="0">
+              <a:schemeClr val="accent1"/>
+            </a:fillRef>
+            <a:effectRef idx="0">
+              <a:schemeClr val="accent1"/>
+            </a:effectRef>
+            <a:fontRef idx="minor">
+              <a:schemeClr val="tx1"/>
+            </a:fontRef>
+          </p:style>
+        </p:cxnSp>
+        <p:cxnSp>
+          <p:nvCxnSpPr>
+            <p:cNvPr id="26" name="Straight Connector 25">
+              <a:extLst>
+                <a:ext uri="{FF2B5EF4-FFF2-40B4-BE49-F238E27FC236}">
+                  <a16:creationId xmlns:a16="http://schemas.microsoft.com/office/drawing/2014/main" id="{57AE062D-AF3F-42C6-83DD-8B4F70FB14D9}"/>
+                </a:ext>
+              </a:extLst>
+            </p:cNvPr>
+            <p:cNvCxnSpPr/>
+            <p:nvPr/>
+          </p:nvCxnSpPr>
+          <p:spPr>
+            <a:xfrm rot="1200000">
+              <a:off x="3844549" y="3476050"/>
+              <a:ext cx="1371600" cy="0"/>
+            </a:xfrm>
+            <a:prstGeom prst="line">
+              <a:avLst/>
+            </a:prstGeom>
+            <a:ln w="6350">
+              <a:solidFill>
+                <a:schemeClr val="tx1"/>
+              </a:solidFill>
+              <a:prstDash val="dash"/>
+            </a:ln>
+          </p:spPr>
+          <p:style>
+            <a:lnRef idx="1">
+              <a:schemeClr val="accent1"/>
+            </a:lnRef>
+            <a:fillRef idx="0">
+              <a:schemeClr val="accent1"/>
+            </a:fillRef>
+            <a:effectRef idx="0">
+              <a:schemeClr val="accent1"/>
+            </a:effectRef>
+            <a:fontRef idx="minor">
+              <a:schemeClr val="tx1"/>
+            </a:fontRef>
+          </p:style>
+        </p:cxnSp>
+        <p:sp>
+          <p:nvSpPr>
+            <p:cNvPr id="27" name="Right Brace 26">
+              <a:extLst>
+                <a:ext uri="{FF2B5EF4-FFF2-40B4-BE49-F238E27FC236}">
+                  <a16:creationId xmlns:a16="http://schemas.microsoft.com/office/drawing/2014/main" id="{13C48FC6-774E-47EB-A50E-E9365E2D447A}"/>
+                </a:ext>
+              </a:extLst>
+            </p:cNvPr>
+            <p:cNvSpPr/>
+            <p:nvPr/>
+          </p:nvSpPr>
+          <p:spPr>
+            <a:xfrm rot="1200000">
+              <a:off x="4490565" y="3061093"/>
+              <a:ext cx="46101" cy="228600"/>
+            </a:xfrm>
+            <a:prstGeom prst="rightBrace">
+              <a:avLst>
+                <a:gd name="adj1" fmla="val 147059"/>
+                <a:gd name="adj2" fmla="val 50000"/>
+              </a:avLst>
+            </a:prstGeom>
+            <a:ln w="9525">
+              <a:solidFill>
+                <a:schemeClr val="tx1"/>
+              </a:solidFill>
+            </a:ln>
+          </p:spPr>
+          <p:style>
+            <a:lnRef idx="1">
+              <a:schemeClr val="accent1"/>
+            </a:lnRef>
+            <a:fillRef idx="0">
+              <a:schemeClr val="accent1"/>
+            </a:fillRef>
+            <a:effectRef idx="0">
+              <a:schemeClr val="accent1"/>
+            </a:effectRef>
+            <a:fontRef idx="minor">
+              <a:schemeClr val="tx1"/>
+            </a:fontRef>
+          </p:style>
+          <p:txBody>
+            <a:bodyPr rtlCol="0" anchor="ctr"/>
+            <a:lstStyle/>
+            <a:p>
+              <a:pPr algn="ctr"/>
+              <a:endParaRPr lang="en-US"/>
+            </a:p>
+          </p:txBody>
+        </p:sp>
+        <p:sp>
+          <p:nvSpPr>
+            <p:cNvPr id="28" name="TextBox 27">
+              <a:extLst>
+                <a:ext uri="{FF2B5EF4-FFF2-40B4-BE49-F238E27FC236}">
+                  <a16:creationId xmlns:a16="http://schemas.microsoft.com/office/drawing/2014/main" id="{87F9A93D-6DD6-421D-AB0E-F3AAFC09D05A}"/>
+                </a:ext>
+              </a:extLst>
+            </p:cNvPr>
+            <p:cNvSpPr txBox="1"/>
+            <p:nvPr/>
+          </p:nvSpPr>
+          <p:spPr>
+            <a:xfrm>
+              <a:off x="5329078" y="3428981"/>
+              <a:ext cx="258084" cy="215444"/>
+            </a:xfrm>
+            <a:prstGeom prst="rect">
+              <a:avLst/>
+            </a:prstGeom>
+            <a:noFill/>
+          </p:spPr>
+          <p:txBody>
+            <a:bodyPr wrap="none" lIns="0" rIns="0" rtlCol="0">
+              <a:spAutoFit/>
+            </a:bodyPr>
+            <a:lstStyle/>
+            <a:p>
+              <a:r>
+                <a:rPr lang="en-US" altLang="zh-TW" sz="800" dirty="0"/>
+                <a:t>radius</a:t>
+              </a:r>
+              <a:endParaRPr lang="zh-TW" altLang="en-US" sz="800" baseline="-25000" dirty="0"/>
+            </a:p>
+          </p:txBody>
+        </p:sp>
+        <p:grpSp>
+          <p:nvGrpSpPr>
+            <p:cNvPr id="29" name="Group 28">
+              <a:extLst>
+                <a:ext uri="{FF2B5EF4-FFF2-40B4-BE49-F238E27FC236}">
+                  <a16:creationId xmlns:a16="http://schemas.microsoft.com/office/drawing/2014/main" id="{509D5C49-1B37-4EBA-8789-E935F339C01D}"/>
+                </a:ext>
+              </a:extLst>
+            </p:cNvPr>
+            <p:cNvGrpSpPr/>
+            <p:nvPr/>
+          </p:nvGrpSpPr>
+          <p:grpSpPr>
+            <a:xfrm rot="2700000">
+              <a:off x="3399712" y="3270540"/>
+              <a:ext cx="1234441" cy="485440"/>
+              <a:chOff x="2468879" y="2791160"/>
+              <a:chExt cx="1234441" cy="485440"/>
+            </a:xfrm>
+          </p:grpSpPr>
+          <p:sp>
+            <p:nvSpPr>
+              <p:cNvPr id="36" name="Flowchart: Or 35">
+                <a:extLst>
+                  <a:ext uri="{FF2B5EF4-FFF2-40B4-BE49-F238E27FC236}">
+                    <a16:creationId xmlns:a16="http://schemas.microsoft.com/office/drawing/2014/main" id="{60798C1D-A928-433C-9A36-2743E0A3C852}"/>
+                  </a:ext>
+                </a:extLst>
+              </p:cNvPr>
+              <p:cNvSpPr>
+                <a:spLocks noChangeAspect="1"/>
+              </p:cNvSpPr>
+              <p:nvPr/>
+            </p:nvSpPr>
+            <p:spPr>
+              <a:xfrm>
+                <a:off x="2713574" y="2791160"/>
+                <a:ext cx="45719" cy="48409"/>
+              </a:xfrm>
+              <a:prstGeom prst="flowChartOr">
+                <a:avLst/>
+              </a:prstGeom>
+              <a:solidFill>
+                <a:schemeClr val="tx1"/>
+              </a:solidFill>
+              <a:ln w="6350">
+                <a:solidFill>
+                  <a:schemeClr val="tx1"/>
+                </a:solidFill>
+              </a:ln>
+            </p:spPr>
+            <p:style>
+              <a:lnRef idx="2">
+                <a:schemeClr val="accent1">
+                  <a:shade val="50000"/>
+                </a:schemeClr>
+              </a:lnRef>
+              <a:fillRef idx="1">
+                <a:schemeClr val="accent1"/>
+              </a:fillRef>
+              <a:effectRef idx="0">
+                <a:schemeClr val="accent1"/>
+              </a:effectRef>
+              <a:fontRef idx="minor">
+                <a:schemeClr val="lt1"/>
+              </a:fontRef>
+            </p:style>
+            <p:txBody>
+              <a:bodyPr rtlCol="0" anchor="ctr"/>
+              <a:lstStyle/>
+              <a:p>
+                <a:pPr algn="ctr"/>
+                <a:endParaRPr lang="en-US"/>
+              </a:p>
+            </p:txBody>
+          </p:sp>
+          <p:grpSp>
+            <p:nvGrpSpPr>
+              <p:cNvPr id="37" name="Group 36">
+                <a:extLst>
+                  <a:ext uri="{FF2B5EF4-FFF2-40B4-BE49-F238E27FC236}">
+                    <a16:creationId xmlns:a16="http://schemas.microsoft.com/office/drawing/2014/main" id="{9A50CDCC-0BEC-43AF-AD92-3BBD4AEEE23A}"/>
+                  </a:ext>
+                </a:extLst>
+              </p:cNvPr>
+              <p:cNvGrpSpPr/>
+              <p:nvPr/>
+            </p:nvGrpSpPr>
+            <p:grpSpPr>
+              <a:xfrm>
+                <a:off x="2468879" y="2819400"/>
+                <a:ext cx="1234441" cy="457200"/>
+                <a:chOff x="2468879" y="2819400"/>
+                <a:chExt cx="1234441" cy="457200"/>
+              </a:xfrm>
+            </p:grpSpPr>
+            <p:sp>
+              <p:nvSpPr>
+                <p:cNvPr id="38" name="Rectangle 37">
+                  <a:extLst>
+                    <a:ext uri="{FF2B5EF4-FFF2-40B4-BE49-F238E27FC236}">
+                      <a16:creationId xmlns:a16="http://schemas.microsoft.com/office/drawing/2014/main" id="{96365B61-B029-4DDC-B17D-BC272BC8F349}"/>
+                    </a:ext>
+                  </a:extLst>
+                </p:cNvPr>
+                <p:cNvSpPr/>
+                <p:nvPr/>
+              </p:nvSpPr>
+              <p:spPr>
+                <a:xfrm>
+                  <a:off x="2736054" y="2819400"/>
+                  <a:ext cx="685800" cy="457200"/>
+                </a:xfrm>
+                <a:prstGeom prst="rect">
+                  <a:avLst/>
+                </a:prstGeom>
+                <a:noFill/>
+                <a:ln w="12700">
+                  <a:solidFill>
+                    <a:schemeClr val="tx1"/>
+                  </a:solidFill>
+                </a:ln>
+              </p:spPr>
+              <p:style>
+                <a:lnRef idx="2">
+                  <a:schemeClr val="accent1">
+                    <a:shade val="50000"/>
+                  </a:schemeClr>
+                </a:lnRef>
+                <a:fillRef idx="1">
+                  <a:schemeClr val="accent1"/>
+                </a:fillRef>
+                <a:effectRef idx="0">
+                  <a:schemeClr val="accent1"/>
+                </a:effectRef>
+                <a:fontRef idx="minor">
+                  <a:schemeClr val="lt1"/>
+                </a:fontRef>
+              </p:style>
+              <p:txBody>
+                <a:bodyPr rtlCol="0" anchor="ctr"/>
+                <a:lstStyle/>
+                <a:p>
+                  <a:pPr algn="ctr"/>
+                  <a:endParaRPr lang="en-US"/>
+                </a:p>
+              </p:txBody>
+            </p:sp>
+            <p:cxnSp>
+              <p:nvCxnSpPr>
+                <p:cNvPr id="39" name="Straight Connector 38">
+                  <a:extLst>
+                    <a:ext uri="{FF2B5EF4-FFF2-40B4-BE49-F238E27FC236}">
+                      <a16:creationId xmlns:a16="http://schemas.microsoft.com/office/drawing/2014/main" id="{C794751C-6D03-44E8-95F8-253127AFCD13}"/>
+                    </a:ext>
+                  </a:extLst>
+                </p:cNvPr>
+                <p:cNvCxnSpPr/>
+                <p:nvPr/>
+              </p:nvCxnSpPr>
+              <p:spPr>
+                <a:xfrm>
+                  <a:off x="3429000" y="2819400"/>
+                  <a:ext cx="274320" cy="0"/>
+                </a:xfrm>
+                <a:prstGeom prst="line">
+                  <a:avLst/>
+                </a:prstGeom>
+                <a:ln w="6350">
+                  <a:solidFill>
+                    <a:schemeClr val="tx1"/>
+                  </a:solidFill>
+                  <a:prstDash val="dash"/>
+                </a:ln>
+              </p:spPr>
+              <p:style>
+                <a:lnRef idx="1">
+                  <a:schemeClr val="accent1"/>
+                </a:lnRef>
+                <a:fillRef idx="0">
+                  <a:schemeClr val="accent1"/>
+                </a:fillRef>
+                <a:effectRef idx="0">
+                  <a:schemeClr val="accent1"/>
+                </a:effectRef>
+                <a:fontRef idx="minor">
+                  <a:schemeClr val="tx1"/>
+                </a:fontRef>
+              </p:style>
+            </p:cxnSp>
+            <p:cxnSp>
+              <p:nvCxnSpPr>
+                <p:cNvPr id="40" name="Straight Connector 39">
+                  <a:extLst>
+                    <a:ext uri="{FF2B5EF4-FFF2-40B4-BE49-F238E27FC236}">
+                      <a16:creationId xmlns:a16="http://schemas.microsoft.com/office/drawing/2014/main" id="{CEC4CF5F-833D-4C6B-89FF-71BA8F1E2CCE}"/>
+                    </a:ext>
+                  </a:extLst>
+                </p:cNvPr>
+                <p:cNvCxnSpPr/>
+                <p:nvPr/>
+              </p:nvCxnSpPr>
+              <p:spPr>
+                <a:xfrm>
+                  <a:off x="2468879" y="2819400"/>
+                  <a:ext cx="274320" cy="0"/>
+                </a:xfrm>
+                <a:prstGeom prst="line">
+                  <a:avLst/>
+                </a:prstGeom>
+                <a:ln w="6350">
+                  <a:solidFill>
+                    <a:schemeClr val="tx1"/>
+                  </a:solidFill>
+                  <a:prstDash val="dash"/>
+                </a:ln>
+              </p:spPr>
+              <p:style>
+                <a:lnRef idx="1">
+                  <a:schemeClr val="accent1"/>
+                </a:lnRef>
+                <a:fillRef idx="0">
+                  <a:schemeClr val="accent1"/>
+                </a:fillRef>
+                <a:effectRef idx="0">
+                  <a:schemeClr val="accent1"/>
+                </a:effectRef>
+                <a:fontRef idx="minor">
+                  <a:schemeClr val="tx1"/>
+                </a:fontRef>
+              </p:style>
+            </p:cxnSp>
+          </p:grpSp>
+        </p:grpSp>
+        <p:grpSp>
+          <p:nvGrpSpPr>
+            <p:cNvPr id="30" name="Group 29">
+              <a:extLst>
+                <a:ext uri="{FF2B5EF4-FFF2-40B4-BE49-F238E27FC236}">
+                  <a16:creationId xmlns:a16="http://schemas.microsoft.com/office/drawing/2014/main" id="{4E4DFB87-90A8-4FB1-A56C-F619491C8FCC}"/>
+                </a:ext>
+              </a:extLst>
+            </p:cNvPr>
+            <p:cNvGrpSpPr/>
+            <p:nvPr/>
+          </p:nvGrpSpPr>
+          <p:grpSpPr>
+            <a:xfrm>
+              <a:off x="3612024" y="2438243"/>
+              <a:ext cx="822960" cy="822960"/>
+              <a:chOff x="2120815" y="2616887"/>
+              <a:chExt cx="822960" cy="822960"/>
+            </a:xfrm>
+          </p:grpSpPr>
+          <p:sp>
+            <p:nvSpPr>
+              <p:cNvPr id="34" name="Flowchart: Or 33">
+                <a:extLst>
+                  <a:ext uri="{FF2B5EF4-FFF2-40B4-BE49-F238E27FC236}">
+                    <a16:creationId xmlns:a16="http://schemas.microsoft.com/office/drawing/2014/main" id="{7C26F0AB-D46B-4287-BAF7-2EAC46AC2BE4}"/>
+                  </a:ext>
+                </a:extLst>
+              </p:cNvPr>
+              <p:cNvSpPr>
+                <a:spLocks noChangeAspect="1"/>
+              </p:cNvSpPr>
+              <p:nvPr/>
+            </p:nvSpPr>
+            <p:spPr>
+              <a:xfrm>
+                <a:off x="2505764" y="3005507"/>
+                <a:ext cx="43180" cy="45720"/>
+              </a:xfrm>
+              <a:prstGeom prst="flowChartOr">
+                <a:avLst/>
+              </a:prstGeom>
+              <a:solidFill>
+                <a:schemeClr val="tx1"/>
+              </a:solidFill>
+              <a:ln w="6350">
+                <a:solidFill>
+                  <a:schemeClr val="tx1"/>
+                </a:solidFill>
+              </a:ln>
+            </p:spPr>
+            <p:style>
+              <a:lnRef idx="2">
+                <a:schemeClr val="accent1">
+                  <a:shade val="50000"/>
+                </a:schemeClr>
+              </a:lnRef>
+              <a:fillRef idx="1">
+                <a:schemeClr val="accent1"/>
+              </a:fillRef>
+              <a:effectRef idx="0">
+                <a:schemeClr val="accent1"/>
+              </a:effectRef>
+              <a:fontRef idx="minor">
+                <a:schemeClr val="lt1"/>
+              </a:fontRef>
+            </p:style>
+            <p:txBody>
+              <a:bodyPr rtlCol="0" anchor="ctr"/>
+              <a:lstStyle/>
+              <a:p>
+                <a:pPr algn="ctr"/>
+                <a:endParaRPr lang="en-US"/>
+              </a:p>
+            </p:txBody>
+          </p:sp>
+          <p:sp>
+            <p:nvSpPr>
+              <p:cNvPr id="35" name="Oval 34">
+                <a:extLst>
+                  <a:ext uri="{FF2B5EF4-FFF2-40B4-BE49-F238E27FC236}">
+                    <a16:creationId xmlns:a16="http://schemas.microsoft.com/office/drawing/2014/main" id="{955CB684-CA93-4CF0-8BAB-1DED75A48F59}"/>
+                  </a:ext>
+                </a:extLst>
+              </p:cNvPr>
+              <p:cNvSpPr>
+                <a:spLocks noChangeAspect="1"/>
+              </p:cNvSpPr>
+              <p:nvPr/>
+            </p:nvSpPr>
+            <p:spPr>
+              <a:xfrm>
+                <a:off x="2120815" y="2616887"/>
+                <a:ext cx="822960" cy="822960"/>
+              </a:xfrm>
+              <a:prstGeom prst="ellipse">
+                <a:avLst/>
+              </a:prstGeom>
+              <a:noFill/>
+              <a:ln w="12700">
+                <a:solidFill>
+                  <a:schemeClr val="tx1"/>
+                </a:solidFill>
+              </a:ln>
+            </p:spPr>
+            <p:style>
+              <a:lnRef idx="2">
+                <a:schemeClr val="accent1">
+                  <a:shade val="50000"/>
+                </a:schemeClr>
+              </a:lnRef>
+              <a:fillRef idx="1">
+                <a:schemeClr val="accent1"/>
+              </a:fillRef>
+              <a:effectRef idx="0">
+                <a:schemeClr val="accent1"/>
+              </a:effectRef>
+              <a:fontRef idx="minor">
+                <a:schemeClr val="lt1"/>
+              </a:fontRef>
+            </p:style>
+            <p:txBody>
+              <a:bodyPr rtlCol="0" anchor="ctr"/>
+              <a:lstStyle/>
+              <a:p>
+                <a:pPr algn="ctr"/>
+                <a:endParaRPr lang="en-US"/>
+              </a:p>
+            </p:txBody>
+          </p:sp>
+        </p:grpSp>
+        <p:cxnSp>
+          <p:nvCxnSpPr>
+            <p:cNvPr id="31" name="Straight Arrow Connector 30">
+              <a:extLst>
+                <a:ext uri="{FF2B5EF4-FFF2-40B4-BE49-F238E27FC236}">
+                  <a16:creationId xmlns:a16="http://schemas.microsoft.com/office/drawing/2014/main" id="{257A81ED-D772-40CD-B5EA-E7663AA9D7D2}"/>
+                </a:ext>
+              </a:extLst>
+            </p:cNvPr>
+            <p:cNvCxnSpPr/>
+            <p:nvPr/>
+          </p:nvCxnSpPr>
+          <p:spPr>
+            <a:xfrm rot="1200000" flipV="1">
+              <a:off x="3972283" y="2864157"/>
+              <a:ext cx="0" cy="228600"/>
+            </a:xfrm>
+            <a:prstGeom prst="straightConnector1">
+              <a:avLst/>
+            </a:prstGeom>
+            <a:ln w="6350">
+              <a:solidFill>
+                <a:schemeClr val="tx1"/>
+              </a:solidFill>
+              <a:prstDash val="solid"/>
+              <a:tailEnd type="triangle" w="sm" len="sm"/>
+            </a:ln>
+          </p:spPr>
+          <p:style>
+            <a:lnRef idx="1">
+              <a:schemeClr val="accent1"/>
+            </a:lnRef>
+            <a:fillRef idx="0">
+              <a:schemeClr val="accent1"/>
+            </a:fillRef>
+            <a:effectRef idx="0">
+              <a:schemeClr val="accent1"/>
+            </a:effectRef>
+            <a:fontRef idx="minor">
+              <a:schemeClr val="tx1"/>
+            </a:fontRef>
+          </p:style>
+        </p:cxnSp>
+        <p:cxnSp>
+          <p:nvCxnSpPr>
+            <p:cNvPr id="32" name="Straight Connector 31">
+              <a:extLst>
+                <a:ext uri="{FF2B5EF4-FFF2-40B4-BE49-F238E27FC236}">
+                  <a16:creationId xmlns:a16="http://schemas.microsoft.com/office/drawing/2014/main" id="{8E9D7B20-86B8-4FF8-9139-E07AE97DFD8D}"/>
+                </a:ext>
+              </a:extLst>
+            </p:cNvPr>
+            <p:cNvCxnSpPr/>
+            <p:nvPr/>
+          </p:nvCxnSpPr>
+          <p:spPr>
+            <a:xfrm rot="8100000">
+              <a:off x="4385118" y="3552357"/>
+              <a:ext cx="137160" cy="0"/>
+            </a:xfrm>
+            <a:prstGeom prst="line">
+              <a:avLst/>
+            </a:prstGeom>
+            <a:ln w="6350">
+              <a:solidFill>
+                <a:schemeClr val="tx1"/>
+              </a:solidFill>
+              <a:prstDash val="dash"/>
+            </a:ln>
+          </p:spPr>
+          <p:style>
+            <a:lnRef idx="1">
+              <a:schemeClr val="accent1"/>
+            </a:lnRef>
+            <a:fillRef idx="0">
+              <a:schemeClr val="accent1"/>
+            </a:fillRef>
+            <a:effectRef idx="0">
+              <a:schemeClr val="accent1"/>
+            </a:effectRef>
+            <a:fontRef idx="minor">
+              <a:schemeClr val="tx1"/>
+            </a:fontRef>
+          </p:style>
+        </p:cxnSp>
+        <p:cxnSp>
+          <p:nvCxnSpPr>
+            <p:cNvPr id="33" name="Straight Connector 32">
+              <a:extLst>
+                <a:ext uri="{FF2B5EF4-FFF2-40B4-BE49-F238E27FC236}">
+                  <a16:creationId xmlns:a16="http://schemas.microsoft.com/office/drawing/2014/main" id="{5AC2EFFC-CA5D-4635-B745-1C18DB79F245}"/>
+                </a:ext>
+              </a:extLst>
+            </p:cNvPr>
+            <p:cNvCxnSpPr/>
+            <p:nvPr/>
+          </p:nvCxnSpPr>
+          <p:spPr>
+            <a:xfrm rot="8100000">
+              <a:off x="3908459" y="3059637"/>
+              <a:ext cx="137160" cy="0"/>
+            </a:xfrm>
+            <a:prstGeom prst="line">
+              <a:avLst/>
+            </a:prstGeom>
+            <a:ln w="6350">
+              <a:solidFill>
+                <a:schemeClr val="tx1"/>
+              </a:solidFill>
+              <a:prstDash val="dash"/>
+            </a:ln>
+          </p:spPr>
+          <p:style>
+            <a:lnRef idx="1">
+              <a:schemeClr val="accent1"/>
+            </a:lnRef>
+            <a:fillRef idx="0">
+              <a:schemeClr val="accent1"/>
+            </a:fillRef>
+            <a:effectRef idx="0">
+              <a:schemeClr val="accent1"/>
+            </a:effectRef>
+            <a:fontRef idx="minor">
+              <a:schemeClr val="tx1"/>
+            </a:fontRef>
+          </p:style>
+        </p:cxnSp>
+      </p:grpSp>
+    </p:spTree>
+    <p:extLst>
+      <p:ext uri="{BB962C8B-B14F-4D97-AF65-F5344CB8AC3E}">
+        <p14:creationId xmlns:p14="http://schemas.microsoft.com/office/powerpoint/2010/main" val="3429619858"/>
+      </p:ext>
+    </p:extLst>
+  </p:cSld>
+  <p:clrMapOvr>
+    <a:masterClrMapping/>
+  </p:clrMapOvr>
+</p:sld>
+</file>
+
+<file path=ppt/slides/slide14.xml><?xml version="1.0" encoding="utf-8"?>
+<p:sld xmlns:a="http://schemas.openxmlformats.org/drawingml/2006/main" xmlns:r="http://schemas.openxmlformats.org/officeDocument/2006/relationships" xmlns:p="http://schemas.openxmlformats.org/presentationml/2006/main">
+  <p:cSld>
+    <p:spTree>
+      <p:nvGrpSpPr>
+        <p:cNvPr id="1" name=""/>
+        <p:cNvGrpSpPr/>
+        <p:nvPr/>
+      </p:nvGrpSpPr>
+      <p:grpSpPr>
+        <a:xfrm>
+          <a:off x="0" y="0"/>
+          <a:ext cx="0" cy="0"/>
+          <a:chOff x="0" y="0"/>
+          <a:chExt cx="0" cy="0"/>
+        </a:xfrm>
+      </p:grpSpPr>
+      <p:sp>
+        <p:nvSpPr>
+          <p:cNvPr id="3" name="Rectangle 2">
+            <a:extLst>
+              <a:ext uri="{FF2B5EF4-FFF2-40B4-BE49-F238E27FC236}">
+                <a16:creationId xmlns:a16="http://schemas.microsoft.com/office/drawing/2014/main" id="{3540B538-F299-475B-8E49-13281C86F7AA}"/>
+              </a:ext>
+            </a:extLst>
+          </p:cNvPr>
+          <p:cNvSpPr/>
+          <p:nvPr/>
+        </p:nvSpPr>
+        <p:spPr>
+          <a:xfrm>
+            <a:off x="1756683" y="1831033"/>
+            <a:ext cx="4267200" cy="2324099"/>
+          </a:xfrm>
+          <a:prstGeom prst="rect">
+            <a:avLst/>
+          </a:prstGeom>
+          <a:noFill/>
+          <a:ln w="9525">
+            <a:prstDash val="sysDash"/>
+          </a:ln>
+        </p:spPr>
+        <p:style>
+          <a:lnRef idx="2">
+            <a:schemeClr val="accent1">
+              <a:shade val="50000"/>
+            </a:schemeClr>
+          </a:lnRef>
+          <a:fillRef idx="1">
+            <a:schemeClr val="accent1"/>
+          </a:fillRef>
+          <a:effectRef idx="0">
+            <a:schemeClr val="accent1"/>
+          </a:effectRef>
+          <a:fontRef idx="minor">
+            <a:schemeClr val="lt1"/>
+          </a:fontRef>
+        </p:style>
+        <p:txBody>
+          <a:bodyPr rtlCol="0" anchor="ctr"/>
+          <a:lstStyle/>
+          <a:p>
+            <a:pPr algn="ctr"/>
+            <a:endParaRPr lang="en-US" sz="800"/>
+          </a:p>
+        </p:txBody>
+      </p:sp>
+      <p:sp>
+        <p:nvSpPr>
+          <p:cNvPr id="4" name="TextBox 3">
+            <a:extLst>
+              <a:ext uri="{FF2B5EF4-FFF2-40B4-BE49-F238E27FC236}">
+                <a16:creationId xmlns:a16="http://schemas.microsoft.com/office/drawing/2014/main" id="{DECCB791-C196-4BE6-9771-4CA1B51A3212}"/>
+              </a:ext>
+            </a:extLst>
+          </p:cNvPr>
+          <p:cNvSpPr txBox="1"/>
+          <p:nvPr/>
+        </p:nvSpPr>
+        <p:spPr>
+          <a:xfrm>
+            <a:off x="2953968" y="4724400"/>
+            <a:ext cx="2125158" cy="338554"/>
+          </a:xfrm>
+          <a:prstGeom prst="rect">
+            <a:avLst/>
+          </a:prstGeom>
+          <a:noFill/>
+          <a:ln>
+            <a:noFill/>
+          </a:ln>
+        </p:spPr>
+        <p:txBody>
+          <a:bodyPr wrap="square" lIns="0" rIns="0" rtlCol="0">
+            <a:spAutoFit/>
+          </a:bodyPr>
+          <a:lstStyle/>
+          <a:p>
+            <a:r>
+              <a:rPr lang="en-US" altLang="zh-CN" sz="1600" dirty="0"/>
               <a:t>Figure 9</a:t>
             </a:r>
             <a:r>
-              <a:rPr lang="en-US" altLang="zh-TW" sz="1600"/>
-              <a:t>-17</a:t>
-            </a:r>
-            <a:endParaRPr lang="en-US" altLang="zh-TW" sz="1600" dirty="0"/>
+              <a:rPr lang="en-US" altLang="zh-TW" sz="1600" dirty="0"/>
+              <a:t>-18</a:t>
+            </a:r>
           </a:p>
         </p:txBody>
       </p:sp>

</xml_diff>

<commit_message>
Complete RigidShape definition in 9.5
</commit_message>
<xml_diff>
--- a/Word/Diagrams/chapter9/chap 9.figures.pptx
+++ b/Word/Diagrams/chapter9/chap 9.figures.pptx
@@ -5,7 +5,7 @@
     <p:sldMasterId id="2147483660" r:id="rId1"/>
   </p:sldMasterIdLst>
   <p:notesMasterIdLst>
-    <p:notesMasterId r:id="rId16"/>
+    <p:notesMasterId r:id="rId18"/>
   </p:notesMasterIdLst>
   <p:sldIdLst>
     <p:sldId id="306" r:id="rId2"/>
@@ -22,6 +22,8 @@
     <p:sldId id="315" r:id="rId13"/>
     <p:sldId id="317" r:id="rId14"/>
     <p:sldId id="316" r:id="rId15"/>
+    <p:sldId id="318" r:id="rId16"/>
+    <p:sldId id="319" r:id="rId17"/>
   </p:sldIdLst>
   <p:sldSz cx="9144000" cy="6858000" type="screen4x3"/>
   <p:notesSz cx="6858000" cy="9144000"/>
@@ -222,7 +224,7 @@
             <a:fld id="{9CCF083D-F2BC-4786-8C77-844DFCD3515B}" type="datetimeFigureOut">
               <a:rPr lang="zh-TW" altLang="en-US" smtClean="0"/>
               <a:pPr/>
-              <a:t>2021/6/15</a:t>
+              <a:t>2021/6/22</a:t>
             </a:fld>
             <a:endParaRPr lang="zh-TW" altLang="en-US"/>
           </a:p>
@@ -686,7 +688,7 @@
             <a:fld id="{E3D07B0C-BD95-41BE-BB3E-AC75822DF381}" type="datetimeFigureOut">
               <a:rPr lang="en-US" smtClean="0"/>
               <a:pPr/>
-              <a:t>6/15/2021</a:t>
+              <a:t>6/22/2021</a:t>
             </a:fld>
             <a:endParaRPr lang="en-US" dirty="0"/>
           </a:p>
@@ -851,7 +853,7 @@
             <a:fld id="{E3D07B0C-BD95-41BE-BB3E-AC75822DF381}" type="datetimeFigureOut">
               <a:rPr lang="en-US" smtClean="0"/>
               <a:pPr/>
-              <a:t>6/15/2021</a:t>
+              <a:t>6/22/2021</a:t>
             </a:fld>
             <a:endParaRPr lang="en-US" dirty="0"/>
           </a:p>
@@ -1027,7 +1029,7 @@
             <a:fld id="{E3D07B0C-BD95-41BE-BB3E-AC75822DF381}" type="datetimeFigureOut">
               <a:rPr lang="en-US" smtClean="0"/>
               <a:pPr/>
-              <a:t>6/15/2021</a:t>
+              <a:t>6/22/2021</a:t>
             </a:fld>
             <a:endParaRPr lang="en-US" dirty="0"/>
           </a:p>
@@ -1192,7 +1194,7 @@
             <a:fld id="{E3D07B0C-BD95-41BE-BB3E-AC75822DF381}" type="datetimeFigureOut">
               <a:rPr lang="en-US" smtClean="0"/>
               <a:pPr/>
-              <a:t>6/15/2021</a:t>
+              <a:t>6/22/2021</a:t>
             </a:fld>
             <a:endParaRPr lang="en-US" dirty="0"/>
           </a:p>
@@ -1435,7 +1437,7 @@
             <a:fld id="{E3D07B0C-BD95-41BE-BB3E-AC75822DF381}" type="datetimeFigureOut">
               <a:rPr lang="en-US" smtClean="0"/>
               <a:pPr/>
-              <a:t>6/15/2021</a:t>
+              <a:t>6/22/2021</a:t>
             </a:fld>
             <a:endParaRPr lang="en-US" dirty="0"/>
           </a:p>
@@ -1719,7 +1721,7 @@
             <a:fld id="{E3D07B0C-BD95-41BE-BB3E-AC75822DF381}" type="datetimeFigureOut">
               <a:rPr lang="en-US" smtClean="0"/>
               <a:pPr/>
-              <a:t>6/15/2021</a:t>
+              <a:t>6/22/2021</a:t>
             </a:fld>
             <a:endParaRPr lang="en-US" dirty="0"/>
           </a:p>
@@ -2148,7 +2150,7 @@
             <a:fld id="{E3D07B0C-BD95-41BE-BB3E-AC75822DF381}" type="datetimeFigureOut">
               <a:rPr lang="en-US" smtClean="0"/>
               <a:pPr/>
-              <a:t>6/15/2021</a:t>
+              <a:t>6/22/2021</a:t>
             </a:fld>
             <a:endParaRPr lang="en-US" dirty="0"/>
           </a:p>
@@ -2262,7 +2264,7 @@
             <a:fld id="{E3D07B0C-BD95-41BE-BB3E-AC75822DF381}" type="datetimeFigureOut">
               <a:rPr lang="en-US" smtClean="0"/>
               <a:pPr/>
-              <a:t>6/15/2021</a:t>
+              <a:t>6/22/2021</a:t>
             </a:fld>
             <a:endParaRPr lang="en-US" dirty="0"/>
           </a:p>
@@ -2354,7 +2356,7 @@
             <a:fld id="{E3D07B0C-BD95-41BE-BB3E-AC75822DF381}" type="datetimeFigureOut">
               <a:rPr lang="en-US" smtClean="0"/>
               <a:pPr/>
-              <a:t>6/15/2021</a:t>
+              <a:t>6/22/2021</a:t>
             </a:fld>
             <a:endParaRPr lang="en-US" dirty="0"/>
           </a:p>
@@ -2545,7 +2547,7 @@
             <a:fld id="{E3D07B0C-BD95-41BE-BB3E-AC75822DF381}" type="datetimeFigureOut">
               <a:rPr lang="en-US" smtClean="0"/>
               <a:pPr/>
-              <a:t>6/15/2021</a:t>
+              <a:t>6/22/2021</a:t>
             </a:fld>
             <a:endParaRPr lang="en-US" dirty="0"/>
           </a:p>
@@ -2863,7 +2865,7 @@
             <a:fld id="{E3D07B0C-BD95-41BE-BB3E-AC75822DF381}" type="datetimeFigureOut">
               <a:rPr lang="en-US" smtClean="0"/>
               <a:pPr/>
-              <a:t>6/15/2021</a:t>
+              <a:t>6/22/2021</a:t>
             </a:fld>
             <a:endParaRPr lang="en-US" dirty="0"/>
           </a:p>
@@ -3245,7 +3247,7 @@
             <a:fld id="{E3D07B0C-BD95-41BE-BB3E-AC75822DF381}" type="datetimeFigureOut">
               <a:rPr lang="en-US" smtClean="0"/>
               <a:pPr/>
-              <a:t>6/15/2021</a:t>
+              <a:t>6/22/2021</a:t>
             </a:fld>
             <a:endParaRPr lang="en-US" dirty="0"/>
           </a:p>
@@ -10736,8 +10738,8 @@
             </a:fontRef>
           </p:style>
         </p:cxnSp>
-        <mc:AlternateContent xmlns:mc="http://schemas.openxmlformats.org/markup-compatibility/2006">
-          <mc:Choice xmlns:a14="http://schemas.microsoft.com/office/drawing/2010/main" Requires="a14">
+        <mc:AlternateContent xmlns:mc="http://schemas.openxmlformats.org/markup-compatibility/2006" xmlns:a14="http://schemas.microsoft.com/office/drawing/2010/main">
+          <mc:Choice Requires="a14">
             <p:sp>
               <p:nvSpPr>
                 <p:cNvPr id="13" name="TextBox 12">
@@ -10802,7 +10804,7 @@
               </p:txBody>
             </p:sp>
           </mc:Choice>
-          <mc:Fallback>
+          <mc:Fallback xmlns="">
             <p:sp>
               <p:nvSpPr>
                 <p:cNvPr id="13" name="TextBox 12">
@@ -13012,6 +13014,4005 @@
 </p:sld>
 </file>
 
+<file path=ppt/slides/slide15.xml><?xml version="1.0" encoding="utf-8"?>
+<p:sld xmlns:a="http://schemas.openxmlformats.org/drawingml/2006/main" xmlns:r="http://schemas.openxmlformats.org/officeDocument/2006/relationships" xmlns:p="http://schemas.openxmlformats.org/presentationml/2006/main">
+  <p:cSld>
+    <p:spTree>
+      <p:nvGrpSpPr>
+        <p:cNvPr id="1" name=""/>
+        <p:cNvGrpSpPr/>
+        <p:nvPr/>
+      </p:nvGrpSpPr>
+      <p:grpSpPr>
+        <a:xfrm>
+          <a:off x="0" y="0"/>
+          <a:ext cx="0" cy="0"/>
+          <a:chOff x="0" y="0"/>
+          <a:chExt cx="0" cy="0"/>
+        </a:xfrm>
+      </p:grpSpPr>
+      <p:sp>
+        <p:nvSpPr>
+          <p:cNvPr id="2" name="Rectangle 1">
+            <a:extLst>
+              <a:ext uri="{FF2B5EF4-FFF2-40B4-BE49-F238E27FC236}">
+                <a16:creationId xmlns:a16="http://schemas.microsoft.com/office/drawing/2014/main" id="{5548AA9C-172F-4FBA-8B34-80EDFF0B3DD4}"/>
+              </a:ext>
+            </a:extLst>
+          </p:cNvPr>
+          <p:cNvSpPr/>
+          <p:nvPr/>
+        </p:nvSpPr>
+        <p:spPr>
+          <a:xfrm>
+            <a:off x="1652016" y="1829016"/>
+            <a:ext cx="4267200" cy="2324099"/>
+          </a:xfrm>
+          <a:prstGeom prst="rect">
+            <a:avLst/>
+          </a:prstGeom>
+          <a:noFill/>
+          <a:ln w="9525">
+            <a:prstDash val="sysDash"/>
+          </a:ln>
+        </p:spPr>
+        <p:style>
+          <a:lnRef idx="2">
+            <a:schemeClr val="accent1">
+              <a:shade val="50000"/>
+            </a:schemeClr>
+          </a:lnRef>
+          <a:fillRef idx="1">
+            <a:schemeClr val="accent1"/>
+          </a:fillRef>
+          <a:effectRef idx="0">
+            <a:schemeClr val="accent1"/>
+          </a:effectRef>
+          <a:fontRef idx="minor">
+            <a:schemeClr val="lt1"/>
+          </a:fontRef>
+        </p:style>
+        <p:txBody>
+          <a:bodyPr rtlCol="0" anchor="ctr"/>
+          <a:lstStyle/>
+          <a:p>
+            <a:pPr algn="ctr"/>
+            <a:endParaRPr lang="en-US" sz="800"/>
+          </a:p>
+        </p:txBody>
+      </p:sp>
+      <p:sp>
+        <p:nvSpPr>
+          <p:cNvPr id="3" name="Freeform 13">
+            <a:extLst>
+              <a:ext uri="{FF2B5EF4-FFF2-40B4-BE49-F238E27FC236}">
+                <a16:creationId xmlns:a16="http://schemas.microsoft.com/office/drawing/2014/main" id="{B705570D-605C-43CB-BC3B-94455E6D7419}"/>
+              </a:ext>
+            </a:extLst>
+          </p:cNvPr>
+          <p:cNvSpPr/>
+          <p:nvPr/>
+        </p:nvSpPr>
+        <p:spPr>
+          <a:xfrm>
+            <a:off x="3341725" y="3271884"/>
+            <a:ext cx="203752" cy="461918"/>
+          </a:xfrm>
+          <a:custGeom>
+            <a:avLst/>
+            <a:gdLst>
+              <a:gd name="connsiteX0" fmla="*/ 156390 w 156390"/>
+              <a:gd name="connsiteY0" fmla="*/ 0 h 567708"/>
+              <a:gd name="connsiteX1" fmla="*/ 378 w 156390"/>
+              <a:gd name="connsiteY1" fmla="*/ 177679 h 567708"/>
+              <a:gd name="connsiteX2" fmla="*/ 113053 w 156390"/>
+              <a:gd name="connsiteY2" fmla="*/ 407363 h 567708"/>
+              <a:gd name="connsiteX3" fmla="*/ 130388 w 156390"/>
+              <a:gd name="connsiteY3" fmla="*/ 567708 h 567708"/>
+              <a:gd name="connsiteX4" fmla="*/ 130388 w 156390"/>
+              <a:gd name="connsiteY4" fmla="*/ 567708 h 567708"/>
+              <a:gd name="connsiteX0" fmla="*/ 156390 w 157057"/>
+              <a:gd name="connsiteY0" fmla="*/ 0 h 567708"/>
+              <a:gd name="connsiteX1" fmla="*/ 378 w 157057"/>
+              <a:gd name="connsiteY1" fmla="*/ 177679 h 567708"/>
+              <a:gd name="connsiteX2" fmla="*/ 113053 w 157057"/>
+              <a:gd name="connsiteY2" fmla="*/ 407363 h 567708"/>
+              <a:gd name="connsiteX3" fmla="*/ 130388 w 157057"/>
+              <a:gd name="connsiteY3" fmla="*/ 567708 h 567708"/>
+              <a:gd name="connsiteX4" fmla="*/ 130388 w 157057"/>
+              <a:gd name="connsiteY4" fmla="*/ 567708 h 567708"/>
+              <a:gd name="connsiteX0" fmla="*/ 156390 w 168460"/>
+              <a:gd name="connsiteY0" fmla="*/ 0 h 567708"/>
+              <a:gd name="connsiteX1" fmla="*/ 378 w 168460"/>
+              <a:gd name="connsiteY1" fmla="*/ 177679 h 567708"/>
+              <a:gd name="connsiteX2" fmla="*/ 113053 w 168460"/>
+              <a:gd name="connsiteY2" fmla="*/ 407363 h 567708"/>
+              <a:gd name="connsiteX3" fmla="*/ 130388 w 168460"/>
+              <a:gd name="connsiteY3" fmla="*/ 567708 h 567708"/>
+              <a:gd name="connsiteX4" fmla="*/ 130388 w 168460"/>
+              <a:gd name="connsiteY4" fmla="*/ 567708 h 567708"/>
+              <a:gd name="connsiteX0" fmla="*/ 139118 w 152058"/>
+              <a:gd name="connsiteY0" fmla="*/ 0 h 567708"/>
+              <a:gd name="connsiteX1" fmla="*/ 441 w 152058"/>
+              <a:gd name="connsiteY1" fmla="*/ 234016 h 567708"/>
+              <a:gd name="connsiteX2" fmla="*/ 95781 w 152058"/>
+              <a:gd name="connsiteY2" fmla="*/ 407363 h 567708"/>
+              <a:gd name="connsiteX3" fmla="*/ 113116 w 152058"/>
+              <a:gd name="connsiteY3" fmla="*/ 567708 h 567708"/>
+              <a:gd name="connsiteX4" fmla="*/ 113116 w 152058"/>
+              <a:gd name="connsiteY4" fmla="*/ 567708 h 567708"/>
+              <a:gd name="connsiteX0" fmla="*/ 138981 w 197949"/>
+              <a:gd name="connsiteY0" fmla="*/ 0 h 567708"/>
+              <a:gd name="connsiteX1" fmla="*/ 304 w 197949"/>
+              <a:gd name="connsiteY1" fmla="*/ 234016 h 567708"/>
+              <a:gd name="connsiteX2" fmla="*/ 195318 w 197949"/>
+              <a:gd name="connsiteY2" fmla="*/ 312023 h 567708"/>
+              <a:gd name="connsiteX3" fmla="*/ 112979 w 197949"/>
+              <a:gd name="connsiteY3" fmla="*/ 567708 h 567708"/>
+              <a:gd name="connsiteX4" fmla="*/ 112979 w 197949"/>
+              <a:gd name="connsiteY4" fmla="*/ 567708 h 567708"/>
+              <a:gd name="connsiteX0" fmla="*/ 138964 w 197932"/>
+              <a:gd name="connsiteY0" fmla="*/ 0 h 567708"/>
+              <a:gd name="connsiteX1" fmla="*/ 287 w 197932"/>
+              <a:gd name="connsiteY1" fmla="*/ 234016 h 567708"/>
+              <a:gd name="connsiteX2" fmla="*/ 195301 w 197932"/>
+              <a:gd name="connsiteY2" fmla="*/ 312023 h 567708"/>
+              <a:gd name="connsiteX3" fmla="*/ 112962 w 197932"/>
+              <a:gd name="connsiteY3" fmla="*/ 567708 h 567708"/>
+              <a:gd name="connsiteX4" fmla="*/ 112962 w 197932"/>
+              <a:gd name="connsiteY4" fmla="*/ 567708 h 567708"/>
+              <a:gd name="connsiteX0" fmla="*/ 108671 w 166544"/>
+              <a:gd name="connsiteY0" fmla="*/ 0 h 567708"/>
+              <a:gd name="connsiteX1" fmla="*/ 330 w 166544"/>
+              <a:gd name="connsiteY1" fmla="*/ 303355 h 567708"/>
+              <a:gd name="connsiteX2" fmla="*/ 165008 w 166544"/>
+              <a:gd name="connsiteY2" fmla="*/ 312023 h 567708"/>
+              <a:gd name="connsiteX3" fmla="*/ 82669 w 166544"/>
+              <a:gd name="connsiteY3" fmla="*/ 567708 h 567708"/>
+              <a:gd name="connsiteX4" fmla="*/ 82669 w 166544"/>
+              <a:gd name="connsiteY4" fmla="*/ 567708 h 567708"/>
+              <a:gd name="connsiteX0" fmla="*/ 108831 w 179543"/>
+              <a:gd name="connsiteY0" fmla="*/ 0 h 567708"/>
+              <a:gd name="connsiteX1" fmla="*/ 490 w 179543"/>
+              <a:gd name="connsiteY1" fmla="*/ 303355 h 567708"/>
+              <a:gd name="connsiteX2" fmla="*/ 178169 w 179543"/>
+              <a:gd name="connsiteY2" fmla="*/ 403030 h 567708"/>
+              <a:gd name="connsiteX3" fmla="*/ 82829 w 179543"/>
+              <a:gd name="connsiteY3" fmla="*/ 567708 h 567708"/>
+              <a:gd name="connsiteX4" fmla="*/ 82829 w 179543"/>
+              <a:gd name="connsiteY4" fmla="*/ 567708 h 567708"/>
+              <a:gd name="connsiteX0" fmla="*/ 115928 w 203752"/>
+              <a:gd name="connsiteY0" fmla="*/ 0 h 539876"/>
+              <a:gd name="connsiteX1" fmla="*/ 12350 w 203752"/>
+              <a:gd name="connsiteY1" fmla="*/ 275523 h 539876"/>
+              <a:gd name="connsiteX2" fmla="*/ 190029 w 203752"/>
+              <a:gd name="connsiteY2" fmla="*/ 375198 h 539876"/>
+              <a:gd name="connsiteX3" fmla="*/ 94689 w 203752"/>
+              <a:gd name="connsiteY3" fmla="*/ 539876 h 539876"/>
+              <a:gd name="connsiteX4" fmla="*/ 94689 w 203752"/>
+              <a:gd name="connsiteY4" fmla="*/ 539876 h 539876"/>
+              <a:gd name="connsiteX0" fmla="*/ 115928 w 203752"/>
+              <a:gd name="connsiteY0" fmla="*/ 0 h 539876"/>
+              <a:gd name="connsiteX1" fmla="*/ 12350 w 203752"/>
+              <a:gd name="connsiteY1" fmla="*/ 275523 h 539876"/>
+              <a:gd name="connsiteX2" fmla="*/ 190029 w 203752"/>
+              <a:gd name="connsiteY2" fmla="*/ 375198 h 539876"/>
+              <a:gd name="connsiteX3" fmla="*/ 94689 w 203752"/>
+              <a:gd name="connsiteY3" fmla="*/ 539876 h 539876"/>
+              <a:gd name="connsiteX4" fmla="*/ 94689 w 203752"/>
+              <a:gd name="connsiteY4" fmla="*/ 539876 h 539876"/>
+            </a:gdLst>
+            <a:ahLst/>
+            <a:cxnLst>
+              <a:cxn ang="0">
+                <a:pos x="connsiteX0" y="connsiteY0"/>
+              </a:cxn>
+              <a:cxn ang="0">
+                <a:pos x="connsiteX1" y="connsiteY1"/>
+              </a:cxn>
+              <a:cxn ang="0">
+                <a:pos x="connsiteX2" y="connsiteY2"/>
+              </a:cxn>
+              <a:cxn ang="0">
+                <a:pos x="connsiteX3" y="connsiteY3"/>
+              </a:cxn>
+              <a:cxn ang="0">
+                <a:pos x="connsiteX4" y="connsiteY4"/>
+              </a:cxn>
+            </a:cxnLst>
+            <a:rect l="l" t="t" r="r" b="b"/>
+            <a:pathLst>
+              <a:path w="203752" h="539876">
+                <a:moveTo>
+                  <a:pt x="115928" y="0"/>
+                </a:moveTo>
+                <a:cubicBezTo>
+                  <a:pt x="90818" y="56722"/>
+                  <a:pt x="0" y="212990"/>
+                  <a:pt x="12350" y="275523"/>
+                </a:cubicBezTo>
+                <a:cubicBezTo>
+                  <a:pt x="24700" y="338056"/>
+                  <a:pt x="176306" y="331139"/>
+                  <a:pt x="190029" y="375198"/>
+                </a:cubicBezTo>
+                <a:cubicBezTo>
+                  <a:pt x="203752" y="419257"/>
+                  <a:pt x="110579" y="512430"/>
+                  <a:pt x="94689" y="539876"/>
+                </a:cubicBezTo>
+                <a:lnTo>
+                  <a:pt x="94689" y="539876"/>
+                </a:lnTo>
+              </a:path>
+            </a:pathLst>
+          </a:custGeom>
+          <a:noFill/>
+          <a:ln w="6350">
+            <a:solidFill>
+              <a:schemeClr val="tx1"/>
+            </a:solidFill>
+            <a:headEnd type="arrow" w="sm" len="sm"/>
+          </a:ln>
+        </p:spPr>
+        <p:style>
+          <a:lnRef idx="2">
+            <a:schemeClr val="accent1">
+              <a:shade val="50000"/>
+            </a:schemeClr>
+          </a:lnRef>
+          <a:fillRef idx="1">
+            <a:schemeClr val="accent1"/>
+          </a:fillRef>
+          <a:effectRef idx="0">
+            <a:schemeClr val="accent1"/>
+          </a:effectRef>
+          <a:fontRef idx="minor">
+            <a:schemeClr val="lt1"/>
+          </a:fontRef>
+        </p:style>
+        <p:txBody>
+          <a:bodyPr rtlCol="0" anchor="ctr"/>
+          <a:lstStyle/>
+          <a:p>
+            <a:pPr algn="ctr"/>
+            <a:endParaRPr lang="en-US"/>
+          </a:p>
+        </p:txBody>
+      </p:sp>
+      <p:sp>
+        <p:nvSpPr>
+          <p:cNvPr id="4" name="TextBox 3">
+            <a:extLst>
+              <a:ext uri="{FF2B5EF4-FFF2-40B4-BE49-F238E27FC236}">
+                <a16:creationId xmlns:a16="http://schemas.microsoft.com/office/drawing/2014/main" id="{0E6D020B-6A78-49BB-B9C8-BB7FF4F96C0B}"/>
+              </a:ext>
+            </a:extLst>
+          </p:cNvPr>
+          <p:cNvSpPr txBox="1"/>
+          <p:nvPr/>
+        </p:nvSpPr>
+        <p:spPr>
+          <a:xfrm>
+            <a:off x="3257876" y="3679686"/>
+            <a:ext cx="370958" cy="338554"/>
+          </a:xfrm>
+          <a:prstGeom prst="rect">
+            <a:avLst/>
+          </a:prstGeom>
+          <a:noFill/>
+          <a:ln>
+            <a:noFill/>
+          </a:ln>
+        </p:spPr>
+        <p:txBody>
+          <a:bodyPr wrap="square" lIns="0" rIns="0" rtlCol="0">
+            <a:spAutoFit/>
+          </a:bodyPr>
+          <a:lstStyle/>
+          <a:p>
+            <a:pPr algn="ctr"/>
+            <a:r>
+              <a:rPr lang="en-US" altLang="zh-TW" sz="800" dirty="0"/>
+              <a:t>Previous</a:t>
+            </a:r>
+          </a:p>
+          <a:p>
+            <a:pPr algn="ctr"/>
+            <a:r>
+              <a:rPr lang="en-US" altLang="zh-TW" sz="800" dirty="0"/>
+              <a:t>update</a:t>
+            </a:r>
+            <a:endParaRPr lang="zh-TW" altLang="en-US" sz="800" dirty="0"/>
+          </a:p>
+        </p:txBody>
+      </p:sp>
+      <p:sp>
+        <p:nvSpPr>
+          <p:cNvPr id="5" name="Freeform 16">
+            <a:extLst>
+              <a:ext uri="{FF2B5EF4-FFF2-40B4-BE49-F238E27FC236}">
+                <a16:creationId xmlns:a16="http://schemas.microsoft.com/office/drawing/2014/main" id="{5AC85C6B-F813-4C9E-8640-53C95FD45734}"/>
+              </a:ext>
+            </a:extLst>
+          </p:cNvPr>
+          <p:cNvSpPr/>
+          <p:nvPr/>
+        </p:nvSpPr>
+        <p:spPr>
+          <a:xfrm>
+            <a:off x="4327689" y="2782203"/>
+            <a:ext cx="207603" cy="951598"/>
+          </a:xfrm>
+          <a:custGeom>
+            <a:avLst/>
+            <a:gdLst>
+              <a:gd name="connsiteX0" fmla="*/ 156390 w 156390"/>
+              <a:gd name="connsiteY0" fmla="*/ 0 h 567708"/>
+              <a:gd name="connsiteX1" fmla="*/ 378 w 156390"/>
+              <a:gd name="connsiteY1" fmla="*/ 177679 h 567708"/>
+              <a:gd name="connsiteX2" fmla="*/ 113053 w 156390"/>
+              <a:gd name="connsiteY2" fmla="*/ 407363 h 567708"/>
+              <a:gd name="connsiteX3" fmla="*/ 130388 w 156390"/>
+              <a:gd name="connsiteY3" fmla="*/ 567708 h 567708"/>
+              <a:gd name="connsiteX4" fmla="*/ 130388 w 156390"/>
+              <a:gd name="connsiteY4" fmla="*/ 567708 h 567708"/>
+              <a:gd name="connsiteX0" fmla="*/ 156390 w 157057"/>
+              <a:gd name="connsiteY0" fmla="*/ 0 h 567708"/>
+              <a:gd name="connsiteX1" fmla="*/ 378 w 157057"/>
+              <a:gd name="connsiteY1" fmla="*/ 177679 h 567708"/>
+              <a:gd name="connsiteX2" fmla="*/ 113053 w 157057"/>
+              <a:gd name="connsiteY2" fmla="*/ 407363 h 567708"/>
+              <a:gd name="connsiteX3" fmla="*/ 130388 w 157057"/>
+              <a:gd name="connsiteY3" fmla="*/ 567708 h 567708"/>
+              <a:gd name="connsiteX4" fmla="*/ 130388 w 157057"/>
+              <a:gd name="connsiteY4" fmla="*/ 567708 h 567708"/>
+              <a:gd name="connsiteX0" fmla="*/ 156390 w 168460"/>
+              <a:gd name="connsiteY0" fmla="*/ 0 h 567708"/>
+              <a:gd name="connsiteX1" fmla="*/ 378 w 168460"/>
+              <a:gd name="connsiteY1" fmla="*/ 177679 h 567708"/>
+              <a:gd name="connsiteX2" fmla="*/ 113053 w 168460"/>
+              <a:gd name="connsiteY2" fmla="*/ 407363 h 567708"/>
+              <a:gd name="connsiteX3" fmla="*/ 130388 w 168460"/>
+              <a:gd name="connsiteY3" fmla="*/ 567708 h 567708"/>
+              <a:gd name="connsiteX4" fmla="*/ 130388 w 168460"/>
+              <a:gd name="connsiteY4" fmla="*/ 567708 h 567708"/>
+              <a:gd name="connsiteX0" fmla="*/ 139118 w 152058"/>
+              <a:gd name="connsiteY0" fmla="*/ 0 h 567708"/>
+              <a:gd name="connsiteX1" fmla="*/ 441 w 152058"/>
+              <a:gd name="connsiteY1" fmla="*/ 234016 h 567708"/>
+              <a:gd name="connsiteX2" fmla="*/ 95781 w 152058"/>
+              <a:gd name="connsiteY2" fmla="*/ 407363 h 567708"/>
+              <a:gd name="connsiteX3" fmla="*/ 113116 w 152058"/>
+              <a:gd name="connsiteY3" fmla="*/ 567708 h 567708"/>
+              <a:gd name="connsiteX4" fmla="*/ 113116 w 152058"/>
+              <a:gd name="connsiteY4" fmla="*/ 567708 h 567708"/>
+              <a:gd name="connsiteX0" fmla="*/ 138981 w 197949"/>
+              <a:gd name="connsiteY0" fmla="*/ 0 h 567708"/>
+              <a:gd name="connsiteX1" fmla="*/ 304 w 197949"/>
+              <a:gd name="connsiteY1" fmla="*/ 234016 h 567708"/>
+              <a:gd name="connsiteX2" fmla="*/ 195318 w 197949"/>
+              <a:gd name="connsiteY2" fmla="*/ 312023 h 567708"/>
+              <a:gd name="connsiteX3" fmla="*/ 112979 w 197949"/>
+              <a:gd name="connsiteY3" fmla="*/ 567708 h 567708"/>
+              <a:gd name="connsiteX4" fmla="*/ 112979 w 197949"/>
+              <a:gd name="connsiteY4" fmla="*/ 567708 h 567708"/>
+              <a:gd name="connsiteX0" fmla="*/ 138964 w 197932"/>
+              <a:gd name="connsiteY0" fmla="*/ 0 h 567708"/>
+              <a:gd name="connsiteX1" fmla="*/ 287 w 197932"/>
+              <a:gd name="connsiteY1" fmla="*/ 234016 h 567708"/>
+              <a:gd name="connsiteX2" fmla="*/ 195301 w 197932"/>
+              <a:gd name="connsiteY2" fmla="*/ 312023 h 567708"/>
+              <a:gd name="connsiteX3" fmla="*/ 112962 w 197932"/>
+              <a:gd name="connsiteY3" fmla="*/ 567708 h 567708"/>
+              <a:gd name="connsiteX4" fmla="*/ 112962 w 197932"/>
+              <a:gd name="connsiteY4" fmla="*/ 567708 h 567708"/>
+              <a:gd name="connsiteX0" fmla="*/ 108671 w 166544"/>
+              <a:gd name="connsiteY0" fmla="*/ 0 h 567708"/>
+              <a:gd name="connsiteX1" fmla="*/ 330 w 166544"/>
+              <a:gd name="connsiteY1" fmla="*/ 303355 h 567708"/>
+              <a:gd name="connsiteX2" fmla="*/ 165008 w 166544"/>
+              <a:gd name="connsiteY2" fmla="*/ 312023 h 567708"/>
+              <a:gd name="connsiteX3" fmla="*/ 82669 w 166544"/>
+              <a:gd name="connsiteY3" fmla="*/ 567708 h 567708"/>
+              <a:gd name="connsiteX4" fmla="*/ 82669 w 166544"/>
+              <a:gd name="connsiteY4" fmla="*/ 567708 h 567708"/>
+              <a:gd name="connsiteX0" fmla="*/ 108831 w 179543"/>
+              <a:gd name="connsiteY0" fmla="*/ 0 h 567708"/>
+              <a:gd name="connsiteX1" fmla="*/ 490 w 179543"/>
+              <a:gd name="connsiteY1" fmla="*/ 303355 h 567708"/>
+              <a:gd name="connsiteX2" fmla="*/ 178169 w 179543"/>
+              <a:gd name="connsiteY2" fmla="*/ 403030 h 567708"/>
+              <a:gd name="connsiteX3" fmla="*/ 82829 w 179543"/>
+              <a:gd name="connsiteY3" fmla="*/ 567708 h 567708"/>
+              <a:gd name="connsiteX4" fmla="*/ 82829 w 179543"/>
+              <a:gd name="connsiteY4" fmla="*/ 567708 h 567708"/>
+              <a:gd name="connsiteX0" fmla="*/ 124542 w 207603"/>
+              <a:gd name="connsiteY0" fmla="*/ 0 h 567708"/>
+              <a:gd name="connsiteX1" fmla="*/ 96674 w 207603"/>
+              <a:gd name="connsiteY1" fmla="*/ 63389 h 567708"/>
+              <a:gd name="connsiteX2" fmla="*/ 16201 w 207603"/>
+              <a:gd name="connsiteY2" fmla="*/ 303355 h 567708"/>
+              <a:gd name="connsiteX3" fmla="*/ 193880 w 207603"/>
+              <a:gd name="connsiteY3" fmla="*/ 403030 h 567708"/>
+              <a:gd name="connsiteX4" fmla="*/ 98540 w 207603"/>
+              <a:gd name="connsiteY4" fmla="*/ 567708 h 567708"/>
+              <a:gd name="connsiteX5" fmla="*/ 98540 w 207603"/>
+              <a:gd name="connsiteY5" fmla="*/ 567708 h 567708"/>
+            </a:gdLst>
+            <a:ahLst/>
+            <a:cxnLst>
+              <a:cxn ang="0">
+                <a:pos x="connsiteX0" y="connsiteY0"/>
+              </a:cxn>
+              <a:cxn ang="0">
+                <a:pos x="connsiteX1" y="connsiteY1"/>
+              </a:cxn>
+              <a:cxn ang="0">
+                <a:pos x="connsiteX2" y="connsiteY2"/>
+              </a:cxn>
+              <a:cxn ang="0">
+                <a:pos x="connsiteX3" y="connsiteY3"/>
+              </a:cxn>
+              <a:cxn ang="0">
+                <a:pos x="connsiteX4" y="connsiteY4"/>
+              </a:cxn>
+              <a:cxn ang="0">
+                <a:pos x="connsiteX5" y="connsiteY5"/>
+              </a:cxn>
+            </a:cxnLst>
+            <a:rect l="l" t="t" r="r" b="b"/>
+            <a:pathLst>
+              <a:path w="207603" h="567708">
+                <a:moveTo>
+                  <a:pt x="124542" y="0"/>
+                </a:moveTo>
+                <a:cubicBezTo>
+                  <a:pt x="125057" y="620"/>
+                  <a:pt x="114731" y="12830"/>
+                  <a:pt x="96674" y="63389"/>
+                </a:cubicBezTo>
+                <a:cubicBezTo>
+                  <a:pt x="78617" y="113948"/>
+                  <a:pt x="0" y="246748"/>
+                  <a:pt x="16201" y="303355"/>
+                </a:cubicBezTo>
+                <a:cubicBezTo>
+                  <a:pt x="32402" y="359962"/>
+                  <a:pt x="180157" y="358971"/>
+                  <a:pt x="193880" y="403030"/>
+                </a:cubicBezTo>
+                <a:cubicBezTo>
+                  <a:pt x="207603" y="447089"/>
+                  <a:pt x="114430" y="540262"/>
+                  <a:pt x="98540" y="567708"/>
+                </a:cubicBezTo>
+                <a:lnTo>
+                  <a:pt x="98540" y="567708"/>
+                </a:lnTo>
+              </a:path>
+            </a:pathLst>
+          </a:custGeom>
+          <a:noFill/>
+          <a:ln w="6350">
+            <a:solidFill>
+              <a:schemeClr val="tx1"/>
+            </a:solidFill>
+            <a:headEnd type="arrow" w="sm" len="sm"/>
+          </a:ln>
+        </p:spPr>
+        <p:style>
+          <a:lnRef idx="2">
+            <a:schemeClr val="accent1">
+              <a:shade val="50000"/>
+            </a:schemeClr>
+          </a:lnRef>
+          <a:fillRef idx="1">
+            <a:schemeClr val="accent1"/>
+          </a:fillRef>
+          <a:effectRef idx="0">
+            <a:schemeClr val="accent1"/>
+          </a:effectRef>
+          <a:fontRef idx="minor">
+            <a:schemeClr val="lt1"/>
+          </a:fontRef>
+        </p:style>
+        <p:txBody>
+          <a:bodyPr rtlCol="0" anchor="ctr"/>
+          <a:lstStyle/>
+          <a:p>
+            <a:pPr algn="ctr"/>
+            <a:endParaRPr lang="en-US"/>
+          </a:p>
+        </p:txBody>
+      </p:sp>
+      <p:sp>
+        <p:nvSpPr>
+          <p:cNvPr id="6" name="Freeform 17">
+            <a:extLst>
+              <a:ext uri="{FF2B5EF4-FFF2-40B4-BE49-F238E27FC236}">
+                <a16:creationId xmlns:a16="http://schemas.microsoft.com/office/drawing/2014/main" id="{C1552C8B-7415-449A-8715-89F90D4AF2EC}"/>
+              </a:ext>
+            </a:extLst>
+          </p:cNvPr>
+          <p:cNvSpPr/>
+          <p:nvPr/>
+        </p:nvSpPr>
+        <p:spPr>
+          <a:xfrm>
+            <a:off x="3884315" y="3047999"/>
+            <a:ext cx="202958" cy="685801"/>
+          </a:xfrm>
+          <a:custGeom>
+            <a:avLst/>
+            <a:gdLst>
+              <a:gd name="connsiteX0" fmla="*/ 156390 w 156390"/>
+              <a:gd name="connsiteY0" fmla="*/ 0 h 567708"/>
+              <a:gd name="connsiteX1" fmla="*/ 378 w 156390"/>
+              <a:gd name="connsiteY1" fmla="*/ 177679 h 567708"/>
+              <a:gd name="connsiteX2" fmla="*/ 113053 w 156390"/>
+              <a:gd name="connsiteY2" fmla="*/ 407363 h 567708"/>
+              <a:gd name="connsiteX3" fmla="*/ 130388 w 156390"/>
+              <a:gd name="connsiteY3" fmla="*/ 567708 h 567708"/>
+              <a:gd name="connsiteX4" fmla="*/ 130388 w 156390"/>
+              <a:gd name="connsiteY4" fmla="*/ 567708 h 567708"/>
+              <a:gd name="connsiteX0" fmla="*/ 156390 w 157057"/>
+              <a:gd name="connsiteY0" fmla="*/ 0 h 567708"/>
+              <a:gd name="connsiteX1" fmla="*/ 378 w 157057"/>
+              <a:gd name="connsiteY1" fmla="*/ 177679 h 567708"/>
+              <a:gd name="connsiteX2" fmla="*/ 113053 w 157057"/>
+              <a:gd name="connsiteY2" fmla="*/ 407363 h 567708"/>
+              <a:gd name="connsiteX3" fmla="*/ 130388 w 157057"/>
+              <a:gd name="connsiteY3" fmla="*/ 567708 h 567708"/>
+              <a:gd name="connsiteX4" fmla="*/ 130388 w 157057"/>
+              <a:gd name="connsiteY4" fmla="*/ 567708 h 567708"/>
+              <a:gd name="connsiteX0" fmla="*/ 156390 w 168460"/>
+              <a:gd name="connsiteY0" fmla="*/ 0 h 567708"/>
+              <a:gd name="connsiteX1" fmla="*/ 378 w 168460"/>
+              <a:gd name="connsiteY1" fmla="*/ 177679 h 567708"/>
+              <a:gd name="connsiteX2" fmla="*/ 113053 w 168460"/>
+              <a:gd name="connsiteY2" fmla="*/ 407363 h 567708"/>
+              <a:gd name="connsiteX3" fmla="*/ 130388 w 168460"/>
+              <a:gd name="connsiteY3" fmla="*/ 567708 h 567708"/>
+              <a:gd name="connsiteX4" fmla="*/ 130388 w 168460"/>
+              <a:gd name="connsiteY4" fmla="*/ 567708 h 567708"/>
+              <a:gd name="connsiteX0" fmla="*/ 139118 w 152058"/>
+              <a:gd name="connsiteY0" fmla="*/ 0 h 567708"/>
+              <a:gd name="connsiteX1" fmla="*/ 441 w 152058"/>
+              <a:gd name="connsiteY1" fmla="*/ 234016 h 567708"/>
+              <a:gd name="connsiteX2" fmla="*/ 95781 w 152058"/>
+              <a:gd name="connsiteY2" fmla="*/ 407363 h 567708"/>
+              <a:gd name="connsiteX3" fmla="*/ 113116 w 152058"/>
+              <a:gd name="connsiteY3" fmla="*/ 567708 h 567708"/>
+              <a:gd name="connsiteX4" fmla="*/ 113116 w 152058"/>
+              <a:gd name="connsiteY4" fmla="*/ 567708 h 567708"/>
+              <a:gd name="connsiteX0" fmla="*/ 138981 w 197949"/>
+              <a:gd name="connsiteY0" fmla="*/ 0 h 567708"/>
+              <a:gd name="connsiteX1" fmla="*/ 304 w 197949"/>
+              <a:gd name="connsiteY1" fmla="*/ 234016 h 567708"/>
+              <a:gd name="connsiteX2" fmla="*/ 195318 w 197949"/>
+              <a:gd name="connsiteY2" fmla="*/ 312023 h 567708"/>
+              <a:gd name="connsiteX3" fmla="*/ 112979 w 197949"/>
+              <a:gd name="connsiteY3" fmla="*/ 567708 h 567708"/>
+              <a:gd name="connsiteX4" fmla="*/ 112979 w 197949"/>
+              <a:gd name="connsiteY4" fmla="*/ 567708 h 567708"/>
+              <a:gd name="connsiteX0" fmla="*/ 138964 w 197932"/>
+              <a:gd name="connsiteY0" fmla="*/ 0 h 567708"/>
+              <a:gd name="connsiteX1" fmla="*/ 287 w 197932"/>
+              <a:gd name="connsiteY1" fmla="*/ 234016 h 567708"/>
+              <a:gd name="connsiteX2" fmla="*/ 195301 w 197932"/>
+              <a:gd name="connsiteY2" fmla="*/ 312023 h 567708"/>
+              <a:gd name="connsiteX3" fmla="*/ 112962 w 197932"/>
+              <a:gd name="connsiteY3" fmla="*/ 567708 h 567708"/>
+              <a:gd name="connsiteX4" fmla="*/ 112962 w 197932"/>
+              <a:gd name="connsiteY4" fmla="*/ 567708 h 567708"/>
+              <a:gd name="connsiteX0" fmla="*/ 108671 w 166544"/>
+              <a:gd name="connsiteY0" fmla="*/ 0 h 567708"/>
+              <a:gd name="connsiteX1" fmla="*/ 330 w 166544"/>
+              <a:gd name="connsiteY1" fmla="*/ 303355 h 567708"/>
+              <a:gd name="connsiteX2" fmla="*/ 165008 w 166544"/>
+              <a:gd name="connsiteY2" fmla="*/ 312023 h 567708"/>
+              <a:gd name="connsiteX3" fmla="*/ 82669 w 166544"/>
+              <a:gd name="connsiteY3" fmla="*/ 567708 h 567708"/>
+              <a:gd name="connsiteX4" fmla="*/ 82669 w 166544"/>
+              <a:gd name="connsiteY4" fmla="*/ 567708 h 567708"/>
+              <a:gd name="connsiteX0" fmla="*/ 108831 w 179543"/>
+              <a:gd name="connsiteY0" fmla="*/ 0 h 567708"/>
+              <a:gd name="connsiteX1" fmla="*/ 490 w 179543"/>
+              <a:gd name="connsiteY1" fmla="*/ 303355 h 567708"/>
+              <a:gd name="connsiteX2" fmla="*/ 178169 w 179543"/>
+              <a:gd name="connsiteY2" fmla="*/ 403030 h 567708"/>
+              <a:gd name="connsiteX3" fmla="*/ 82829 w 179543"/>
+              <a:gd name="connsiteY3" fmla="*/ 567708 h 567708"/>
+              <a:gd name="connsiteX4" fmla="*/ 82829 w 179543"/>
+              <a:gd name="connsiteY4" fmla="*/ 567708 h 567708"/>
+              <a:gd name="connsiteX0" fmla="*/ 119897 w 202958"/>
+              <a:gd name="connsiteY0" fmla="*/ 0 h 567708"/>
+              <a:gd name="connsiteX1" fmla="*/ 11556 w 202958"/>
+              <a:gd name="connsiteY1" fmla="*/ 303355 h 567708"/>
+              <a:gd name="connsiteX2" fmla="*/ 189235 w 202958"/>
+              <a:gd name="connsiteY2" fmla="*/ 403030 h 567708"/>
+              <a:gd name="connsiteX3" fmla="*/ 93895 w 202958"/>
+              <a:gd name="connsiteY3" fmla="*/ 567708 h 567708"/>
+              <a:gd name="connsiteX4" fmla="*/ 93895 w 202958"/>
+              <a:gd name="connsiteY4" fmla="*/ 567708 h 567708"/>
+            </a:gdLst>
+            <a:ahLst/>
+            <a:cxnLst>
+              <a:cxn ang="0">
+                <a:pos x="connsiteX0" y="connsiteY0"/>
+              </a:cxn>
+              <a:cxn ang="0">
+                <a:pos x="connsiteX1" y="connsiteY1"/>
+              </a:cxn>
+              <a:cxn ang="0">
+                <a:pos x="connsiteX2" y="connsiteY2"/>
+              </a:cxn>
+              <a:cxn ang="0">
+                <a:pos x="connsiteX3" y="connsiteY3"/>
+              </a:cxn>
+              <a:cxn ang="0">
+                <a:pos x="connsiteX4" y="connsiteY4"/>
+              </a:cxn>
+            </a:cxnLst>
+            <a:rect l="l" t="t" r="r" b="b"/>
+            <a:pathLst>
+              <a:path w="202958" h="567708">
+                <a:moveTo>
+                  <a:pt x="119897" y="0"/>
+                </a:moveTo>
+                <a:cubicBezTo>
+                  <a:pt x="109073" y="62401"/>
+                  <a:pt x="0" y="236183"/>
+                  <a:pt x="11556" y="303355"/>
+                </a:cubicBezTo>
+                <a:cubicBezTo>
+                  <a:pt x="23112" y="370527"/>
+                  <a:pt x="175512" y="358971"/>
+                  <a:pt x="189235" y="403030"/>
+                </a:cubicBezTo>
+                <a:cubicBezTo>
+                  <a:pt x="202958" y="447089"/>
+                  <a:pt x="109785" y="540262"/>
+                  <a:pt x="93895" y="567708"/>
+                </a:cubicBezTo>
+                <a:lnTo>
+                  <a:pt x="93895" y="567708"/>
+                </a:lnTo>
+              </a:path>
+            </a:pathLst>
+          </a:custGeom>
+          <a:noFill/>
+          <a:ln w="6350">
+            <a:solidFill>
+              <a:schemeClr val="tx1"/>
+            </a:solidFill>
+            <a:headEnd type="arrow" w="sm" len="sm"/>
+          </a:ln>
+        </p:spPr>
+        <p:style>
+          <a:lnRef idx="2">
+            <a:schemeClr val="accent1">
+              <a:shade val="50000"/>
+            </a:schemeClr>
+          </a:lnRef>
+          <a:fillRef idx="1">
+            <a:schemeClr val="accent1"/>
+          </a:fillRef>
+          <a:effectRef idx="0">
+            <a:schemeClr val="accent1"/>
+          </a:effectRef>
+          <a:fontRef idx="minor">
+            <a:schemeClr val="lt1"/>
+          </a:fontRef>
+        </p:style>
+        <p:txBody>
+          <a:bodyPr rtlCol="0" anchor="ctr"/>
+          <a:lstStyle/>
+          <a:p>
+            <a:pPr algn="ctr"/>
+            <a:endParaRPr lang="en-US"/>
+          </a:p>
+        </p:txBody>
+      </p:sp>
+      <p:sp>
+        <p:nvSpPr>
+          <p:cNvPr id="7" name="TextBox 6">
+            <a:extLst>
+              <a:ext uri="{FF2B5EF4-FFF2-40B4-BE49-F238E27FC236}">
+                <a16:creationId xmlns:a16="http://schemas.microsoft.com/office/drawing/2014/main" id="{E5974DBD-CFF2-44F8-AE96-C71F7634007E}"/>
+              </a:ext>
+            </a:extLst>
+          </p:cNvPr>
+          <p:cNvSpPr txBox="1"/>
+          <p:nvPr/>
+        </p:nvSpPr>
+        <p:spPr>
+          <a:xfrm>
+            <a:off x="3820559" y="3679686"/>
+            <a:ext cx="329184" cy="338554"/>
+          </a:xfrm>
+          <a:prstGeom prst="rect">
+            <a:avLst/>
+          </a:prstGeom>
+          <a:noFill/>
+          <a:ln>
+            <a:noFill/>
+          </a:ln>
+        </p:spPr>
+        <p:txBody>
+          <a:bodyPr wrap="square" lIns="0" rIns="0" rtlCol="0">
+            <a:spAutoFit/>
+          </a:bodyPr>
+          <a:lstStyle/>
+          <a:p>
+            <a:pPr algn="ctr"/>
+            <a:r>
+              <a:rPr lang="en-US" altLang="zh-TW" sz="800" dirty="0"/>
+              <a:t>Current</a:t>
+            </a:r>
+          </a:p>
+          <a:p>
+            <a:pPr algn="ctr"/>
+            <a:r>
+              <a:rPr lang="en-US" altLang="zh-TW" sz="800" dirty="0"/>
+              <a:t>update</a:t>
+            </a:r>
+            <a:endParaRPr lang="zh-TW" altLang="en-US" sz="800" dirty="0"/>
+          </a:p>
+        </p:txBody>
+      </p:sp>
+      <p:sp>
+        <p:nvSpPr>
+          <p:cNvPr id="8" name="TextBox 7">
+            <a:extLst>
+              <a:ext uri="{FF2B5EF4-FFF2-40B4-BE49-F238E27FC236}">
+                <a16:creationId xmlns:a16="http://schemas.microsoft.com/office/drawing/2014/main" id="{0959D20E-A3BB-49FC-A77A-644C9A18F4AF}"/>
+              </a:ext>
+            </a:extLst>
+          </p:cNvPr>
+          <p:cNvSpPr txBox="1"/>
+          <p:nvPr/>
+        </p:nvSpPr>
+        <p:spPr>
+          <a:xfrm>
+            <a:off x="4299940" y="3679686"/>
+            <a:ext cx="323102" cy="338554"/>
+          </a:xfrm>
+          <a:prstGeom prst="rect">
+            <a:avLst/>
+          </a:prstGeom>
+          <a:noFill/>
+          <a:ln>
+            <a:noFill/>
+          </a:ln>
+        </p:spPr>
+        <p:txBody>
+          <a:bodyPr wrap="square" lIns="0" rIns="0" rtlCol="0">
+            <a:spAutoFit/>
+          </a:bodyPr>
+          <a:lstStyle/>
+          <a:p>
+            <a:pPr algn="ctr"/>
+            <a:r>
+              <a:rPr lang="en-US" altLang="zh-TW" sz="800" dirty="0"/>
+              <a:t>Next </a:t>
+            </a:r>
+          </a:p>
+          <a:p>
+            <a:pPr algn="ctr"/>
+            <a:r>
+              <a:rPr lang="en-US" altLang="zh-TW" sz="800" dirty="0"/>
+              <a:t>update</a:t>
+            </a:r>
+            <a:endParaRPr lang="zh-TW" altLang="en-US" sz="800" dirty="0"/>
+          </a:p>
+        </p:txBody>
+      </p:sp>
+      <p:sp>
+        <p:nvSpPr>
+          <p:cNvPr id="9" name="Rectangle 8">
+            <a:extLst>
+              <a:ext uri="{FF2B5EF4-FFF2-40B4-BE49-F238E27FC236}">
+                <a16:creationId xmlns:a16="http://schemas.microsoft.com/office/drawing/2014/main" id="{7D509E99-75F4-47F1-A4CB-E11E2225276F}"/>
+              </a:ext>
+            </a:extLst>
+          </p:cNvPr>
+          <p:cNvSpPr/>
+          <p:nvPr/>
+        </p:nvSpPr>
+        <p:spPr>
+          <a:xfrm>
+            <a:off x="3339032" y="2755716"/>
+            <a:ext cx="342699" cy="453828"/>
+          </a:xfrm>
+          <a:prstGeom prst="rect">
+            <a:avLst/>
+          </a:prstGeom>
+          <a:noFill/>
+          <a:ln w="9525">
+            <a:solidFill>
+              <a:schemeClr val="tx1"/>
+            </a:solidFill>
+          </a:ln>
+        </p:spPr>
+        <p:style>
+          <a:lnRef idx="2">
+            <a:schemeClr val="accent1">
+              <a:shade val="50000"/>
+            </a:schemeClr>
+          </a:lnRef>
+          <a:fillRef idx="1">
+            <a:schemeClr val="accent1"/>
+          </a:fillRef>
+          <a:effectRef idx="0">
+            <a:schemeClr val="accent1"/>
+          </a:effectRef>
+          <a:fontRef idx="minor">
+            <a:schemeClr val="lt1"/>
+          </a:fontRef>
+        </p:style>
+        <p:txBody>
+          <a:bodyPr rtlCol="0" anchor="ctr"/>
+          <a:lstStyle/>
+          <a:p>
+            <a:pPr algn="ctr"/>
+            <a:endParaRPr lang="en-US"/>
+          </a:p>
+        </p:txBody>
+      </p:sp>
+      <p:sp>
+        <p:nvSpPr>
+          <p:cNvPr id="10" name="Rectangle 9">
+            <a:extLst>
+              <a:ext uri="{FF2B5EF4-FFF2-40B4-BE49-F238E27FC236}">
+                <a16:creationId xmlns:a16="http://schemas.microsoft.com/office/drawing/2014/main" id="{D82D6464-8B8D-425A-9056-BA4534FC1BEC}"/>
+              </a:ext>
+            </a:extLst>
+          </p:cNvPr>
+          <p:cNvSpPr/>
+          <p:nvPr/>
+        </p:nvSpPr>
+        <p:spPr>
+          <a:xfrm>
+            <a:off x="3822267" y="2518198"/>
+            <a:ext cx="342699" cy="453828"/>
+          </a:xfrm>
+          <a:prstGeom prst="rect">
+            <a:avLst/>
+          </a:prstGeom>
+          <a:noFill/>
+          <a:ln w="9525">
+            <a:solidFill>
+              <a:schemeClr val="tx1"/>
+            </a:solidFill>
+          </a:ln>
+        </p:spPr>
+        <p:style>
+          <a:lnRef idx="2">
+            <a:schemeClr val="accent1">
+              <a:shade val="50000"/>
+            </a:schemeClr>
+          </a:lnRef>
+          <a:fillRef idx="1">
+            <a:schemeClr val="accent1"/>
+          </a:fillRef>
+          <a:effectRef idx="0">
+            <a:schemeClr val="accent1"/>
+          </a:effectRef>
+          <a:fontRef idx="minor">
+            <a:schemeClr val="lt1"/>
+          </a:fontRef>
+        </p:style>
+        <p:txBody>
+          <a:bodyPr rtlCol="0" anchor="ctr"/>
+          <a:lstStyle/>
+          <a:p>
+            <a:pPr algn="ctr"/>
+            <a:endParaRPr lang="en-US"/>
+          </a:p>
+        </p:txBody>
+      </p:sp>
+      <p:sp>
+        <p:nvSpPr>
+          <p:cNvPr id="11" name="Rectangle 10">
+            <a:extLst>
+              <a:ext uri="{FF2B5EF4-FFF2-40B4-BE49-F238E27FC236}">
+                <a16:creationId xmlns:a16="http://schemas.microsoft.com/office/drawing/2014/main" id="{72C6BC4E-AAEB-477D-BC50-FB827426CED8}"/>
+              </a:ext>
+            </a:extLst>
+          </p:cNvPr>
+          <p:cNvSpPr/>
+          <p:nvPr/>
+        </p:nvSpPr>
+        <p:spPr>
+          <a:xfrm>
+            <a:off x="4305501" y="2298290"/>
+            <a:ext cx="342699" cy="453828"/>
+          </a:xfrm>
+          <a:prstGeom prst="rect">
+            <a:avLst/>
+          </a:prstGeom>
+          <a:noFill/>
+          <a:ln w="9525">
+            <a:solidFill>
+              <a:schemeClr val="tx1"/>
+            </a:solidFill>
+          </a:ln>
+        </p:spPr>
+        <p:style>
+          <a:lnRef idx="2">
+            <a:schemeClr val="accent1">
+              <a:shade val="50000"/>
+            </a:schemeClr>
+          </a:lnRef>
+          <a:fillRef idx="1">
+            <a:schemeClr val="accent1"/>
+          </a:fillRef>
+          <a:effectRef idx="0">
+            <a:schemeClr val="accent1"/>
+          </a:effectRef>
+          <a:fontRef idx="minor">
+            <a:schemeClr val="lt1"/>
+          </a:fontRef>
+        </p:style>
+        <p:txBody>
+          <a:bodyPr rtlCol="0" anchor="ctr"/>
+          <a:lstStyle/>
+          <a:p>
+            <a:pPr algn="ctr"/>
+            <a:endParaRPr lang="en-US"/>
+          </a:p>
+        </p:txBody>
+      </p:sp>
+      <p:sp>
+        <p:nvSpPr>
+          <p:cNvPr id="12" name="TextBox 11">
+            <a:extLst>
+              <a:ext uri="{FF2B5EF4-FFF2-40B4-BE49-F238E27FC236}">
+                <a16:creationId xmlns:a16="http://schemas.microsoft.com/office/drawing/2014/main" id="{97063BB0-9358-43FB-BEF2-B99989A3EA23}"/>
+              </a:ext>
+            </a:extLst>
+          </p:cNvPr>
+          <p:cNvSpPr txBox="1"/>
+          <p:nvPr/>
+        </p:nvSpPr>
+        <p:spPr>
+          <a:xfrm>
+            <a:off x="3056442" y="4301734"/>
+            <a:ext cx="2125158" cy="338554"/>
+          </a:xfrm>
+          <a:prstGeom prst="rect">
+            <a:avLst/>
+          </a:prstGeom>
+          <a:noFill/>
+          <a:ln>
+            <a:noFill/>
+          </a:ln>
+        </p:spPr>
+        <p:txBody>
+          <a:bodyPr wrap="square" lIns="0" rIns="0" rtlCol="0">
+            <a:spAutoFit/>
+          </a:bodyPr>
+          <a:lstStyle/>
+          <a:p>
+            <a:r>
+              <a:rPr lang="en-US" altLang="zh-TW" sz="1600" dirty="0"/>
+              <a:t>Figure 9-19</a:t>
+            </a:r>
+            <a:endParaRPr lang="zh-TW" altLang="en-US" sz="1600" baseline="-25000" dirty="0"/>
+          </a:p>
+        </p:txBody>
+      </p:sp>
+      <p:sp>
+        <p:nvSpPr>
+          <p:cNvPr id="13" name="TextBox 12">
+            <a:extLst>
+              <a:ext uri="{FF2B5EF4-FFF2-40B4-BE49-F238E27FC236}">
+                <a16:creationId xmlns:a16="http://schemas.microsoft.com/office/drawing/2014/main" id="{FA378CFE-DBA4-4F47-907E-EAD487ED1DF5}"/>
+              </a:ext>
+            </a:extLst>
+          </p:cNvPr>
+          <p:cNvSpPr txBox="1"/>
+          <p:nvPr/>
+        </p:nvSpPr>
+        <p:spPr>
+          <a:xfrm>
+            <a:off x="3114998" y="2127111"/>
+            <a:ext cx="604513" cy="338554"/>
+          </a:xfrm>
+          <a:prstGeom prst="rect">
+            <a:avLst/>
+          </a:prstGeom>
+          <a:noFill/>
+          <a:ln>
+            <a:noFill/>
+          </a:ln>
+        </p:spPr>
+        <p:txBody>
+          <a:bodyPr wrap="square" lIns="0" rIns="0" rtlCol="0">
+            <a:spAutoFit/>
+          </a:bodyPr>
+          <a:lstStyle/>
+          <a:p>
+            <a:pPr algn="ctr"/>
+            <a:r>
+              <a:rPr lang="en-US" altLang="zh-TW" sz="800" dirty="0"/>
+              <a:t>Constant</a:t>
+            </a:r>
+          </a:p>
+          <a:p>
+            <a:pPr algn="ctr"/>
+            <a:r>
+              <a:rPr lang="en-US" altLang="zh-TW" sz="800" dirty="0"/>
+              <a:t>displacement</a:t>
+            </a:r>
+            <a:endParaRPr lang="zh-TW" altLang="en-US" sz="800" dirty="0"/>
+          </a:p>
+        </p:txBody>
+      </p:sp>
+      <p:sp>
+        <p:nvSpPr>
+          <p:cNvPr id="14" name="Freeform 22">
+            <a:extLst>
+              <a:ext uri="{FF2B5EF4-FFF2-40B4-BE49-F238E27FC236}">
+                <a16:creationId xmlns:a16="http://schemas.microsoft.com/office/drawing/2014/main" id="{2D6A2E8C-4549-44F0-AE97-1F4218A6D1BB}"/>
+              </a:ext>
+            </a:extLst>
+          </p:cNvPr>
+          <p:cNvSpPr/>
+          <p:nvPr/>
+        </p:nvSpPr>
+        <p:spPr>
+          <a:xfrm rot="15543968">
+            <a:off x="3762713" y="2199804"/>
+            <a:ext cx="461838" cy="458332"/>
+          </a:xfrm>
+          <a:custGeom>
+            <a:avLst/>
+            <a:gdLst>
+              <a:gd name="connsiteX0" fmla="*/ 156390 w 156390"/>
+              <a:gd name="connsiteY0" fmla="*/ 0 h 567708"/>
+              <a:gd name="connsiteX1" fmla="*/ 378 w 156390"/>
+              <a:gd name="connsiteY1" fmla="*/ 177679 h 567708"/>
+              <a:gd name="connsiteX2" fmla="*/ 113053 w 156390"/>
+              <a:gd name="connsiteY2" fmla="*/ 407363 h 567708"/>
+              <a:gd name="connsiteX3" fmla="*/ 130388 w 156390"/>
+              <a:gd name="connsiteY3" fmla="*/ 567708 h 567708"/>
+              <a:gd name="connsiteX4" fmla="*/ 130388 w 156390"/>
+              <a:gd name="connsiteY4" fmla="*/ 567708 h 567708"/>
+              <a:gd name="connsiteX0" fmla="*/ 156390 w 157057"/>
+              <a:gd name="connsiteY0" fmla="*/ 0 h 567708"/>
+              <a:gd name="connsiteX1" fmla="*/ 378 w 157057"/>
+              <a:gd name="connsiteY1" fmla="*/ 177679 h 567708"/>
+              <a:gd name="connsiteX2" fmla="*/ 113053 w 157057"/>
+              <a:gd name="connsiteY2" fmla="*/ 407363 h 567708"/>
+              <a:gd name="connsiteX3" fmla="*/ 130388 w 157057"/>
+              <a:gd name="connsiteY3" fmla="*/ 567708 h 567708"/>
+              <a:gd name="connsiteX4" fmla="*/ 130388 w 157057"/>
+              <a:gd name="connsiteY4" fmla="*/ 567708 h 567708"/>
+              <a:gd name="connsiteX0" fmla="*/ 156390 w 168460"/>
+              <a:gd name="connsiteY0" fmla="*/ 0 h 567708"/>
+              <a:gd name="connsiteX1" fmla="*/ 378 w 168460"/>
+              <a:gd name="connsiteY1" fmla="*/ 177679 h 567708"/>
+              <a:gd name="connsiteX2" fmla="*/ 113053 w 168460"/>
+              <a:gd name="connsiteY2" fmla="*/ 407363 h 567708"/>
+              <a:gd name="connsiteX3" fmla="*/ 130388 w 168460"/>
+              <a:gd name="connsiteY3" fmla="*/ 567708 h 567708"/>
+              <a:gd name="connsiteX4" fmla="*/ 130388 w 168460"/>
+              <a:gd name="connsiteY4" fmla="*/ 567708 h 567708"/>
+              <a:gd name="connsiteX0" fmla="*/ 139118 w 152058"/>
+              <a:gd name="connsiteY0" fmla="*/ 0 h 567708"/>
+              <a:gd name="connsiteX1" fmla="*/ 441 w 152058"/>
+              <a:gd name="connsiteY1" fmla="*/ 234016 h 567708"/>
+              <a:gd name="connsiteX2" fmla="*/ 95781 w 152058"/>
+              <a:gd name="connsiteY2" fmla="*/ 407363 h 567708"/>
+              <a:gd name="connsiteX3" fmla="*/ 113116 w 152058"/>
+              <a:gd name="connsiteY3" fmla="*/ 567708 h 567708"/>
+              <a:gd name="connsiteX4" fmla="*/ 113116 w 152058"/>
+              <a:gd name="connsiteY4" fmla="*/ 567708 h 567708"/>
+              <a:gd name="connsiteX0" fmla="*/ 138981 w 197949"/>
+              <a:gd name="connsiteY0" fmla="*/ 0 h 567708"/>
+              <a:gd name="connsiteX1" fmla="*/ 304 w 197949"/>
+              <a:gd name="connsiteY1" fmla="*/ 234016 h 567708"/>
+              <a:gd name="connsiteX2" fmla="*/ 195318 w 197949"/>
+              <a:gd name="connsiteY2" fmla="*/ 312023 h 567708"/>
+              <a:gd name="connsiteX3" fmla="*/ 112979 w 197949"/>
+              <a:gd name="connsiteY3" fmla="*/ 567708 h 567708"/>
+              <a:gd name="connsiteX4" fmla="*/ 112979 w 197949"/>
+              <a:gd name="connsiteY4" fmla="*/ 567708 h 567708"/>
+              <a:gd name="connsiteX0" fmla="*/ 138964 w 197932"/>
+              <a:gd name="connsiteY0" fmla="*/ 0 h 567708"/>
+              <a:gd name="connsiteX1" fmla="*/ 287 w 197932"/>
+              <a:gd name="connsiteY1" fmla="*/ 234016 h 567708"/>
+              <a:gd name="connsiteX2" fmla="*/ 195301 w 197932"/>
+              <a:gd name="connsiteY2" fmla="*/ 312023 h 567708"/>
+              <a:gd name="connsiteX3" fmla="*/ 112962 w 197932"/>
+              <a:gd name="connsiteY3" fmla="*/ 567708 h 567708"/>
+              <a:gd name="connsiteX4" fmla="*/ 112962 w 197932"/>
+              <a:gd name="connsiteY4" fmla="*/ 567708 h 567708"/>
+              <a:gd name="connsiteX0" fmla="*/ 108671 w 166544"/>
+              <a:gd name="connsiteY0" fmla="*/ 0 h 567708"/>
+              <a:gd name="connsiteX1" fmla="*/ 330 w 166544"/>
+              <a:gd name="connsiteY1" fmla="*/ 303355 h 567708"/>
+              <a:gd name="connsiteX2" fmla="*/ 165008 w 166544"/>
+              <a:gd name="connsiteY2" fmla="*/ 312023 h 567708"/>
+              <a:gd name="connsiteX3" fmla="*/ 82669 w 166544"/>
+              <a:gd name="connsiteY3" fmla="*/ 567708 h 567708"/>
+              <a:gd name="connsiteX4" fmla="*/ 82669 w 166544"/>
+              <a:gd name="connsiteY4" fmla="*/ 567708 h 567708"/>
+              <a:gd name="connsiteX0" fmla="*/ 108831 w 179543"/>
+              <a:gd name="connsiteY0" fmla="*/ 0 h 567708"/>
+              <a:gd name="connsiteX1" fmla="*/ 490 w 179543"/>
+              <a:gd name="connsiteY1" fmla="*/ 303355 h 567708"/>
+              <a:gd name="connsiteX2" fmla="*/ 178169 w 179543"/>
+              <a:gd name="connsiteY2" fmla="*/ 403030 h 567708"/>
+              <a:gd name="connsiteX3" fmla="*/ 82829 w 179543"/>
+              <a:gd name="connsiteY3" fmla="*/ 567708 h 567708"/>
+              <a:gd name="connsiteX4" fmla="*/ 82829 w 179543"/>
+              <a:gd name="connsiteY4" fmla="*/ 567708 h 567708"/>
+              <a:gd name="connsiteX0" fmla="*/ 119897 w 202958"/>
+              <a:gd name="connsiteY0" fmla="*/ 0 h 567708"/>
+              <a:gd name="connsiteX1" fmla="*/ 11556 w 202958"/>
+              <a:gd name="connsiteY1" fmla="*/ 303355 h 567708"/>
+              <a:gd name="connsiteX2" fmla="*/ 189235 w 202958"/>
+              <a:gd name="connsiteY2" fmla="*/ 403030 h 567708"/>
+              <a:gd name="connsiteX3" fmla="*/ 93895 w 202958"/>
+              <a:gd name="connsiteY3" fmla="*/ 567708 h 567708"/>
+              <a:gd name="connsiteX4" fmla="*/ 93895 w 202958"/>
+              <a:gd name="connsiteY4" fmla="*/ 567708 h 567708"/>
+              <a:gd name="connsiteX0" fmla="*/ 119897 w 202958"/>
+              <a:gd name="connsiteY0" fmla="*/ 0 h 567708"/>
+              <a:gd name="connsiteX1" fmla="*/ 11556 w 202958"/>
+              <a:gd name="connsiteY1" fmla="*/ 303355 h 567708"/>
+              <a:gd name="connsiteX2" fmla="*/ 189235 w 202958"/>
+              <a:gd name="connsiteY2" fmla="*/ 403030 h 567708"/>
+              <a:gd name="connsiteX3" fmla="*/ 93895 w 202958"/>
+              <a:gd name="connsiteY3" fmla="*/ 567708 h 567708"/>
+              <a:gd name="connsiteX4" fmla="*/ 93895 w 202958"/>
+              <a:gd name="connsiteY4" fmla="*/ 567708 h 567708"/>
+              <a:gd name="connsiteX0" fmla="*/ 112675 w 118808"/>
+              <a:gd name="connsiteY0" fmla="*/ 0 h 567708"/>
+              <a:gd name="connsiteX1" fmla="*/ 4334 w 118808"/>
+              <a:gd name="connsiteY1" fmla="*/ 303355 h 567708"/>
+              <a:gd name="connsiteX2" fmla="*/ 86673 w 118808"/>
+              <a:gd name="connsiteY2" fmla="*/ 567708 h 567708"/>
+              <a:gd name="connsiteX3" fmla="*/ 86673 w 118808"/>
+              <a:gd name="connsiteY3" fmla="*/ 567708 h 567708"/>
+              <a:gd name="connsiteX0" fmla="*/ 26002 w 26002"/>
+              <a:gd name="connsiteY0" fmla="*/ 0 h 567708"/>
+              <a:gd name="connsiteX1" fmla="*/ 0 w 26002"/>
+              <a:gd name="connsiteY1" fmla="*/ 567708 h 567708"/>
+              <a:gd name="connsiteX2" fmla="*/ 0 w 26002"/>
+              <a:gd name="connsiteY2" fmla="*/ 567708 h 567708"/>
+              <a:gd name="connsiteX0" fmla="*/ 26002 w 26002"/>
+              <a:gd name="connsiteY0" fmla="*/ 0 h 567708"/>
+              <a:gd name="connsiteX1" fmla="*/ 14128 w 26002"/>
+              <a:gd name="connsiteY1" fmla="*/ 246994 h 567708"/>
+              <a:gd name="connsiteX2" fmla="*/ 0 w 26002"/>
+              <a:gd name="connsiteY2" fmla="*/ 567708 h 567708"/>
+              <a:gd name="connsiteX3" fmla="*/ 0 w 26002"/>
+              <a:gd name="connsiteY3" fmla="*/ 567708 h 567708"/>
+              <a:gd name="connsiteX0" fmla="*/ 138585 w 138585"/>
+              <a:gd name="connsiteY0" fmla="*/ 0 h 567708"/>
+              <a:gd name="connsiteX1" fmla="*/ 126711 w 138585"/>
+              <a:gd name="connsiteY1" fmla="*/ 246994 h 567708"/>
+              <a:gd name="connsiteX2" fmla="*/ 112583 w 138585"/>
+              <a:gd name="connsiteY2" fmla="*/ 567708 h 567708"/>
+              <a:gd name="connsiteX3" fmla="*/ 112583 w 138585"/>
+              <a:gd name="connsiteY3" fmla="*/ 567708 h 567708"/>
+              <a:gd name="connsiteX0" fmla="*/ 138585 w 138585"/>
+              <a:gd name="connsiteY0" fmla="*/ 0 h 567708"/>
+              <a:gd name="connsiteX1" fmla="*/ 126711 w 138585"/>
+              <a:gd name="connsiteY1" fmla="*/ 246994 h 567708"/>
+              <a:gd name="connsiteX2" fmla="*/ 112583 w 138585"/>
+              <a:gd name="connsiteY2" fmla="*/ 567708 h 567708"/>
+              <a:gd name="connsiteX3" fmla="*/ 112583 w 138585"/>
+              <a:gd name="connsiteY3" fmla="*/ 567708 h 567708"/>
+              <a:gd name="connsiteX0" fmla="*/ 326118 w 326118"/>
+              <a:gd name="connsiteY0" fmla="*/ 0 h 567708"/>
+              <a:gd name="connsiteX1" fmla="*/ 314244 w 326118"/>
+              <a:gd name="connsiteY1" fmla="*/ 246994 h 567708"/>
+              <a:gd name="connsiteX2" fmla="*/ 300116 w 326118"/>
+              <a:gd name="connsiteY2" fmla="*/ 567708 h 567708"/>
+              <a:gd name="connsiteX3" fmla="*/ 0 w 326118"/>
+              <a:gd name="connsiteY3" fmla="*/ 321618 h 567708"/>
+              <a:gd name="connsiteX0" fmla="*/ 326118 w 326118"/>
+              <a:gd name="connsiteY0" fmla="*/ 0 h 321618"/>
+              <a:gd name="connsiteX1" fmla="*/ 314244 w 326118"/>
+              <a:gd name="connsiteY1" fmla="*/ 246994 h 321618"/>
+              <a:gd name="connsiteX2" fmla="*/ 0 w 326118"/>
+              <a:gd name="connsiteY2" fmla="*/ 321618 h 321618"/>
+              <a:gd name="connsiteX0" fmla="*/ 326118 w 326118"/>
+              <a:gd name="connsiteY0" fmla="*/ 0 h 321618"/>
+              <a:gd name="connsiteX1" fmla="*/ 314245 w 326118"/>
+              <a:gd name="connsiteY1" fmla="*/ 246994 h 321618"/>
+              <a:gd name="connsiteX2" fmla="*/ 0 w 326118"/>
+              <a:gd name="connsiteY2" fmla="*/ 321618 h 321618"/>
+              <a:gd name="connsiteX0" fmla="*/ 326118 w 326118"/>
+              <a:gd name="connsiteY0" fmla="*/ 0 h 321618"/>
+              <a:gd name="connsiteX1" fmla="*/ 314245 w 326118"/>
+              <a:gd name="connsiteY1" fmla="*/ 246994 h 321618"/>
+              <a:gd name="connsiteX2" fmla="*/ 0 w 326118"/>
+              <a:gd name="connsiteY2" fmla="*/ 321618 h 321618"/>
+              <a:gd name="connsiteX0" fmla="*/ 326118 w 368598"/>
+              <a:gd name="connsiteY0" fmla="*/ 0 h 321618"/>
+              <a:gd name="connsiteX1" fmla="*/ 314245 w 368598"/>
+              <a:gd name="connsiteY1" fmla="*/ 246994 h 321618"/>
+              <a:gd name="connsiteX2" fmla="*/ 0 w 368598"/>
+              <a:gd name="connsiteY2" fmla="*/ 321618 h 321618"/>
+              <a:gd name="connsiteX0" fmla="*/ 326118 w 368598"/>
+              <a:gd name="connsiteY0" fmla="*/ 0 h 321618"/>
+              <a:gd name="connsiteX1" fmla="*/ 314245 w 368598"/>
+              <a:gd name="connsiteY1" fmla="*/ 246994 h 321618"/>
+              <a:gd name="connsiteX2" fmla="*/ 0 w 368598"/>
+              <a:gd name="connsiteY2" fmla="*/ 321618 h 321618"/>
+              <a:gd name="connsiteX0" fmla="*/ 326118 w 326118"/>
+              <a:gd name="connsiteY0" fmla="*/ 0 h 321618"/>
+              <a:gd name="connsiteX1" fmla="*/ 207387 w 326118"/>
+              <a:gd name="connsiteY1" fmla="*/ 256482 h 321618"/>
+              <a:gd name="connsiteX2" fmla="*/ 0 w 326118"/>
+              <a:gd name="connsiteY2" fmla="*/ 321618 h 321618"/>
+              <a:gd name="connsiteX0" fmla="*/ 326118 w 326118"/>
+              <a:gd name="connsiteY0" fmla="*/ 0 h 332301"/>
+              <a:gd name="connsiteX1" fmla="*/ 207387 w 326118"/>
+              <a:gd name="connsiteY1" fmla="*/ 256482 h 332301"/>
+              <a:gd name="connsiteX2" fmla="*/ 0 w 326118"/>
+              <a:gd name="connsiteY2" fmla="*/ 321618 h 332301"/>
+            </a:gdLst>
+            <a:ahLst/>
+            <a:cxnLst>
+              <a:cxn ang="0">
+                <a:pos x="connsiteX0" y="connsiteY0"/>
+              </a:cxn>
+              <a:cxn ang="0">
+                <a:pos x="connsiteX1" y="connsiteY1"/>
+              </a:cxn>
+              <a:cxn ang="0">
+                <a:pos x="connsiteX2" y="connsiteY2"/>
+              </a:cxn>
+            </a:cxnLst>
+            <a:rect l="l" t="t" r="r" b="b"/>
+            <a:pathLst>
+              <a:path w="326118" h="332301">
+                <a:moveTo>
+                  <a:pt x="326118" y="0"/>
+                </a:moveTo>
+                <a:cubicBezTo>
+                  <a:pt x="322160" y="82331"/>
+                  <a:pt x="261740" y="202879"/>
+                  <a:pt x="207387" y="256482"/>
+                </a:cubicBezTo>
+                <a:cubicBezTo>
+                  <a:pt x="153034" y="310085"/>
+                  <a:pt x="80186" y="332301"/>
+                  <a:pt x="0" y="321618"/>
+                </a:cubicBezTo>
+              </a:path>
+            </a:pathLst>
+          </a:custGeom>
+          <a:noFill/>
+          <a:ln w="6350">
+            <a:solidFill>
+              <a:schemeClr val="tx1"/>
+            </a:solidFill>
+            <a:headEnd type="none" w="sm" len="sm"/>
+            <a:tailEnd type="arrow" w="sm" len="sm"/>
+          </a:ln>
+        </p:spPr>
+        <p:style>
+          <a:lnRef idx="2">
+            <a:schemeClr val="accent1">
+              <a:shade val="50000"/>
+            </a:schemeClr>
+          </a:lnRef>
+          <a:fillRef idx="1">
+            <a:schemeClr val="accent1"/>
+          </a:fillRef>
+          <a:effectRef idx="0">
+            <a:schemeClr val="accent1"/>
+          </a:effectRef>
+          <a:fontRef idx="minor">
+            <a:schemeClr val="lt1"/>
+          </a:fontRef>
+        </p:style>
+        <p:txBody>
+          <a:bodyPr rtlCol="0" anchor="ctr"/>
+          <a:lstStyle/>
+          <a:p>
+            <a:pPr algn="ctr"/>
+            <a:endParaRPr lang="en-US"/>
+          </a:p>
+        </p:txBody>
+      </p:sp>
+      <p:sp>
+        <p:nvSpPr>
+          <p:cNvPr id="15" name="Freeform 23">
+            <a:extLst>
+              <a:ext uri="{FF2B5EF4-FFF2-40B4-BE49-F238E27FC236}">
+                <a16:creationId xmlns:a16="http://schemas.microsoft.com/office/drawing/2014/main" id="{F1C56FB3-3AE3-4E72-BA03-C8A6B155424C}"/>
+              </a:ext>
+            </a:extLst>
+          </p:cNvPr>
+          <p:cNvSpPr/>
+          <p:nvPr/>
+        </p:nvSpPr>
+        <p:spPr>
+          <a:xfrm rot="15543968">
+            <a:off x="3393994" y="2526976"/>
+            <a:ext cx="453393" cy="225273"/>
+          </a:xfrm>
+          <a:custGeom>
+            <a:avLst/>
+            <a:gdLst>
+              <a:gd name="connsiteX0" fmla="*/ 156390 w 156390"/>
+              <a:gd name="connsiteY0" fmla="*/ 0 h 567708"/>
+              <a:gd name="connsiteX1" fmla="*/ 378 w 156390"/>
+              <a:gd name="connsiteY1" fmla="*/ 177679 h 567708"/>
+              <a:gd name="connsiteX2" fmla="*/ 113053 w 156390"/>
+              <a:gd name="connsiteY2" fmla="*/ 407363 h 567708"/>
+              <a:gd name="connsiteX3" fmla="*/ 130388 w 156390"/>
+              <a:gd name="connsiteY3" fmla="*/ 567708 h 567708"/>
+              <a:gd name="connsiteX4" fmla="*/ 130388 w 156390"/>
+              <a:gd name="connsiteY4" fmla="*/ 567708 h 567708"/>
+              <a:gd name="connsiteX0" fmla="*/ 156390 w 157057"/>
+              <a:gd name="connsiteY0" fmla="*/ 0 h 567708"/>
+              <a:gd name="connsiteX1" fmla="*/ 378 w 157057"/>
+              <a:gd name="connsiteY1" fmla="*/ 177679 h 567708"/>
+              <a:gd name="connsiteX2" fmla="*/ 113053 w 157057"/>
+              <a:gd name="connsiteY2" fmla="*/ 407363 h 567708"/>
+              <a:gd name="connsiteX3" fmla="*/ 130388 w 157057"/>
+              <a:gd name="connsiteY3" fmla="*/ 567708 h 567708"/>
+              <a:gd name="connsiteX4" fmla="*/ 130388 w 157057"/>
+              <a:gd name="connsiteY4" fmla="*/ 567708 h 567708"/>
+              <a:gd name="connsiteX0" fmla="*/ 156390 w 168460"/>
+              <a:gd name="connsiteY0" fmla="*/ 0 h 567708"/>
+              <a:gd name="connsiteX1" fmla="*/ 378 w 168460"/>
+              <a:gd name="connsiteY1" fmla="*/ 177679 h 567708"/>
+              <a:gd name="connsiteX2" fmla="*/ 113053 w 168460"/>
+              <a:gd name="connsiteY2" fmla="*/ 407363 h 567708"/>
+              <a:gd name="connsiteX3" fmla="*/ 130388 w 168460"/>
+              <a:gd name="connsiteY3" fmla="*/ 567708 h 567708"/>
+              <a:gd name="connsiteX4" fmla="*/ 130388 w 168460"/>
+              <a:gd name="connsiteY4" fmla="*/ 567708 h 567708"/>
+              <a:gd name="connsiteX0" fmla="*/ 139118 w 152058"/>
+              <a:gd name="connsiteY0" fmla="*/ 0 h 567708"/>
+              <a:gd name="connsiteX1" fmla="*/ 441 w 152058"/>
+              <a:gd name="connsiteY1" fmla="*/ 234016 h 567708"/>
+              <a:gd name="connsiteX2" fmla="*/ 95781 w 152058"/>
+              <a:gd name="connsiteY2" fmla="*/ 407363 h 567708"/>
+              <a:gd name="connsiteX3" fmla="*/ 113116 w 152058"/>
+              <a:gd name="connsiteY3" fmla="*/ 567708 h 567708"/>
+              <a:gd name="connsiteX4" fmla="*/ 113116 w 152058"/>
+              <a:gd name="connsiteY4" fmla="*/ 567708 h 567708"/>
+              <a:gd name="connsiteX0" fmla="*/ 138981 w 197949"/>
+              <a:gd name="connsiteY0" fmla="*/ 0 h 567708"/>
+              <a:gd name="connsiteX1" fmla="*/ 304 w 197949"/>
+              <a:gd name="connsiteY1" fmla="*/ 234016 h 567708"/>
+              <a:gd name="connsiteX2" fmla="*/ 195318 w 197949"/>
+              <a:gd name="connsiteY2" fmla="*/ 312023 h 567708"/>
+              <a:gd name="connsiteX3" fmla="*/ 112979 w 197949"/>
+              <a:gd name="connsiteY3" fmla="*/ 567708 h 567708"/>
+              <a:gd name="connsiteX4" fmla="*/ 112979 w 197949"/>
+              <a:gd name="connsiteY4" fmla="*/ 567708 h 567708"/>
+              <a:gd name="connsiteX0" fmla="*/ 138964 w 197932"/>
+              <a:gd name="connsiteY0" fmla="*/ 0 h 567708"/>
+              <a:gd name="connsiteX1" fmla="*/ 287 w 197932"/>
+              <a:gd name="connsiteY1" fmla="*/ 234016 h 567708"/>
+              <a:gd name="connsiteX2" fmla="*/ 195301 w 197932"/>
+              <a:gd name="connsiteY2" fmla="*/ 312023 h 567708"/>
+              <a:gd name="connsiteX3" fmla="*/ 112962 w 197932"/>
+              <a:gd name="connsiteY3" fmla="*/ 567708 h 567708"/>
+              <a:gd name="connsiteX4" fmla="*/ 112962 w 197932"/>
+              <a:gd name="connsiteY4" fmla="*/ 567708 h 567708"/>
+              <a:gd name="connsiteX0" fmla="*/ 108671 w 166544"/>
+              <a:gd name="connsiteY0" fmla="*/ 0 h 567708"/>
+              <a:gd name="connsiteX1" fmla="*/ 330 w 166544"/>
+              <a:gd name="connsiteY1" fmla="*/ 303355 h 567708"/>
+              <a:gd name="connsiteX2" fmla="*/ 165008 w 166544"/>
+              <a:gd name="connsiteY2" fmla="*/ 312023 h 567708"/>
+              <a:gd name="connsiteX3" fmla="*/ 82669 w 166544"/>
+              <a:gd name="connsiteY3" fmla="*/ 567708 h 567708"/>
+              <a:gd name="connsiteX4" fmla="*/ 82669 w 166544"/>
+              <a:gd name="connsiteY4" fmla="*/ 567708 h 567708"/>
+              <a:gd name="connsiteX0" fmla="*/ 108831 w 179543"/>
+              <a:gd name="connsiteY0" fmla="*/ 0 h 567708"/>
+              <a:gd name="connsiteX1" fmla="*/ 490 w 179543"/>
+              <a:gd name="connsiteY1" fmla="*/ 303355 h 567708"/>
+              <a:gd name="connsiteX2" fmla="*/ 178169 w 179543"/>
+              <a:gd name="connsiteY2" fmla="*/ 403030 h 567708"/>
+              <a:gd name="connsiteX3" fmla="*/ 82829 w 179543"/>
+              <a:gd name="connsiteY3" fmla="*/ 567708 h 567708"/>
+              <a:gd name="connsiteX4" fmla="*/ 82829 w 179543"/>
+              <a:gd name="connsiteY4" fmla="*/ 567708 h 567708"/>
+              <a:gd name="connsiteX0" fmla="*/ 119897 w 202958"/>
+              <a:gd name="connsiteY0" fmla="*/ 0 h 567708"/>
+              <a:gd name="connsiteX1" fmla="*/ 11556 w 202958"/>
+              <a:gd name="connsiteY1" fmla="*/ 303355 h 567708"/>
+              <a:gd name="connsiteX2" fmla="*/ 189235 w 202958"/>
+              <a:gd name="connsiteY2" fmla="*/ 403030 h 567708"/>
+              <a:gd name="connsiteX3" fmla="*/ 93895 w 202958"/>
+              <a:gd name="connsiteY3" fmla="*/ 567708 h 567708"/>
+              <a:gd name="connsiteX4" fmla="*/ 93895 w 202958"/>
+              <a:gd name="connsiteY4" fmla="*/ 567708 h 567708"/>
+              <a:gd name="connsiteX0" fmla="*/ 119897 w 202958"/>
+              <a:gd name="connsiteY0" fmla="*/ 0 h 567708"/>
+              <a:gd name="connsiteX1" fmla="*/ 11556 w 202958"/>
+              <a:gd name="connsiteY1" fmla="*/ 303355 h 567708"/>
+              <a:gd name="connsiteX2" fmla="*/ 189235 w 202958"/>
+              <a:gd name="connsiteY2" fmla="*/ 403030 h 567708"/>
+              <a:gd name="connsiteX3" fmla="*/ 93895 w 202958"/>
+              <a:gd name="connsiteY3" fmla="*/ 567708 h 567708"/>
+              <a:gd name="connsiteX4" fmla="*/ 93895 w 202958"/>
+              <a:gd name="connsiteY4" fmla="*/ 567708 h 567708"/>
+              <a:gd name="connsiteX0" fmla="*/ 112675 w 118808"/>
+              <a:gd name="connsiteY0" fmla="*/ 0 h 567708"/>
+              <a:gd name="connsiteX1" fmla="*/ 4334 w 118808"/>
+              <a:gd name="connsiteY1" fmla="*/ 303355 h 567708"/>
+              <a:gd name="connsiteX2" fmla="*/ 86673 w 118808"/>
+              <a:gd name="connsiteY2" fmla="*/ 567708 h 567708"/>
+              <a:gd name="connsiteX3" fmla="*/ 86673 w 118808"/>
+              <a:gd name="connsiteY3" fmla="*/ 567708 h 567708"/>
+              <a:gd name="connsiteX0" fmla="*/ 26002 w 26002"/>
+              <a:gd name="connsiteY0" fmla="*/ 0 h 567708"/>
+              <a:gd name="connsiteX1" fmla="*/ 0 w 26002"/>
+              <a:gd name="connsiteY1" fmla="*/ 567708 h 567708"/>
+              <a:gd name="connsiteX2" fmla="*/ 0 w 26002"/>
+              <a:gd name="connsiteY2" fmla="*/ 567708 h 567708"/>
+              <a:gd name="connsiteX0" fmla="*/ 26002 w 26002"/>
+              <a:gd name="connsiteY0" fmla="*/ 0 h 567708"/>
+              <a:gd name="connsiteX1" fmla="*/ 14128 w 26002"/>
+              <a:gd name="connsiteY1" fmla="*/ 246994 h 567708"/>
+              <a:gd name="connsiteX2" fmla="*/ 0 w 26002"/>
+              <a:gd name="connsiteY2" fmla="*/ 567708 h 567708"/>
+              <a:gd name="connsiteX3" fmla="*/ 0 w 26002"/>
+              <a:gd name="connsiteY3" fmla="*/ 567708 h 567708"/>
+              <a:gd name="connsiteX0" fmla="*/ 138585 w 138585"/>
+              <a:gd name="connsiteY0" fmla="*/ 0 h 567708"/>
+              <a:gd name="connsiteX1" fmla="*/ 126711 w 138585"/>
+              <a:gd name="connsiteY1" fmla="*/ 246994 h 567708"/>
+              <a:gd name="connsiteX2" fmla="*/ 112583 w 138585"/>
+              <a:gd name="connsiteY2" fmla="*/ 567708 h 567708"/>
+              <a:gd name="connsiteX3" fmla="*/ 112583 w 138585"/>
+              <a:gd name="connsiteY3" fmla="*/ 567708 h 567708"/>
+              <a:gd name="connsiteX0" fmla="*/ 138585 w 138585"/>
+              <a:gd name="connsiteY0" fmla="*/ 0 h 567708"/>
+              <a:gd name="connsiteX1" fmla="*/ 126711 w 138585"/>
+              <a:gd name="connsiteY1" fmla="*/ 246994 h 567708"/>
+              <a:gd name="connsiteX2" fmla="*/ 112583 w 138585"/>
+              <a:gd name="connsiteY2" fmla="*/ 567708 h 567708"/>
+              <a:gd name="connsiteX3" fmla="*/ 112583 w 138585"/>
+              <a:gd name="connsiteY3" fmla="*/ 567708 h 567708"/>
+              <a:gd name="connsiteX0" fmla="*/ 326118 w 326118"/>
+              <a:gd name="connsiteY0" fmla="*/ 0 h 567708"/>
+              <a:gd name="connsiteX1" fmla="*/ 314244 w 326118"/>
+              <a:gd name="connsiteY1" fmla="*/ 246994 h 567708"/>
+              <a:gd name="connsiteX2" fmla="*/ 300116 w 326118"/>
+              <a:gd name="connsiteY2" fmla="*/ 567708 h 567708"/>
+              <a:gd name="connsiteX3" fmla="*/ 0 w 326118"/>
+              <a:gd name="connsiteY3" fmla="*/ 321618 h 567708"/>
+              <a:gd name="connsiteX0" fmla="*/ 326118 w 326118"/>
+              <a:gd name="connsiteY0" fmla="*/ 0 h 321618"/>
+              <a:gd name="connsiteX1" fmla="*/ 314244 w 326118"/>
+              <a:gd name="connsiteY1" fmla="*/ 246994 h 321618"/>
+              <a:gd name="connsiteX2" fmla="*/ 0 w 326118"/>
+              <a:gd name="connsiteY2" fmla="*/ 321618 h 321618"/>
+              <a:gd name="connsiteX0" fmla="*/ 326118 w 326118"/>
+              <a:gd name="connsiteY0" fmla="*/ 0 h 321618"/>
+              <a:gd name="connsiteX1" fmla="*/ 314245 w 326118"/>
+              <a:gd name="connsiteY1" fmla="*/ 246994 h 321618"/>
+              <a:gd name="connsiteX2" fmla="*/ 0 w 326118"/>
+              <a:gd name="connsiteY2" fmla="*/ 321618 h 321618"/>
+              <a:gd name="connsiteX0" fmla="*/ 326118 w 326118"/>
+              <a:gd name="connsiteY0" fmla="*/ 0 h 321618"/>
+              <a:gd name="connsiteX1" fmla="*/ 314245 w 326118"/>
+              <a:gd name="connsiteY1" fmla="*/ 246994 h 321618"/>
+              <a:gd name="connsiteX2" fmla="*/ 0 w 326118"/>
+              <a:gd name="connsiteY2" fmla="*/ 321618 h 321618"/>
+              <a:gd name="connsiteX0" fmla="*/ 326118 w 368598"/>
+              <a:gd name="connsiteY0" fmla="*/ 0 h 321618"/>
+              <a:gd name="connsiteX1" fmla="*/ 314245 w 368598"/>
+              <a:gd name="connsiteY1" fmla="*/ 246994 h 321618"/>
+              <a:gd name="connsiteX2" fmla="*/ 0 w 368598"/>
+              <a:gd name="connsiteY2" fmla="*/ 321618 h 321618"/>
+              <a:gd name="connsiteX0" fmla="*/ 326118 w 502239"/>
+              <a:gd name="connsiteY0" fmla="*/ 0 h 321618"/>
+              <a:gd name="connsiteX1" fmla="*/ 500260 w 502239"/>
+              <a:gd name="connsiteY1" fmla="*/ 151661 h 321618"/>
+              <a:gd name="connsiteX2" fmla="*/ 314245 w 502239"/>
+              <a:gd name="connsiteY2" fmla="*/ 246994 h 321618"/>
+              <a:gd name="connsiteX3" fmla="*/ 0 w 502239"/>
+              <a:gd name="connsiteY3" fmla="*/ 321618 h 321618"/>
+              <a:gd name="connsiteX0" fmla="*/ 500260 w 500260"/>
+              <a:gd name="connsiteY0" fmla="*/ 0 h 169957"/>
+              <a:gd name="connsiteX1" fmla="*/ 314245 w 500260"/>
+              <a:gd name="connsiteY1" fmla="*/ 95333 h 169957"/>
+              <a:gd name="connsiteX2" fmla="*/ 0 w 500260"/>
+              <a:gd name="connsiteY2" fmla="*/ 169957 h 169957"/>
+              <a:gd name="connsiteX0" fmla="*/ 500260 w 500260"/>
+              <a:gd name="connsiteY0" fmla="*/ 0 h 169957"/>
+              <a:gd name="connsiteX1" fmla="*/ 333194 w 500260"/>
+              <a:gd name="connsiteY1" fmla="*/ 117908 h 169957"/>
+              <a:gd name="connsiteX2" fmla="*/ 0 w 500260"/>
+              <a:gd name="connsiteY2" fmla="*/ 169957 h 169957"/>
+              <a:gd name="connsiteX0" fmla="*/ 500260 w 500260"/>
+              <a:gd name="connsiteY0" fmla="*/ 0 h 170641"/>
+              <a:gd name="connsiteX1" fmla="*/ 333194 w 500260"/>
+              <a:gd name="connsiteY1" fmla="*/ 117908 h 170641"/>
+              <a:gd name="connsiteX2" fmla="*/ 0 w 500260"/>
+              <a:gd name="connsiteY2" fmla="*/ 169957 h 170641"/>
+              <a:gd name="connsiteX0" fmla="*/ 500260 w 500260"/>
+              <a:gd name="connsiteY0" fmla="*/ 0 h 182952"/>
+              <a:gd name="connsiteX1" fmla="*/ 333194 w 500260"/>
+              <a:gd name="connsiteY1" fmla="*/ 117908 h 182952"/>
+              <a:gd name="connsiteX2" fmla="*/ 0 w 500260"/>
+              <a:gd name="connsiteY2" fmla="*/ 169957 h 182952"/>
+              <a:gd name="connsiteX0" fmla="*/ 493817 w 493817"/>
+              <a:gd name="connsiteY0" fmla="*/ 0 h 166287"/>
+              <a:gd name="connsiteX1" fmla="*/ 326751 w 493817"/>
+              <a:gd name="connsiteY1" fmla="*/ 117908 h 166287"/>
+              <a:gd name="connsiteX2" fmla="*/ 0 w 493817"/>
+              <a:gd name="connsiteY2" fmla="*/ 153292 h 166287"/>
+            </a:gdLst>
+            <a:ahLst/>
+            <a:cxnLst>
+              <a:cxn ang="0">
+                <a:pos x="connsiteX0" y="connsiteY0"/>
+              </a:cxn>
+              <a:cxn ang="0">
+                <a:pos x="connsiteX1" y="connsiteY1"/>
+              </a:cxn>
+              <a:cxn ang="0">
+                <a:pos x="connsiteX2" y="connsiteY2"/>
+              </a:cxn>
+            </a:cxnLst>
+            <a:rect l="l" t="t" r="r" b="b"/>
+            <a:pathLst>
+              <a:path w="493817" h="166287">
+                <a:moveTo>
+                  <a:pt x="493817" y="0"/>
+                </a:moveTo>
+                <a:cubicBezTo>
+                  <a:pt x="491838" y="41166"/>
+                  <a:pt x="409054" y="92359"/>
+                  <a:pt x="326751" y="117908"/>
+                </a:cubicBezTo>
+                <a:cubicBezTo>
+                  <a:pt x="244448" y="143457"/>
+                  <a:pt x="92490" y="166287"/>
+                  <a:pt x="0" y="153292"/>
+                </a:cubicBezTo>
+              </a:path>
+            </a:pathLst>
+          </a:custGeom>
+          <a:noFill/>
+          <a:ln w="6350">
+            <a:solidFill>
+              <a:schemeClr val="tx1"/>
+            </a:solidFill>
+            <a:headEnd type="none" w="sm" len="sm"/>
+            <a:tailEnd type="arrow" w="sm" len="sm"/>
+          </a:ln>
+        </p:spPr>
+        <p:style>
+          <a:lnRef idx="2">
+            <a:schemeClr val="accent1">
+              <a:shade val="50000"/>
+            </a:schemeClr>
+          </a:lnRef>
+          <a:fillRef idx="1">
+            <a:schemeClr val="accent1"/>
+          </a:fillRef>
+          <a:effectRef idx="0">
+            <a:schemeClr val="accent1"/>
+          </a:effectRef>
+          <a:fontRef idx="minor">
+            <a:schemeClr val="lt1"/>
+          </a:fontRef>
+        </p:style>
+        <p:txBody>
+          <a:bodyPr rtlCol="0" anchor="ctr"/>
+          <a:lstStyle/>
+          <a:p>
+            <a:pPr algn="ctr"/>
+            <a:endParaRPr lang="en-US"/>
+          </a:p>
+        </p:txBody>
+      </p:sp>
+      <p:cxnSp>
+        <p:nvCxnSpPr>
+          <p:cNvPr id="16" name="Straight Connector 15">
+            <a:extLst>
+              <a:ext uri="{FF2B5EF4-FFF2-40B4-BE49-F238E27FC236}">
+                <a16:creationId xmlns:a16="http://schemas.microsoft.com/office/drawing/2014/main" id="{F9BE9771-A062-4668-83C1-98A52556D404}"/>
+              </a:ext>
+            </a:extLst>
+          </p:cNvPr>
+          <p:cNvCxnSpPr/>
+          <p:nvPr/>
+        </p:nvCxnSpPr>
+        <p:spPr>
+          <a:xfrm rot="60000" flipV="1">
+            <a:off x="4005263" y="2528889"/>
+            <a:ext cx="471488" cy="223836"/>
+          </a:xfrm>
+          <a:prstGeom prst="line">
+            <a:avLst/>
+          </a:prstGeom>
+          <a:ln w="19050">
+            <a:solidFill>
+              <a:schemeClr val="tx1"/>
+            </a:solidFill>
+            <a:tailEnd type="triangle" w="sm" len="sm"/>
+          </a:ln>
+        </p:spPr>
+        <p:style>
+          <a:lnRef idx="1">
+            <a:schemeClr val="accent1"/>
+          </a:lnRef>
+          <a:fillRef idx="0">
+            <a:schemeClr val="accent1"/>
+          </a:fillRef>
+          <a:effectRef idx="0">
+            <a:schemeClr val="accent1"/>
+          </a:effectRef>
+          <a:fontRef idx="minor">
+            <a:schemeClr val="tx1"/>
+          </a:fontRef>
+        </p:style>
+      </p:cxnSp>
+      <p:cxnSp>
+        <p:nvCxnSpPr>
+          <p:cNvPr id="17" name="Straight Connector 16">
+            <a:extLst>
+              <a:ext uri="{FF2B5EF4-FFF2-40B4-BE49-F238E27FC236}">
+                <a16:creationId xmlns:a16="http://schemas.microsoft.com/office/drawing/2014/main" id="{34E109E6-53C0-4B4E-AE52-A5CC172227C3}"/>
+              </a:ext>
+            </a:extLst>
+          </p:cNvPr>
+          <p:cNvCxnSpPr/>
+          <p:nvPr/>
+        </p:nvCxnSpPr>
+        <p:spPr>
+          <a:xfrm rot="60000" flipV="1">
+            <a:off x="3514728" y="2755109"/>
+            <a:ext cx="471488" cy="223836"/>
+          </a:xfrm>
+          <a:prstGeom prst="line">
+            <a:avLst/>
+          </a:prstGeom>
+          <a:ln w="19050">
+            <a:solidFill>
+              <a:schemeClr val="tx1"/>
+            </a:solidFill>
+            <a:tailEnd type="triangle" w="sm" len="sm"/>
+          </a:ln>
+        </p:spPr>
+        <p:style>
+          <a:lnRef idx="1">
+            <a:schemeClr val="accent1"/>
+          </a:lnRef>
+          <a:fillRef idx="0">
+            <a:schemeClr val="accent1"/>
+          </a:fillRef>
+          <a:effectRef idx="0">
+            <a:schemeClr val="accent1"/>
+          </a:effectRef>
+          <a:fontRef idx="minor">
+            <a:schemeClr val="tx1"/>
+          </a:fontRef>
+        </p:style>
+      </p:cxnSp>
+    </p:spTree>
+    <p:extLst>
+      <p:ext uri="{BB962C8B-B14F-4D97-AF65-F5344CB8AC3E}">
+        <p14:creationId xmlns:p14="http://schemas.microsoft.com/office/powerpoint/2010/main" val="3586626873"/>
+      </p:ext>
+    </p:extLst>
+  </p:cSld>
+  <p:clrMapOvr>
+    <a:masterClrMapping/>
+  </p:clrMapOvr>
+</p:sld>
+</file>
+
+<file path=ppt/slides/slide16.xml><?xml version="1.0" encoding="utf-8"?>
+<p:sld xmlns:a="http://schemas.openxmlformats.org/drawingml/2006/main" xmlns:r="http://schemas.openxmlformats.org/officeDocument/2006/relationships" xmlns:p="http://schemas.openxmlformats.org/presentationml/2006/main">
+  <p:cSld>
+    <p:spTree>
+      <p:nvGrpSpPr>
+        <p:cNvPr id="1" name=""/>
+        <p:cNvGrpSpPr/>
+        <p:nvPr/>
+      </p:nvGrpSpPr>
+      <p:grpSpPr>
+        <a:xfrm>
+          <a:off x="0" y="0"/>
+          <a:ext cx="0" cy="0"/>
+          <a:chOff x="0" y="0"/>
+          <a:chExt cx="0" cy="0"/>
+        </a:xfrm>
+      </p:grpSpPr>
+      <p:sp>
+        <p:nvSpPr>
+          <p:cNvPr id="2" name="Rectangle 1">
+            <a:extLst>
+              <a:ext uri="{FF2B5EF4-FFF2-40B4-BE49-F238E27FC236}">
+                <a16:creationId xmlns:a16="http://schemas.microsoft.com/office/drawing/2014/main" id="{DE75EE02-BD2F-4367-B014-E668900F22B4}"/>
+              </a:ext>
+            </a:extLst>
+          </p:cNvPr>
+          <p:cNvSpPr/>
+          <p:nvPr/>
+        </p:nvSpPr>
+        <p:spPr>
+          <a:xfrm>
+            <a:off x="1652016" y="1829016"/>
+            <a:ext cx="4267200" cy="2324099"/>
+          </a:xfrm>
+          <a:prstGeom prst="rect">
+            <a:avLst/>
+          </a:prstGeom>
+          <a:noFill/>
+          <a:ln w="9525">
+            <a:prstDash val="sysDash"/>
+          </a:ln>
+        </p:spPr>
+        <p:style>
+          <a:lnRef idx="2">
+            <a:schemeClr val="accent1">
+              <a:shade val="50000"/>
+            </a:schemeClr>
+          </a:lnRef>
+          <a:fillRef idx="1">
+            <a:schemeClr val="accent1"/>
+          </a:fillRef>
+          <a:effectRef idx="0">
+            <a:schemeClr val="accent1"/>
+          </a:effectRef>
+          <a:fontRef idx="minor">
+            <a:schemeClr val="lt1"/>
+          </a:fontRef>
+        </p:style>
+        <p:txBody>
+          <a:bodyPr rtlCol="0" anchor="ctr"/>
+          <a:lstStyle/>
+          <a:p>
+            <a:pPr algn="ctr"/>
+            <a:endParaRPr lang="en-US" sz="800"/>
+          </a:p>
+        </p:txBody>
+      </p:sp>
+      <p:sp>
+        <p:nvSpPr>
+          <p:cNvPr id="3" name="TextBox 2">
+            <a:extLst>
+              <a:ext uri="{FF2B5EF4-FFF2-40B4-BE49-F238E27FC236}">
+                <a16:creationId xmlns:a16="http://schemas.microsoft.com/office/drawing/2014/main" id="{E306E877-7665-434C-9599-3025077F214B}"/>
+              </a:ext>
+            </a:extLst>
+          </p:cNvPr>
+          <p:cNvSpPr txBox="1"/>
+          <p:nvPr/>
+        </p:nvSpPr>
+        <p:spPr>
+          <a:xfrm>
+            <a:off x="3095883" y="1331084"/>
+            <a:ext cx="370958" cy="215444"/>
+          </a:xfrm>
+          <a:prstGeom prst="rect">
+            <a:avLst/>
+          </a:prstGeom>
+          <a:noFill/>
+          <a:ln>
+            <a:noFill/>
+          </a:ln>
+        </p:spPr>
+        <p:txBody>
+          <a:bodyPr wrap="square" lIns="0" rIns="0" rtlCol="0">
+            <a:spAutoFit/>
+          </a:bodyPr>
+          <a:lstStyle/>
+          <a:p>
+            <a:pPr algn="ctr"/>
+            <a:r>
+              <a:rPr lang="en-US" altLang="zh-TW" sz="800" dirty="0"/>
+              <a:t>Previous</a:t>
+            </a:r>
+          </a:p>
+        </p:txBody>
+      </p:sp>
+      <p:sp>
+        <p:nvSpPr>
+          <p:cNvPr id="4" name="TextBox 3">
+            <a:extLst>
+              <a:ext uri="{FF2B5EF4-FFF2-40B4-BE49-F238E27FC236}">
+                <a16:creationId xmlns:a16="http://schemas.microsoft.com/office/drawing/2014/main" id="{419FC2C8-4FED-4818-ABBC-262DDA501CF4}"/>
+              </a:ext>
+            </a:extLst>
+          </p:cNvPr>
+          <p:cNvSpPr txBox="1"/>
+          <p:nvPr/>
+        </p:nvSpPr>
+        <p:spPr>
+          <a:xfrm>
+            <a:off x="3577604" y="1331084"/>
+            <a:ext cx="329184" cy="215444"/>
+          </a:xfrm>
+          <a:prstGeom prst="rect">
+            <a:avLst/>
+          </a:prstGeom>
+          <a:noFill/>
+          <a:ln>
+            <a:noFill/>
+          </a:ln>
+        </p:spPr>
+        <p:txBody>
+          <a:bodyPr wrap="square" lIns="0" rIns="0" rtlCol="0">
+            <a:spAutoFit/>
+          </a:bodyPr>
+          <a:lstStyle/>
+          <a:p>
+            <a:pPr algn="ctr"/>
+            <a:r>
+              <a:rPr lang="en-US" altLang="zh-TW" sz="800" dirty="0"/>
+              <a:t>Current</a:t>
+            </a:r>
+          </a:p>
+        </p:txBody>
+      </p:sp>
+      <p:sp>
+        <p:nvSpPr>
+          <p:cNvPr id="5" name="TextBox 4">
+            <a:extLst>
+              <a:ext uri="{FF2B5EF4-FFF2-40B4-BE49-F238E27FC236}">
+                <a16:creationId xmlns:a16="http://schemas.microsoft.com/office/drawing/2014/main" id="{9B957F3A-C0DE-4175-AC97-5B26F35DD243}"/>
+              </a:ext>
+            </a:extLst>
+          </p:cNvPr>
+          <p:cNvSpPr txBox="1"/>
+          <p:nvPr/>
+        </p:nvSpPr>
+        <p:spPr>
+          <a:xfrm>
+            <a:off x="4035553" y="1331084"/>
+            <a:ext cx="267298" cy="215444"/>
+          </a:xfrm>
+          <a:prstGeom prst="rect">
+            <a:avLst/>
+          </a:prstGeom>
+          <a:noFill/>
+          <a:ln>
+            <a:noFill/>
+          </a:ln>
+        </p:spPr>
+        <p:txBody>
+          <a:bodyPr wrap="square" lIns="0" rIns="0" rtlCol="0">
+            <a:spAutoFit/>
+          </a:bodyPr>
+          <a:lstStyle/>
+          <a:p>
+            <a:pPr algn="ctr"/>
+            <a:r>
+              <a:rPr lang="en-US" altLang="zh-TW" sz="800" dirty="0"/>
+              <a:t>Next </a:t>
+            </a:r>
+          </a:p>
+        </p:txBody>
+      </p:sp>
+      <p:sp>
+        <p:nvSpPr>
+          <p:cNvPr id="6" name="TextBox 5">
+            <a:extLst>
+              <a:ext uri="{FF2B5EF4-FFF2-40B4-BE49-F238E27FC236}">
+                <a16:creationId xmlns:a16="http://schemas.microsoft.com/office/drawing/2014/main" id="{8F4F8FA7-A167-42C7-ABE2-05F8151155C6}"/>
+              </a:ext>
+            </a:extLst>
+          </p:cNvPr>
+          <p:cNvSpPr txBox="1"/>
+          <p:nvPr/>
+        </p:nvSpPr>
+        <p:spPr>
+          <a:xfrm>
+            <a:off x="3056442" y="4301734"/>
+            <a:ext cx="2125158" cy="338554"/>
+          </a:xfrm>
+          <a:prstGeom prst="rect">
+            <a:avLst/>
+          </a:prstGeom>
+          <a:noFill/>
+          <a:ln>
+            <a:noFill/>
+          </a:ln>
+        </p:spPr>
+        <p:txBody>
+          <a:bodyPr wrap="square" lIns="0" rIns="0" rtlCol="0">
+            <a:spAutoFit/>
+          </a:bodyPr>
+          <a:lstStyle/>
+          <a:p>
+            <a:r>
+              <a:rPr lang="en-US" altLang="zh-TW" sz="1600"/>
+              <a:t>Figure 9-20</a:t>
+            </a:r>
+            <a:endParaRPr lang="zh-TW" altLang="en-US" sz="1600" baseline="-25000" dirty="0"/>
+          </a:p>
+        </p:txBody>
+      </p:sp>
+      <p:sp>
+        <p:nvSpPr>
+          <p:cNvPr id="7" name="Rectangle 6">
+            <a:extLst>
+              <a:ext uri="{FF2B5EF4-FFF2-40B4-BE49-F238E27FC236}">
+                <a16:creationId xmlns:a16="http://schemas.microsoft.com/office/drawing/2014/main" id="{E0D86850-E861-4FE4-B2AF-878163D770F2}"/>
+              </a:ext>
+            </a:extLst>
+          </p:cNvPr>
+          <p:cNvSpPr/>
+          <p:nvPr/>
+        </p:nvSpPr>
+        <p:spPr>
+          <a:xfrm>
+            <a:off x="3187731" y="998142"/>
+            <a:ext cx="179722" cy="321224"/>
+          </a:xfrm>
+          <a:prstGeom prst="rect">
+            <a:avLst/>
+          </a:prstGeom>
+          <a:noFill/>
+          <a:ln w="3175">
+            <a:solidFill>
+              <a:schemeClr val="tx1"/>
+            </a:solidFill>
+          </a:ln>
+        </p:spPr>
+        <p:style>
+          <a:lnRef idx="2">
+            <a:schemeClr val="accent1">
+              <a:shade val="50000"/>
+            </a:schemeClr>
+          </a:lnRef>
+          <a:fillRef idx="1">
+            <a:schemeClr val="accent1"/>
+          </a:fillRef>
+          <a:effectRef idx="0">
+            <a:schemeClr val="accent1"/>
+          </a:effectRef>
+          <a:fontRef idx="minor">
+            <a:schemeClr val="lt1"/>
+          </a:fontRef>
+        </p:style>
+        <p:txBody>
+          <a:bodyPr rtlCol="0" anchor="ctr"/>
+          <a:lstStyle/>
+          <a:p>
+            <a:pPr algn="ctr"/>
+            <a:endParaRPr lang="en-US"/>
+          </a:p>
+        </p:txBody>
+      </p:sp>
+      <p:sp>
+        <p:nvSpPr>
+          <p:cNvPr id="8" name="Rectangle 7">
+            <a:extLst>
+              <a:ext uri="{FF2B5EF4-FFF2-40B4-BE49-F238E27FC236}">
+                <a16:creationId xmlns:a16="http://schemas.microsoft.com/office/drawing/2014/main" id="{380D6F2E-533B-4A76-84C9-DBB282B05443}"/>
+              </a:ext>
+            </a:extLst>
+          </p:cNvPr>
+          <p:cNvSpPr>
+            <a:spLocks noChangeAspect="1"/>
+          </p:cNvSpPr>
+          <p:nvPr/>
+        </p:nvSpPr>
+        <p:spPr>
+          <a:xfrm>
+            <a:off x="3477645" y="796987"/>
+            <a:ext cx="179722" cy="321224"/>
+          </a:xfrm>
+          <a:prstGeom prst="rect">
+            <a:avLst/>
+          </a:prstGeom>
+          <a:noFill/>
+          <a:ln w="3175">
+            <a:solidFill>
+              <a:schemeClr val="tx1"/>
+            </a:solidFill>
+          </a:ln>
+        </p:spPr>
+        <p:style>
+          <a:lnRef idx="2">
+            <a:schemeClr val="accent1">
+              <a:shade val="50000"/>
+            </a:schemeClr>
+          </a:lnRef>
+          <a:fillRef idx="1">
+            <a:schemeClr val="accent1"/>
+          </a:fillRef>
+          <a:effectRef idx="0">
+            <a:schemeClr val="accent1"/>
+          </a:effectRef>
+          <a:fontRef idx="minor">
+            <a:schemeClr val="lt1"/>
+          </a:fontRef>
+        </p:style>
+        <p:txBody>
+          <a:bodyPr rtlCol="0" anchor="ctr"/>
+          <a:lstStyle/>
+          <a:p>
+            <a:pPr algn="ctr"/>
+            <a:endParaRPr lang="en-US"/>
+          </a:p>
+        </p:txBody>
+      </p:sp>
+      <p:sp>
+        <p:nvSpPr>
+          <p:cNvPr id="9" name="Rectangle 8">
+            <a:extLst>
+              <a:ext uri="{FF2B5EF4-FFF2-40B4-BE49-F238E27FC236}">
+                <a16:creationId xmlns:a16="http://schemas.microsoft.com/office/drawing/2014/main" id="{EF8B83B7-7464-45E9-8C17-6CA7323F73F5}"/>
+              </a:ext>
+            </a:extLst>
+          </p:cNvPr>
+          <p:cNvSpPr/>
+          <p:nvPr/>
+        </p:nvSpPr>
+        <p:spPr>
+          <a:xfrm>
+            <a:off x="3952333" y="708226"/>
+            <a:ext cx="179722" cy="321224"/>
+          </a:xfrm>
+          <a:prstGeom prst="rect">
+            <a:avLst/>
+          </a:prstGeom>
+          <a:noFill/>
+          <a:ln w="3175">
+            <a:solidFill>
+              <a:schemeClr val="tx1"/>
+            </a:solidFill>
+          </a:ln>
+        </p:spPr>
+        <p:style>
+          <a:lnRef idx="2">
+            <a:schemeClr val="accent1">
+              <a:shade val="50000"/>
+            </a:schemeClr>
+          </a:lnRef>
+          <a:fillRef idx="1">
+            <a:schemeClr val="accent1"/>
+          </a:fillRef>
+          <a:effectRef idx="0">
+            <a:schemeClr val="accent1"/>
+          </a:effectRef>
+          <a:fontRef idx="minor">
+            <a:schemeClr val="lt1"/>
+          </a:fontRef>
+        </p:style>
+        <p:txBody>
+          <a:bodyPr rtlCol="0" anchor="ctr"/>
+          <a:lstStyle/>
+          <a:p>
+            <a:pPr algn="ctr"/>
+            <a:endParaRPr lang="en-US"/>
+          </a:p>
+        </p:txBody>
+      </p:sp>
+      <p:cxnSp>
+        <p:nvCxnSpPr>
+          <p:cNvPr id="10" name="Straight Connector 9">
+            <a:extLst>
+              <a:ext uri="{FF2B5EF4-FFF2-40B4-BE49-F238E27FC236}">
+                <a16:creationId xmlns:a16="http://schemas.microsoft.com/office/drawing/2014/main" id="{C1A79D17-9C21-41BE-B8ED-2A1D80C72552}"/>
+              </a:ext>
+            </a:extLst>
+          </p:cNvPr>
+          <p:cNvCxnSpPr/>
+          <p:nvPr/>
+        </p:nvCxnSpPr>
+        <p:spPr>
+          <a:xfrm flipV="1">
+            <a:off x="4451077" y="1404648"/>
+            <a:ext cx="438150" cy="76200"/>
+          </a:xfrm>
+          <a:prstGeom prst="line">
+            <a:avLst/>
+          </a:prstGeom>
+          <a:ln w="3175">
+            <a:solidFill>
+              <a:schemeClr val="tx1"/>
+            </a:solidFill>
+            <a:prstDash val="sysDot"/>
+            <a:tailEnd type="triangle" w="sm" len="sm"/>
+          </a:ln>
+        </p:spPr>
+        <p:style>
+          <a:lnRef idx="1">
+            <a:schemeClr val="accent1"/>
+          </a:lnRef>
+          <a:fillRef idx="0">
+            <a:schemeClr val="accent1"/>
+          </a:fillRef>
+          <a:effectRef idx="0">
+            <a:schemeClr val="accent1"/>
+          </a:effectRef>
+          <a:fontRef idx="minor">
+            <a:schemeClr val="tx1"/>
+          </a:fontRef>
+        </p:style>
+      </p:cxnSp>
+      <p:cxnSp>
+        <p:nvCxnSpPr>
+          <p:cNvPr id="11" name="Straight Connector 10">
+            <a:extLst>
+              <a:ext uri="{FF2B5EF4-FFF2-40B4-BE49-F238E27FC236}">
+                <a16:creationId xmlns:a16="http://schemas.microsoft.com/office/drawing/2014/main" id="{0CA87A16-E82A-41BF-A71D-84C2EC1275B0}"/>
+              </a:ext>
+            </a:extLst>
+          </p:cNvPr>
+          <p:cNvCxnSpPr/>
+          <p:nvPr/>
+        </p:nvCxnSpPr>
+        <p:spPr>
+          <a:xfrm>
+            <a:off x="4467003" y="776660"/>
+            <a:ext cx="14287" cy="385762"/>
+          </a:xfrm>
+          <a:prstGeom prst="line">
+            <a:avLst/>
+          </a:prstGeom>
+          <a:ln w="9525">
+            <a:solidFill>
+              <a:schemeClr val="tx1"/>
+            </a:solidFill>
+            <a:prstDash val="dash"/>
+            <a:tailEnd type="triangle" w="sm" len="sm"/>
+          </a:ln>
+        </p:spPr>
+        <p:style>
+          <a:lnRef idx="1">
+            <a:schemeClr val="accent1"/>
+          </a:lnRef>
+          <a:fillRef idx="0">
+            <a:schemeClr val="accent1"/>
+          </a:fillRef>
+          <a:effectRef idx="0">
+            <a:schemeClr val="accent1"/>
+          </a:effectRef>
+          <a:fontRef idx="minor">
+            <a:schemeClr val="tx1"/>
+          </a:fontRef>
+        </p:style>
+      </p:cxnSp>
+      <p:cxnSp>
+        <p:nvCxnSpPr>
+          <p:cNvPr id="12" name="Straight Connector 11">
+            <a:extLst>
+              <a:ext uri="{FF2B5EF4-FFF2-40B4-BE49-F238E27FC236}">
+                <a16:creationId xmlns:a16="http://schemas.microsoft.com/office/drawing/2014/main" id="{BB3DFF18-98A8-4779-B952-2AB7FF705116}"/>
+              </a:ext>
+            </a:extLst>
+          </p:cNvPr>
+          <p:cNvCxnSpPr/>
+          <p:nvPr/>
+        </p:nvCxnSpPr>
+        <p:spPr>
+          <a:xfrm flipV="1">
+            <a:off x="3281362" y="950456"/>
+            <a:ext cx="311943" cy="209549"/>
+          </a:xfrm>
+          <a:prstGeom prst="line">
+            <a:avLst/>
+          </a:prstGeom>
+          <a:ln w="3175">
+            <a:solidFill>
+              <a:schemeClr val="tx1"/>
+            </a:solidFill>
+            <a:prstDash val="sysDot"/>
+            <a:tailEnd type="triangle" w="sm" len="sm"/>
+          </a:ln>
+        </p:spPr>
+        <p:style>
+          <a:lnRef idx="1">
+            <a:schemeClr val="accent1"/>
+          </a:lnRef>
+          <a:fillRef idx="0">
+            <a:schemeClr val="accent1"/>
+          </a:fillRef>
+          <a:effectRef idx="0">
+            <a:schemeClr val="accent1"/>
+          </a:effectRef>
+          <a:fontRef idx="minor">
+            <a:schemeClr val="tx1"/>
+          </a:fontRef>
+        </p:style>
+      </p:cxnSp>
+      <mc:AlternateContent xmlns:mc="http://schemas.openxmlformats.org/markup-compatibility/2006">
+        <mc:Choice xmlns:a14="http://schemas.microsoft.com/office/drawing/2010/main" Requires="a14">
+          <p:sp>
+            <p:nvSpPr>
+              <p:cNvPr id="13" name="TextBox 12">
+                <a:extLst>
+                  <a:ext uri="{FF2B5EF4-FFF2-40B4-BE49-F238E27FC236}">
+                    <a16:creationId xmlns:a16="http://schemas.microsoft.com/office/drawing/2014/main" id="{5A3E749E-C1E3-4B58-BAC4-0130FE61CEB9}"/>
+                  </a:ext>
+                </a:extLst>
+              </p:cNvPr>
+              <p:cNvSpPr txBox="1"/>
+              <p:nvPr/>
+            </p:nvSpPr>
+            <p:spPr>
+              <a:xfrm>
+                <a:off x="3392814" y="824974"/>
+                <a:ext cx="102657" cy="230256"/>
+              </a:xfrm>
+              <a:prstGeom prst="rect">
+                <a:avLst/>
+              </a:prstGeom>
+              <a:noFill/>
+            </p:spPr>
+            <p:txBody>
+              <a:bodyPr wrap="none" lIns="0" rIns="0" rtlCol="0">
+                <a:spAutoFit/>
+              </a:bodyPr>
+              <a:lstStyle/>
+              <a:p>
+                <a14:m>
+                  <m:oMath xmlns:m="http://schemas.openxmlformats.org/officeDocument/2006/math">
+                    <m:acc>
+                      <m:accPr>
+                        <m:chr m:val="⃑"/>
+                        <m:ctrlPr>
+                          <a:rPr lang="en-US" altLang="zh-CN" sz="800" i="1" smtClean="0">
+                            <a:latin typeface="Cambria Math" panose="02040503050406030204" pitchFamily="18" charset="0"/>
+                          </a:rPr>
+                        </m:ctrlPr>
+                      </m:accPr>
+                      <m:e>
+                        <m:r>
+                          <a:rPr lang="en-US" altLang="zh-CN" sz="800" b="0" i="1" smtClean="0">
+                            <a:latin typeface="Cambria Math" panose="02040503050406030204" pitchFamily="18" charset="0"/>
+                          </a:rPr>
+                          <m:t>𝑉</m:t>
+                        </m:r>
+                      </m:e>
+                    </m:acc>
+                  </m:oMath>
+                </a14:m>
+                <a:r>
+                  <a:rPr lang="en-US" altLang="zh-CN" sz="800" baseline="-25000" dirty="0"/>
+                  <a:t>p</a:t>
+                </a:r>
+                <a:endParaRPr lang="zh-CN" altLang="en-US" sz="800" baseline="-25000" dirty="0"/>
+              </a:p>
+            </p:txBody>
+          </p:sp>
+        </mc:Choice>
+        <mc:Fallback>
+          <p:sp>
+            <p:nvSpPr>
+              <p:cNvPr id="13" name="TextBox 12">
+                <a:extLst>
+                  <a:ext uri="{FF2B5EF4-FFF2-40B4-BE49-F238E27FC236}">
+                    <a16:creationId xmlns:a16="http://schemas.microsoft.com/office/drawing/2014/main" id="{5A3E749E-C1E3-4B58-BAC4-0130FE61CEB9}"/>
+                  </a:ext>
+                </a:extLst>
+              </p:cNvPr>
+              <p:cNvSpPr txBox="1">
+                <a:spLocks noRot="1" noChangeAspect="1" noMove="1" noResize="1" noEditPoints="1" noAdjustHandles="1" noChangeArrowheads="1" noChangeShapeType="1" noTextEdit="1"/>
+              </p:cNvSpPr>
+              <p:nvPr/>
+            </p:nvSpPr>
+            <p:spPr>
+              <a:xfrm>
+                <a:off x="3392814" y="824974"/>
+                <a:ext cx="102657" cy="230256"/>
+              </a:xfrm>
+              <a:prstGeom prst="rect">
+                <a:avLst/>
+              </a:prstGeom>
+              <a:blipFill>
+                <a:blip r:embed="rId2"/>
+                <a:stretch>
+                  <a:fillRect l="-37500" r="-50000" b="-5263"/>
+                </a:stretch>
+              </a:blipFill>
+            </p:spPr>
+            <p:txBody>
+              <a:bodyPr/>
+              <a:lstStyle/>
+              <a:p>
+                <a:r>
+                  <a:rPr lang="en-US">
+                    <a:noFill/>
+                  </a:rPr>
+                  <a:t> </a:t>
+                </a:r>
+              </a:p>
+            </p:txBody>
+          </p:sp>
+        </mc:Fallback>
+      </mc:AlternateContent>
+      <mc:AlternateContent xmlns:mc="http://schemas.openxmlformats.org/markup-compatibility/2006">
+        <mc:Choice xmlns:a14="http://schemas.microsoft.com/office/drawing/2010/main" Requires="a14">
+          <p:sp>
+            <p:nvSpPr>
+              <p:cNvPr id="14" name="TextBox 13">
+                <a:extLst>
+                  <a:ext uri="{FF2B5EF4-FFF2-40B4-BE49-F238E27FC236}">
+                    <a16:creationId xmlns:a16="http://schemas.microsoft.com/office/drawing/2014/main" id="{D4FC06F0-93C3-4D7D-B404-C749118E9090}"/>
+                  </a:ext>
+                </a:extLst>
+              </p:cNvPr>
+              <p:cNvSpPr txBox="1"/>
+              <p:nvPr/>
+            </p:nvSpPr>
+            <p:spPr>
+              <a:xfrm>
+                <a:off x="3773953" y="700713"/>
+                <a:ext cx="96245" cy="230256"/>
+              </a:xfrm>
+              <a:prstGeom prst="rect">
+                <a:avLst/>
+              </a:prstGeom>
+              <a:noFill/>
+            </p:spPr>
+            <p:txBody>
+              <a:bodyPr wrap="none" lIns="0" rIns="0" rtlCol="0">
+                <a:spAutoFit/>
+              </a:bodyPr>
+              <a:lstStyle/>
+              <a:p>
+                <a14:m>
+                  <m:oMath xmlns:m="http://schemas.openxmlformats.org/officeDocument/2006/math">
+                    <m:acc>
+                      <m:accPr>
+                        <m:chr m:val="⃑"/>
+                        <m:ctrlPr>
+                          <a:rPr lang="en-US" altLang="zh-CN" sz="800" i="1" smtClean="0">
+                            <a:latin typeface="Cambria Math" panose="02040503050406030204" pitchFamily="18" charset="0"/>
+                          </a:rPr>
+                        </m:ctrlPr>
+                      </m:accPr>
+                      <m:e>
+                        <m:r>
+                          <a:rPr lang="en-US" altLang="zh-CN" sz="800" b="0" i="1" smtClean="0">
+                            <a:latin typeface="Cambria Math" panose="02040503050406030204" pitchFamily="18" charset="0"/>
+                          </a:rPr>
+                          <m:t>𝑉</m:t>
+                        </m:r>
+                      </m:e>
+                    </m:acc>
+                  </m:oMath>
+                </a14:m>
+                <a:r>
+                  <a:rPr lang="en-US" altLang="zh-CN" sz="800" baseline="-25000" dirty="0"/>
+                  <a:t>c</a:t>
+                </a:r>
+                <a:endParaRPr lang="zh-CN" altLang="en-US" sz="800" baseline="-25000" dirty="0"/>
+              </a:p>
+            </p:txBody>
+          </p:sp>
+        </mc:Choice>
+        <mc:Fallback>
+          <p:sp>
+            <p:nvSpPr>
+              <p:cNvPr id="14" name="TextBox 13">
+                <a:extLst>
+                  <a:ext uri="{FF2B5EF4-FFF2-40B4-BE49-F238E27FC236}">
+                    <a16:creationId xmlns:a16="http://schemas.microsoft.com/office/drawing/2014/main" id="{D4FC06F0-93C3-4D7D-B404-C749118E9090}"/>
+                  </a:ext>
+                </a:extLst>
+              </p:cNvPr>
+              <p:cNvSpPr txBox="1">
+                <a:spLocks noRot="1" noChangeAspect="1" noMove="1" noResize="1" noEditPoints="1" noAdjustHandles="1" noChangeArrowheads="1" noChangeShapeType="1" noTextEdit="1"/>
+              </p:cNvSpPr>
+              <p:nvPr/>
+            </p:nvSpPr>
+            <p:spPr>
+              <a:xfrm>
+                <a:off x="3773953" y="700713"/>
+                <a:ext cx="96245" cy="230256"/>
+              </a:xfrm>
+              <a:prstGeom prst="rect">
+                <a:avLst/>
+              </a:prstGeom>
+              <a:blipFill>
+                <a:blip r:embed="rId3"/>
+                <a:stretch>
+                  <a:fillRect l="-37500" r="-43750" b="-2632"/>
+                </a:stretch>
+              </a:blipFill>
+            </p:spPr>
+            <p:txBody>
+              <a:bodyPr/>
+              <a:lstStyle/>
+              <a:p>
+                <a:r>
+                  <a:rPr lang="en-US">
+                    <a:noFill/>
+                  </a:rPr>
+                  <a:t> </a:t>
+                </a:r>
+              </a:p>
+            </p:txBody>
+          </p:sp>
+        </mc:Fallback>
+      </mc:AlternateContent>
+      <mc:AlternateContent xmlns:mc="http://schemas.openxmlformats.org/markup-compatibility/2006">
+        <mc:Choice xmlns:a14="http://schemas.microsoft.com/office/drawing/2010/main" Requires="a14">
+          <p:sp>
+            <p:nvSpPr>
+              <p:cNvPr id="15" name="TextBox 14">
+                <a:extLst>
+                  <a:ext uri="{FF2B5EF4-FFF2-40B4-BE49-F238E27FC236}">
+                    <a16:creationId xmlns:a16="http://schemas.microsoft.com/office/drawing/2014/main" id="{3C0CD230-639C-4C78-9040-124E0518CAE3}"/>
+                  </a:ext>
+                </a:extLst>
+              </p:cNvPr>
+              <p:cNvSpPr txBox="1"/>
+              <p:nvPr/>
+            </p:nvSpPr>
+            <p:spPr>
+              <a:xfrm>
+                <a:off x="4486393" y="824658"/>
+                <a:ext cx="89063" cy="212622"/>
+              </a:xfrm>
+              <a:prstGeom prst="rect">
+                <a:avLst/>
+              </a:prstGeom>
+              <a:noFill/>
+            </p:spPr>
+            <p:txBody>
+              <a:bodyPr wrap="none" lIns="0" rIns="0" rtlCol="0">
+                <a:spAutoFit/>
+              </a:bodyPr>
+              <a:lstStyle/>
+              <a:p>
+                <a14:m>
+                  <m:oMath xmlns:m="http://schemas.openxmlformats.org/officeDocument/2006/math">
+                    <m:acc>
+                      <m:accPr>
+                        <m:chr m:val="⃑"/>
+                        <m:ctrlPr>
+                          <a:rPr lang="en-US" altLang="zh-CN" sz="800" i="1" smtClean="0">
+                            <a:latin typeface="Cambria Math" panose="02040503050406030204" pitchFamily="18" charset="0"/>
+                          </a:rPr>
+                        </m:ctrlPr>
+                      </m:accPr>
+                      <m:e>
+                        <m:r>
+                          <a:rPr lang="en-US" altLang="zh-CN" sz="800" b="0" i="1" smtClean="0">
+                            <a:latin typeface="Cambria Math" panose="02040503050406030204" pitchFamily="18" charset="0"/>
+                          </a:rPr>
+                          <m:t>𝑎</m:t>
+                        </m:r>
+                      </m:e>
+                    </m:acc>
+                  </m:oMath>
+                </a14:m>
+                <a:r>
+                  <a:rPr lang="en-US" altLang="zh-CN" sz="800" baseline="-25000" dirty="0"/>
+                  <a:t>c</a:t>
+                </a:r>
+                <a:endParaRPr lang="zh-CN" altLang="en-US" sz="800" baseline="-25000" dirty="0"/>
+              </a:p>
+            </p:txBody>
+          </p:sp>
+        </mc:Choice>
+        <mc:Fallback>
+          <p:sp>
+            <p:nvSpPr>
+              <p:cNvPr id="15" name="TextBox 14">
+                <a:extLst>
+                  <a:ext uri="{FF2B5EF4-FFF2-40B4-BE49-F238E27FC236}">
+                    <a16:creationId xmlns:a16="http://schemas.microsoft.com/office/drawing/2014/main" id="{3C0CD230-639C-4C78-9040-124E0518CAE3}"/>
+                  </a:ext>
+                </a:extLst>
+              </p:cNvPr>
+              <p:cNvSpPr txBox="1">
+                <a:spLocks noRot="1" noChangeAspect="1" noMove="1" noResize="1" noEditPoints="1" noAdjustHandles="1" noChangeArrowheads="1" noChangeShapeType="1" noTextEdit="1"/>
+              </p:cNvSpPr>
+              <p:nvPr/>
+            </p:nvSpPr>
+            <p:spPr>
+              <a:xfrm>
+                <a:off x="4486393" y="824658"/>
+                <a:ext cx="89063" cy="212622"/>
+              </a:xfrm>
+              <a:prstGeom prst="rect">
+                <a:avLst/>
+              </a:prstGeom>
+              <a:blipFill>
+                <a:blip r:embed="rId4"/>
+                <a:stretch>
+                  <a:fillRect l="-33333" r="-46667" b="-5714"/>
+                </a:stretch>
+              </a:blipFill>
+            </p:spPr>
+            <p:txBody>
+              <a:bodyPr/>
+              <a:lstStyle/>
+              <a:p>
+                <a:r>
+                  <a:rPr lang="en-US">
+                    <a:noFill/>
+                  </a:rPr>
+                  <a:t> </a:t>
+                </a:r>
+              </a:p>
+            </p:txBody>
+          </p:sp>
+        </mc:Fallback>
+      </mc:AlternateContent>
+      <p:grpSp>
+        <p:nvGrpSpPr>
+          <p:cNvPr id="16" name="Group 15">
+            <a:extLst>
+              <a:ext uri="{FF2B5EF4-FFF2-40B4-BE49-F238E27FC236}">
+                <a16:creationId xmlns:a16="http://schemas.microsoft.com/office/drawing/2014/main" id="{2ED8C740-6313-4918-BD1C-0DA634E763C2}"/>
+              </a:ext>
+            </a:extLst>
+          </p:cNvPr>
+          <p:cNvGrpSpPr/>
+          <p:nvPr/>
+        </p:nvGrpSpPr>
+        <p:grpSpPr>
+          <a:xfrm>
+            <a:off x="2517264" y="2711093"/>
+            <a:ext cx="1179487" cy="695167"/>
+            <a:chOff x="1820772" y="2711093"/>
+            <a:chExt cx="1179487" cy="695167"/>
+          </a:xfrm>
+        </p:grpSpPr>
+        <p:cxnSp>
+          <p:nvCxnSpPr>
+            <p:cNvPr id="17" name="Straight Connector 16">
+              <a:extLst>
+                <a:ext uri="{FF2B5EF4-FFF2-40B4-BE49-F238E27FC236}">
+                  <a16:creationId xmlns:a16="http://schemas.microsoft.com/office/drawing/2014/main" id="{0E9B40DE-CD1F-488B-9453-D9CBE5B322A1}"/>
+                </a:ext>
+              </a:extLst>
+            </p:cNvPr>
+            <p:cNvCxnSpPr/>
+            <p:nvPr/>
+          </p:nvCxnSpPr>
+          <p:spPr>
+            <a:xfrm flipV="1">
+              <a:off x="1915453" y="2963090"/>
+              <a:ext cx="704249" cy="122478"/>
+            </a:xfrm>
+            <a:prstGeom prst="line">
+              <a:avLst/>
+            </a:prstGeom>
+            <a:ln w="9525">
+              <a:solidFill>
+                <a:schemeClr val="tx1"/>
+              </a:solidFill>
+              <a:tailEnd type="triangle" w="sm" len="sm"/>
+            </a:ln>
+          </p:spPr>
+          <p:style>
+            <a:lnRef idx="1">
+              <a:schemeClr val="accent1"/>
+            </a:lnRef>
+            <a:fillRef idx="0">
+              <a:schemeClr val="accent1"/>
+            </a:fillRef>
+            <a:effectRef idx="0">
+              <a:schemeClr val="accent1"/>
+            </a:effectRef>
+            <a:fontRef idx="minor">
+              <a:schemeClr val="tx1"/>
+            </a:fontRef>
+          </p:style>
+        </p:cxnSp>
+        <p:cxnSp>
+          <p:nvCxnSpPr>
+            <p:cNvPr id="18" name="Straight Connector 17">
+              <a:extLst>
+                <a:ext uri="{FF2B5EF4-FFF2-40B4-BE49-F238E27FC236}">
+                  <a16:creationId xmlns:a16="http://schemas.microsoft.com/office/drawing/2014/main" id="{40517C68-0A99-4B40-B14A-4E0566B476F9}"/>
+                </a:ext>
+              </a:extLst>
+            </p:cNvPr>
+            <p:cNvCxnSpPr/>
+            <p:nvPr/>
+          </p:nvCxnSpPr>
+          <p:spPr>
+            <a:xfrm>
+              <a:off x="1923888" y="3081603"/>
+              <a:ext cx="808524" cy="155972"/>
+            </a:xfrm>
+            <a:prstGeom prst="line">
+              <a:avLst/>
+            </a:prstGeom>
+            <a:ln w="9525">
+              <a:solidFill>
+                <a:schemeClr val="tx1"/>
+              </a:solidFill>
+              <a:tailEnd type="triangle" w="sm" len="sm"/>
+            </a:ln>
+          </p:spPr>
+          <p:style>
+            <a:lnRef idx="1">
+              <a:schemeClr val="accent1"/>
+            </a:lnRef>
+            <a:fillRef idx="0">
+              <a:schemeClr val="accent1"/>
+            </a:fillRef>
+            <a:effectRef idx="0">
+              <a:schemeClr val="accent1"/>
+            </a:effectRef>
+            <a:fontRef idx="minor">
+              <a:schemeClr val="tx1"/>
+            </a:fontRef>
+          </p:style>
+        </p:cxnSp>
+        <p:cxnSp>
+          <p:nvCxnSpPr>
+            <p:cNvPr id="19" name="Straight Connector 18">
+              <a:extLst>
+                <a:ext uri="{FF2B5EF4-FFF2-40B4-BE49-F238E27FC236}">
+                  <a16:creationId xmlns:a16="http://schemas.microsoft.com/office/drawing/2014/main" id="{8C2A7AE1-B03D-4039-96AE-8F4B9F9B6905}"/>
+                </a:ext>
+              </a:extLst>
+            </p:cNvPr>
+            <p:cNvCxnSpPr/>
+            <p:nvPr/>
+          </p:nvCxnSpPr>
+          <p:spPr>
+            <a:xfrm>
+              <a:off x="2642078" y="2956261"/>
+              <a:ext cx="98593" cy="275412"/>
+            </a:xfrm>
+            <a:prstGeom prst="line">
+              <a:avLst/>
+            </a:prstGeom>
+            <a:ln w="3175">
+              <a:solidFill>
+                <a:schemeClr val="tx1"/>
+              </a:solidFill>
+              <a:prstDash val="dash"/>
+              <a:tailEnd type="triangle" w="sm" len="sm"/>
+            </a:ln>
+          </p:spPr>
+          <p:style>
+            <a:lnRef idx="1">
+              <a:schemeClr val="accent1"/>
+            </a:lnRef>
+            <a:fillRef idx="0">
+              <a:schemeClr val="accent1"/>
+            </a:fillRef>
+            <a:effectRef idx="0">
+              <a:schemeClr val="accent1"/>
+            </a:effectRef>
+            <a:fontRef idx="minor">
+              <a:schemeClr val="tx1"/>
+            </a:fontRef>
+          </p:style>
+        </p:cxnSp>
+        <mc:AlternateContent xmlns:mc="http://schemas.openxmlformats.org/markup-compatibility/2006" xmlns:a14="http://schemas.microsoft.com/office/drawing/2010/main">
+          <mc:Choice Requires="a14">
+            <p:sp>
+              <p:nvSpPr>
+                <p:cNvPr id="20" name="TextBox 19">
+                  <a:extLst>
+                    <a:ext uri="{FF2B5EF4-FFF2-40B4-BE49-F238E27FC236}">
+                      <a16:creationId xmlns:a16="http://schemas.microsoft.com/office/drawing/2014/main" id="{A9B4286F-41FE-4E2F-839E-BFFA1819218A}"/>
+                    </a:ext>
+                  </a:extLst>
+                </p:cNvPr>
+                <p:cNvSpPr txBox="1"/>
+                <p:nvPr/>
+              </p:nvSpPr>
+              <p:spPr>
+                <a:xfrm>
+                  <a:off x="2089374" y="2792363"/>
+                  <a:ext cx="270972" cy="230256"/>
+                </a:xfrm>
+                <a:prstGeom prst="rect">
+                  <a:avLst/>
+                </a:prstGeom>
+                <a:noFill/>
+              </p:spPr>
+              <p:txBody>
+                <a:bodyPr wrap="none" lIns="0" rIns="0" rtlCol="0">
+                  <a:spAutoFit/>
+                </a:bodyPr>
+                <a:lstStyle/>
+                <a:p>
+                  <a14:m>
+                    <m:oMath xmlns:m="http://schemas.openxmlformats.org/officeDocument/2006/math">
+                      <m:acc>
+                        <m:accPr>
+                          <m:chr m:val="⃑"/>
+                          <m:ctrlPr>
+                            <a:rPr lang="en-US" altLang="zh-CN" sz="800" i="1" smtClean="0">
+                              <a:latin typeface="Cambria Math" panose="02040503050406030204" pitchFamily="18" charset="0"/>
+                            </a:rPr>
+                          </m:ctrlPr>
+                        </m:accPr>
+                        <m:e>
+                          <m:r>
+                            <a:rPr lang="en-US" altLang="zh-CN" sz="800" b="0" i="1" smtClean="0">
+                              <a:latin typeface="Cambria Math" panose="02040503050406030204" pitchFamily="18" charset="0"/>
+                            </a:rPr>
+                            <m:t>𝑉</m:t>
+                          </m:r>
+                        </m:e>
+                      </m:acc>
+                    </m:oMath>
+                  </a14:m>
+                  <a:r>
+                    <a:rPr lang="en-US" altLang="zh-CN" sz="800" baseline="-25000" dirty="0"/>
+                    <a:t>current</a:t>
+                  </a:r>
+                  <a:endParaRPr lang="zh-CN" altLang="en-US" sz="800" baseline="-25000" dirty="0"/>
+                </a:p>
+              </p:txBody>
+            </p:sp>
+          </mc:Choice>
+          <mc:Fallback xmlns="">
+            <p:sp>
+              <p:nvSpPr>
+                <p:cNvPr id="19" name="TextBox 18"/>
+                <p:cNvSpPr txBox="1">
+                  <a:spLocks noRot="1" noChangeAspect="1" noMove="1" noResize="1" noEditPoints="1" noAdjustHandles="1" noChangeArrowheads="1" noChangeShapeType="1" noTextEdit="1"/>
+                </p:cNvSpPr>
+                <p:nvPr/>
+              </p:nvSpPr>
+              <p:spPr>
+                <a:xfrm>
+                  <a:off x="2089374" y="2792363"/>
+                  <a:ext cx="270972" cy="230256"/>
+                </a:xfrm>
+                <a:prstGeom prst="rect">
+                  <a:avLst/>
+                </a:prstGeom>
+                <a:blipFill rotWithShape="0">
+                  <a:blip r:embed="rId6"/>
+                  <a:stretch>
+                    <a:fillRect l="-13636" r="-20455" b="-5263"/>
+                  </a:stretch>
+                </a:blipFill>
+              </p:spPr>
+              <p:txBody>
+                <a:bodyPr/>
+                <a:lstStyle/>
+                <a:p>
+                  <a:r>
+                    <a:rPr lang="en-US">
+                      <a:noFill/>
+                    </a:rPr>
+                    <a:t> </a:t>
+                  </a:r>
+                </a:p>
+              </p:txBody>
+            </p:sp>
+          </mc:Fallback>
+        </mc:AlternateContent>
+        <mc:AlternateContent xmlns:mc="http://schemas.openxmlformats.org/markup-compatibility/2006" xmlns:a14="http://schemas.microsoft.com/office/drawing/2010/main">
+          <mc:Choice Requires="a14">
+            <p:sp>
+              <p:nvSpPr>
+                <p:cNvPr id="21" name="TextBox 20">
+                  <a:extLst>
+                    <a:ext uri="{FF2B5EF4-FFF2-40B4-BE49-F238E27FC236}">
+                      <a16:creationId xmlns:a16="http://schemas.microsoft.com/office/drawing/2014/main" id="{F3E6551A-CDE2-4659-941D-844CF2E4C320}"/>
+                    </a:ext>
+                  </a:extLst>
+                </p:cNvPr>
+                <p:cNvSpPr txBox="1"/>
+                <p:nvPr/>
+              </p:nvSpPr>
+              <p:spPr>
+                <a:xfrm>
+                  <a:off x="2736469" y="2949320"/>
+                  <a:ext cx="263790" cy="212622"/>
+                </a:xfrm>
+                <a:prstGeom prst="rect">
+                  <a:avLst/>
+                </a:prstGeom>
+                <a:noFill/>
+              </p:spPr>
+              <p:txBody>
+                <a:bodyPr wrap="none" lIns="0" rIns="0" rtlCol="0">
+                  <a:spAutoFit/>
+                </a:bodyPr>
+                <a:lstStyle/>
+                <a:p>
+                  <a14:m>
+                    <m:oMath xmlns:m="http://schemas.openxmlformats.org/officeDocument/2006/math">
+                      <m:acc>
+                        <m:accPr>
+                          <m:chr m:val="⃑"/>
+                          <m:ctrlPr>
+                            <a:rPr lang="en-US" altLang="zh-CN" sz="800" i="1" smtClean="0">
+                              <a:latin typeface="Cambria Math" panose="02040503050406030204" pitchFamily="18" charset="0"/>
+                            </a:rPr>
+                          </m:ctrlPr>
+                        </m:accPr>
+                        <m:e>
+                          <m:r>
+                            <a:rPr lang="en-US" altLang="zh-CN" sz="800" b="0" i="1" smtClean="0">
+                              <a:latin typeface="Cambria Math" panose="02040503050406030204" pitchFamily="18" charset="0"/>
+                            </a:rPr>
+                            <m:t>𝑎</m:t>
+                          </m:r>
+                        </m:e>
+                      </m:acc>
+                    </m:oMath>
+                  </a14:m>
+                  <a:r>
+                    <a:rPr lang="en-US" altLang="zh-CN" sz="800" baseline="-25000" dirty="0"/>
+                    <a:t>current</a:t>
+                  </a:r>
+                  <a:endParaRPr lang="zh-CN" altLang="en-US" sz="800" baseline="-25000" dirty="0"/>
+                </a:p>
+              </p:txBody>
+            </p:sp>
+          </mc:Choice>
+          <mc:Fallback xmlns="">
+            <p:sp>
+              <p:nvSpPr>
+                <p:cNvPr id="22" name="TextBox 21"/>
+                <p:cNvSpPr txBox="1">
+                  <a:spLocks noRot="1" noChangeAspect="1" noMove="1" noResize="1" noEditPoints="1" noAdjustHandles="1" noChangeArrowheads="1" noChangeShapeType="1" noTextEdit="1"/>
+                </p:cNvSpPr>
+                <p:nvPr/>
+              </p:nvSpPr>
+              <p:spPr>
+                <a:xfrm>
+                  <a:off x="2736469" y="2949320"/>
+                  <a:ext cx="263790" cy="212622"/>
+                </a:xfrm>
+                <a:prstGeom prst="rect">
+                  <a:avLst/>
+                </a:prstGeom>
+                <a:blipFill rotWithShape="0">
+                  <a:blip r:embed="rId7"/>
+                  <a:stretch>
+                    <a:fillRect l="-9302" r="-20930" b="-2857"/>
+                  </a:stretch>
+                </a:blipFill>
+              </p:spPr>
+              <p:txBody>
+                <a:bodyPr/>
+                <a:lstStyle/>
+                <a:p>
+                  <a:r>
+                    <a:rPr lang="en-US">
+                      <a:noFill/>
+                    </a:rPr>
+                    <a:t> </a:t>
+                  </a:r>
+                </a:p>
+              </p:txBody>
+            </p:sp>
+          </mc:Fallback>
+        </mc:AlternateContent>
+        <mc:AlternateContent xmlns:mc="http://schemas.openxmlformats.org/markup-compatibility/2006" xmlns:a14="http://schemas.microsoft.com/office/drawing/2010/main">
+          <mc:Choice Requires="a14">
+            <p:sp>
+              <p:nvSpPr>
+                <p:cNvPr id="22" name="TextBox 21">
+                  <a:extLst>
+                    <a:ext uri="{FF2B5EF4-FFF2-40B4-BE49-F238E27FC236}">
+                      <a16:creationId xmlns:a16="http://schemas.microsoft.com/office/drawing/2014/main" id="{483C1D5E-A784-435D-9FAF-C02F191484E3}"/>
+                    </a:ext>
+                  </a:extLst>
+                </p:cNvPr>
+                <p:cNvSpPr txBox="1"/>
+                <p:nvPr/>
+              </p:nvSpPr>
+              <p:spPr>
+                <a:xfrm>
+                  <a:off x="2320113" y="3176004"/>
+                  <a:ext cx="186013" cy="230256"/>
+                </a:xfrm>
+                <a:prstGeom prst="rect">
+                  <a:avLst/>
+                </a:prstGeom>
+                <a:noFill/>
+              </p:spPr>
+              <p:txBody>
+                <a:bodyPr wrap="none" lIns="0" rIns="0" rtlCol="0">
+                  <a:spAutoFit/>
+                </a:bodyPr>
+                <a:lstStyle/>
+                <a:p>
+                  <a14:m>
+                    <m:oMath xmlns:m="http://schemas.openxmlformats.org/officeDocument/2006/math">
+                      <m:acc>
+                        <m:accPr>
+                          <m:chr m:val="⃑"/>
+                          <m:ctrlPr>
+                            <a:rPr lang="en-US" altLang="zh-CN" sz="800" i="1" smtClean="0">
+                              <a:latin typeface="Cambria Math" panose="02040503050406030204" pitchFamily="18" charset="0"/>
+                            </a:rPr>
+                          </m:ctrlPr>
+                        </m:accPr>
+                        <m:e>
+                          <m:r>
+                            <a:rPr lang="en-US" altLang="zh-CN" sz="800" b="0" i="1" smtClean="0">
+                              <a:latin typeface="Cambria Math" panose="02040503050406030204" pitchFamily="18" charset="0"/>
+                            </a:rPr>
+                            <m:t>𝑉</m:t>
+                          </m:r>
+                        </m:e>
+                      </m:acc>
+                    </m:oMath>
+                  </a14:m>
+                  <a:r>
+                    <a:rPr lang="en-US" altLang="zh-CN" sz="800" baseline="-25000" dirty="0"/>
+                    <a:t>new</a:t>
+                  </a:r>
+                  <a:endParaRPr lang="zh-CN" altLang="en-US" sz="800" baseline="-25000" dirty="0"/>
+                </a:p>
+              </p:txBody>
+            </p:sp>
+          </mc:Choice>
+          <mc:Fallback xmlns="">
+            <p:sp>
+              <p:nvSpPr>
+                <p:cNvPr id="24" name="TextBox 23"/>
+                <p:cNvSpPr txBox="1">
+                  <a:spLocks noRot="1" noChangeAspect="1" noMove="1" noResize="1" noEditPoints="1" noAdjustHandles="1" noChangeArrowheads="1" noChangeShapeType="1" noTextEdit="1"/>
+                </p:cNvSpPr>
+                <p:nvPr/>
+              </p:nvSpPr>
+              <p:spPr>
+                <a:xfrm>
+                  <a:off x="2320113" y="3176004"/>
+                  <a:ext cx="186013" cy="230256"/>
+                </a:xfrm>
+                <a:prstGeom prst="rect">
+                  <a:avLst/>
+                </a:prstGeom>
+                <a:blipFill rotWithShape="0">
+                  <a:blip r:embed="rId8"/>
+                  <a:stretch>
+                    <a:fillRect l="-20000" r="-26667" b="-2632"/>
+                  </a:stretch>
+                </a:blipFill>
+              </p:spPr>
+              <p:txBody>
+                <a:bodyPr/>
+                <a:lstStyle/>
+                <a:p>
+                  <a:r>
+                    <a:rPr lang="en-US">
+                      <a:noFill/>
+                    </a:rPr>
+                    <a:t> </a:t>
+                  </a:r>
+                </a:p>
+              </p:txBody>
+            </p:sp>
+          </mc:Fallback>
+        </mc:AlternateContent>
+        <p:sp>
+          <p:nvSpPr>
+            <p:cNvPr id="23" name="椭圆 12">
+              <a:extLst>
+                <a:ext uri="{FF2B5EF4-FFF2-40B4-BE49-F238E27FC236}">
+                  <a16:creationId xmlns:a16="http://schemas.microsoft.com/office/drawing/2014/main" id="{7F1D1A5B-8129-4635-BF02-2983193B2A07}"/>
+                </a:ext>
+              </a:extLst>
+            </p:cNvPr>
+            <p:cNvSpPr/>
+            <p:nvPr/>
+          </p:nvSpPr>
+          <p:spPr>
+            <a:xfrm>
+              <a:off x="1897453" y="3061274"/>
+              <a:ext cx="54864" cy="54864"/>
+            </a:xfrm>
+            <a:prstGeom prst="ellipse">
+              <a:avLst/>
+            </a:prstGeom>
+            <a:solidFill>
+              <a:schemeClr val="tx1"/>
+            </a:solidFill>
+            <a:ln>
+              <a:noFill/>
+            </a:ln>
+          </p:spPr>
+          <p:style>
+            <a:lnRef idx="2">
+              <a:schemeClr val="accent1">
+                <a:shade val="50000"/>
+              </a:schemeClr>
+            </a:lnRef>
+            <a:fillRef idx="1">
+              <a:schemeClr val="accent1"/>
+            </a:fillRef>
+            <a:effectRef idx="0">
+              <a:schemeClr val="accent1"/>
+            </a:effectRef>
+            <a:fontRef idx="minor">
+              <a:schemeClr val="lt1"/>
+            </a:fontRef>
+          </p:style>
+          <p:txBody>
+            <a:bodyPr rtlCol="0" anchor="ctr"/>
+            <a:lstStyle/>
+            <a:p>
+              <a:pPr algn="ctr"/>
+              <a:endParaRPr lang="zh-CN" altLang="en-US"/>
+            </a:p>
+          </p:txBody>
+        </p:sp>
+        <mc:AlternateContent xmlns:mc="http://schemas.openxmlformats.org/markup-compatibility/2006" xmlns:a14="http://schemas.microsoft.com/office/drawing/2010/main">
+          <mc:Choice Requires="a14">
+            <p:sp>
+              <p:nvSpPr>
+                <p:cNvPr id="24" name="TextBox 23">
+                  <a:extLst>
+                    <a:ext uri="{FF2B5EF4-FFF2-40B4-BE49-F238E27FC236}">
+                      <a16:creationId xmlns:a16="http://schemas.microsoft.com/office/drawing/2014/main" id="{F2E99C03-9A54-40A8-95E7-D4A2E3C19E8E}"/>
+                    </a:ext>
+                  </a:extLst>
+                </p:cNvPr>
+                <p:cNvSpPr txBox="1"/>
+                <p:nvPr/>
+              </p:nvSpPr>
+              <p:spPr>
+                <a:xfrm>
+                  <a:off x="2555946" y="2711093"/>
+                  <a:ext cx="177613" cy="212622"/>
+                </a:xfrm>
+                <a:prstGeom prst="rect">
+                  <a:avLst/>
+                </a:prstGeom>
+                <a:noFill/>
+              </p:spPr>
+              <p:txBody>
+                <a:bodyPr wrap="none" lIns="0" rIns="0" rtlCol="0">
+                  <a:spAutoFit/>
+                </a:bodyPr>
+                <a:lstStyle/>
+                <a:p>
+                  <a14:m>
+                    <m:oMath xmlns:m="http://schemas.openxmlformats.org/officeDocument/2006/math">
+                      <m:r>
+                        <a:rPr lang="en-US" altLang="zh-CN" sz="800" b="0" i="1" smtClean="0">
+                          <a:latin typeface="Cambria Math" panose="02040503050406030204" pitchFamily="18" charset="0"/>
+                        </a:rPr>
+                        <m:t>𝑝</m:t>
+                      </m:r>
+                    </m:oMath>
+                  </a14:m>
+                  <a:r>
+                    <a:rPr lang="en-US" altLang="zh-CN" sz="800" baseline="-25000" dirty="0"/>
+                    <a:t>new</a:t>
+                  </a:r>
+                  <a:endParaRPr lang="zh-CN" altLang="en-US" sz="800" baseline="-25000" dirty="0"/>
+                </a:p>
+              </p:txBody>
+            </p:sp>
+          </mc:Choice>
+          <mc:Fallback xmlns="">
+            <p:sp>
+              <p:nvSpPr>
+                <p:cNvPr id="31" name="TextBox 30"/>
+                <p:cNvSpPr txBox="1">
+                  <a:spLocks noRot="1" noChangeAspect="1" noMove="1" noResize="1" noEditPoints="1" noAdjustHandles="1" noChangeArrowheads="1" noChangeShapeType="1" noTextEdit="1"/>
+                </p:cNvSpPr>
+                <p:nvPr/>
+              </p:nvSpPr>
+              <p:spPr>
+                <a:xfrm>
+                  <a:off x="2555946" y="2711093"/>
+                  <a:ext cx="177613" cy="212622"/>
+                </a:xfrm>
+                <a:prstGeom prst="rect">
+                  <a:avLst/>
+                </a:prstGeom>
+                <a:blipFill rotWithShape="0">
+                  <a:blip r:embed="rId9"/>
+                  <a:stretch>
+                    <a:fillRect l="-24138" r="-27586" b="-2857"/>
+                  </a:stretch>
+                </a:blipFill>
+              </p:spPr>
+              <p:txBody>
+                <a:bodyPr/>
+                <a:lstStyle/>
+                <a:p>
+                  <a:r>
+                    <a:rPr lang="en-US">
+                      <a:noFill/>
+                    </a:rPr>
+                    <a:t> </a:t>
+                  </a:r>
+                </a:p>
+              </p:txBody>
+            </p:sp>
+          </mc:Fallback>
+        </mc:AlternateContent>
+        <mc:AlternateContent xmlns:mc="http://schemas.openxmlformats.org/markup-compatibility/2006" xmlns:a14="http://schemas.microsoft.com/office/drawing/2010/main">
+          <mc:Choice Requires="a14">
+            <p:sp>
+              <p:nvSpPr>
+                <p:cNvPr id="25" name="TextBox 24">
+                  <a:extLst>
+                    <a:ext uri="{FF2B5EF4-FFF2-40B4-BE49-F238E27FC236}">
+                      <a16:creationId xmlns:a16="http://schemas.microsoft.com/office/drawing/2014/main" id="{37D6FC9E-8BBA-43B6-B929-EEAD378BC18D}"/>
+                    </a:ext>
+                  </a:extLst>
+                </p:cNvPr>
+                <p:cNvSpPr txBox="1"/>
+                <p:nvPr/>
+              </p:nvSpPr>
+              <p:spPr>
+                <a:xfrm>
+                  <a:off x="1820772" y="3056110"/>
+                  <a:ext cx="262572" cy="212622"/>
+                </a:xfrm>
+                <a:prstGeom prst="rect">
+                  <a:avLst/>
+                </a:prstGeom>
+                <a:noFill/>
+              </p:spPr>
+              <p:txBody>
+                <a:bodyPr wrap="none" lIns="0" rIns="0" rtlCol="0">
+                  <a:spAutoFit/>
+                </a:bodyPr>
+                <a:lstStyle/>
+                <a:p>
+                  <a14:m>
+                    <m:oMath xmlns:m="http://schemas.openxmlformats.org/officeDocument/2006/math">
+                      <m:r>
+                        <a:rPr lang="en-US" altLang="zh-CN" sz="800" b="0" i="1" smtClean="0">
+                          <a:latin typeface="Cambria Math" panose="02040503050406030204" pitchFamily="18" charset="0"/>
+                        </a:rPr>
+                        <m:t>𝑝</m:t>
+                      </m:r>
+                    </m:oMath>
+                  </a14:m>
+                  <a:r>
+                    <a:rPr lang="en-US" altLang="zh-CN" sz="800" baseline="-25000" dirty="0"/>
+                    <a:t>current</a:t>
+                  </a:r>
+                  <a:endParaRPr lang="zh-CN" altLang="en-US" sz="800" baseline="-25000" dirty="0"/>
+                </a:p>
+              </p:txBody>
+            </p:sp>
+          </mc:Choice>
+          <mc:Fallback xmlns="">
+            <p:sp>
+              <p:nvSpPr>
+                <p:cNvPr id="32" name="TextBox 31"/>
+                <p:cNvSpPr txBox="1">
+                  <a:spLocks noRot="1" noChangeAspect="1" noMove="1" noResize="1" noEditPoints="1" noAdjustHandles="1" noChangeArrowheads="1" noChangeShapeType="1" noTextEdit="1"/>
+                </p:cNvSpPr>
+                <p:nvPr/>
+              </p:nvSpPr>
+              <p:spPr>
+                <a:xfrm>
+                  <a:off x="1820772" y="3056110"/>
+                  <a:ext cx="262572" cy="212622"/>
+                </a:xfrm>
+                <a:prstGeom prst="rect">
+                  <a:avLst/>
+                </a:prstGeom>
+                <a:blipFill rotWithShape="0">
+                  <a:blip r:embed="rId10"/>
+                  <a:stretch>
+                    <a:fillRect l="-16279" r="-20930" b="-5714"/>
+                  </a:stretch>
+                </a:blipFill>
+              </p:spPr>
+              <p:txBody>
+                <a:bodyPr/>
+                <a:lstStyle/>
+                <a:p>
+                  <a:r>
+                    <a:rPr lang="en-US">
+                      <a:noFill/>
+                    </a:rPr>
+                    <a:t> </a:t>
+                  </a:r>
+                </a:p>
+              </p:txBody>
+            </p:sp>
+          </mc:Fallback>
+        </mc:AlternateContent>
+        <p:sp>
+          <p:nvSpPr>
+            <p:cNvPr id="26" name="椭圆 12">
+              <a:extLst>
+                <a:ext uri="{FF2B5EF4-FFF2-40B4-BE49-F238E27FC236}">
+                  <a16:creationId xmlns:a16="http://schemas.microsoft.com/office/drawing/2014/main" id="{E0CE7491-07F6-49D7-9894-AFD7D6CFDD5E}"/>
+                </a:ext>
+              </a:extLst>
+            </p:cNvPr>
+            <p:cNvSpPr/>
+            <p:nvPr/>
+          </p:nvSpPr>
+          <p:spPr>
+            <a:xfrm>
+              <a:off x="2617321" y="2936303"/>
+              <a:ext cx="54864" cy="54864"/>
+            </a:xfrm>
+            <a:prstGeom prst="ellipse">
+              <a:avLst/>
+            </a:prstGeom>
+            <a:solidFill>
+              <a:schemeClr val="tx1"/>
+            </a:solidFill>
+            <a:ln>
+              <a:noFill/>
+            </a:ln>
+          </p:spPr>
+          <p:style>
+            <a:lnRef idx="2">
+              <a:schemeClr val="accent1">
+                <a:shade val="50000"/>
+              </a:schemeClr>
+            </a:lnRef>
+            <a:fillRef idx="1">
+              <a:schemeClr val="accent1"/>
+            </a:fillRef>
+            <a:effectRef idx="0">
+              <a:schemeClr val="accent1"/>
+            </a:effectRef>
+            <a:fontRef idx="minor">
+              <a:schemeClr val="lt1"/>
+            </a:fontRef>
+          </p:style>
+          <p:txBody>
+            <a:bodyPr rtlCol="0" anchor="ctr"/>
+            <a:lstStyle/>
+            <a:p>
+              <a:pPr algn="ctr"/>
+              <a:endParaRPr lang="zh-CN" altLang="en-US"/>
+            </a:p>
+          </p:txBody>
+        </p:sp>
+      </p:grpSp>
+      <p:grpSp>
+        <p:nvGrpSpPr>
+          <p:cNvPr id="27" name="Group 26">
+            <a:extLst>
+              <a:ext uri="{FF2B5EF4-FFF2-40B4-BE49-F238E27FC236}">
+                <a16:creationId xmlns:a16="http://schemas.microsoft.com/office/drawing/2014/main" id="{5740189B-5079-42DF-883D-8DFB0E92C271}"/>
+              </a:ext>
+            </a:extLst>
+          </p:cNvPr>
+          <p:cNvGrpSpPr/>
+          <p:nvPr/>
+        </p:nvGrpSpPr>
+        <p:grpSpPr>
+          <a:xfrm>
+            <a:off x="4016895" y="2791884"/>
+            <a:ext cx="1150656" cy="643080"/>
+            <a:chOff x="4260724" y="2791884"/>
+            <a:chExt cx="1150656" cy="643080"/>
+          </a:xfrm>
+        </p:grpSpPr>
+        <p:cxnSp>
+          <p:nvCxnSpPr>
+            <p:cNvPr id="28" name="Straight Connector 27">
+              <a:extLst>
+                <a:ext uri="{FF2B5EF4-FFF2-40B4-BE49-F238E27FC236}">
+                  <a16:creationId xmlns:a16="http://schemas.microsoft.com/office/drawing/2014/main" id="{A5E661B3-5E51-43DA-856D-68F2804AD34E}"/>
+                </a:ext>
+              </a:extLst>
+            </p:cNvPr>
+            <p:cNvCxnSpPr/>
+            <p:nvPr/>
+          </p:nvCxnSpPr>
+          <p:spPr>
+            <a:xfrm flipV="1">
+              <a:off x="4355405" y="2956261"/>
+              <a:ext cx="704249" cy="122478"/>
+            </a:xfrm>
+            <a:prstGeom prst="line">
+              <a:avLst/>
+            </a:prstGeom>
+            <a:ln w="9525">
+              <a:solidFill>
+                <a:schemeClr val="tx1"/>
+              </a:solidFill>
+              <a:tailEnd type="triangle" w="sm" len="sm"/>
+            </a:ln>
+          </p:spPr>
+          <p:style>
+            <a:lnRef idx="1">
+              <a:schemeClr val="accent1"/>
+            </a:lnRef>
+            <a:fillRef idx="0">
+              <a:schemeClr val="accent1"/>
+            </a:fillRef>
+            <a:effectRef idx="0">
+              <a:schemeClr val="accent1"/>
+            </a:effectRef>
+            <a:fontRef idx="minor">
+              <a:schemeClr val="tx1"/>
+            </a:fontRef>
+          </p:style>
+        </p:cxnSp>
+        <p:cxnSp>
+          <p:nvCxnSpPr>
+            <p:cNvPr id="29" name="Straight Connector 28">
+              <a:extLst>
+                <a:ext uri="{FF2B5EF4-FFF2-40B4-BE49-F238E27FC236}">
+                  <a16:creationId xmlns:a16="http://schemas.microsoft.com/office/drawing/2014/main" id="{99D87170-56F4-4192-8D2B-82A5ED380C29}"/>
+                </a:ext>
+              </a:extLst>
+            </p:cNvPr>
+            <p:cNvCxnSpPr/>
+            <p:nvPr/>
+          </p:nvCxnSpPr>
+          <p:spPr>
+            <a:xfrm>
+              <a:off x="4367953" y="3082243"/>
+              <a:ext cx="808524" cy="155972"/>
+            </a:xfrm>
+            <a:prstGeom prst="line">
+              <a:avLst/>
+            </a:prstGeom>
+            <a:ln w="9525">
+              <a:solidFill>
+                <a:schemeClr val="tx1"/>
+              </a:solidFill>
+              <a:tailEnd type="triangle" w="sm" len="sm"/>
+            </a:ln>
+          </p:spPr>
+          <p:style>
+            <a:lnRef idx="1">
+              <a:schemeClr val="accent1"/>
+            </a:lnRef>
+            <a:fillRef idx="0">
+              <a:schemeClr val="accent1"/>
+            </a:fillRef>
+            <a:effectRef idx="0">
+              <a:schemeClr val="accent1"/>
+            </a:effectRef>
+            <a:fontRef idx="minor">
+              <a:schemeClr val="tx1"/>
+            </a:fontRef>
+          </p:style>
+        </p:cxnSp>
+        <p:cxnSp>
+          <p:nvCxnSpPr>
+            <p:cNvPr id="30" name="Straight Connector 29">
+              <a:extLst>
+                <a:ext uri="{FF2B5EF4-FFF2-40B4-BE49-F238E27FC236}">
+                  <a16:creationId xmlns:a16="http://schemas.microsoft.com/office/drawing/2014/main" id="{A81051F7-39D4-4AFC-A933-990C51B115C9}"/>
+                </a:ext>
+              </a:extLst>
+            </p:cNvPr>
+            <p:cNvCxnSpPr/>
+            <p:nvPr/>
+          </p:nvCxnSpPr>
+          <p:spPr>
+            <a:xfrm>
+              <a:off x="5072202" y="2952403"/>
+              <a:ext cx="98593" cy="275412"/>
+            </a:xfrm>
+            <a:prstGeom prst="line">
+              <a:avLst/>
+            </a:prstGeom>
+            <a:ln w="3175">
+              <a:solidFill>
+                <a:schemeClr val="tx1"/>
+              </a:solidFill>
+              <a:prstDash val="dash"/>
+              <a:tailEnd type="triangle" w="sm" len="sm"/>
+            </a:ln>
+          </p:spPr>
+          <p:style>
+            <a:lnRef idx="1">
+              <a:schemeClr val="accent1"/>
+            </a:lnRef>
+            <a:fillRef idx="0">
+              <a:schemeClr val="accent1"/>
+            </a:fillRef>
+            <a:effectRef idx="0">
+              <a:schemeClr val="accent1"/>
+            </a:effectRef>
+            <a:fontRef idx="minor">
+              <a:schemeClr val="tx1"/>
+            </a:fontRef>
+          </p:style>
+        </p:cxnSp>
+        <mc:AlternateContent xmlns:mc="http://schemas.openxmlformats.org/markup-compatibility/2006" xmlns:a14="http://schemas.microsoft.com/office/drawing/2010/main">
+          <mc:Choice Requires="a14">
+            <p:sp>
+              <p:nvSpPr>
+                <p:cNvPr id="31" name="TextBox 30">
+                  <a:extLst>
+                    <a:ext uri="{FF2B5EF4-FFF2-40B4-BE49-F238E27FC236}">
+                      <a16:creationId xmlns:a16="http://schemas.microsoft.com/office/drawing/2014/main" id="{BFDD0334-7A26-42D1-9CE7-D99FC9F9C35F}"/>
+                    </a:ext>
+                  </a:extLst>
+                </p:cNvPr>
+                <p:cNvSpPr txBox="1"/>
+                <p:nvPr/>
+              </p:nvSpPr>
+              <p:spPr>
+                <a:xfrm>
+                  <a:off x="4529326" y="2791884"/>
+                  <a:ext cx="270972" cy="230256"/>
+                </a:xfrm>
+                <a:prstGeom prst="rect">
+                  <a:avLst/>
+                </a:prstGeom>
+                <a:noFill/>
+              </p:spPr>
+              <p:txBody>
+                <a:bodyPr wrap="none" lIns="0" rIns="0" rtlCol="0">
+                  <a:spAutoFit/>
+                </a:bodyPr>
+                <a:lstStyle/>
+                <a:p>
+                  <a14:m>
+                    <m:oMath xmlns:m="http://schemas.openxmlformats.org/officeDocument/2006/math">
+                      <m:acc>
+                        <m:accPr>
+                          <m:chr m:val="⃑"/>
+                          <m:ctrlPr>
+                            <a:rPr lang="en-US" altLang="zh-CN" sz="800" i="1" smtClean="0">
+                              <a:latin typeface="Cambria Math" panose="02040503050406030204" pitchFamily="18" charset="0"/>
+                            </a:rPr>
+                          </m:ctrlPr>
+                        </m:accPr>
+                        <m:e>
+                          <m:r>
+                            <a:rPr lang="en-US" altLang="zh-CN" sz="800" b="0" i="1" smtClean="0">
+                              <a:latin typeface="Cambria Math" panose="02040503050406030204" pitchFamily="18" charset="0"/>
+                            </a:rPr>
+                            <m:t>𝑉</m:t>
+                          </m:r>
+                        </m:e>
+                      </m:acc>
+                    </m:oMath>
+                  </a14:m>
+                  <a:r>
+                    <a:rPr lang="en-US" altLang="zh-CN" sz="800" baseline="-25000" dirty="0"/>
+                    <a:t>current</a:t>
+                  </a:r>
+                  <a:endParaRPr lang="zh-CN" altLang="en-US" sz="800" baseline="-25000" dirty="0"/>
+                </a:p>
+              </p:txBody>
+            </p:sp>
+          </mc:Choice>
+          <mc:Fallback xmlns="">
+            <p:sp>
+              <p:nvSpPr>
+                <p:cNvPr id="44" name="TextBox 43"/>
+                <p:cNvSpPr txBox="1">
+                  <a:spLocks noRot="1" noChangeAspect="1" noMove="1" noResize="1" noEditPoints="1" noAdjustHandles="1" noChangeArrowheads="1" noChangeShapeType="1" noTextEdit="1"/>
+                </p:cNvSpPr>
+                <p:nvPr/>
+              </p:nvSpPr>
+              <p:spPr>
+                <a:xfrm>
+                  <a:off x="4529326" y="2791884"/>
+                  <a:ext cx="270972" cy="230256"/>
+                </a:xfrm>
+                <a:prstGeom prst="rect">
+                  <a:avLst/>
+                </a:prstGeom>
+                <a:blipFill rotWithShape="0">
+                  <a:blip r:embed="rId11"/>
+                  <a:stretch>
+                    <a:fillRect l="-13636" r="-20455" b="-2632"/>
+                  </a:stretch>
+                </a:blipFill>
+              </p:spPr>
+              <p:txBody>
+                <a:bodyPr/>
+                <a:lstStyle/>
+                <a:p>
+                  <a:r>
+                    <a:rPr lang="en-US">
+                      <a:noFill/>
+                    </a:rPr>
+                    <a:t> </a:t>
+                  </a:r>
+                </a:p>
+              </p:txBody>
+            </p:sp>
+          </mc:Fallback>
+        </mc:AlternateContent>
+        <mc:AlternateContent xmlns:mc="http://schemas.openxmlformats.org/markup-compatibility/2006" xmlns:a14="http://schemas.microsoft.com/office/drawing/2010/main">
+          <mc:Choice Requires="a14">
+            <p:sp>
+              <p:nvSpPr>
+                <p:cNvPr id="32" name="TextBox 31">
+                  <a:extLst>
+                    <a:ext uri="{FF2B5EF4-FFF2-40B4-BE49-F238E27FC236}">
+                      <a16:creationId xmlns:a16="http://schemas.microsoft.com/office/drawing/2014/main" id="{85D54C02-B43A-4DF7-8099-F37798CCC4C9}"/>
+                    </a:ext>
+                  </a:extLst>
+                </p:cNvPr>
+                <p:cNvSpPr txBox="1"/>
+                <p:nvPr/>
+              </p:nvSpPr>
+              <p:spPr>
+                <a:xfrm>
+                  <a:off x="5147590" y="2939671"/>
+                  <a:ext cx="263790" cy="212622"/>
+                </a:xfrm>
+                <a:prstGeom prst="rect">
+                  <a:avLst/>
+                </a:prstGeom>
+                <a:noFill/>
+              </p:spPr>
+              <p:txBody>
+                <a:bodyPr wrap="none" lIns="0" rIns="0" rtlCol="0">
+                  <a:spAutoFit/>
+                </a:bodyPr>
+                <a:lstStyle/>
+                <a:p>
+                  <a14:m>
+                    <m:oMath xmlns:m="http://schemas.openxmlformats.org/officeDocument/2006/math">
+                      <m:acc>
+                        <m:accPr>
+                          <m:chr m:val="⃑"/>
+                          <m:ctrlPr>
+                            <a:rPr lang="en-US" altLang="zh-CN" sz="800" i="1" smtClean="0">
+                              <a:latin typeface="Cambria Math" panose="02040503050406030204" pitchFamily="18" charset="0"/>
+                            </a:rPr>
+                          </m:ctrlPr>
+                        </m:accPr>
+                        <m:e>
+                          <m:r>
+                            <a:rPr lang="en-US" altLang="zh-CN" sz="800" b="0" i="1" smtClean="0">
+                              <a:latin typeface="Cambria Math" panose="02040503050406030204" pitchFamily="18" charset="0"/>
+                            </a:rPr>
+                            <m:t>𝑎</m:t>
+                          </m:r>
+                        </m:e>
+                      </m:acc>
+                    </m:oMath>
+                  </a14:m>
+                  <a:r>
+                    <a:rPr lang="en-US" altLang="zh-CN" sz="800" baseline="-25000" dirty="0"/>
+                    <a:t>current</a:t>
+                  </a:r>
+                  <a:endParaRPr lang="zh-CN" altLang="en-US" sz="800" baseline="-25000" dirty="0"/>
+                </a:p>
+              </p:txBody>
+            </p:sp>
+          </mc:Choice>
+          <mc:Fallback xmlns="">
+            <p:sp>
+              <p:nvSpPr>
+                <p:cNvPr id="45" name="TextBox 44"/>
+                <p:cNvSpPr txBox="1">
+                  <a:spLocks noRot="1" noChangeAspect="1" noMove="1" noResize="1" noEditPoints="1" noAdjustHandles="1" noChangeArrowheads="1" noChangeShapeType="1" noTextEdit="1"/>
+                </p:cNvSpPr>
+                <p:nvPr/>
+              </p:nvSpPr>
+              <p:spPr>
+                <a:xfrm>
+                  <a:off x="5147590" y="2939671"/>
+                  <a:ext cx="263790" cy="212622"/>
+                </a:xfrm>
+                <a:prstGeom prst="rect">
+                  <a:avLst/>
+                </a:prstGeom>
+                <a:blipFill rotWithShape="0">
+                  <a:blip r:embed="rId12"/>
+                  <a:stretch>
+                    <a:fillRect l="-9091" r="-18182" b="-5714"/>
+                  </a:stretch>
+                </a:blipFill>
+              </p:spPr>
+              <p:txBody>
+                <a:bodyPr/>
+                <a:lstStyle/>
+                <a:p>
+                  <a:r>
+                    <a:rPr lang="en-US">
+                      <a:noFill/>
+                    </a:rPr>
+                    <a:t> </a:t>
+                  </a:r>
+                </a:p>
+              </p:txBody>
+            </p:sp>
+          </mc:Fallback>
+        </mc:AlternateContent>
+        <mc:AlternateContent xmlns:mc="http://schemas.openxmlformats.org/markup-compatibility/2006" xmlns:a14="http://schemas.microsoft.com/office/drawing/2010/main">
+          <mc:Choice Requires="a14">
+            <p:sp>
+              <p:nvSpPr>
+                <p:cNvPr id="33" name="TextBox 32">
+                  <a:extLst>
+                    <a:ext uri="{FF2B5EF4-FFF2-40B4-BE49-F238E27FC236}">
+                      <a16:creationId xmlns:a16="http://schemas.microsoft.com/office/drawing/2014/main" id="{90913CB7-CD87-485E-BF7D-FCFC9868CCEE}"/>
+                    </a:ext>
+                  </a:extLst>
+                </p:cNvPr>
+                <p:cNvSpPr txBox="1"/>
+                <p:nvPr/>
+              </p:nvSpPr>
+              <p:spPr>
+                <a:xfrm>
+                  <a:off x="4749215" y="3137799"/>
+                  <a:ext cx="186013" cy="230256"/>
+                </a:xfrm>
+                <a:prstGeom prst="rect">
+                  <a:avLst/>
+                </a:prstGeom>
+                <a:noFill/>
+              </p:spPr>
+              <p:txBody>
+                <a:bodyPr wrap="none" lIns="0" rIns="0" rtlCol="0">
+                  <a:spAutoFit/>
+                </a:bodyPr>
+                <a:lstStyle/>
+                <a:p>
+                  <a14:m>
+                    <m:oMath xmlns:m="http://schemas.openxmlformats.org/officeDocument/2006/math">
+                      <m:acc>
+                        <m:accPr>
+                          <m:chr m:val="⃑"/>
+                          <m:ctrlPr>
+                            <a:rPr lang="en-US" altLang="zh-CN" sz="800" i="1" smtClean="0">
+                              <a:latin typeface="Cambria Math" panose="02040503050406030204" pitchFamily="18" charset="0"/>
+                            </a:rPr>
+                          </m:ctrlPr>
+                        </m:accPr>
+                        <m:e>
+                          <m:r>
+                            <a:rPr lang="en-US" altLang="zh-CN" sz="800" b="0" i="1" smtClean="0">
+                              <a:latin typeface="Cambria Math" panose="02040503050406030204" pitchFamily="18" charset="0"/>
+                            </a:rPr>
+                            <m:t>𝑉</m:t>
+                          </m:r>
+                        </m:e>
+                      </m:acc>
+                    </m:oMath>
+                  </a14:m>
+                  <a:r>
+                    <a:rPr lang="en-US" altLang="zh-CN" sz="800" baseline="-25000" dirty="0"/>
+                    <a:t>new</a:t>
+                  </a:r>
+                  <a:endParaRPr lang="zh-CN" altLang="en-US" sz="800" baseline="-25000" dirty="0"/>
+                </a:p>
+              </p:txBody>
+            </p:sp>
+          </mc:Choice>
+          <mc:Fallback xmlns="">
+            <p:sp>
+              <p:nvSpPr>
+                <p:cNvPr id="46" name="TextBox 45"/>
+                <p:cNvSpPr txBox="1">
+                  <a:spLocks noRot="1" noChangeAspect="1" noMove="1" noResize="1" noEditPoints="1" noAdjustHandles="1" noChangeArrowheads="1" noChangeShapeType="1" noTextEdit="1"/>
+                </p:cNvSpPr>
+                <p:nvPr/>
+              </p:nvSpPr>
+              <p:spPr>
+                <a:xfrm>
+                  <a:off x="4749215" y="3137799"/>
+                  <a:ext cx="186013" cy="230256"/>
+                </a:xfrm>
+                <a:prstGeom prst="rect">
+                  <a:avLst/>
+                </a:prstGeom>
+                <a:blipFill rotWithShape="0">
+                  <a:blip r:embed="rId13"/>
+                  <a:stretch>
+                    <a:fillRect l="-19355" r="-22581" b="-2632"/>
+                  </a:stretch>
+                </a:blipFill>
+              </p:spPr>
+              <p:txBody>
+                <a:bodyPr/>
+                <a:lstStyle/>
+                <a:p>
+                  <a:r>
+                    <a:rPr lang="en-US">
+                      <a:noFill/>
+                    </a:rPr>
+                    <a:t> </a:t>
+                  </a:r>
+                </a:p>
+              </p:txBody>
+            </p:sp>
+          </mc:Fallback>
+        </mc:AlternateContent>
+        <p:sp>
+          <p:nvSpPr>
+            <p:cNvPr id="34" name="椭圆 12">
+              <a:extLst>
+                <a:ext uri="{FF2B5EF4-FFF2-40B4-BE49-F238E27FC236}">
+                  <a16:creationId xmlns:a16="http://schemas.microsoft.com/office/drawing/2014/main" id="{D412D904-2970-4DB0-B4A9-5B180A62C830}"/>
+                </a:ext>
+              </a:extLst>
+            </p:cNvPr>
+            <p:cNvSpPr/>
+            <p:nvPr/>
+          </p:nvSpPr>
+          <p:spPr>
+            <a:xfrm>
+              <a:off x="4337405" y="3060795"/>
+              <a:ext cx="54864" cy="54864"/>
+            </a:xfrm>
+            <a:prstGeom prst="ellipse">
+              <a:avLst/>
+            </a:prstGeom>
+            <a:solidFill>
+              <a:schemeClr val="tx1"/>
+            </a:solidFill>
+            <a:ln>
+              <a:noFill/>
+            </a:ln>
+          </p:spPr>
+          <p:style>
+            <a:lnRef idx="2">
+              <a:schemeClr val="accent1">
+                <a:shade val="50000"/>
+              </a:schemeClr>
+            </a:lnRef>
+            <a:fillRef idx="1">
+              <a:schemeClr val="accent1"/>
+            </a:fillRef>
+            <a:effectRef idx="0">
+              <a:schemeClr val="accent1"/>
+            </a:effectRef>
+            <a:fontRef idx="minor">
+              <a:schemeClr val="lt1"/>
+            </a:fontRef>
+          </p:style>
+          <p:txBody>
+            <a:bodyPr rtlCol="0" anchor="ctr"/>
+            <a:lstStyle/>
+            <a:p>
+              <a:pPr algn="ctr"/>
+              <a:endParaRPr lang="zh-CN" altLang="en-US"/>
+            </a:p>
+          </p:txBody>
+        </p:sp>
+        <mc:AlternateContent xmlns:mc="http://schemas.openxmlformats.org/markup-compatibility/2006" xmlns:a14="http://schemas.microsoft.com/office/drawing/2010/main">
+          <mc:Choice Requires="a14">
+            <p:sp>
+              <p:nvSpPr>
+                <p:cNvPr id="35" name="TextBox 34">
+                  <a:extLst>
+                    <a:ext uri="{FF2B5EF4-FFF2-40B4-BE49-F238E27FC236}">
+                      <a16:creationId xmlns:a16="http://schemas.microsoft.com/office/drawing/2014/main" id="{D575A477-8509-454D-A167-A111F7B11E5E}"/>
+                    </a:ext>
+                  </a:extLst>
+                </p:cNvPr>
+                <p:cNvSpPr txBox="1"/>
+                <p:nvPr/>
+              </p:nvSpPr>
+              <p:spPr>
+                <a:xfrm>
+                  <a:off x="5180543" y="3222342"/>
+                  <a:ext cx="177613" cy="212622"/>
+                </a:xfrm>
+                <a:prstGeom prst="rect">
+                  <a:avLst/>
+                </a:prstGeom>
+                <a:noFill/>
+              </p:spPr>
+              <p:txBody>
+                <a:bodyPr wrap="none" lIns="0" rIns="0" rtlCol="0">
+                  <a:spAutoFit/>
+                </a:bodyPr>
+                <a:lstStyle/>
+                <a:p>
+                  <a14:m>
+                    <m:oMath xmlns:m="http://schemas.openxmlformats.org/officeDocument/2006/math">
+                      <m:r>
+                        <a:rPr lang="en-US" altLang="zh-CN" sz="800" b="0" i="1" smtClean="0">
+                          <a:latin typeface="Cambria Math" panose="02040503050406030204" pitchFamily="18" charset="0"/>
+                        </a:rPr>
+                        <m:t>𝑝</m:t>
+                      </m:r>
+                    </m:oMath>
+                  </a14:m>
+                  <a:r>
+                    <a:rPr lang="en-US" altLang="zh-CN" sz="800" baseline="-25000" dirty="0"/>
+                    <a:t>new</a:t>
+                  </a:r>
+                  <a:endParaRPr lang="zh-CN" altLang="en-US" sz="800" baseline="-25000" dirty="0"/>
+                </a:p>
+              </p:txBody>
+            </p:sp>
+          </mc:Choice>
+          <mc:Fallback xmlns="">
+            <p:sp>
+              <p:nvSpPr>
+                <p:cNvPr id="48" name="TextBox 47"/>
+                <p:cNvSpPr txBox="1">
+                  <a:spLocks noRot="1" noChangeAspect="1" noMove="1" noResize="1" noEditPoints="1" noAdjustHandles="1" noChangeArrowheads="1" noChangeShapeType="1" noTextEdit="1"/>
+                </p:cNvSpPr>
+                <p:nvPr/>
+              </p:nvSpPr>
+              <p:spPr>
+                <a:xfrm>
+                  <a:off x="5180543" y="3222342"/>
+                  <a:ext cx="177613" cy="212622"/>
+                </a:xfrm>
+                <a:prstGeom prst="rect">
+                  <a:avLst/>
+                </a:prstGeom>
+                <a:blipFill rotWithShape="0">
+                  <a:blip r:embed="rId9"/>
+                  <a:stretch>
+                    <a:fillRect l="-24138" r="-27586" b="-5882"/>
+                  </a:stretch>
+                </a:blipFill>
+              </p:spPr>
+              <p:txBody>
+                <a:bodyPr/>
+                <a:lstStyle/>
+                <a:p>
+                  <a:r>
+                    <a:rPr lang="en-US">
+                      <a:noFill/>
+                    </a:rPr>
+                    <a:t> </a:t>
+                  </a:r>
+                </a:p>
+              </p:txBody>
+            </p:sp>
+          </mc:Fallback>
+        </mc:AlternateContent>
+        <mc:AlternateContent xmlns:mc="http://schemas.openxmlformats.org/markup-compatibility/2006" xmlns:a14="http://schemas.microsoft.com/office/drawing/2010/main">
+          <mc:Choice Requires="a14">
+            <p:sp>
+              <p:nvSpPr>
+                <p:cNvPr id="36" name="TextBox 35">
+                  <a:extLst>
+                    <a:ext uri="{FF2B5EF4-FFF2-40B4-BE49-F238E27FC236}">
+                      <a16:creationId xmlns:a16="http://schemas.microsoft.com/office/drawing/2014/main" id="{9FF8F333-C386-4602-83B7-6CF71D287448}"/>
+                    </a:ext>
+                  </a:extLst>
+                </p:cNvPr>
+                <p:cNvSpPr txBox="1"/>
+                <p:nvPr/>
+              </p:nvSpPr>
+              <p:spPr>
+                <a:xfrm>
+                  <a:off x="4260724" y="3055631"/>
+                  <a:ext cx="262572" cy="212622"/>
+                </a:xfrm>
+                <a:prstGeom prst="rect">
+                  <a:avLst/>
+                </a:prstGeom>
+                <a:noFill/>
+              </p:spPr>
+              <p:txBody>
+                <a:bodyPr wrap="none" lIns="0" rIns="0" rtlCol="0">
+                  <a:spAutoFit/>
+                </a:bodyPr>
+                <a:lstStyle/>
+                <a:p>
+                  <a14:m>
+                    <m:oMath xmlns:m="http://schemas.openxmlformats.org/officeDocument/2006/math">
+                      <m:r>
+                        <a:rPr lang="en-US" altLang="zh-CN" sz="800" b="0" i="1" smtClean="0">
+                          <a:latin typeface="Cambria Math" panose="02040503050406030204" pitchFamily="18" charset="0"/>
+                        </a:rPr>
+                        <m:t>𝑝</m:t>
+                      </m:r>
+                    </m:oMath>
+                  </a14:m>
+                  <a:r>
+                    <a:rPr lang="en-US" altLang="zh-CN" sz="800" baseline="-25000" dirty="0"/>
+                    <a:t>current</a:t>
+                  </a:r>
+                  <a:endParaRPr lang="zh-CN" altLang="en-US" sz="800" baseline="-25000" dirty="0"/>
+                </a:p>
+              </p:txBody>
+            </p:sp>
+          </mc:Choice>
+          <mc:Fallback xmlns="">
+            <p:sp>
+              <p:nvSpPr>
+                <p:cNvPr id="49" name="TextBox 48"/>
+                <p:cNvSpPr txBox="1">
+                  <a:spLocks noRot="1" noChangeAspect="1" noMove="1" noResize="1" noEditPoints="1" noAdjustHandles="1" noChangeArrowheads="1" noChangeShapeType="1" noTextEdit="1"/>
+                </p:cNvSpPr>
+                <p:nvPr/>
+              </p:nvSpPr>
+              <p:spPr>
+                <a:xfrm>
+                  <a:off x="4260724" y="3055631"/>
+                  <a:ext cx="262572" cy="212622"/>
+                </a:xfrm>
+                <a:prstGeom prst="rect">
+                  <a:avLst/>
+                </a:prstGeom>
+                <a:blipFill rotWithShape="0">
+                  <a:blip r:embed="rId10"/>
+                  <a:stretch>
+                    <a:fillRect l="-16279" r="-20930" b="-5714"/>
+                  </a:stretch>
+                </a:blipFill>
+              </p:spPr>
+              <p:txBody>
+                <a:bodyPr/>
+                <a:lstStyle/>
+                <a:p>
+                  <a:r>
+                    <a:rPr lang="en-US">
+                      <a:noFill/>
+                    </a:rPr>
+                    <a:t> </a:t>
+                  </a:r>
+                </a:p>
+              </p:txBody>
+            </p:sp>
+          </mc:Fallback>
+        </mc:AlternateContent>
+        <p:sp>
+          <p:nvSpPr>
+            <p:cNvPr id="37" name="椭圆 12">
+              <a:extLst>
+                <a:ext uri="{FF2B5EF4-FFF2-40B4-BE49-F238E27FC236}">
+                  <a16:creationId xmlns:a16="http://schemas.microsoft.com/office/drawing/2014/main" id="{748E5E51-F0AC-4DCD-BD33-A766200E5A1D}"/>
+                </a:ext>
+              </a:extLst>
+            </p:cNvPr>
+            <p:cNvSpPr/>
+            <p:nvPr/>
+          </p:nvSpPr>
+          <p:spPr>
+            <a:xfrm>
+              <a:off x="5176477" y="3222342"/>
+              <a:ext cx="54864" cy="54864"/>
+            </a:xfrm>
+            <a:prstGeom prst="ellipse">
+              <a:avLst/>
+            </a:prstGeom>
+            <a:solidFill>
+              <a:schemeClr val="tx1"/>
+            </a:solidFill>
+            <a:ln>
+              <a:noFill/>
+            </a:ln>
+          </p:spPr>
+          <p:style>
+            <a:lnRef idx="2">
+              <a:schemeClr val="accent1">
+                <a:shade val="50000"/>
+              </a:schemeClr>
+            </a:lnRef>
+            <a:fillRef idx="1">
+              <a:schemeClr val="accent1"/>
+            </a:fillRef>
+            <a:effectRef idx="0">
+              <a:schemeClr val="accent1"/>
+            </a:effectRef>
+            <a:fontRef idx="minor">
+              <a:schemeClr val="lt1"/>
+            </a:fontRef>
+          </p:style>
+          <p:txBody>
+            <a:bodyPr rtlCol="0" anchor="ctr"/>
+            <a:lstStyle/>
+            <a:p>
+              <a:pPr algn="ctr"/>
+              <a:endParaRPr lang="zh-CN" altLang="en-US"/>
+            </a:p>
+          </p:txBody>
+        </p:sp>
+      </p:grpSp>
+    </p:spTree>
+    <p:extLst>
+      <p:ext uri="{BB962C8B-B14F-4D97-AF65-F5344CB8AC3E}">
+        <p14:creationId xmlns:p14="http://schemas.microsoft.com/office/powerpoint/2010/main" val="1966143555"/>
+      </p:ext>
+    </p:extLst>
+  </p:cSld>
+  <p:clrMapOvr>
+    <a:masterClrMapping/>
+  </p:clrMapOvr>
+</p:sld>
+</file>
+
 <file path=ppt/slides/slide2.xml><?xml version="1.0" encoding="utf-8"?>
 <p:sld xmlns:a="http://schemas.openxmlformats.org/drawingml/2006/main" xmlns:r="http://schemas.openxmlformats.org/officeDocument/2006/relationships" xmlns:p="http://schemas.openxmlformats.org/presentationml/2006/main">
   <p:cSld>

</xml_diff>

<commit_message>
9.7 almost complete done, must uypdate Physics.js in all projects
</commit_message>
<xml_diff>
--- a/Word/Diagrams/chapter9/chap 9.figures.pptx
+++ b/Word/Diagrams/chapter9/chap 9.figures.pptx
@@ -5,7 +5,7 @@
     <p:sldMasterId id="2147483660" r:id="rId1"/>
   </p:sldMasterIdLst>
   <p:notesMasterIdLst>
-    <p:notesMasterId r:id="rId20"/>
+    <p:notesMasterId r:id="rId22"/>
   </p:notesMasterIdLst>
   <p:sldIdLst>
     <p:sldId id="306" r:id="rId2"/>
@@ -26,6 +26,8 @@
     <p:sldId id="319" r:id="rId17"/>
     <p:sldId id="320" r:id="rId18"/>
     <p:sldId id="321" r:id="rId19"/>
+    <p:sldId id="322" r:id="rId20"/>
+    <p:sldId id="323" r:id="rId21"/>
   </p:sldIdLst>
   <p:sldSz cx="9144000" cy="6858000" type="screen4x3"/>
   <p:notesSz cx="6858000" cy="9144000"/>
@@ -226,7 +228,7 @@
             <a:fld id="{9CCF083D-F2BC-4786-8C77-844DFCD3515B}" type="datetimeFigureOut">
               <a:rPr lang="zh-TW" altLang="en-US" smtClean="0"/>
               <a:pPr/>
-              <a:t>2021/6/22</a:t>
+              <a:t>2021/6/25</a:t>
             </a:fld>
             <a:endParaRPr lang="zh-TW" altLang="en-US"/>
           </a:p>
@@ -690,7 +692,7 @@
             <a:fld id="{E3D07B0C-BD95-41BE-BB3E-AC75822DF381}" type="datetimeFigureOut">
               <a:rPr lang="en-US" smtClean="0"/>
               <a:pPr/>
-              <a:t>6/22/2021</a:t>
+              <a:t>6/25/2021</a:t>
             </a:fld>
             <a:endParaRPr lang="en-US" dirty="0"/>
           </a:p>
@@ -855,7 +857,7 @@
             <a:fld id="{E3D07B0C-BD95-41BE-BB3E-AC75822DF381}" type="datetimeFigureOut">
               <a:rPr lang="en-US" smtClean="0"/>
               <a:pPr/>
-              <a:t>6/22/2021</a:t>
+              <a:t>6/25/2021</a:t>
             </a:fld>
             <a:endParaRPr lang="en-US" dirty="0"/>
           </a:p>
@@ -1031,7 +1033,7 @@
             <a:fld id="{E3D07B0C-BD95-41BE-BB3E-AC75822DF381}" type="datetimeFigureOut">
               <a:rPr lang="en-US" smtClean="0"/>
               <a:pPr/>
-              <a:t>6/22/2021</a:t>
+              <a:t>6/25/2021</a:t>
             </a:fld>
             <a:endParaRPr lang="en-US" dirty="0"/>
           </a:p>
@@ -1196,7 +1198,7 @@
             <a:fld id="{E3D07B0C-BD95-41BE-BB3E-AC75822DF381}" type="datetimeFigureOut">
               <a:rPr lang="en-US" smtClean="0"/>
               <a:pPr/>
-              <a:t>6/22/2021</a:t>
+              <a:t>6/25/2021</a:t>
             </a:fld>
             <a:endParaRPr lang="en-US" dirty="0"/>
           </a:p>
@@ -1439,7 +1441,7 @@
             <a:fld id="{E3D07B0C-BD95-41BE-BB3E-AC75822DF381}" type="datetimeFigureOut">
               <a:rPr lang="en-US" smtClean="0"/>
               <a:pPr/>
-              <a:t>6/22/2021</a:t>
+              <a:t>6/25/2021</a:t>
             </a:fld>
             <a:endParaRPr lang="en-US" dirty="0"/>
           </a:p>
@@ -1723,7 +1725,7 @@
             <a:fld id="{E3D07B0C-BD95-41BE-BB3E-AC75822DF381}" type="datetimeFigureOut">
               <a:rPr lang="en-US" smtClean="0"/>
               <a:pPr/>
-              <a:t>6/22/2021</a:t>
+              <a:t>6/25/2021</a:t>
             </a:fld>
             <a:endParaRPr lang="en-US" dirty="0"/>
           </a:p>
@@ -2152,7 +2154,7 @@
             <a:fld id="{E3D07B0C-BD95-41BE-BB3E-AC75822DF381}" type="datetimeFigureOut">
               <a:rPr lang="en-US" smtClean="0"/>
               <a:pPr/>
-              <a:t>6/22/2021</a:t>
+              <a:t>6/25/2021</a:t>
             </a:fld>
             <a:endParaRPr lang="en-US" dirty="0"/>
           </a:p>
@@ -2266,7 +2268,7 @@
             <a:fld id="{E3D07B0C-BD95-41BE-BB3E-AC75822DF381}" type="datetimeFigureOut">
               <a:rPr lang="en-US" smtClean="0"/>
               <a:pPr/>
-              <a:t>6/22/2021</a:t>
+              <a:t>6/25/2021</a:t>
             </a:fld>
             <a:endParaRPr lang="en-US" dirty="0"/>
           </a:p>
@@ -2358,7 +2360,7 @@
             <a:fld id="{E3D07B0C-BD95-41BE-BB3E-AC75822DF381}" type="datetimeFigureOut">
               <a:rPr lang="en-US" smtClean="0"/>
               <a:pPr/>
-              <a:t>6/22/2021</a:t>
+              <a:t>6/25/2021</a:t>
             </a:fld>
             <a:endParaRPr lang="en-US" dirty="0"/>
           </a:p>
@@ -2549,7 +2551,7 @@
             <a:fld id="{E3D07B0C-BD95-41BE-BB3E-AC75822DF381}" type="datetimeFigureOut">
               <a:rPr lang="en-US" smtClean="0"/>
               <a:pPr/>
-              <a:t>6/22/2021</a:t>
+              <a:t>6/25/2021</a:t>
             </a:fld>
             <a:endParaRPr lang="en-US" dirty="0"/>
           </a:p>
@@ -2867,7 +2869,7 @@
             <a:fld id="{E3D07B0C-BD95-41BE-BB3E-AC75822DF381}" type="datetimeFigureOut">
               <a:rPr lang="en-US" smtClean="0"/>
               <a:pPr/>
-              <a:t>6/22/2021</a:t>
+              <a:t>6/25/2021</a:t>
             </a:fld>
             <a:endParaRPr lang="en-US" dirty="0"/>
           </a:p>
@@ -3249,7 +3251,7 @@
             <a:fld id="{E3D07B0C-BD95-41BE-BB3E-AC75822DF381}" type="datetimeFigureOut">
               <a:rPr lang="en-US" smtClean="0"/>
               <a:pPr/>
-              <a:t>6/22/2021</a:t>
+              <a:t>6/25/2021</a:t>
             </a:fld>
             <a:endParaRPr lang="en-US" dirty="0"/>
           </a:p>
@@ -15228,8 +15230,8 @@
           </a:fontRef>
         </p:style>
       </p:cxnSp>
-      <mc:AlternateContent xmlns:mc="http://schemas.openxmlformats.org/markup-compatibility/2006">
-        <mc:Choice xmlns:a14="http://schemas.microsoft.com/office/drawing/2010/main" Requires="a14">
+      <mc:AlternateContent xmlns:mc="http://schemas.openxmlformats.org/markup-compatibility/2006" xmlns:a14="http://schemas.microsoft.com/office/drawing/2010/main">
+        <mc:Choice Requires="a14">
           <p:sp>
             <p:nvSpPr>
               <p:cNvPr id="13" name="TextBox 12">
@@ -15289,7 +15291,7 @@
             </p:txBody>
           </p:sp>
         </mc:Choice>
-        <mc:Fallback>
+        <mc:Fallback xmlns="">
           <p:sp>
             <p:nvSpPr>
               <p:cNvPr id="13" name="TextBox 12">
@@ -15334,8 +15336,8 @@
           </p:sp>
         </mc:Fallback>
       </mc:AlternateContent>
-      <mc:AlternateContent xmlns:mc="http://schemas.openxmlformats.org/markup-compatibility/2006">
-        <mc:Choice xmlns:a14="http://schemas.microsoft.com/office/drawing/2010/main" Requires="a14">
+      <mc:AlternateContent xmlns:mc="http://schemas.openxmlformats.org/markup-compatibility/2006" xmlns:a14="http://schemas.microsoft.com/office/drawing/2010/main">
+        <mc:Choice Requires="a14">
           <p:sp>
             <p:nvSpPr>
               <p:cNvPr id="14" name="TextBox 13">
@@ -15395,7 +15397,7 @@
             </p:txBody>
           </p:sp>
         </mc:Choice>
-        <mc:Fallback>
+        <mc:Fallback xmlns="">
           <p:sp>
             <p:nvSpPr>
               <p:cNvPr id="14" name="TextBox 13">
@@ -15440,8 +15442,8 @@
           </p:sp>
         </mc:Fallback>
       </mc:AlternateContent>
-      <mc:AlternateContent xmlns:mc="http://schemas.openxmlformats.org/markup-compatibility/2006">
-        <mc:Choice xmlns:a14="http://schemas.microsoft.com/office/drawing/2010/main" Requires="a14">
+      <mc:AlternateContent xmlns:mc="http://schemas.openxmlformats.org/markup-compatibility/2006" xmlns:a14="http://schemas.microsoft.com/office/drawing/2010/main">
+        <mc:Choice Requires="a14">
           <p:sp>
             <p:nvSpPr>
               <p:cNvPr id="15" name="TextBox 14">
@@ -15501,7 +15503,7 @@
             </p:txBody>
           </p:sp>
         </mc:Choice>
-        <mc:Fallback>
+        <mc:Fallback xmlns="">
           <p:sp>
             <p:nvSpPr>
               <p:cNvPr id="15" name="TextBox 14">
@@ -18907,6 +18909,1329 @@
 </p:sld>
 </file>
 
+<file path=ppt/slides/slide19.xml><?xml version="1.0" encoding="utf-8"?>
+<p:sld xmlns:a="http://schemas.openxmlformats.org/drawingml/2006/main" xmlns:r="http://schemas.openxmlformats.org/officeDocument/2006/relationships" xmlns:p="http://schemas.openxmlformats.org/presentationml/2006/main">
+  <p:cSld>
+    <p:spTree>
+      <p:nvGrpSpPr>
+        <p:cNvPr id="1" name=""/>
+        <p:cNvGrpSpPr/>
+        <p:nvPr/>
+      </p:nvGrpSpPr>
+      <p:grpSpPr>
+        <a:xfrm>
+          <a:off x="0" y="0"/>
+          <a:ext cx="0" cy="0"/>
+          <a:chOff x="0" y="0"/>
+          <a:chExt cx="0" cy="0"/>
+        </a:xfrm>
+      </p:grpSpPr>
+      <p:sp>
+        <p:nvSpPr>
+          <p:cNvPr id="2" name="Rectangle 1">
+            <a:extLst>
+              <a:ext uri="{FF2B5EF4-FFF2-40B4-BE49-F238E27FC236}">
+                <a16:creationId xmlns:a16="http://schemas.microsoft.com/office/drawing/2014/main" id="{EA1AE5F2-517D-4131-8CEF-21548E10BB59}"/>
+              </a:ext>
+            </a:extLst>
+          </p:cNvPr>
+          <p:cNvSpPr/>
+          <p:nvPr/>
+        </p:nvSpPr>
+        <p:spPr>
+          <a:xfrm>
+            <a:off x="1652016" y="1829016"/>
+            <a:ext cx="4267200" cy="2324099"/>
+          </a:xfrm>
+          <a:prstGeom prst="rect">
+            <a:avLst/>
+          </a:prstGeom>
+          <a:noFill/>
+          <a:ln w="9525">
+            <a:prstDash val="sysDash"/>
+          </a:ln>
+        </p:spPr>
+        <p:style>
+          <a:lnRef idx="2">
+            <a:schemeClr val="accent1">
+              <a:shade val="50000"/>
+            </a:schemeClr>
+          </a:lnRef>
+          <a:fillRef idx="1">
+            <a:schemeClr val="accent1"/>
+          </a:fillRef>
+          <a:effectRef idx="0">
+            <a:schemeClr val="accent1"/>
+          </a:effectRef>
+          <a:fontRef idx="minor">
+            <a:schemeClr val="lt1"/>
+          </a:fontRef>
+        </p:style>
+        <p:txBody>
+          <a:bodyPr rtlCol="0" anchor="ctr"/>
+          <a:lstStyle/>
+          <a:p>
+            <a:pPr algn="ctr"/>
+            <a:endParaRPr lang="en-US" sz="800"/>
+          </a:p>
+        </p:txBody>
+      </p:sp>
+      <p:sp>
+        <p:nvSpPr>
+          <p:cNvPr id="3" name="TextBox 2">
+            <a:extLst>
+              <a:ext uri="{FF2B5EF4-FFF2-40B4-BE49-F238E27FC236}">
+                <a16:creationId xmlns:a16="http://schemas.microsoft.com/office/drawing/2014/main" id="{A13F515A-68C2-49C2-AACF-4F35153228C5}"/>
+              </a:ext>
+            </a:extLst>
+          </p:cNvPr>
+          <p:cNvSpPr txBox="1"/>
+          <p:nvPr/>
+        </p:nvSpPr>
+        <p:spPr>
+          <a:xfrm>
+            <a:off x="3056442" y="4301734"/>
+            <a:ext cx="2125158" cy="338554"/>
+          </a:xfrm>
+          <a:prstGeom prst="rect">
+            <a:avLst/>
+          </a:prstGeom>
+          <a:noFill/>
+          <a:ln>
+            <a:noFill/>
+          </a:ln>
+        </p:spPr>
+        <p:txBody>
+          <a:bodyPr wrap="square" lIns="0" rIns="0" rtlCol="0">
+            <a:spAutoFit/>
+          </a:bodyPr>
+          <a:lstStyle/>
+          <a:p>
+            <a:r>
+              <a:rPr lang="en-US" altLang="zh-TW" sz="1600" dirty="0"/>
+              <a:t>Figure 9-25</a:t>
+            </a:r>
+            <a:endParaRPr lang="zh-TW" altLang="en-US" sz="1600" baseline="-25000" dirty="0"/>
+          </a:p>
+        </p:txBody>
+      </p:sp>
+      <p:sp>
+        <p:nvSpPr>
+          <p:cNvPr id="4" name="Oval 3">
+            <a:extLst>
+              <a:ext uri="{FF2B5EF4-FFF2-40B4-BE49-F238E27FC236}">
+                <a16:creationId xmlns:a16="http://schemas.microsoft.com/office/drawing/2014/main" id="{D7DC5C21-83E7-47BD-B14F-D86FC0F75EC8}"/>
+              </a:ext>
+            </a:extLst>
+          </p:cNvPr>
+          <p:cNvSpPr>
+            <a:spLocks noChangeAspect="1"/>
+          </p:cNvSpPr>
+          <p:nvPr/>
+        </p:nvSpPr>
+        <p:spPr>
+          <a:xfrm>
+            <a:off x="3229382" y="1990708"/>
+            <a:ext cx="548640" cy="548640"/>
+          </a:xfrm>
+          <a:prstGeom prst="ellipse">
+            <a:avLst/>
+          </a:prstGeom>
+          <a:noFill/>
+          <a:ln w="12700">
+            <a:solidFill>
+              <a:schemeClr val="tx1"/>
+            </a:solidFill>
+          </a:ln>
+        </p:spPr>
+        <p:style>
+          <a:lnRef idx="2">
+            <a:schemeClr val="accent1">
+              <a:shade val="50000"/>
+            </a:schemeClr>
+          </a:lnRef>
+          <a:fillRef idx="1">
+            <a:schemeClr val="accent1"/>
+          </a:fillRef>
+          <a:effectRef idx="0">
+            <a:schemeClr val="accent1"/>
+          </a:effectRef>
+          <a:fontRef idx="minor">
+            <a:schemeClr val="lt1"/>
+          </a:fontRef>
+        </p:style>
+        <p:txBody>
+          <a:bodyPr rtlCol="0" anchor="ctr"/>
+          <a:lstStyle/>
+          <a:p>
+            <a:pPr algn="ctr"/>
+            <a:endParaRPr lang="en-US"/>
+          </a:p>
+        </p:txBody>
+      </p:sp>
+      <p:sp>
+        <p:nvSpPr>
+          <p:cNvPr id="5" name="Oval 4">
+            <a:extLst>
+              <a:ext uri="{FF2B5EF4-FFF2-40B4-BE49-F238E27FC236}">
+                <a16:creationId xmlns:a16="http://schemas.microsoft.com/office/drawing/2014/main" id="{F0B259A1-A753-4716-ACDB-5F6D19293A34}"/>
+              </a:ext>
+            </a:extLst>
+          </p:cNvPr>
+          <p:cNvSpPr>
+            <a:spLocks noChangeAspect="1"/>
+          </p:cNvSpPr>
+          <p:nvPr/>
+        </p:nvSpPr>
+        <p:spPr>
+          <a:xfrm>
+            <a:off x="3229382" y="3136445"/>
+            <a:ext cx="548640" cy="548640"/>
+          </a:xfrm>
+          <a:prstGeom prst="ellipse">
+            <a:avLst/>
+          </a:prstGeom>
+          <a:noFill/>
+          <a:ln w="12700">
+            <a:solidFill>
+              <a:schemeClr val="tx1"/>
+            </a:solidFill>
+          </a:ln>
+        </p:spPr>
+        <p:style>
+          <a:lnRef idx="2">
+            <a:schemeClr val="accent1">
+              <a:shade val="50000"/>
+            </a:schemeClr>
+          </a:lnRef>
+          <a:fillRef idx="1">
+            <a:schemeClr val="accent1"/>
+          </a:fillRef>
+          <a:effectRef idx="0">
+            <a:schemeClr val="accent1"/>
+          </a:effectRef>
+          <a:fontRef idx="minor">
+            <a:schemeClr val="lt1"/>
+          </a:fontRef>
+        </p:style>
+        <p:txBody>
+          <a:bodyPr rtlCol="0" anchor="ctr"/>
+          <a:lstStyle/>
+          <a:p>
+            <a:pPr algn="ctr"/>
+            <a:endParaRPr lang="en-US"/>
+          </a:p>
+        </p:txBody>
+      </p:sp>
+      <p:cxnSp>
+        <p:nvCxnSpPr>
+          <p:cNvPr id="6" name="Straight Connector 5">
+            <a:extLst>
+              <a:ext uri="{FF2B5EF4-FFF2-40B4-BE49-F238E27FC236}">
+                <a16:creationId xmlns:a16="http://schemas.microsoft.com/office/drawing/2014/main" id="{E4E2258B-EE33-4FB5-ADAB-2344167187B9}"/>
+              </a:ext>
+            </a:extLst>
+          </p:cNvPr>
+          <p:cNvCxnSpPr/>
+          <p:nvPr/>
+        </p:nvCxnSpPr>
+        <p:spPr>
+          <a:xfrm>
+            <a:off x="3503702" y="2268629"/>
+            <a:ext cx="627826" cy="589518"/>
+          </a:xfrm>
+          <a:prstGeom prst="line">
+            <a:avLst/>
+          </a:prstGeom>
+          <a:ln w="9525">
+            <a:solidFill>
+              <a:schemeClr val="tx1"/>
+            </a:solidFill>
+            <a:tailEnd type="triangle" w="sm" len="sm"/>
+          </a:ln>
+        </p:spPr>
+        <p:style>
+          <a:lnRef idx="1">
+            <a:schemeClr val="accent1"/>
+          </a:lnRef>
+          <a:fillRef idx="0">
+            <a:schemeClr val="accent1"/>
+          </a:fillRef>
+          <a:effectRef idx="0">
+            <a:schemeClr val="accent1"/>
+          </a:effectRef>
+          <a:fontRef idx="minor">
+            <a:schemeClr val="tx1"/>
+          </a:fontRef>
+        </p:style>
+      </p:cxnSp>
+      <p:cxnSp>
+        <p:nvCxnSpPr>
+          <p:cNvPr id="7" name="Straight Connector 6">
+            <a:extLst>
+              <a:ext uri="{FF2B5EF4-FFF2-40B4-BE49-F238E27FC236}">
+                <a16:creationId xmlns:a16="http://schemas.microsoft.com/office/drawing/2014/main" id="{5B8BE255-13A0-45EF-BD6D-344F9F2D5206}"/>
+              </a:ext>
+            </a:extLst>
+          </p:cNvPr>
+          <p:cNvCxnSpPr/>
+          <p:nvPr/>
+        </p:nvCxnSpPr>
+        <p:spPr>
+          <a:xfrm>
+            <a:off x="3582889" y="2862119"/>
+            <a:ext cx="548640" cy="0"/>
+          </a:xfrm>
+          <a:prstGeom prst="line">
+            <a:avLst/>
+          </a:prstGeom>
+          <a:ln w="9525">
+            <a:solidFill>
+              <a:schemeClr val="tx1"/>
+            </a:solidFill>
+            <a:prstDash val="dash"/>
+            <a:headEnd type="triangle" w="sm" len="sm"/>
+            <a:tailEnd type="none" w="sm" len="sm"/>
+          </a:ln>
+        </p:spPr>
+        <p:style>
+          <a:lnRef idx="1">
+            <a:schemeClr val="accent1"/>
+          </a:lnRef>
+          <a:fillRef idx="0">
+            <a:schemeClr val="accent1"/>
+          </a:fillRef>
+          <a:effectRef idx="0">
+            <a:schemeClr val="accent1"/>
+          </a:effectRef>
+          <a:fontRef idx="minor">
+            <a:schemeClr val="tx1"/>
+          </a:fontRef>
+        </p:style>
+      </p:cxnSp>
+      <mc:AlternateContent xmlns:mc="http://schemas.openxmlformats.org/markup-compatibility/2006">
+        <mc:Choice xmlns:a14="http://schemas.microsoft.com/office/drawing/2010/main" Requires="a14">
+          <p:sp>
+            <p:nvSpPr>
+              <p:cNvPr id="8" name="TextBox 7">
+                <a:extLst>
+                  <a:ext uri="{FF2B5EF4-FFF2-40B4-BE49-F238E27FC236}">
+                    <a16:creationId xmlns:a16="http://schemas.microsoft.com/office/drawing/2014/main" id="{23FCAB93-BF73-4CE8-BF78-D54F1CBE9DEA}"/>
+                  </a:ext>
+                </a:extLst>
+              </p:cNvPr>
+              <p:cNvSpPr txBox="1"/>
+              <p:nvPr/>
+            </p:nvSpPr>
+            <p:spPr>
+              <a:xfrm>
+                <a:off x="3812043" y="2357521"/>
+                <a:ext cx="102657" cy="230256"/>
+              </a:xfrm>
+              <a:prstGeom prst="rect">
+                <a:avLst/>
+              </a:prstGeom>
+              <a:noFill/>
+            </p:spPr>
+            <p:txBody>
+              <a:bodyPr wrap="none" lIns="0" rIns="0" rtlCol="0">
+                <a:spAutoFit/>
+              </a:bodyPr>
+              <a:lstStyle/>
+              <a:p>
+                <a14:m>
+                  <m:oMath xmlns:m="http://schemas.openxmlformats.org/officeDocument/2006/math">
+                    <m:acc>
+                      <m:accPr>
+                        <m:chr m:val="⃑"/>
+                        <m:ctrlPr>
+                          <a:rPr lang="en-US" altLang="zh-CN" sz="800" i="1" smtClean="0">
+                            <a:latin typeface="Cambria Math" panose="02040503050406030204" pitchFamily="18" charset="0"/>
+                          </a:rPr>
+                        </m:ctrlPr>
+                      </m:accPr>
+                      <m:e>
+                        <m:r>
+                          <a:rPr lang="en-US" altLang="zh-CN" sz="800" b="0" i="1" smtClean="0">
+                            <a:latin typeface="Cambria Math" panose="02040503050406030204" pitchFamily="18" charset="0"/>
+                          </a:rPr>
+                          <m:t>𝑉</m:t>
+                        </m:r>
+                      </m:e>
+                    </m:acc>
+                  </m:oMath>
+                </a14:m>
+                <a:r>
+                  <a:rPr lang="en-US" altLang="zh-CN" sz="800" baseline="-25000" dirty="0"/>
+                  <a:t>1</a:t>
+                </a:r>
+                <a:endParaRPr lang="zh-CN" altLang="en-US" sz="800" baseline="-25000" dirty="0"/>
+              </a:p>
+            </p:txBody>
+          </p:sp>
+        </mc:Choice>
+        <mc:Fallback>
+          <p:sp>
+            <p:nvSpPr>
+              <p:cNvPr id="8" name="TextBox 7">
+                <a:extLst>
+                  <a:ext uri="{FF2B5EF4-FFF2-40B4-BE49-F238E27FC236}">
+                    <a16:creationId xmlns:a16="http://schemas.microsoft.com/office/drawing/2014/main" id="{23FCAB93-BF73-4CE8-BF78-D54F1CBE9DEA}"/>
+                  </a:ext>
+                </a:extLst>
+              </p:cNvPr>
+              <p:cNvSpPr txBox="1">
+                <a:spLocks noRot="1" noChangeAspect="1" noMove="1" noResize="1" noEditPoints="1" noAdjustHandles="1" noChangeArrowheads="1" noChangeShapeType="1" noTextEdit="1"/>
+              </p:cNvSpPr>
+              <p:nvPr/>
+            </p:nvSpPr>
+            <p:spPr>
+              <a:xfrm>
+                <a:off x="3812043" y="2357521"/>
+                <a:ext cx="102657" cy="230256"/>
+              </a:xfrm>
+              <a:prstGeom prst="rect">
+                <a:avLst/>
+              </a:prstGeom>
+              <a:blipFill>
+                <a:blip r:embed="rId2"/>
+                <a:stretch>
+                  <a:fillRect l="-35294" r="-41176" b="-2632"/>
+                </a:stretch>
+              </a:blipFill>
+            </p:spPr>
+            <p:txBody>
+              <a:bodyPr/>
+              <a:lstStyle/>
+              <a:p>
+                <a:r>
+                  <a:rPr lang="en-US">
+                    <a:noFill/>
+                  </a:rPr>
+                  <a:t> </a:t>
+                </a:r>
+              </a:p>
+            </p:txBody>
+          </p:sp>
+        </mc:Fallback>
+      </mc:AlternateContent>
+      <mc:AlternateContent xmlns:mc="http://schemas.openxmlformats.org/markup-compatibility/2006">
+        <mc:Choice xmlns:a14="http://schemas.microsoft.com/office/drawing/2010/main" Requires="a14">
+          <p:sp>
+            <p:nvSpPr>
+              <p:cNvPr id="9" name="TextBox 8">
+                <a:extLst>
+                  <a:ext uri="{FF2B5EF4-FFF2-40B4-BE49-F238E27FC236}">
+                    <a16:creationId xmlns:a16="http://schemas.microsoft.com/office/drawing/2014/main" id="{A1418B2C-31CA-4E46-9F13-B5D03B1A33A4}"/>
+                  </a:ext>
+                </a:extLst>
+              </p:cNvPr>
+              <p:cNvSpPr txBox="1"/>
+              <p:nvPr/>
+            </p:nvSpPr>
+            <p:spPr>
+              <a:xfrm>
+                <a:off x="3812043" y="3137276"/>
+                <a:ext cx="102657" cy="230256"/>
+              </a:xfrm>
+              <a:prstGeom prst="rect">
+                <a:avLst/>
+              </a:prstGeom>
+              <a:noFill/>
+            </p:spPr>
+            <p:txBody>
+              <a:bodyPr wrap="none" lIns="0" rIns="0" rtlCol="0">
+                <a:spAutoFit/>
+              </a:bodyPr>
+              <a:lstStyle/>
+              <a:p>
+                <a14:m>
+                  <m:oMath xmlns:m="http://schemas.openxmlformats.org/officeDocument/2006/math">
+                    <m:acc>
+                      <m:accPr>
+                        <m:chr m:val="⃑"/>
+                        <m:ctrlPr>
+                          <a:rPr lang="en-US" altLang="zh-CN" sz="800" i="1" smtClean="0">
+                            <a:latin typeface="Cambria Math" panose="02040503050406030204" pitchFamily="18" charset="0"/>
+                          </a:rPr>
+                        </m:ctrlPr>
+                      </m:accPr>
+                      <m:e>
+                        <m:r>
+                          <a:rPr lang="en-US" altLang="zh-CN" sz="800" b="0" i="1" smtClean="0">
+                            <a:latin typeface="Cambria Math" panose="02040503050406030204" pitchFamily="18" charset="0"/>
+                          </a:rPr>
+                          <m:t>𝑉</m:t>
+                        </m:r>
+                      </m:e>
+                    </m:acc>
+                  </m:oMath>
+                </a14:m>
+                <a:r>
+                  <a:rPr lang="en-US" altLang="zh-CN" sz="800" baseline="-25000" dirty="0"/>
+                  <a:t>2</a:t>
+                </a:r>
+                <a:endParaRPr lang="zh-CN" altLang="en-US" sz="800" baseline="-25000" dirty="0"/>
+              </a:p>
+            </p:txBody>
+          </p:sp>
+        </mc:Choice>
+        <mc:Fallback>
+          <p:sp>
+            <p:nvSpPr>
+              <p:cNvPr id="9" name="TextBox 8">
+                <a:extLst>
+                  <a:ext uri="{FF2B5EF4-FFF2-40B4-BE49-F238E27FC236}">
+                    <a16:creationId xmlns:a16="http://schemas.microsoft.com/office/drawing/2014/main" id="{A1418B2C-31CA-4E46-9F13-B5D03B1A33A4}"/>
+                  </a:ext>
+                </a:extLst>
+              </p:cNvPr>
+              <p:cNvSpPr txBox="1">
+                <a:spLocks noRot="1" noChangeAspect="1" noMove="1" noResize="1" noEditPoints="1" noAdjustHandles="1" noChangeArrowheads="1" noChangeShapeType="1" noTextEdit="1"/>
+              </p:cNvSpPr>
+              <p:nvPr/>
+            </p:nvSpPr>
+            <p:spPr>
+              <a:xfrm>
+                <a:off x="3812043" y="3137276"/>
+                <a:ext cx="102657" cy="230256"/>
+              </a:xfrm>
+              <a:prstGeom prst="rect">
+                <a:avLst/>
+              </a:prstGeom>
+              <a:blipFill>
+                <a:blip r:embed="rId3"/>
+                <a:stretch>
+                  <a:fillRect l="-35294" r="-41176" b="-5405"/>
+                </a:stretch>
+              </a:blipFill>
+            </p:spPr>
+            <p:txBody>
+              <a:bodyPr/>
+              <a:lstStyle/>
+              <a:p>
+                <a:r>
+                  <a:rPr lang="en-US">
+                    <a:noFill/>
+                  </a:rPr>
+                  <a:t> </a:t>
+                </a:r>
+              </a:p>
+            </p:txBody>
+          </p:sp>
+        </mc:Fallback>
+      </mc:AlternateContent>
+      <mc:AlternateContent xmlns:mc="http://schemas.openxmlformats.org/markup-compatibility/2006">
+        <mc:Choice xmlns:a14="http://schemas.microsoft.com/office/drawing/2010/main" Requires="a14">
+          <p:sp>
+            <p:nvSpPr>
+              <p:cNvPr id="10" name="TextBox 9">
+                <a:extLst>
+                  <a:ext uri="{FF2B5EF4-FFF2-40B4-BE49-F238E27FC236}">
+                    <a16:creationId xmlns:a16="http://schemas.microsoft.com/office/drawing/2014/main" id="{84CADA7B-6F68-4C28-98D5-AF897C13D569}"/>
+                  </a:ext>
+                </a:extLst>
+              </p:cNvPr>
+              <p:cNvSpPr txBox="1"/>
+              <p:nvPr/>
+            </p:nvSpPr>
+            <p:spPr>
+              <a:xfrm>
+                <a:off x="3698279" y="2704343"/>
+                <a:ext cx="170816" cy="218650"/>
+              </a:xfrm>
+              <a:prstGeom prst="rect">
+                <a:avLst/>
+              </a:prstGeom>
+              <a:noFill/>
+            </p:spPr>
+            <p:txBody>
+              <a:bodyPr wrap="none" lIns="0" rIns="0" rtlCol="0">
+                <a:spAutoFit/>
+              </a:bodyPr>
+              <a:lstStyle/>
+              <a:p>
+                <a:pPr/>
+                <a14:m>
+                  <m:oMathPara xmlns:m="http://schemas.openxmlformats.org/officeDocument/2006/math">
+                    <m:oMathParaPr>
+                      <m:jc m:val="centerGroup"/>
+                    </m:oMathParaPr>
+                    <m:oMath xmlns:m="http://schemas.openxmlformats.org/officeDocument/2006/math">
+                      <m:r>
+                        <a:rPr lang="en-US" altLang="zh-CN" sz="800" b="0" i="1" smtClean="0">
+                          <a:latin typeface="Cambria Math" panose="02040503050406030204" pitchFamily="18" charset="0"/>
+                        </a:rPr>
+                        <m:t>−</m:t>
+                      </m:r>
+                      <m:acc>
+                        <m:accPr>
+                          <m:chr m:val="̂"/>
+                          <m:ctrlPr>
+                            <a:rPr lang="en-US" altLang="zh-CN" sz="800" i="1" smtClean="0">
+                              <a:latin typeface="Cambria Math" panose="02040503050406030204" pitchFamily="18" charset="0"/>
+                            </a:rPr>
+                          </m:ctrlPr>
+                        </m:accPr>
+                        <m:e>
+                          <m:r>
+                            <a:rPr lang="en-US" altLang="zh-CN" sz="800" b="0" i="1" smtClean="0">
+                              <a:latin typeface="Cambria Math" panose="02040503050406030204" pitchFamily="18" charset="0"/>
+                            </a:rPr>
+                            <m:t>𝑁</m:t>
+                          </m:r>
+                        </m:e>
+                      </m:acc>
+                    </m:oMath>
+                  </m:oMathPara>
+                </a14:m>
+                <a:endParaRPr lang="zh-CN" altLang="en-US" sz="800" baseline="-25000" dirty="0"/>
+              </a:p>
+            </p:txBody>
+          </p:sp>
+        </mc:Choice>
+        <mc:Fallback>
+          <p:sp>
+            <p:nvSpPr>
+              <p:cNvPr id="10" name="TextBox 9">
+                <a:extLst>
+                  <a:ext uri="{FF2B5EF4-FFF2-40B4-BE49-F238E27FC236}">
+                    <a16:creationId xmlns:a16="http://schemas.microsoft.com/office/drawing/2014/main" id="{84CADA7B-6F68-4C28-98D5-AF897C13D569}"/>
+                  </a:ext>
+                </a:extLst>
+              </p:cNvPr>
+              <p:cNvSpPr txBox="1">
+                <a:spLocks noRot="1" noChangeAspect="1" noMove="1" noResize="1" noEditPoints="1" noAdjustHandles="1" noChangeArrowheads="1" noChangeShapeType="1" noTextEdit="1"/>
+              </p:cNvSpPr>
+              <p:nvPr/>
+            </p:nvSpPr>
+            <p:spPr>
+              <a:xfrm>
+                <a:off x="3698279" y="2704343"/>
+                <a:ext cx="170816" cy="218650"/>
+              </a:xfrm>
+              <a:prstGeom prst="rect">
+                <a:avLst/>
+              </a:prstGeom>
+              <a:blipFill>
+                <a:blip r:embed="rId4"/>
+                <a:stretch>
+                  <a:fillRect l="-7143" r="-85714"/>
+                </a:stretch>
+              </a:blipFill>
+            </p:spPr>
+            <p:txBody>
+              <a:bodyPr/>
+              <a:lstStyle/>
+              <a:p>
+                <a:r>
+                  <a:rPr lang="en-US">
+                    <a:noFill/>
+                  </a:rPr>
+                  <a:t> </a:t>
+                </a:r>
+              </a:p>
+            </p:txBody>
+          </p:sp>
+        </mc:Fallback>
+      </mc:AlternateContent>
+      <mc:AlternateContent xmlns:mc="http://schemas.openxmlformats.org/markup-compatibility/2006">
+        <mc:Choice xmlns:a14="http://schemas.microsoft.com/office/drawing/2010/main" Requires="a14">
+          <p:sp>
+            <p:nvSpPr>
+              <p:cNvPr id="11" name="TextBox 10">
+                <a:extLst>
+                  <a:ext uri="{FF2B5EF4-FFF2-40B4-BE49-F238E27FC236}">
+                    <a16:creationId xmlns:a16="http://schemas.microsoft.com/office/drawing/2014/main" id="{56169655-1635-4CC0-B1E3-68949DA962B0}"/>
+                  </a:ext>
+                </a:extLst>
+              </p:cNvPr>
+              <p:cNvSpPr txBox="1"/>
+              <p:nvPr/>
+            </p:nvSpPr>
+            <p:spPr>
+              <a:xfrm>
+                <a:off x="4144631" y="3148882"/>
+                <a:ext cx="79188" cy="218650"/>
+              </a:xfrm>
+              <a:prstGeom prst="rect">
+                <a:avLst/>
+              </a:prstGeom>
+              <a:noFill/>
+            </p:spPr>
+            <p:txBody>
+              <a:bodyPr wrap="none" lIns="0" rIns="0" rtlCol="0">
+                <a:spAutoFit/>
+              </a:bodyPr>
+              <a:lstStyle/>
+              <a:p>
+                <a:pPr/>
+                <a14:m>
+                  <m:oMathPara xmlns:m="http://schemas.openxmlformats.org/officeDocument/2006/math">
+                    <m:oMathParaPr>
+                      <m:jc m:val="centerGroup"/>
+                    </m:oMathParaPr>
+                    <m:oMath xmlns:m="http://schemas.openxmlformats.org/officeDocument/2006/math">
+                      <m:acc>
+                        <m:accPr>
+                          <m:chr m:val="̂"/>
+                          <m:ctrlPr>
+                            <a:rPr lang="en-US" altLang="zh-CN" sz="800" i="1" smtClean="0">
+                              <a:latin typeface="Cambria Math" panose="02040503050406030204" pitchFamily="18" charset="0"/>
+                            </a:rPr>
+                          </m:ctrlPr>
+                        </m:accPr>
+                        <m:e>
+                          <m:r>
+                            <a:rPr lang="en-US" altLang="zh-CN" sz="800" b="0" i="1" smtClean="0">
+                              <a:latin typeface="Cambria Math" panose="02040503050406030204" pitchFamily="18" charset="0"/>
+                            </a:rPr>
+                            <m:t>𝑇</m:t>
+                          </m:r>
+                        </m:e>
+                      </m:acc>
+                    </m:oMath>
+                  </m:oMathPara>
+                </a14:m>
+                <a:endParaRPr lang="zh-CN" altLang="en-US" sz="800" baseline="-25000" dirty="0"/>
+              </a:p>
+            </p:txBody>
+          </p:sp>
+        </mc:Choice>
+        <mc:Fallback>
+          <p:sp>
+            <p:nvSpPr>
+              <p:cNvPr id="11" name="TextBox 10">
+                <a:extLst>
+                  <a:ext uri="{FF2B5EF4-FFF2-40B4-BE49-F238E27FC236}">
+                    <a16:creationId xmlns:a16="http://schemas.microsoft.com/office/drawing/2014/main" id="{56169655-1635-4CC0-B1E3-68949DA962B0}"/>
+                  </a:ext>
+                </a:extLst>
+              </p:cNvPr>
+              <p:cNvSpPr txBox="1">
+                <a:spLocks noRot="1" noChangeAspect="1" noMove="1" noResize="1" noEditPoints="1" noAdjustHandles="1" noChangeArrowheads="1" noChangeShapeType="1" noTextEdit="1"/>
+              </p:cNvSpPr>
+              <p:nvPr/>
+            </p:nvSpPr>
+            <p:spPr>
+              <a:xfrm>
+                <a:off x="4144631" y="3148882"/>
+                <a:ext cx="79188" cy="218650"/>
+              </a:xfrm>
+              <a:prstGeom prst="rect">
+                <a:avLst/>
+              </a:prstGeom>
+              <a:blipFill>
+                <a:blip r:embed="rId5"/>
+                <a:stretch>
+                  <a:fillRect l="-38462" r="-76923"/>
+                </a:stretch>
+              </a:blipFill>
+            </p:spPr>
+            <p:txBody>
+              <a:bodyPr/>
+              <a:lstStyle/>
+              <a:p>
+                <a:r>
+                  <a:rPr lang="en-US">
+                    <a:noFill/>
+                  </a:rPr>
+                  <a:t> </a:t>
+                </a:r>
+              </a:p>
+            </p:txBody>
+          </p:sp>
+        </mc:Fallback>
+      </mc:AlternateContent>
+      <p:sp>
+        <p:nvSpPr>
+          <p:cNvPr id="12" name="TextBox 11">
+            <a:extLst>
+              <a:ext uri="{FF2B5EF4-FFF2-40B4-BE49-F238E27FC236}">
+                <a16:creationId xmlns:a16="http://schemas.microsoft.com/office/drawing/2014/main" id="{839AC3D4-AF87-4D7D-ABBB-4162603C7D47}"/>
+              </a:ext>
+            </a:extLst>
+          </p:cNvPr>
+          <p:cNvSpPr txBox="1">
+            <a:spLocks noChangeAspect="1"/>
+          </p:cNvSpPr>
+          <p:nvPr/>
+        </p:nvSpPr>
+        <p:spPr>
+          <a:xfrm>
+            <a:off x="3090712" y="2149612"/>
+            <a:ext cx="67326" cy="230832"/>
+          </a:xfrm>
+          <a:prstGeom prst="rect">
+            <a:avLst/>
+          </a:prstGeom>
+          <a:noFill/>
+        </p:spPr>
+        <p:txBody>
+          <a:bodyPr wrap="none" lIns="0" rIns="0" rtlCol="0">
+            <a:spAutoFit/>
+          </a:bodyPr>
+          <a:lstStyle/>
+          <a:p>
+            <a:r>
+              <a:rPr lang="en-US" altLang="zh-CN" sz="900" dirty="0"/>
+              <a:t>A</a:t>
+            </a:r>
+            <a:endParaRPr lang="zh-CN" altLang="en-US" sz="900" dirty="0"/>
+          </a:p>
+        </p:txBody>
+      </p:sp>
+      <p:sp>
+        <p:nvSpPr>
+          <p:cNvPr id="13" name="TextBox 12">
+            <a:extLst>
+              <a:ext uri="{FF2B5EF4-FFF2-40B4-BE49-F238E27FC236}">
+                <a16:creationId xmlns:a16="http://schemas.microsoft.com/office/drawing/2014/main" id="{68E4AE0A-DDED-405B-A702-90519F9FCF4A}"/>
+              </a:ext>
+            </a:extLst>
+          </p:cNvPr>
+          <p:cNvSpPr txBox="1">
+            <a:spLocks noChangeAspect="1"/>
+          </p:cNvSpPr>
+          <p:nvPr/>
+        </p:nvSpPr>
+        <p:spPr>
+          <a:xfrm>
+            <a:off x="2665194" y="3295349"/>
+            <a:ext cx="538609" cy="230832"/>
+          </a:xfrm>
+          <a:prstGeom prst="rect">
+            <a:avLst/>
+          </a:prstGeom>
+          <a:noFill/>
+        </p:spPr>
+        <p:txBody>
+          <a:bodyPr wrap="none" lIns="0" rIns="0" rtlCol="0">
+            <a:spAutoFit/>
+          </a:bodyPr>
+          <a:lstStyle/>
+          <a:p>
+            <a:r>
+              <a:rPr lang="en-US" altLang="zh-CN" sz="900" dirty="0"/>
+              <a:t>Reflected A</a:t>
+            </a:r>
+            <a:endParaRPr lang="zh-CN" altLang="en-US" sz="900" dirty="0"/>
+          </a:p>
+        </p:txBody>
+      </p:sp>
+      <p:cxnSp>
+        <p:nvCxnSpPr>
+          <p:cNvPr id="14" name="Straight Connector 13">
+            <a:extLst>
+              <a:ext uri="{FF2B5EF4-FFF2-40B4-BE49-F238E27FC236}">
+                <a16:creationId xmlns:a16="http://schemas.microsoft.com/office/drawing/2014/main" id="{ED2D7F86-D619-40D1-B77B-B401C37FE27C}"/>
+              </a:ext>
+            </a:extLst>
+          </p:cNvPr>
+          <p:cNvCxnSpPr/>
+          <p:nvPr/>
+        </p:nvCxnSpPr>
+        <p:spPr>
+          <a:xfrm flipV="1">
+            <a:off x="3500077" y="2861217"/>
+            <a:ext cx="631451" cy="562205"/>
+          </a:xfrm>
+          <a:prstGeom prst="line">
+            <a:avLst/>
+          </a:prstGeom>
+          <a:ln w="9525">
+            <a:solidFill>
+              <a:schemeClr val="tx1"/>
+            </a:solidFill>
+            <a:headEnd type="triangle" w="sm" len="sm"/>
+            <a:tailEnd type="none" w="sm" len="sm"/>
+          </a:ln>
+        </p:spPr>
+        <p:style>
+          <a:lnRef idx="1">
+            <a:schemeClr val="accent1"/>
+          </a:lnRef>
+          <a:fillRef idx="0">
+            <a:schemeClr val="accent1"/>
+          </a:fillRef>
+          <a:effectRef idx="0">
+            <a:schemeClr val="accent1"/>
+          </a:effectRef>
+          <a:fontRef idx="minor">
+            <a:schemeClr val="tx1"/>
+          </a:fontRef>
+        </p:style>
+      </p:cxnSp>
+      <p:sp>
+        <p:nvSpPr>
+          <p:cNvPr id="15" name="Oval 14">
+            <a:extLst>
+              <a:ext uri="{FF2B5EF4-FFF2-40B4-BE49-F238E27FC236}">
+                <a16:creationId xmlns:a16="http://schemas.microsoft.com/office/drawing/2014/main" id="{D20C1C63-B154-4E9C-8404-9A1EF90876E3}"/>
+              </a:ext>
+            </a:extLst>
+          </p:cNvPr>
+          <p:cNvSpPr>
+            <a:spLocks noChangeAspect="1"/>
+          </p:cNvSpPr>
+          <p:nvPr/>
+        </p:nvSpPr>
+        <p:spPr>
+          <a:xfrm>
+            <a:off x="3857209" y="2584314"/>
+            <a:ext cx="548640" cy="548640"/>
+          </a:xfrm>
+          <a:prstGeom prst="ellipse">
+            <a:avLst/>
+          </a:prstGeom>
+          <a:noFill/>
+          <a:ln w="12700">
+            <a:solidFill>
+              <a:schemeClr val="bg1">
+                <a:lumMod val="65000"/>
+              </a:schemeClr>
+            </a:solidFill>
+          </a:ln>
+        </p:spPr>
+        <p:style>
+          <a:lnRef idx="2">
+            <a:schemeClr val="accent1">
+              <a:shade val="50000"/>
+            </a:schemeClr>
+          </a:lnRef>
+          <a:fillRef idx="1">
+            <a:schemeClr val="accent1"/>
+          </a:fillRef>
+          <a:effectRef idx="0">
+            <a:schemeClr val="accent1"/>
+          </a:effectRef>
+          <a:fontRef idx="minor">
+            <a:schemeClr val="lt1"/>
+          </a:fontRef>
+        </p:style>
+        <p:txBody>
+          <a:bodyPr rtlCol="0" anchor="ctr"/>
+          <a:lstStyle/>
+          <a:p>
+            <a:pPr algn="ctr"/>
+            <a:endParaRPr lang="en-US"/>
+          </a:p>
+        </p:txBody>
+      </p:sp>
+      <p:cxnSp>
+        <p:nvCxnSpPr>
+          <p:cNvPr id="16" name="Straight Connector 15">
+            <a:extLst>
+              <a:ext uri="{FF2B5EF4-FFF2-40B4-BE49-F238E27FC236}">
+                <a16:creationId xmlns:a16="http://schemas.microsoft.com/office/drawing/2014/main" id="{DA4285BB-27C0-4922-A87A-2B45E5273B22}"/>
+              </a:ext>
+            </a:extLst>
+          </p:cNvPr>
+          <p:cNvCxnSpPr/>
+          <p:nvPr/>
+        </p:nvCxnSpPr>
+        <p:spPr>
+          <a:xfrm>
+            <a:off x="4131529" y="2862125"/>
+            <a:ext cx="0" cy="548640"/>
+          </a:xfrm>
+          <a:prstGeom prst="line">
+            <a:avLst/>
+          </a:prstGeom>
+          <a:ln w="9525">
+            <a:solidFill>
+              <a:schemeClr val="tx1"/>
+            </a:solidFill>
+            <a:prstDash val="dash"/>
+            <a:tailEnd type="triangle" w="sm" len="sm"/>
+          </a:ln>
+        </p:spPr>
+        <p:style>
+          <a:lnRef idx="1">
+            <a:schemeClr val="accent1"/>
+          </a:lnRef>
+          <a:fillRef idx="0">
+            <a:schemeClr val="accent1"/>
+          </a:fillRef>
+          <a:effectRef idx="0">
+            <a:schemeClr val="accent1"/>
+          </a:effectRef>
+          <a:fontRef idx="minor">
+            <a:schemeClr val="tx1"/>
+          </a:fontRef>
+        </p:style>
+      </p:cxnSp>
+      <p:cxnSp>
+        <p:nvCxnSpPr>
+          <p:cNvPr id="17" name="Straight Connector 16">
+            <a:extLst>
+              <a:ext uri="{FF2B5EF4-FFF2-40B4-BE49-F238E27FC236}">
+                <a16:creationId xmlns:a16="http://schemas.microsoft.com/office/drawing/2014/main" id="{ADB3CF05-802C-4D8D-9384-BDA25B63D544}"/>
+              </a:ext>
+            </a:extLst>
+          </p:cNvPr>
+          <p:cNvCxnSpPr/>
+          <p:nvPr/>
+        </p:nvCxnSpPr>
+        <p:spPr>
+          <a:xfrm>
+            <a:off x="3503702" y="2265028"/>
+            <a:ext cx="0" cy="548640"/>
+          </a:xfrm>
+          <a:prstGeom prst="line">
+            <a:avLst/>
+          </a:prstGeom>
+          <a:ln w="9525">
+            <a:solidFill>
+              <a:schemeClr val="tx1"/>
+            </a:solidFill>
+            <a:prstDash val="dash"/>
+            <a:tailEnd type="triangle" w="sm" len="sm"/>
+          </a:ln>
+        </p:spPr>
+        <p:style>
+          <a:lnRef idx="1">
+            <a:schemeClr val="accent1"/>
+          </a:lnRef>
+          <a:fillRef idx="0">
+            <a:schemeClr val="accent1"/>
+          </a:fillRef>
+          <a:effectRef idx="0">
+            <a:schemeClr val="accent1"/>
+          </a:effectRef>
+          <a:fontRef idx="minor">
+            <a:schemeClr val="tx1"/>
+          </a:fontRef>
+        </p:style>
+      </p:cxnSp>
+      <p:cxnSp>
+        <p:nvCxnSpPr>
+          <p:cNvPr id="18" name="Straight Connector 17">
+            <a:extLst>
+              <a:ext uri="{FF2B5EF4-FFF2-40B4-BE49-F238E27FC236}">
+                <a16:creationId xmlns:a16="http://schemas.microsoft.com/office/drawing/2014/main" id="{C88109EF-77B8-4D63-B636-6C48FE347BFE}"/>
+              </a:ext>
+            </a:extLst>
+          </p:cNvPr>
+          <p:cNvCxnSpPr/>
+          <p:nvPr/>
+        </p:nvCxnSpPr>
+        <p:spPr>
+          <a:xfrm>
+            <a:off x="3503702" y="2265028"/>
+            <a:ext cx="548640" cy="0"/>
+          </a:xfrm>
+          <a:prstGeom prst="line">
+            <a:avLst/>
+          </a:prstGeom>
+          <a:ln w="9525">
+            <a:solidFill>
+              <a:schemeClr val="tx1"/>
+            </a:solidFill>
+            <a:prstDash val="dash"/>
+            <a:headEnd type="none" w="sm" len="sm"/>
+            <a:tailEnd type="triangle" w="sm" len="sm"/>
+          </a:ln>
+        </p:spPr>
+        <p:style>
+          <a:lnRef idx="1">
+            <a:schemeClr val="accent1"/>
+          </a:lnRef>
+          <a:fillRef idx="0">
+            <a:schemeClr val="accent1"/>
+          </a:fillRef>
+          <a:effectRef idx="0">
+            <a:schemeClr val="accent1"/>
+          </a:effectRef>
+          <a:fontRef idx="minor">
+            <a:schemeClr val="tx1"/>
+          </a:fontRef>
+        </p:style>
+      </p:cxnSp>
+      <mc:AlternateContent xmlns:mc="http://schemas.openxmlformats.org/markup-compatibility/2006">
+        <mc:Choice xmlns:a14="http://schemas.microsoft.com/office/drawing/2010/main" Requires="a14">
+          <p:sp>
+            <p:nvSpPr>
+              <p:cNvPr id="19" name="TextBox 18">
+                <a:extLst>
+                  <a:ext uri="{FF2B5EF4-FFF2-40B4-BE49-F238E27FC236}">
+                    <a16:creationId xmlns:a16="http://schemas.microsoft.com/office/drawing/2014/main" id="{665F6F57-973A-45D1-9687-D379173E397C}"/>
+                  </a:ext>
+                </a:extLst>
+              </p:cNvPr>
+              <p:cNvSpPr txBox="1"/>
+              <p:nvPr/>
+            </p:nvSpPr>
+            <p:spPr>
+              <a:xfrm>
+                <a:off x="3820828" y="2091322"/>
+                <a:ext cx="93872" cy="218650"/>
+              </a:xfrm>
+              <a:prstGeom prst="rect">
+                <a:avLst/>
+              </a:prstGeom>
+              <a:noFill/>
+            </p:spPr>
+            <p:txBody>
+              <a:bodyPr wrap="none" lIns="0" rIns="0" rtlCol="0">
+                <a:spAutoFit/>
+              </a:bodyPr>
+              <a:lstStyle/>
+              <a:p>
+                <a:pPr/>
+                <a14:m>
+                  <m:oMathPara xmlns:m="http://schemas.openxmlformats.org/officeDocument/2006/math">
+                    <m:oMathParaPr>
+                      <m:jc m:val="centerGroup"/>
+                    </m:oMathParaPr>
+                    <m:oMath xmlns:m="http://schemas.openxmlformats.org/officeDocument/2006/math">
+                      <m:acc>
+                        <m:accPr>
+                          <m:chr m:val="̂"/>
+                          <m:ctrlPr>
+                            <a:rPr lang="en-US" altLang="zh-CN" sz="800" i="1" smtClean="0">
+                              <a:latin typeface="Cambria Math" panose="02040503050406030204" pitchFamily="18" charset="0"/>
+                            </a:rPr>
+                          </m:ctrlPr>
+                        </m:accPr>
+                        <m:e>
+                          <m:r>
+                            <a:rPr lang="en-US" altLang="zh-CN" sz="800" b="0" i="1" smtClean="0">
+                              <a:latin typeface="Cambria Math" panose="02040503050406030204" pitchFamily="18" charset="0"/>
+                            </a:rPr>
+                            <m:t>𝑁</m:t>
+                          </m:r>
+                        </m:e>
+                      </m:acc>
+                    </m:oMath>
+                  </m:oMathPara>
+                </a14:m>
+                <a:endParaRPr lang="zh-CN" altLang="en-US" sz="800" baseline="-25000" dirty="0"/>
+              </a:p>
+            </p:txBody>
+          </p:sp>
+        </mc:Choice>
+        <mc:Fallback>
+          <p:sp>
+            <p:nvSpPr>
+              <p:cNvPr id="19" name="TextBox 18">
+                <a:extLst>
+                  <a:ext uri="{FF2B5EF4-FFF2-40B4-BE49-F238E27FC236}">
+                    <a16:creationId xmlns:a16="http://schemas.microsoft.com/office/drawing/2014/main" id="{665F6F57-973A-45D1-9687-D379173E397C}"/>
+                  </a:ext>
+                </a:extLst>
+              </p:cNvPr>
+              <p:cNvSpPr txBox="1">
+                <a:spLocks noRot="1" noChangeAspect="1" noMove="1" noResize="1" noEditPoints="1" noAdjustHandles="1" noChangeArrowheads="1" noChangeShapeType="1" noTextEdit="1"/>
+              </p:cNvSpPr>
+              <p:nvPr/>
+            </p:nvSpPr>
+            <p:spPr>
+              <a:xfrm>
+                <a:off x="3820828" y="2091322"/>
+                <a:ext cx="93872" cy="218650"/>
+              </a:xfrm>
+              <a:prstGeom prst="rect">
+                <a:avLst/>
+              </a:prstGeom>
+              <a:blipFill>
+                <a:blip r:embed="rId6"/>
+                <a:stretch>
+                  <a:fillRect l="-33333" r="-73333"/>
+                </a:stretch>
+              </a:blipFill>
+            </p:spPr>
+            <p:txBody>
+              <a:bodyPr/>
+              <a:lstStyle/>
+              <a:p>
+                <a:r>
+                  <a:rPr lang="en-US">
+                    <a:noFill/>
+                  </a:rPr>
+                  <a:t> </a:t>
+                </a:r>
+              </a:p>
+            </p:txBody>
+          </p:sp>
+        </mc:Fallback>
+      </mc:AlternateContent>
+      <mc:AlternateContent xmlns:mc="http://schemas.openxmlformats.org/markup-compatibility/2006">
+        <mc:Choice xmlns:a14="http://schemas.microsoft.com/office/drawing/2010/main" Requires="a14">
+          <p:sp>
+            <p:nvSpPr>
+              <p:cNvPr id="20" name="TextBox 19">
+                <a:extLst>
+                  <a:ext uri="{FF2B5EF4-FFF2-40B4-BE49-F238E27FC236}">
+                    <a16:creationId xmlns:a16="http://schemas.microsoft.com/office/drawing/2014/main" id="{C533AFF4-B51C-499B-B1E4-F6A78B1C0A7A}"/>
+                  </a:ext>
+                </a:extLst>
+              </p:cNvPr>
+              <p:cNvSpPr txBox="1"/>
+              <p:nvPr/>
+            </p:nvSpPr>
+            <p:spPr>
+              <a:xfrm>
+                <a:off x="3422702" y="2529515"/>
+                <a:ext cx="79188" cy="218650"/>
+              </a:xfrm>
+              <a:prstGeom prst="rect">
+                <a:avLst/>
+              </a:prstGeom>
+              <a:noFill/>
+            </p:spPr>
+            <p:txBody>
+              <a:bodyPr wrap="none" lIns="0" rIns="0" rtlCol="0">
+                <a:spAutoFit/>
+              </a:bodyPr>
+              <a:lstStyle/>
+              <a:p>
+                <a:pPr/>
+                <a14:m>
+                  <m:oMathPara xmlns:m="http://schemas.openxmlformats.org/officeDocument/2006/math">
+                    <m:oMathParaPr>
+                      <m:jc m:val="centerGroup"/>
+                    </m:oMathParaPr>
+                    <m:oMath xmlns:m="http://schemas.openxmlformats.org/officeDocument/2006/math">
+                      <m:acc>
+                        <m:accPr>
+                          <m:chr m:val="̂"/>
+                          <m:ctrlPr>
+                            <a:rPr lang="en-US" altLang="zh-CN" sz="800" i="1" smtClean="0">
+                              <a:latin typeface="Cambria Math" panose="02040503050406030204" pitchFamily="18" charset="0"/>
+                            </a:rPr>
+                          </m:ctrlPr>
+                        </m:accPr>
+                        <m:e>
+                          <m:r>
+                            <a:rPr lang="en-US" altLang="zh-CN" sz="800" b="0" i="1" smtClean="0">
+                              <a:latin typeface="Cambria Math" panose="02040503050406030204" pitchFamily="18" charset="0"/>
+                            </a:rPr>
+                            <m:t>𝑇</m:t>
+                          </m:r>
+                        </m:e>
+                      </m:acc>
+                    </m:oMath>
+                  </m:oMathPara>
+                </a14:m>
+                <a:endParaRPr lang="zh-CN" altLang="en-US" sz="800" baseline="-25000" dirty="0"/>
+              </a:p>
+            </p:txBody>
+          </p:sp>
+        </mc:Choice>
+        <mc:Fallback>
+          <p:sp>
+            <p:nvSpPr>
+              <p:cNvPr id="20" name="TextBox 19">
+                <a:extLst>
+                  <a:ext uri="{FF2B5EF4-FFF2-40B4-BE49-F238E27FC236}">
+                    <a16:creationId xmlns:a16="http://schemas.microsoft.com/office/drawing/2014/main" id="{C533AFF4-B51C-499B-B1E4-F6A78B1C0A7A}"/>
+                  </a:ext>
+                </a:extLst>
+              </p:cNvPr>
+              <p:cNvSpPr txBox="1">
+                <a:spLocks noRot="1" noChangeAspect="1" noMove="1" noResize="1" noEditPoints="1" noAdjustHandles="1" noChangeArrowheads="1" noChangeShapeType="1" noTextEdit="1"/>
+              </p:cNvSpPr>
+              <p:nvPr/>
+            </p:nvSpPr>
+            <p:spPr>
+              <a:xfrm>
+                <a:off x="3422702" y="2529515"/>
+                <a:ext cx="79188" cy="218650"/>
+              </a:xfrm>
+              <a:prstGeom prst="rect">
+                <a:avLst/>
+              </a:prstGeom>
+              <a:blipFill>
+                <a:blip r:embed="rId7"/>
+                <a:stretch>
+                  <a:fillRect l="-38462" r="-84615"/>
+                </a:stretch>
+              </a:blipFill>
+            </p:spPr>
+            <p:txBody>
+              <a:bodyPr/>
+              <a:lstStyle/>
+              <a:p>
+                <a:r>
+                  <a:rPr lang="en-US">
+                    <a:noFill/>
+                  </a:rPr>
+                  <a:t> </a:t>
+                </a:r>
+              </a:p>
+            </p:txBody>
+          </p:sp>
+        </mc:Fallback>
+      </mc:AlternateContent>
+      <p:sp>
+        <p:nvSpPr>
+          <p:cNvPr id="21" name="Rectangle 20">
+            <a:extLst>
+              <a:ext uri="{FF2B5EF4-FFF2-40B4-BE49-F238E27FC236}">
+                <a16:creationId xmlns:a16="http://schemas.microsoft.com/office/drawing/2014/main" id="{212EC9A6-63D2-4CA5-A7F8-BED09775D236}"/>
+              </a:ext>
+            </a:extLst>
+          </p:cNvPr>
+          <p:cNvSpPr/>
+          <p:nvPr/>
+        </p:nvSpPr>
+        <p:spPr>
+          <a:xfrm>
+            <a:off x="4405848" y="1800224"/>
+            <a:ext cx="292894" cy="2501510"/>
+          </a:xfrm>
+          <a:prstGeom prst="rect">
+            <a:avLst/>
+          </a:prstGeom>
+          <a:solidFill>
+            <a:schemeClr val="tx1">
+              <a:lumMod val="50000"/>
+              <a:lumOff val="50000"/>
+            </a:schemeClr>
+          </a:solidFill>
+          <a:ln>
+            <a:noFill/>
+          </a:ln>
+        </p:spPr>
+        <p:style>
+          <a:lnRef idx="2">
+            <a:schemeClr val="accent1">
+              <a:shade val="50000"/>
+            </a:schemeClr>
+          </a:lnRef>
+          <a:fillRef idx="1">
+            <a:schemeClr val="accent1"/>
+          </a:fillRef>
+          <a:effectRef idx="0">
+            <a:schemeClr val="accent1"/>
+          </a:effectRef>
+          <a:fontRef idx="minor">
+            <a:schemeClr val="lt1"/>
+          </a:fontRef>
+        </p:style>
+        <p:txBody>
+          <a:bodyPr rtlCol="0" anchor="ctr"/>
+          <a:lstStyle/>
+          <a:p>
+            <a:pPr algn="ctr"/>
+            <a:endParaRPr lang="en-US"/>
+          </a:p>
+        </p:txBody>
+      </p:sp>
+    </p:spTree>
+    <p:extLst>
+      <p:ext uri="{BB962C8B-B14F-4D97-AF65-F5344CB8AC3E}">
+        <p14:creationId xmlns:p14="http://schemas.microsoft.com/office/powerpoint/2010/main" val="2126047472"/>
+      </p:ext>
+    </p:extLst>
+  </p:cSld>
+  <p:clrMapOvr>
+    <a:masterClrMapping/>
+  </p:clrMapOvr>
+</p:sld>
+</file>
+
 <file path=ppt/slides/slide2.xml><?xml version="1.0" encoding="utf-8"?>
 <p:sld xmlns:a="http://schemas.openxmlformats.org/drawingml/2006/main" xmlns:r="http://schemas.openxmlformats.org/officeDocument/2006/relationships" xmlns:p="http://schemas.openxmlformats.org/presentationml/2006/main">
   <p:cSld>
@@ -20236,6 +21561,908 @@
     <p:extLst>
       <p:ext uri="{BB962C8B-B14F-4D97-AF65-F5344CB8AC3E}">
         <p14:creationId xmlns:p14="http://schemas.microsoft.com/office/powerpoint/2010/main" val="3972070070"/>
+      </p:ext>
+    </p:extLst>
+  </p:cSld>
+  <p:clrMapOvr>
+    <a:masterClrMapping/>
+  </p:clrMapOvr>
+</p:sld>
+</file>
+
+<file path=ppt/slides/slide20.xml><?xml version="1.0" encoding="utf-8"?>
+<p:sld xmlns:a="http://schemas.openxmlformats.org/drawingml/2006/main" xmlns:r="http://schemas.openxmlformats.org/officeDocument/2006/relationships" xmlns:p="http://schemas.openxmlformats.org/presentationml/2006/main">
+  <p:cSld>
+    <p:spTree>
+      <p:nvGrpSpPr>
+        <p:cNvPr id="1" name=""/>
+        <p:cNvGrpSpPr/>
+        <p:nvPr/>
+      </p:nvGrpSpPr>
+      <p:grpSpPr>
+        <a:xfrm>
+          <a:off x="0" y="0"/>
+          <a:ext cx="0" cy="0"/>
+          <a:chOff x="0" y="0"/>
+          <a:chExt cx="0" cy="0"/>
+        </a:xfrm>
+      </p:grpSpPr>
+      <p:sp>
+        <p:nvSpPr>
+          <p:cNvPr id="2" name="Rectangle 1">
+            <a:extLst>
+              <a:ext uri="{FF2B5EF4-FFF2-40B4-BE49-F238E27FC236}">
+                <a16:creationId xmlns:a16="http://schemas.microsoft.com/office/drawing/2014/main" id="{78685FAC-ADAA-4B51-B611-079EA31A5D8A}"/>
+              </a:ext>
+            </a:extLst>
+          </p:cNvPr>
+          <p:cNvSpPr/>
+          <p:nvPr/>
+        </p:nvSpPr>
+        <p:spPr>
+          <a:xfrm>
+            <a:off x="1652016" y="1829016"/>
+            <a:ext cx="4267200" cy="2324099"/>
+          </a:xfrm>
+          <a:prstGeom prst="rect">
+            <a:avLst/>
+          </a:prstGeom>
+          <a:noFill/>
+          <a:ln w="9525">
+            <a:prstDash val="sysDash"/>
+          </a:ln>
+        </p:spPr>
+        <p:style>
+          <a:lnRef idx="2">
+            <a:schemeClr val="accent1">
+              <a:shade val="50000"/>
+            </a:schemeClr>
+          </a:lnRef>
+          <a:fillRef idx="1">
+            <a:schemeClr val="accent1"/>
+          </a:fillRef>
+          <a:effectRef idx="0">
+            <a:schemeClr val="accent1"/>
+          </a:effectRef>
+          <a:fontRef idx="minor">
+            <a:schemeClr val="lt1"/>
+          </a:fontRef>
+        </p:style>
+        <p:txBody>
+          <a:bodyPr rtlCol="0" anchor="ctr"/>
+          <a:lstStyle/>
+          <a:p>
+            <a:pPr algn="ctr"/>
+            <a:endParaRPr lang="en-US" sz="800"/>
+          </a:p>
+        </p:txBody>
+      </p:sp>
+      <p:sp>
+        <p:nvSpPr>
+          <p:cNvPr id="3" name="TextBox 2">
+            <a:extLst>
+              <a:ext uri="{FF2B5EF4-FFF2-40B4-BE49-F238E27FC236}">
+                <a16:creationId xmlns:a16="http://schemas.microsoft.com/office/drawing/2014/main" id="{D4C5CD11-3CD4-418B-94A7-24E7A5454368}"/>
+              </a:ext>
+            </a:extLst>
+          </p:cNvPr>
+          <p:cNvSpPr txBox="1"/>
+          <p:nvPr/>
+        </p:nvSpPr>
+        <p:spPr>
+          <a:xfrm>
+            <a:off x="3071902" y="4262181"/>
+            <a:ext cx="2125158" cy="338554"/>
+          </a:xfrm>
+          <a:prstGeom prst="rect">
+            <a:avLst/>
+          </a:prstGeom>
+          <a:noFill/>
+          <a:ln>
+            <a:noFill/>
+          </a:ln>
+        </p:spPr>
+        <p:txBody>
+          <a:bodyPr wrap="square" lIns="0" rIns="0" rtlCol="0">
+            <a:spAutoFit/>
+          </a:bodyPr>
+          <a:lstStyle/>
+          <a:p>
+            <a:r>
+              <a:rPr lang="en-US" altLang="zh-TW" sz="1600"/>
+              <a:t>Figure 9-26</a:t>
+            </a:r>
+            <a:endParaRPr lang="zh-TW" altLang="en-US" sz="1600" baseline="-25000" dirty="0"/>
+          </a:p>
+        </p:txBody>
+      </p:sp>
+      <p:sp>
+        <p:nvSpPr>
+          <p:cNvPr id="4" name="Oval 3">
+            <a:extLst>
+              <a:ext uri="{FF2B5EF4-FFF2-40B4-BE49-F238E27FC236}">
+                <a16:creationId xmlns:a16="http://schemas.microsoft.com/office/drawing/2014/main" id="{09C64E92-3216-411C-9D3B-3D8E8E21ED6A}"/>
+              </a:ext>
+            </a:extLst>
+          </p:cNvPr>
+          <p:cNvSpPr>
+            <a:spLocks noChangeAspect="1"/>
+          </p:cNvSpPr>
+          <p:nvPr/>
+        </p:nvSpPr>
+        <p:spPr>
+          <a:xfrm>
+            <a:off x="3229382" y="2409407"/>
+            <a:ext cx="548640" cy="548640"/>
+          </a:xfrm>
+          <a:prstGeom prst="ellipse">
+            <a:avLst/>
+          </a:prstGeom>
+          <a:noFill/>
+          <a:ln w="12700">
+            <a:solidFill>
+              <a:schemeClr val="tx1"/>
+            </a:solidFill>
+          </a:ln>
+        </p:spPr>
+        <p:style>
+          <a:lnRef idx="2">
+            <a:schemeClr val="accent1">
+              <a:shade val="50000"/>
+            </a:schemeClr>
+          </a:lnRef>
+          <a:fillRef idx="1">
+            <a:schemeClr val="accent1"/>
+          </a:fillRef>
+          <a:effectRef idx="0">
+            <a:schemeClr val="accent1"/>
+          </a:effectRef>
+          <a:fontRef idx="minor">
+            <a:schemeClr val="lt1"/>
+          </a:fontRef>
+        </p:style>
+        <p:txBody>
+          <a:bodyPr rtlCol="0" anchor="ctr"/>
+          <a:lstStyle/>
+          <a:p>
+            <a:pPr algn="ctr"/>
+            <a:endParaRPr lang="en-US"/>
+          </a:p>
+        </p:txBody>
+      </p:sp>
+      <p:sp>
+        <p:nvSpPr>
+          <p:cNvPr id="5" name="Oval 4">
+            <a:extLst>
+              <a:ext uri="{FF2B5EF4-FFF2-40B4-BE49-F238E27FC236}">
+                <a16:creationId xmlns:a16="http://schemas.microsoft.com/office/drawing/2014/main" id="{0958CABC-DDBF-4F90-9A89-137E2C85469E}"/>
+              </a:ext>
+            </a:extLst>
+          </p:cNvPr>
+          <p:cNvSpPr>
+            <a:spLocks noChangeAspect="1"/>
+          </p:cNvSpPr>
+          <p:nvPr/>
+        </p:nvSpPr>
+        <p:spPr>
+          <a:xfrm>
+            <a:off x="3229382" y="2957622"/>
+            <a:ext cx="548640" cy="548640"/>
+          </a:xfrm>
+          <a:prstGeom prst="ellipse">
+            <a:avLst/>
+          </a:prstGeom>
+          <a:noFill/>
+          <a:ln w="12700">
+            <a:solidFill>
+              <a:schemeClr val="tx1"/>
+            </a:solidFill>
+          </a:ln>
+        </p:spPr>
+        <p:style>
+          <a:lnRef idx="2">
+            <a:schemeClr val="accent1">
+              <a:shade val="50000"/>
+            </a:schemeClr>
+          </a:lnRef>
+          <a:fillRef idx="1">
+            <a:schemeClr val="accent1"/>
+          </a:fillRef>
+          <a:effectRef idx="0">
+            <a:schemeClr val="accent1"/>
+          </a:effectRef>
+          <a:fontRef idx="minor">
+            <a:schemeClr val="lt1"/>
+          </a:fontRef>
+        </p:style>
+        <p:txBody>
+          <a:bodyPr rtlCol="0" anchor="ctr"/>
+          <a:lstStyle/>
+          <a:p>
+            <a:pPr algn="ctr"/>
+            <a:endParaRPr lang="en-US"/>
+          </a:p>
+        </p:txBody>
+      </p:sp>
+      <p:cxnSp>
+        <p:nvCxnSpPr>
+          <p:cNvPr id="6" name="Straight Connector 5">
+            <a:extLst>
+              <a:ext uri="{FF2B5EF4-FFF2-40B4-BE49-F238E27FC236}">
+                <a16:creationId xmlns:a16="http://schemas.microsoft.com/office/drawing/2014/main" id="{336FD984-99A8-4057-9217-D58A4124DBEF}"/>
+              </a:ext>
+            </a:extLst>
+          </p:cNvPr>
+          <p:cNvCxnSpPr/>
+          <p:nvPr/>
+        </p:nvCxnSpPr>
+        <p:spPr>
+          <a:xfrm>
+            <a:off x="3503702" y="2679279"/>
+            <a:ext cx="0" cy="548640"/>
+          </a:xfrm>
+          <a:prstGeom prst="line">
+            <a:avLst/>
+          </a:prstGeom>
+          <a:ln w="9525">
+            <a:solidFill>
+              <a:schemeClr val="tx1"/>
+            </a:solidFill>
+            <a:prstDash val="dash"/>
+            <a:headEnd type="triangle" w="sm" len="sm"/>
+          </a:ln>
+        </p:spPr>
+        <p:style>
+          <a:lnRef idx="1">
+            <a:schemeClr val="accent1"/>
+          </a:lnRef>
+          <a:fillRef idx="0">
+            <a:schemeClr val="accent1"/>
+          </a:fillRef>
+          <a:effectRef idx="0">
+            <a:schemeClr val="accent1"/>
+          </a:effectRef>
+          <a:fontRef idx="minor">
+            <a:schemeClr val="tx1"/>
+          </a:fontRef>
+        </p:style>
+      </p:cxnSp>
+      <p:cxnSp>
+        <p:nvCxnSpPr>
+          <p:cNvPr id="7" name="Straight Connector 6">
+            <a:extLst>
+              <a:ext uri="{FF2B5EF4-FFF2-40B4-BE49-F238E27FC236}">
+                <a16:creationId xmlns:a16="http://schemas.microsoft.com/office/drawing/2014/main" id="{B9C3133D-B339-4123-8CDC-05CCC965DFA5}"/>
+              </a:ext>
+            </a:extLst>
+          </p:cNvPr>
+          <p:cNvCxnSpPr/>
+          <p:nvPr/>
+        </p:nvCxnSpPr>
+        <p:spPr>
+          <a:xfrm>
+            <a:off x="3503702" y="2672984"/>
+            <a:ext cx="526452" cy="215934"/>
+          </a:xfrm>
+          <a:prstGeom prst="line">
+            <a:avLst/>
+          </a:prstGeom>
+          <a:ln w="9525">
+            <a:solidFill>
+              <a:schemeClr val="tx1"/>
+            </a:solidFill>
+            <a:tailEnd type="triangle" w="sm" len="sm"/>
+          </a:ln>
+        </p:spPr>
+        <p:style>
+          <a:lnRef idx="1">
+            <a:schemeClr val="accent1"/>
+          </a:lnRef>
+          <a:fillRef idx="0">
+            <a:schemeClr val="accent1"/>
+          </a:fillRef>
+          <a:effectRef idx="0">
+            <a:schemeClr val="accent1"/>
+          </a:effectRef>
+          <a:fontRef idx="minor">
+            <a:schemeClr val="tx1"/>
+          </a:fontRef>
+        </p:style>
+      </p:cxnSp>
+      <p:cxnSp>
+        <p:nvCxnSpPr>
+          <p:cNvPr id="8" name="Straight Connector 7">
+            <a:extLst>
+              <a:ext uri="{FF2B5EF4-FFF2-40B4-BE49-F238E27FC236}">
+                <a16:creationId xmlns:a16="http://schemas.microsoft.com/office/drawing/2014/main" id="{18E43F48-D2A1-46E4-8AB9-0136D167142E}"/>
+              </a:ext>
+            </a:extLst>
+          </p:cNvPr>
+          <p:cNvCxnSpPr/>
+          <p:nvPr/>
+        </p:nvCxnSpPr>
+        <p:spPr>
+          <a:xfrm>
+            <a:off x="3503702" y="2956829"/>
+            <a:ext cx="439648" cy="0"/>
+          </a:xfrm>
+          <a:prstGeom prst="line">
+            <a:avLst/>
+          </a:prstGeom>
+          <a:ln w="9525">
+            <a:solidFill>
+              <a:schemeClr val="tx1"/>
+            </a:solidFill>
+            <a:prstDash val="dash"/>
+            <a:tailEnd type="triangle" w="sm" len="sm"/>
+          </a:ln>
+        </p:spPr>
+        <p:style>
+          <a:lnRef idx="1">
+            <a:schemeClr val="accent1"/>
+          </a:lnRef>
+          <a:fillRef idx="0">
+            <a:schemeClr val="accent1"/>
+          </a:fillRef>
+          <a:effectRef idx="0">
+            <a:schemeClr val="accent1"/>
+          </a:effectRef>
+          <a:fontRef idx="minor">
+            <a:schemeClr val="tx1"/>
+          </a:fontRef>
+        </p:style>
+      </p:cxnSp>
+      <mc:AlternateContent xmlns:mc="http://schemas.openxmlformats.org/markup-compatibility/2006">
+        <mc:Choice xmlns:a14="http://schemas.microsoft.com/office/drawing/2010/main" Requires="a14">
+          <p:sp>
+            <p:nvSpPr>
+              <p:cNvPr id="9" name="TextBox 8">
+                <a:extLst>
+                  <a:ext uri="{FF2B5EF4-FFF2-40B4-BE49-F238E27FC236}">
+                    <a16:creationId xmlns:a16="http://schemas.microsoft.com/office/drawing/2014/main" id="{73522415-BC0D-4912-9334-2D8E3711E0A2}"/>
+                  </a:ext>
+                </a:extLst>
+              </p:cNvPr>
+              <p:cNvSpPr txBox="1"/>
+              <p:nvPr/>
+            </p:nvSpPr>
+            <p:spPr>
+              <a:xfrm>
+                <a:off x="3887423" y="2652264"/>
+                <a:ext cx="142731" cy="230256"/>
+              </a:xfrm>
+              <a:prstGeom prst="rect">
+                <a:avLst/>
+              </a:prstGeom>
+              <a:noFill/>
+            </p:spPr>
+            <p:txBody>
+              <a:bodyPr wrap="none" lIns="0" rIns="0" rtlCol="0">
+                <a:spAutoFit/>
+              </a:bodyPr>
+              <a:lstStyle/>
+              <a:p>
+                <a14:m>
+                  <m:oMath xmlns:m="http://schemas.openxmlformats.org/officeDocument/2006/math">
+                    <m:acc>
+                      <m:accPr>
+                        <m:chr m:val="⃑"/>
+                        <m:ctrlPr>
+                          <a:rPr lang="en-US" altLang="zh-CN" sz="800" i="1" smtClean="0">
+                            <a:latin typeface="Cambria Math" panose="02040503050406030204" pitchFamily="18" charset="0"/>
+                          </a:rPr>
+                        </m:ctrlPr>
+                      </m:accPr>
+                      <m:e>
+                        <m:r>
+                          <a:rPr lang="en-US" altLang="zh-CN" sz="800" b="0" i="1" smtClean="0">
+                            <a:latin typeface="Cambria Math" panose="02040503050406030204" pitchFamily="18" charset="0"/>
+                          </a:rPr>
+                          <m:t>𝑉</m:t>
+                        </m:r>
+                      </m:e>
+                    </m:acc>
+                  </m:oMath>
+                </a14:m>
+                <a:r>
+                  <a:rPr lang="en-US" altLang="zh-CN" sz="800" baseline="-25000" dirty="0"/>
+                  <a:t>A1</a:t>
+                </a:r>
+                <a:endParaRPr lang="zh-CN" altLang="en-US" sz="800" baseline="-25000" dirty="0"/>
+              </a:p>
+            </p:txBody>
+          </p:sp>
+        </mc:Choice>
+        <mc:Fallback>
+          <p:sp>
+            <p:nvSpPr>
+              <p:cNvPr id="9" name="TextBox 8">
+                <a:extLst>
+                  <a:ext uri="{FF2B5EF4-FFF2-40B4-BE49-F238E27FC236}">
+                    <a16:creationId xmlns:a16="http://schemas.microsoft.com/office/drawing/2014/main" id="{73522415-BC0D-4912-9334-2D8E3711E0A2}"/>
+                  </a:ext>
+                </a:extLst>
+              </p:cNvPr>
+              <p:cNvSpPr txBox="1">
+                <a:spLocks noRot="1" noChangeAspect="1" noMove="1" noResize="1" noEditPoints="1" noAdjustHandles="1" noChangeArrowheads="1" noChangeShapeType="1" noTextEdit="1"/>
+              </p:cNvSpPr>
+              <p:nvPr/>
+            </p:nvSpPr>
+            <p:spPr>
+              <a:xfrm>
+                <a:off x="3887423" y="2652264"/>
+                <a:ext cx="142731" cy="230256"/>
+              </a:xfrm>
+              <a:prstGeom prst="rect">
+                <a:avLst/>
+              </a:prstGeom>
+              <a:blipFill>
+                <a:blip r:embed="rId2"/>
+                <a:stretch>
+                  <a:fillRect l="-26087" r="-30435" b="-5263"/>
+                </a:stretch>
+              </a:blipFill>
+            </p:spPr>
+            <p:txBody>
+              <a:bodyPr/>
+              <a:lstStyle/>
+              <a:p>
+                <a:r>
+                  <a:rPr lang="en-US">
+                    <a:noFill/>
+                  </a:rPr>
+                  <a:t> </a:t>
+                </a:r>
+              </a:p>
+            </p:txBody>
+          </p:sp>
+        </mc:Fallback>
+      </mc:AlternateContent>
+      <mc:AlternateContent xmlns:mc="http://schemas.openxmlformats.org/markup-compatibility/2006">
+        <mc:Choice xmlns:a14="http://schemas.microsoft.com/office/drawing/2010/main" Requires="a14">
+          <p:sp>
+            <p:nvSpPr>
+              <p:cNvPr id="10" name="TextBox 9">
+                <a:extLst>
+                  <a:ext uri="{FF2B5EF4-FFF2-40B4-BE49-F238E27FC236}">
+                    <a16:creationId xmlns:a16="http://schemas.microsoft.com/office/drawing/2014/main" id="{A6FE97DB-67FE-48DF-890F-AA137F9FBDAC}"/>
+                  </a:ext>
+                </a:extLst>
+              </p:cNvPr>
+              <p:cNvSpPr txBox="1"/>
+              <p:nvPr/>
+            </p:nvSpPr>
+            <p:spPr>
+              <a:xfrm>
+                <a:off x="3056442" y="3021317"/>
+                <a:ext cx="142731" cy="230256"/>
+              </a:xfrm>
+              <a:prstGeom prst="rect">
+                <a:avLst/>
+              </a:prstGeom>
+              <a:noFill/>
+            </p:spPr>
+            <p:txBody>
+              <a:bodyPr wrap="none" lIns="0" rIns="0" rtlCol="0">
+                <a:spAutoFit/>
+              </a:bodyPr>
+              <a:lstStyle/>
+              <a:p>
+                <a14:m>
+                  <m:oMath xmlns:m="http://schemas.openxmlformats.org/officeDocument/2006/math">
+                    <m:acc>
+                      <m:accPr>
+                        <m:chr m:val="⃑"/>
+                        <m:ctrlPr>
+                          <a:rPr lang="en-US" altLang="zh-CN" sz="800" i="1" smtClean="0">
+                            <a:latin typeface="Cambria Math" panose="02040503050406030204" pitchFamily="18" charset="0"/>
+                          </a:rPr>
+                        </m:ctrlPr>
+                      </m:accPr>
+                      <m:e>
+                        <m:r>
+                          <a:rPr lang="en-US" altLang="zh-CN" sz="800" b="0" i="1" smtClean="0">
+                            <a:latin typeface="Cambria Math" panose="02040503050406030204" pitchFamily="18" charset="0"/>
+                          </a:rPr>
+                          <m:t>𝑉</m:t>
+                        </m:r>
+                      </m:e>
+                    </m:acc>
+                  </m:oMath>
+                </a14:m>
+                <a:r>
+                  <a:rPr lang="en-US" altLang="zh-CN" sz="800" baseline="-25000" dirty="0"/>
+                  <a:t>B1</a:t>
+                </a:r>
+                <a:endParaRPr lang="zh-CN" altLang="en-US" sz="800" baseline="-25000" dirty="0"/>
+              </a:p>
+            </p:txBody>
+          </p:sp>
+        </mc:Choice>
+        <mc:Fallback>
+          <p:sp>
+            <p:nvSpPr>
+              <p:cNvPr id="10" name="TextBox 9">
+                <a:extLst>
+                  <a:ext uri="{FF2B5EF4-FFF2-40B4-BE49-F238E27FC236}">
+                    <a16:creationId xmlns:a16="http://schemas.microsoft.com/office/drawing/2014/main" id="{A6FE97DB-67FE-48DF-890F-AA137F9FBDAC}"/>
+                  </a:ext>
+                </a:extLst>
+              </p:cNvPr>
+              <p:cNvSpPr txBox="1">
+                <a:spLocks noRot="1" noChangeAspect="1" noMove="1" noResize="1" noEditPoints="1" noAdjustHandles="1" noChangeArrowheads="1" noChangeShapeType="1" noTextEdit="1"/>
+              </p:cNvSpPr>
+              <p:nvPr/>
+            </p:nvSpPr>
+            <p:spPr>
+              <a:xfrm>
+                <a:off x="3056442" y="3021317"/>
+                <a:ext cx="142731" cy="230256"/>
+              </a:xfrm>
+              <a:prstGeom prst="rect">
+                <a:avLst/>
+              </a:prstGeom>
+              <a:blipFill>
+                <a:blip r:embed="rId3"/>
+                <a:stretch>
+                  <a:fillRect l="-25000" r="-25000" b="-5405"/>
+                </a:stretch>
+              </a:blipFill>
+            </p:spPr>
+            <p:txBody>
+              <a:bodyPr/>
+              <a:lstStyle/>
+              <a:p>
+                <a:r>
+                  <a:rPr lang="en-US">
+                    <a:noFill/>
+                  </a:rPr>
+                  <a:t> </a:t>
+                </a:r>
+              </a:p>
+            </p:txBody>
+          </p:sp>
+        </mc:Fallback>
+      </mc:AlternateContent>
+      <mc:AlternateContent xmlns:mc="http://schemas.openxmlformats.org/markup-compatibility/2006">
+        <mc:Choice xmlns:a14="http://schemas.microsoft.com/office/drawing/2010/main" Requires="a14">
+          <p:sp>
+            <p:nvSpPr>
+              <p:cNvPr id="11" name="TextBox 10">
+                <a:extLst>
+                  <a:ext uri="{FF2B5EF4-FFF2-40B4-BE49-F238E27FC236}">
+                    <a16:creationId xmlns:a16="http://schemas.microsoft.com/office/drawing/2014/main" id="{51EF6962-2ECF-4204-B039-1DB2F5FE1A0C}"/>
+                  </a:ext>
+                </a:extLst>
+              </p:cNvPr>
+              <p:cNvSpPr txBox="1"/>
+              <p:nvPr/>
+            </p:nvSpPr>
+            <p:spPr>
+              <a:xfrm>
+                <a:off x="3404227" y="2748544"/>
+                <a:ext cx="93872" cy="218650"/>
+              </a:xfrm>
+              <a:prstGeom prst="rect">
+                <a:avLst/>
+              </a:prstGeom>
+              <a:noFill/>
+            </p:spPr>
+            <p:txBody>
+              <a:bodyPr wrap="none" lIns="0" rIns="0" rtlCol="0">
+                <a:spAutoFit/>
+              </a:bodyPr>
+              <a:lstStyle/>
+              <a:p>
+                <a:pPr/>
+                <a14:m>
+                  <m:oMathPara xmlns:m="http://schemas.openxmlformats.org/officeDocument/2006/math">
+                    <m:oMathParaPr>
+                      <m:jc m:val="centerGroup"/>
+                    </m:oMathParaPr>
+                    <m:oMath xmlns:m="http://schemas.openxmlformats.org/officeDocument/2006/math">
+                      <m:acc>
+                        <m:accPr>
+                          <m:chr m:val="̂"/>
+                          <m:ctrlPr>
+                            <a:rPr lang="en-US" altLang="zh-CN" sz="800" i="1" smtClean="0">
+                              <a:latin typeface="Cambria Math" panose="02040503050406030204" pitchFamily="18" charset="0"/>
+                            </a:rPr>
+                          </m:ctrlPr>
+                        </m:accPr>
+                        <m:e>
+                          <m:r>
+                            <a:rPr lang="en-US" altLang="zh-CN" sz="800" b="0" i="1" smtClean="0">
+                              <a:latin typeface="Cambria Math" panose="02040503050406030204" pitchFamily="18" charset="0"/>
+                            </a:rPr>
+                            <m:t>𝑁</m:t>
+                          </m:r>
+                        </m:e>
+                      </m:acc>
+                    </m:oMath>
+                  </m:oMathPara>
+                </a14:m>
+                <a:endParaRPr lang="zh-CN" altLang="en-US" sz="800" baseline="-25000" dirty="0"/>
+              </a:p>
+            </p:txBody>
+          </p:sp>
+        </mc:Choice>
+        <mc:Fallback>
+          <p:sp>
+            <p:nvSpPr>
+              <p:cNvPr id="11" name="TextBox 10">
+                <a:extLst>
+                  <a:ext uri="{FF2B5EF4-FFF2-40B4-BE49-F238E27FC236}">
+                    <a16:creationId xmlns:a16="http://schemas.microsoft.com/office/drawing/2014/main" id="{51EF6962-2ECF-4204-B039-1DB2F5FE1A0C}"/>
+                  </a:ext>
+                </a:extLst>
+              </p:cNvPr>
+              <p:cNvSpPr txBox="1">
+                <a:spLocks noRot="1" noChangeAspect="1" noMove="1" noResize="1" noEditPoints="1" noAdjustHandles="1" noChangeArrowheads="1" noChangeShapeType="1" noTextEdit="1"/>
+              </p:cNvSpPr>
+              <p:nvPr/>
+            </p:nvSpPr>
+            <p:spPr>
+              <a:xfrm>
+                <a:off x="3404227" y="2748544"/>
+                <a:ext cx="93872" cy="218650"/>
+              </a:xfrm>
+              <a:prstGeom prst="rect">
+                <a:avLst/>
+              </a:prstGeom>
+              <a:blipFill>
+                <a:blip r:embed="rId4"/>
+                <a:stretch>
+                  <a:fillRect l="-31250" r="-68750"/>
+                </a:stretch>
+              </a:blipFill>
+            </p:spPr>
+            <p:txBody>
+              <a:bodyPr/>
+              <a:lstStyle/>
+              <a:p>
+                <a:r>
+                  <a:rPr lang="en-US">
+                    <a:noFill/>
+                  </a:rPr>
+                  <a:t> </a:t>
+                </a:r>
+              </a:p>
+            </p:txBody>
+          </p:sp>
+        </mc:Fallback>
+      </mc:AlternateContent>
+      <mc:AlternateContent xmlns:mc="http://schemas.openxmlformats.org/markup-compatibility/2006">
+        <mc:Choice xmlns:a14="http://schemas.microsoft.com/office/drawing/2010/main" Requires="a14">
+          <p:sp>
+            <p:nvSpPr>
+              <p:cNvPr id="12" name="TextBox 11">
+                <a:extLst>
+                  <a:ext uri="{FF2B5EF4-FFF2-40B4-BE49-F238E27FC236}">
+                    <a16:creationId xmlns:a16="http://schemas.microsoft.com/office/drawing/2014/main" id="{BC0C661D-5C01-4397-ACDA-C648BA1360E6}"/>
+                  </a:ext>
+                </a:extLst>
+              </p:cNvPr>
+              <p:cNvSpPr txBox="1"/>
+              <p:nvPr/>
+            </p:nvSpPr>
+            <p:spPr>
+              <a:xfrm>
+                <a:off x="3778022" y="2923032"/>
+                <a:ext cx="79188" cy="218650"/>
+              </a:xfrm>
+              <a:prstGeom prst="rect">
+                <a:avLst/>
+              </a:prstGeom>
+              <a:noFill/>
+            </p:spPr>
+            <p:txBody>
+              <a:bodyPr wrap="none" lIns="0" rIns="0" rtlCol="0">
+                <a:spAutoFit/>
+              </a:bodyPr>
+              <a:lstStyle/>
+              <a:p>
+                <a:pPr/>
+                <a14:m>
+                  <m:oMathPara xmlns:m="http://schemas.openxmlformats.org/officeDocument/2006/math">
+                    <m:oMathParaPr>
+                      <m:jc m:val="centerGroup"/>
+                    </m:oMathParaPr>
+                    <m:oMath xmlns:m="http://schemas.openxmlformats.org/officeDocument/2006/math">
+                      <m:acc>
+                        <m:accPr>
+                          <m:chr m:val="̂"/>
+                          <m:ctrlPr>
+                            <a:rPr lang="en-US" altLang="zh-CN" sz="800" i="1" smtClean="0">
+                              <a:latin typeface="Cambria Math" panose="02040503050406030204" pitchFamily="18" charset="0"/>
+                            </a:rPr>
+                          </m:ctrlPr>
+                        </m:accPr>
+                        <m:e>
+                          <m:r>
+                            <a:rPr lang="en-US" altLang="zh-CN" sz="800" b="0" i="1" smtClean="0">
+                              <a:latin typeface="Cambria Math" panose="02040503050406030204" pitchFamily="18" charset="0"/>
+                            </a:rPr>
+                            <m:t>𝑇</m:t>
+                          </m:r>
+                        </m:e>
+                      </m:acc>
+                    </m:oMath>
+                  </m:oMathPara>
+                </a14:m>
+                <a:endParaRPr lang="zh-CN" altLang="en-US" sz="800" baseline="-25000" dirty="0"/>
+              </a:p>
+            </p:txBody>
+          </p:sp>
+        </mc:Choice>
+        <mc:Fallback>
+          <p:sp>
+            <p:nvSpPr>
+              <p:cNvPr id="12" name="TextBox 11">
+                <a:extLst>
+                  <a:ext uri="{FF2B5EF4-FFF2-40B4-BE49-F238E27FC236}">
+                    <a16:creationId xmlns:a16="http://schemas.microsoft.com/office/drawing/2014/main" id="{BC0C661D-5C01-4397-ACDA-C648BA1360E6}"/>
+                  </a:ext>
+                </a:extLst>
+              </p:cNvPr>
+              <p:cNvSpPr txBox="1">
+                <a:spLocks noRot="1" noChangeAspect="1" noMove="1" noResize="1" noEditPoints="1" noAdjustHandles="1" noChangeArrowheads="1" noChangeShapeType="1" noTextEdit="1"/>
+              </p:cNvSpPr>
+              <p:nvPr/>
+            </p:nvSpPr>
+            <p:spPr>
+              <a:xfrm>
+                <a:off x="3778022" y="2923032"/>
+                <a:ext cx="79188" cy="218650"/>
+              </a:xfrm>
+              <a:prstGeom prst="rect">
+                <a:avLst/>
+              </a:prstGeom>
+              <a:blipFill>
+                <a:blip r:embed="rId5"/>
+                <a:stretch>
+                  <a:fillRect l="-38462" r="-76923"/>
+                </a:stretch>
+              </a:blipFill>
+            </p:spPr>
+            <p:txBody>
+              <a:bodyPr/>
+              <a:lstStyle/>
+              <a:p>
+                <a:r>
+                  <a:rPr lang="en-US">
+                    <a:noFill/>
+                  </a:rPr>
+                  <a:t> </a:t>
+                </a:r>
+              </a:p>
+            </p:txBody>
+          </p:sp>
+        </mc:Fallback>
+      </mc:AlternateContent>
+      <p:sp>
+        <p:nvSpPr>
+          <p:cNvPr id="13" name="TextBox 12">
+            <a:extLst>
+              <a:ext uri="{FF2B5EF4-FFF2-40B4-BE49-F238E27FC236}">
+                <a16:creationId xmlns:a16="http://schemas.microsoft.com/office/drawing/2014/main" id="{5B9CCE1D-C34B-41B2-A8CA-7394B62E0806}"/>
+              </a:ext>
+            </a:extLst>
+          </p:cNvPr>
+          <p:cNvSpPr txBox="1">
+            <a:spLocks noChangeAspect="1"/>
+          </p:cNvSpPr>
+          <p:nvPr/>
+        </p:nvSpPr>
+        <p:spPr>
+          <a:xfrm>
+            <a:off x="3430773" y="2406965"/>
+            <a:ext cx="67326" cy="230832"/>
+          </a:xfrm>
+          <a:prstGeom prst="rect">
+            <a:avLst/>
+          </a:prstGeom>
+          <a:noFill/>
+        </p:spPr>
+        <p:txBody>
+          <a:bodyPr wrap="none" lIns="0" rIns="0" rtlCol="0">
+            <a:spAutoFit/>
+          </a:bodyPr>
+          <a:lstStyle/>
+          <a:p>
+            <a:r>
+              <a:rPr lang="en-US" altLang="zh-CN" sz="900" dirty="0"/>
+              <a:t>A</a:t>
+            </a:r>
+            <a:endParaRPr lang="zh-CN" altLang="en-US" sz="900" dirty="0"/>
+          </a:p>
+        </p:txBody>
+      </p:sp>
+      <p:sp>
+        <p:nvSpPr>
+          <p:cNvPr id="14" name="TextBox 13">
+            <a:extLst>
+              <a:ext uri="{FF2B5EF4-FFF2-40B4-BE49-F238E27FC236}">
+                <a16:creationId xmlns:a16="http://schemas.microsoft.com/office/drawing/2014/main" id="{AF1140F9-CCA4-44EB-9E5E-6A0E67C2CD2F}"/>
+              </a:ext>
+            </a:extLst>
+          </p:cNvPr>
+          <p:cNvSpPr txBox="1">
+            <a:spLocks noChangeAspect="1"/>
+          </p:cNvSpPr>
+          <p:nvPr/>
+        </p:nvSpPr>
+        <p:spPr>
+          <a:xfrm>
+            <a:off x="3435581" y="3260343"/>
+            <a:ext cx="62518" cy="230832"/>
+          </a:xfrm>
+          <a:prstGeom prst="rect">
+            <a:avLst/>
+          </a:prstGeom>
+          <a:noFill/>
+        </p:spPr>
+        <p:txBody>
+          <a:bodyPr wrap="none" lIns="0" rIns="0" rtlCol="0">
+            <a:spAutoFit/>
+          </a:bodyPr>
+          <a:lstStyle/>
+          <a:p>
+            <a:r>
+              <a:rPr lang="en-US" altLang="zh-CN" sz="900" dirty="0"/>
+              <a:t>B</a:t>
+            </a:r>
+            <a:endParaRPr lang="zh-CN" altLang="en-US" sz="900" dirty="0"/>
+          </a:p>
+        </p:txBody>
+      </p:sp>
+      <p:cxnSp>
+        <p:nvCxnSpPr>
+          <p:cNvPr id="15" name="Straight Connector 14">
+            <a:extLst>
+              <a:ext uri="{FF2B5EF4-FFF2-40B4-BE49-F238E27FC236}">
+                <a16:creationId xmlns:a16="http://schemas.microsoft.com/office/drawing/2014/main" id="{E2F5965D-0967-4F37-A0B9-0944FBBE0532}"/>
+              </a:ext>
+            </a:extLst>
+          </p:cNvPr>
+          <p:cNvCxnSpPr/>
+          <p:nvPr/>
+        </p:nvCxnSpPr>
+        <p:spPr>
+          <a:xfrm>
+            <a:off x="2977250" y="3011206"/>
+            <a:ext cx="526452" cy="215934"/>
+          </a:xfrm>
+          <a:prstGeom prst="line">
+            <a:avLst/>
+          </a:prstGeom>
+          <a:ln w="9525">
+            <a:solidFill>
+              <a:schemeClr val="tx1"/>
+            </a:solidFill>
+            <a:headEnd type="triangle" w="sm" len="sm"/>
+            <a:tailEnd type="none" w="sm" len="sm"/>
+          </a:ln>
+        </p:spPr>
+        <p:style>
+          <a:lnRef idx="1">
+            <a:schemeClr val="accent1"/>
+          </a:lnRef>
+          <a:fillRef idx="0">
+            <a:schemeClr val="accent1"/>
+          </a:fillRef>
+          <a:effectRef idx="0">
+            <a:schemeClr val="accent1"/>
+          </a:effectRef>
+          <a:fontRef idx="minor">
+            <a:schemeClr val="tx1"/>
+          </a:fontRef>
+        </p:style>
+      </p:cxnSp>
+    </p:spTree>
+    <p:extLst>
+      <p:ext uri="{BB962C8B-B14F-4D97-AF65-F5344CB8AC3E}">
+        <p14:creationId xmlns:p14="http://schemas.microsoft.com/office/powerpoint/2010/main" val="483842107"/>
       </p:ext>
     </p:extLst>
   </p:cSld>

</xml_diff>

<commit_message>
9.8 forumlation figured out
</commit_message>
<xml_diff>
--- a/Word/Diagrams/chapter9/chap 9.figures.pptx
+++ b/Word/Diagrams/chapter9/chap 9.figures.pptx
@@ -5,7 +5,7 @@
     <p:sldMasterId id="2147483660" r:id="rId1"/>
   </p:sldMasterIdLst>
   <p:notesMasterIdLst>
-    <p:notesMasterId r:id="rId22"/>
+    <p:notesMasterId r:id="rId24"/>
   </p:notesMasterIdLst>
   <p:sldIdLst>
     <p:sldId id="306" r:id="rId2"/>
@@ -28,6 +28,8 @@
     <p:sldId id="321" r:id="rId19"/>
     <p:sldId id="322" r:id="rId20"/>
     <p:sldId id="323" r:id="rId21"/>
+    <p:sldId id="324" r:id="rId22"/>
+    <p:sldId id="325" r:id="rId23"/>
   </p:sldIdLst>
   <p:sldSz cx="9144000" cy="6858000" type="screen4x3"/>
   <p:notesSz cx="6858000" cy="9144000"/>
@@ -228,7 +230,7 @@
             <a:fld id="{9CCF083D-F2BC-4786-8C77-844DFCD3515B}" type="datetimeFigureOut">
               <a:rPr lang="zh-TW" altLang="en-US" smtClean="0"/>
               <a:pPr/>
-              <a:t>2021/6/25</a:t>
+              <a:t>2021/6/27</a:t>
             </a:fld>
             <a:endParaRPr lang="zh-TW" altLang="en-US"/>
           </a:p>
@@ -692,7 +694,7 @@
             <a:fld id="{E3D07B0C-BD95-41BE-BB3E-AC75822DF381}" type="datetimeFigureOut">
               <a:rPr lang="en-US" smtClean="0"/>
               <a:pPr/>
-              <a:t>6/25/2021</a:t>
+              <a:t>6/27/2021</a:t>
             </a:fld>
             <a:endParaRPr lang="en-US" dirty="0"/>
           </a:p>
@@ -857,7 +859,7 @@
             <a:fld id="{E3D07B0C-BD95-41BE-BB3E-AC75822DF381}" type="datetimeFigureOut">
               <a:rPr lang="en-US" smtClean="0"/>
               <a:pPr/>
-              <a:t>6/25/2021</a:t>
+              <a:t>6/27/2021</a:t>
             </a:fld>
             <a:endParaRPr lang="en-US" dirty="0"/>
           </a:p>
@@ -1033,7 +1035,7 @@
             <a:fld id="{E3D07B0C-BD95-41BE-BB3E-AC75822DF381}" type="datetimeFigureOut">
               <a:rPr lang="en-US" smtClean="0"/>
               <a:pPr/>
-              <a:t>6/25/2021</a:t>
+              <a:t>6/27/2021</a:t>
             </a:fld>
             <a:endParaRPr lang="en-US" dirty="0"/>
           </a:p>
@@ -1198,7 +1200,7 @@
             <a:fld id="{E3D07B0C-BD95-41BE-BB3E-AC75822DF381}" type="datetimeFigureOut">
               <a:rPr lang="en-US" smtClean="0"/>
               <a:pPr/>
-              <a:t>6/25/2021</a:t>
+              <a:t>6/27/2021</a:t>
             </a:fld>
             <a:endParaRPr lang="en-US" dirty="0"/>
           </a:p>
@@ -1441,7 +1443,7 @@
             <a:fld id="{E3D07B0C-BD95-41BE-BB3E-AC75822DF381}" type="datetimeFigureOut">
               <a:rPr lang="en-US" smtClean="0"/>
               <a:pPr/>
-              <a:t>6/25/2021</a:t>
+              <a:t>6/27/2021</a:t>
             </a:fld>
             <a:endParaRPr lang="en-US" dirty="0"/>
           </a:p>
@@ -1725,7 +1727,7 @@
             <a:fld id="{E3D07B0C-BD95-41BE-BB3E-AC75822DF381}" type="datetimeFigureOut">
               <a:rPr lang="en-US" smtClean="0"/>
               <a:pPr/>
-              <a:t>6/25/2021</a:t>
+              <a:t>6/27/2021</a:t>
             </a:fld>
             <a:endParaRPr lang="en-US" dirty="0"/>
           </a:p>
@@ -2154,7 +2156,7 @@
             <a:fld id="{E3D07B0C-BD95-41BE-BB3E-AC75822DF381}" type="datetimeFigureOut">
               <a:rPr lang="en-US" smtClean="0"/>
               <a:pPr/>
-              <a:t>6/25/2021</a:t>
+              <a:t>6/27/2021</a:t>
             </a:fld>
             <a:endParaRPr lang="en-US" dirty="0"/>
           </a:p>
@@ -2268,7 +2270,7 @@
             <a:fld id="{E3D07B0C-BD95-41BE-BB3E-AC75822DF381}" type="datetimeFigureOut">
               <a:rPr lang="en-US" smtClean="0"/>
               <a:pPr/>
-              <a:t>6/25/2021</a:t>
+              <a:t>6/27/2021</a:t>
             </a:fld>
             <a:endParaRPr lang="en-US" dirty="0"/>
           </a:p>
@@ -2360,7 +2362,7 @@
             <a:fld id="{E3D07B0C-BD95-41BE-BB3E-AC75822DF381}" type="datetimeFigureOut">
               <a:rPr lang="en-US" smtClean="0"/>
               <a:pPr/>
-              <a:t>6/25/2021</a:t>
+              <a:t>6/27/2021</a:t>
             </a:fld>
             <a:endParaRPr lang="en-US" dirty="0"/>
           </a:p>
@@ -2551,7 +2553,7 @@
             <a:fld id="{E3D07B0C-BD95-41BE-BB3E-AC75822DF381}" type="datetimeFigureOut">
               <a:rPr lang="en-US" smtClean="0"/>
               <a:pPr/>
-              <a:t>6/25/2021</a:t>
+              <a:t>6/27/2021</a:t>
             </a:fld>
             <a:endParaRPr lang="en-US" dirty="0"/>
           </a:p>
@@ -2869,7 +2871,7 @@
             <a:fld id="{E3D07B0C-BD95-41BE-BB3E-AC75822DF381}" type="datetimeFigureOut">
               <a:rPr lang="en-US" smtClean="0"/>
               <a:pPr/>
-              <a:t>6/25/2021</a:t>
+              <a:t>6/27/2021</a:t>
             </a:fld>
             <a:endParaRPr lang="en-US" dirty="0"/>
           </a:p>
@@ -3251,7 +3253,7 @@
             <a:fld id="{E3D07B0C-BD95-41BE-BB3E-AC75822DF381}" type="datetimeFigureOut">
               <a:rPr lang="en-US" smtClean="0"/>
               <a:pPr/>
-              <a:t>6/25/2021</a:t>
+              <a:t>6/27/2021</a:t>
             </a:fld>
             <a:endParaRPr lang="en-US" dirty="0"/>
           </a:p>
@@ -19209,8 +19211,8 @@
           </a:fontRef>
         </p:style>
       </p:cxnSp>
-      <mc:AlternateContent xmlns:mc="http://schemas.openxmlformats.org/markup-compatibility/2006">
-        <mc:Choice xmlns:a14="http://schemas.microsoft.com/office/drawing/2010/main" Requires="a14">
+      <mc:AlternateContent xmlns:mc="http://schemas.openxmlformats.org/markup-compatibility/2006" xmlns:a14="http://schemas.microsoft.com/office/drawing/2010/main">
+        <mc:Choice Requires="a14">
           <p:sp>
             <p:nvSpPr>
               <p:cNvPr id="8" name="TextBox 7">
@@ -19270,7 +19272,7 @@
             </p:txBody>
           </p:sp>
         </mc:Choice>
-        <mc:Fallback>
+        <mc:Fallback xmlns="">
           <p:sp>
             <p:nvSpPr>
               <p:cNvPr id="8" name="TextBox 7">
@@ -19315,8 +19317,8 @@
           </p:sp>
         </mc:Fallback>
       </mc:AlternateContent>
-      <mc:AlternateContent xmlns:mc="http://schemas.openxmlformats.org/markup-compatibility/2006">
-        <mc:Choice xmlns:a14="http://schemas.microsoft.com/office/drawing/2010/main" Requires="a14">
+      <mc:AlternateContent xmlns:mc="http://schemas.openxmlformats.org/markup-compatibility/2006" xmlns:a14="http://schemas.microsoft.com/office/drawing/2010/main">
+        <mc:Choice Requires="a14">
           <p:sp>
             <p:nvSpPr>
               <p:cNvPr id="9" name="TextBox 8">
@@ -19376,7 +19378,7 @@
             </p:txBody>
           </p:sp>
         </mc:Choice>
-        <mc:Fallback>
+        <mc:Fallback xmlns="">
           <p:sp>
             <p:nvSpPr>
               <p:cNvPr id="9" name="TextBox 8">
@@ -19421,8 +19423,8 @@
           </p:sp>
         </mc:Fallback>
       </mc:AlternateContent>
-      <mc:AlternateContent xmlns:mc="http://schemas.openxmlformats.org/markup-compatibility/2006">
-        <mc:Choice xmlns:a14="http://schemas.microsoft.com/office/drawing/2010/main" Requires="a14">
+      <mc:AlternateContent xmlns:mc="http://schemas.openxmlformats.org/markup-compatibility/2006" xmlns:a14="http://schemas.microsoft.com/office/drawing/2010/main">
+        <mc:Choice Requires="a14">
           <p:sp>
             <p:nvSpPr>
               <p:cNvPr id="10" name="TextBox 9">
@@ -19490,7 +19492,7 @@
             </p:txBody>
           </p:sp>
         </mc:Choice>
-        <mc:Fallback>
+        <mc:Fallback xmlns="">
           <p:sp>
             <p:nvSpPr>
               <p:cNvPr id="10" name="TextBox 9">
@@ -19535,8 +19537,8 @@
           </p:sp>
         </mc:Fallback>
       </mc:AlternateContent>
-      <mc:AlternateContent xmlns:mc="http://schemas.openxmlformats.org/markup-compatibility/2006">
-        <mc:Choice xmlns:a14="http://schemas.microsoft.com/office/drawing/2010/main" Requires="a14">
+      <mc:AlternateContent xmlns:mc="http://schemas.openxmlformats.org/markup-compatibility/2006" xmlns:a14="http://schemas.microsoft.com/office/drawing/2010/main">
+        <mc:Choice Requires="a14">
           <p:sp>
             <p:nvSpPr>
               <p:cNvPr id="11" name="TextBox 10">
@@ -19598,7 +19600,7 @@
             </p:txBody>
           </p:sp>
         </mc:Choice>
-        <mc:Fallback>
+        <mc:Fallback xmlns="">
           <p:sp>
             <p:nvSpPr>
               <p:cNvPr id="11" name="TextBox 10">
@@ -19948,8 +19950,8 @@
           </a:fontRef>
         </p:style>
       </p:cxnSp>
-      <mc:AlternateContent xmlns:mc="http://schemas.openxmlformats.org/markup-compatibility/2006">
-        <mc:Choice xmlns:a14="http://schemas.microsoft.com/office/drawing/2010/main" Requires="a14">
+      <mc:AlternateContent xmlns:mc="http://schemas.openxmlformats.org/markup-compatibility/2006" xmlns:a14="http://schemas.microsoft.com/office/drawing/2010/main">
+        <mc:Choice Requires="a14">
           <p:sp>
             <p:nvSpPr>
               <p:cNvPr id="19" name="TextBox 18">
@@ -20011,7 +20013,7 @@
             </p:txBody>
           </p:sp>
         </mc:Choice>
-        <mc:Fallback>
+        <mc:Fallback xmlns="">
           <p:sp>
             <p:nvSpPr>
               <p:cNvPr id="19" name="TextBox 18">
@@ -20056,8 +20058,8 @@
           </p:sp>
         </mc:Fallback>
       </mc:AlternateContent>
-      <mc:AlternateContent xmlns:mc="http://schemas.openxmlformats.org/markup-compatibility/2006">
-        <mc:Choice xmlns:a14="http://schemas.microsoft.com/office/drawing/2010/main" Requires="a14">
+      <mc:AlternateContent xmlns:mc="http://schemas.openxmlformats.org/markup-compatibility/2006" xmlns:a14="http://schemas.microsoft.com/office/drawing/2010/main">
+        <mc:Choice Requires="a14">
           <p:sp>
             <p:nvSpPr>
               <p:cNvPr id="20" name="TextBox 19">
@@ -20119,7 +20121,7 @@
             </p:txBody>
           </p:sp>
         </mc:Choice>
-        <mc:Fallback>
+        <mc:Fallback xmlns="">
           <p:sp>
             <p:nvSpPr>
               <p:cNvPr id="20" name="TextBox 19">
@@ -21912,8 +21914,8 @@
           </a:fontRef>
         </p:style>
       </p:cxnSp>
-      <mc:AlternateContent xmlns:mc="http://schemas.openxmlformats.org/markup-compatibility/2006">
-        <mc:Choice xmlns:a14="http://schemas.microsoft.com/office/drawing/2010/main" Requires="a14">
+      <mc:AlternateContent xmlns:mc="http://schemas.openxmlformats.org/markup-compatibility/2006" xmlns:a14="http://schemas.microsoft.com/office/drawing/2010/main">
+        <mc:Choice Requires="a14">
           <p:sp>
             <p:nvSpPr>
               <p:cNvPr id="9" name="TextBox 8">
@@ -21973,7 +21975,7 @@
             </p:txBody>
           </p:sp>
         </mc:Choice>
-        <mc:Fallback>
+        <mc:Fallback xmlns="">
           <p:sp>
             <p:nvSpPr>
               <p:cNvPr id="9" name="TextBox 8">
@@ -22018,8 +22020,8 @@
           </p:sp>
         </mc:Fallback>
       </mc:AlternateContent>
-      <mc:AlternateContent xmlns:mc="http://schemas.openxmlformats.org/markup-compatibility/2006">
-        <mc:Choice xmlns:a14="http://schemas.microsoft.com/office/drawing/2010/main" Requires="a14">
+      <mc:AlternateContent xmlns:mc="http://schemas.openxmlformats.org/markup-compatibility/2006" xmlns:a14="http://schemas.microsoft.com/office/drawing/2010/main">
+        <mc:Choice Requires="a14">
           <p:sp>
             <p:nvSpPr>
               <p:cNvPr id="10" name="TextBox 9">
@@ -22079,7 +22081,7 @@
             </p:txBody>
           </p:sp>
         </mc:Choice>
-        <mc:Fallback>
+        <mc:Fallback xmlns="">
           <p:sp>
             <p:nvSpPr>
               <p:cNvPr id="10" name="TextBox 9">
@@ -22124,8 +22126,8 @@
           </p:sp>
         </mc:Fallback>
       </mc:AlternateContent>
-      <mc:AlternateContent xmlns:mc="http://schemas.openxmlformats.org/markup-compatibility/2006">
-        <mc:Choice xmlns:a14="http://schemas.microsoft.com/office/drawing/2010/main" Requires="a14">
+      <mc:AlternateContent xmlns:mc="http://schemas.openxmlformats.org/markup-compatibility/2006" xmlns:a14="http://schemas.microsoft.com/office/drawing/2010/main">
+        <mc:Choice Requires="a14">
           <p:sp>
             <p:nvSpPr>
               <p:cNvPr id="11" name="TextBox 10">
@@ -22187,7 +22189,7 @@
             </p:txBody>
           </p:sp>
         </mc:Choice>
-        <mc:Fallback>
+        <mc:Fallback xmlns="">
           <p:sp>
             <p:nvSpPr>
               <p:cNvPr id="11" name="TextBox 10">
@@ -22232,8 +22234,8 @@
           </p:sp>
         </mc:Fallback>
       </mc:AlternateContent>
-      <mc:AlternateContent xmlns:mc="http://schemas.openxmlformats.org/markup-compatibility/2006">
-        <mc:Choice xmlns:a14="http://schemas.microsoft.com/office/drawing/2010/main" Requires="a14">
+      <mc:AlternateContent xmlns:mc="http://schemas.openxmlformats.org/markup-compatibility/2006" xmlns:a14="http://schemas.microsoft.com/office/drawing/2010/main">
+        <mc:Choice Requires="a14">
           <p:sp>
             <p:nvSpPr>
               <p:cNvPr id="12" name="TextBox 11">
@@ -22295,7 +22297,7 @@
             </p:txBody>
           </p:sp>
         </mc:Choice>
-        <mc:Fallback>
+        <mc:Fallback xmlns="">
           <p:sp>
             <p:nvSpPr>
               <p:cNvPr id="12" name="TextBox 11">
@@ -22463,6 +22465,2124 @@
     <p:extLst>
       <p:ext uri="{BB962C8B-B14F-4D97-AF65-F5344CB8AC3E}">
         <p14:creationId xmlns:p14="http://schemas.microsoft.com/office/powerpoint/2010/main" val="483842107"/>
+      </p:ext>
+    </p:extLst>
+  </p:cSld>
+  <p:clrMapOvr>
+    <a:masterClrMapping/>
+  </p:clrMapOvr>
+</p:sld>
+</file>
+
+<file path=ppt/slides/slide21.xml><?xml version="1.0" encoding="utf-8"?>
+<p:sld xmlns:a="http://schemas.openxmlformats.org/drawingml/2006/main" xmlns:r="http://schemas.openxmlformats.org/officeDocument/2006/relationships" xmlns:p="http://schemas.openxmlformats.org/presentationml/2006/main">
+  <p:cSld>
+    <p:spTree>
+      <p:nvGrpSpPr>
+        <p:cNvPr id="1" name=""/>
+        <p:cNvGrpSpPr/>
+        <p:nvPr/>
+      </p:nvGrpSpPr>
+      <p:grpSpPr>
+        <a:xfrm>
+          <a:off x="0" y="0"/>
+          <a:ext cx="0" cy="0"/>
+          <a:chOff x="0" y="0"/>
+          <a:chExt cx="0" cy="0"/>
+        </a:xfrm>
+      </p:grpSpPr>
+      <p:sp>
+        <p:nvSpPr>
+          <p:cNvPr id="2" name="Rectangle 1">
+            <a:extLst>
+              <a:ext uri="{FF2B5EF4-FFF2-40B4-BE49-F238E27FC236}">
+                <a16:creationId xmlns:a16="http://schemas.microsoft.com/office/drawing/2014/main" id="{6D370F31-A304-4D50-A94A-FA1851FBE3F1}"/>
+              </a:ext>
+            </a:extLst>
+          </p:cNvPr>
+          <p:cNvSpPr/>
+          <p:nvPr/>
+        </p:nvSpPr>
+        <p:spPr>
+          <a:xfrm>
+            <a:off x="1652016" y="1829016"/>
+            <a:ext cx="4267200" cy="2324099"/>
+          </a:xfrm>
+          <a:prstGeom prst="rect">
+            <a:avLst/>
+          </a:prstGeom>
+          <a:noFill/>
+          <a:ln w="9525">
+            <a:prstDash val="sysDash"/>
+          </a:ln>
+        </p:spPr>
+        <p:style>
+          <a:lnRef idx="2">
+            <a:schemeClr val="accent1">
+              <a:shade val="50000"/>
+            </a:schemeClr>
+          </a:lnRef>
+          <a:fillRef idx="1">
+            <a:schemeClr val="accent1"/>
+          </a:fillRef>
+          <a:effectRef idx="0">
+            <a:schemeClr val="accent1"/>
+          </a:effectRef>
+          <a:fontRef idx="minor">
+            <a:schemeClr val="lt1"/>
+          </a:fontRef>
+        </p:style>
+        <p:txBody>
+          <a:bodyPr rtlCol="0" anchor="ctr"/>
+          <a:lstStyle/>
+          <a:p>
+            <a:pPr algn="ctr"/>
+            <a:endParaRPr lang="en-US" sz="800"/>
+          </a:p>
+        </p:txBody>
+      </p:sp>
+      <p:sp>
+        <p:nvSpPr>
+          <p:cNvPr id="3" name="TextBox 2">
+            <a:extLst>
+              <a:ext uri="{FF2B5EF4-FFF2-40B4-BE49-F238E27FC236}">
+                <a16:creationId xmlns:a16="http://schemas.microsoft.com/office/drawing/2014/main" id="{7706EFFA-FE9E-4953-9EC4-D5DE5BB6E9EA}"/>
+              </a:ext>
+            </a:extLst>
+          </p:cNvPr>
+          <p:cNvSpPr txBox="1"/>
+          <p:nvPr/>
+        </p:nvSpPr>
+        <p:spPr>
+          <a:xfrm>
+            <a:off x="3056442" y="4301734"/>
+            <a:ext cx="2125158" cy="338554"/>
+          </a:xfrm>
+          <a:prstGeom prst="rect">
+            <a:avLst/>
+          </a:prstGeom>
+          <a:noFill/>
+          <a:ln>
+            <a:noFill/>
+          </a:ln>
+        </p:spPr>
+        <p:txBody>
+          <a:bodyPr wrap="square" lIns="0" rIns="0" rtlCol="0">
+            <a:spAutoFit/>
+          </a:bodyPr>
+          <a:lstStyle/>
+          <a:p>
+            <a:r>
+              <a:rPr lang="en-US" altLang="zh-TW" sz="1600" dirty="0"/>
+              <a:t>Figure 9-28</a:t>
+            </a:r>
+            <a:endParaRPr lang="zh-TW" altLang="en-US" sz="1600" baseline="-25000" dirty="0"/>
+          </a:p>
+        </p:txBody>
+      </p:sp>
+      <p:sp>
+        <p:nvSpPr>
+          <p:cNvPr id="4" name="Rectangle 3">
+            <a:extLst>
+              <a:ext uri="{FF2B5EF4-FFF2-40B4-BE49-F238E27FC236}">
+                <a16:creationId xmlns:a16="http://schemas.microsoft.com/office/drawing/2014/main" id="{BCA871AE-DA83-474A-9728-E3CF40ADF98C}"/>
+              </a:ext>
+            </a:extLst>
+          </p:cNvPr>
+          <p:cNvSpPr/>
+          <p:nvPr/>
+        </p:nvSpPr>
+        <p:spPr>
+          <a:xfrm>
+            <a:off x="3268265" y="2755715"/>
+            <a:ext cx="457200" cy="736387"/>
+          </a:xfrm>
+          <a:prstGeom prst="rect">
+            <a:avLst/>
+          </a:prstGeom>
+          <a:noFill/>
+          <a:ln w="12700">
+            <a:solidFill>
+              <a:schemeClr val="tx1"/>
+            </a:solidFill>
+          </a:ln>
+        </p:spPr>
+        <p:style>
+          <a:lnRef idx="2">
+            <a:schemeClr val="accent1">
+              <a:shade val="50000"/>
+            </a:schemeClr>
+          </a:lnRef>
+          <a:fillRef idx="1">
+            <a:schemeClr val="accent1"/>
+          </a:fillRef>
+          <a:effectRef idx="0">
+            <a:schemeClr val="accent1"/>
+          </a:effectRef>
+          <a:fontRef idx="minor">
+            <a:schemeClr val="lt1"/>
+          </a:fontRef>
+        </p:style>
+        <p:txBody>
+          <a:bodyPr rtlCol="0" anchor="ctr"/>
+          <a:lstStyle/>
+          <a:p>
+            <a:pPr algn="ctr"/>
+            <a:endParaRPr lang="en-US"/>
+          </a:p>
+        </p:txBody>
+      </p:sp>
+      <p:cxnSp>
+        <p:nvCxnSpPr>
+          <p:cNvPr id="5" name="Straight Connector 4">
+            <a:extLst>
+              <a:ext uri="{FF2B5EF4-FFF2-40B4-BE49-F238E27FC236}">
+                <a16:creationId xmlns:a16="http://schemas.microsoft.com/office/drawing/2014/main" id="{C3F8E844-5A55-40EE-8140-96CF9D7461A2}"/>
+              </a:ext>
+            </a:extLst>
+          </p:cNvPr>
+          <p:cNvCxnSpPr/>
+          <p:nvPr/>
+        </p:nvCxnSpPr>
+        <p:spPr>
+          <a:xfrm>
+            <a:off x="3268265" y="3383912"/>
+            <a:ext cx="594360" cy="463"/>
+          </a:xfrm>
+          <a:prstGeom prst="line">
+            <a:avLst/>
+          </a:prstGeom>
+          <a:ln w="9525">
+            <a:solidFill>
+              <a:schemeClr val="tx1"/>
+            </a:solidFill>
+            <a:tailEnd type="triangle" w="sm" len="sm"/>
+          </a:ln>
+        </p:spPr>
+        <p:style>
+          <a:lnRef idx="1">
+            <a:schemeClr val="accent1"/>
+          </a:lnRef>
+          <a:fillRef idx="0">
+            <a:schemeClr val="accent1"/>
+          </a:fillRef>
+          <a:effectRef idx="0">
+            <a:schemeClr val="accent1"/>
+          </a:effectRef>
+          <a:fontRef idx="minor">
+            <a:schemeClr val="tx1"/>
+          </a:fontRef>
+        </p:style>
+      </p:cxnSp>
+      <p:sp>
+        <p:nvSpPr>
+          <p:cNvPr id="6" name="椭圆 35">
+            <a:extLst>
+              <a:ext uri="{FF2B5EF4-FFF2-40B4-BE49-F238E27FC236}">
+                <a16:creationId xmlns:a16="http://schemas.microsoft.com/office/drawing/2014/main" id="{6F03759A-60AC-4AC0-948C-9B8B0B9D9D1E}"/>
+              </a:ext>
+            </a:extLst>
+          </p:cNvPr>
+          <p:cNvSpPr/>
+          <p:nvPr/>
+        </p:nvSpPr>
+        <p:spPr>
+          <a:xfrm>
+            <a:off x="3478865" y="3105908"/>
+            <a:ext cx="36000" cy="36000"/>
+          </a:xfrm>
+          <a:prstGeom prst="ellipse">
+            <a:avLst/>
+          </a:prstGeom>
+          <a:solidFill>
+            <a:schemeClr val="tx1"/>
+          </a:solidFill>
+          <a:ln>
+            <a:noFill/>
+          </a:ln>
+        </p:spPr>
+        <p:style>
+          <a:lnRef idx="2">
+            <a:schemeClr val="accent1">
+              <a:shade val="50000"/>
+            </a:schemeClr>
+          </a:lnRef>
+          <a:fillRef idx="1">
+            <a:schemeClr val="accent1"/>
+          </a:fillRef>
+          <a:effectRef idx="0">
+            <a:schemeClr val="accent1"/>
+          </a:effectRef>
+          <a:fontRef idx="minor">
+            <a:schemeClr val="lt1"/>
+          </a:fontRef>
+        </p:style>
+        <p:txBody>
+          <a:bodyPr rtlCol="0" anchor="ctr"/>
+          <a:lstStyle/>
+          <a:p>
+            <a:pPr algn="ctr"/>
+            <a:endParaRPr lang="zh-CN" altLang="en-US"/>
+          </a:p>
+        </p:txBody>
+      </p:sp>
+      <p:sp>
+        <p:nvSpPr>
+          <p:cNvPr id="7" name="椭圆 35">
+            <a:extLst>
+              <a:ext uri="{FF2B5EF4-FFF2-40B4-BE49-F238E27FC236}">
+                <a16:creationId xmlns:a16="http://schemas.microsoft.com/office/drawing/2014/main" id="{2350497D-6493-4C1D-B789-2C886844105E}"/>
+              </a:ext>
+            </a:extLst>
+          </p:cNvPr>
+          <p:cNvSpPr/>
+          <p:nvPr/>
+        </p:nvSpPr>
+        <p:spPr>
+          <a:xfrm>
+            <a:off x="3248553" y="3370085"/>
+            <a:ext cx="36000" cy="36000"/>
+          </a:xfrm>
+          <a:prstGeom prst="ellipse">
+            <a:avLst/>
+          </a:prstGeom>
+          <a:solidFill>
+            <a:schemeClr val="tx1"/>
+          </a:solidFill>
+          <a:ln>
+            <a:noFill/>
+          </a:ln>
+        </p:spPr>
+        <p:style>
+          <a:lnRef idx="2">
+            <a:schemeClr val="accent1">
+              <a:shade val="50000"/>
+            </a:schemeClr>
+          </a:lnRef>
+          <a:fillRef idx="1">
+            <a:schemeClr val="accent1"/>
+          </a:fillRef>
+          <a:effectRef idx="0">
+            <a:schemeClr val="accent1"/>
+          </a:effectRef>
+          <a:fontRef idx="minor">
+            <a:schemeClr val="lt1"/>
+          </a:fontRef>
+        </p:style>
+        <p:txBody>
+          <a:bodyPr rtlCol="0" anchor="ctr"/>
+          <a:lstStyle/>
+          <a:p>
+            <a:pPr algn="ctr"/>
+            <a:endParaRPr lang="zh-CN" altLang="en-US"/>
+          </a:p>
+        </p:txBody>
+      </p:sp>
+      <p:cxnSp>
+        <p:nvCxnSpPr>
+          <p:cNvPr id="8" name="Straight Connector 7">
+            <a:extLst>
+              <a:ext uri="{FF2B5EF4-FFF2-40B4-BE49-F238E27FC236}">
+                <a16:creationId xmlns:a16="http://schemas.microsoft.com/office/drawing/2014/main" id="{2DD9CB33-9CAC-4BE9-A400-5B9AF945645C}"/>
+              </a:ext>
+            </a:extLst>
+          </p:cNvPr>
+          <p:cNvCxnSpPr>
+            <a:stCxn id="6" idx="3"/>
+            <a:endCxn id="7" idx="7"/>
+          </p:cNvCxnSpPr>
+          <p:nvPr/>
+        </p:nvCxnSpPr>
+        <p:spPr>
+          <a:xfrm flipH="1">
+            <a:off x="3279281" y="3136636"/>
+            <a:ext cx="204856" cy="238721"/>
+          </a:xfrm>
+          <a:prstGeom prst="line">
+            <a:avLst/>
+          </a:prstGeom>
+          <a:ln w="9525">
+            <a:solidFill>
+              <a:schemeClr val="tx1"/>
+            </a:solidFill>
+            <a:tailEnd type="triangle" w="sm" len="sm"/>
+          </a:ln>
+        </p:spPr>
+        <p:style>
+          <a:lnRef idx="1">
+            <a:schemeClr val="accent1"/>
+          </a:lnRef>
+          <a:fillRef idx="0">
+            <a:schemeClr val="accent1"/>
+          </a:fillRef>
+          <a:effectRef idx="0">
+            <a:schemeClr val="accent1"/>
+          </a:effectRef>
+          <a:fontRef idx="minor">
+            <a:schemeClr val="tx1"/>
+          </a:fontRef>
+        </p:style>
+      </p:cxnSp>
+      <p:cxnSp>
+        <p:nvCxnSpPr>
+          <p:cNvPr id="9" name="Straight Connector 8">
+            <a:extLst>
+              <a:ext uri="{FF2B5EF4-FFF2-40B4-BE49-F238E27FC236}">
+                <a16:creationId xmlns:a16="http://schemas.microsoft.com/office/drawing/2014/main" id="{3701B1C8-87C3-4274-B8D3-949617EA5ECD}"/>
+              </a:ext>
+            </a:extLst>
+          </p:cNvPr>
+          <p:cNvCxnSpPr/>
+          <p:nvPr/>
+        </p:nvCxnSpPr>
+        <p:spPr>
+          <a:xfrm>
+            <a:off x="3493722" y="3122940"/>
+            <a:ext cx="548640" cy="0"/>
+          </a:xfrm>
+          <a:prstGeom prst="line">
+            <a:avLst/>
+          </a:prstGeom>
+          <a:ln w="9525">
+            <a:solidFill>
+              <a:schemeClr val="tx1"/>
+            </a:solidFill>
+            <a:tailEnd type="triangle" w="sm" len="sm"/>
+          </a:ln>
+        </p:spPr>
+        <p:style>
+          <a:lnRef idx="1">
+            <a:schemeClr val="accent1"/>
+          </a:lnRef>
+          <a:fillRef idx="0">
+            <a:schemeClr val="accent1"/>
+          </a:fillRef>
+          <a:effectRef idx="0">
+            <a:schemeClr val="accent1"/>
+          </a:effectRef>
+          <a:fontRef idx="minor">
+            <a:schemeClr val="tx1"/>
+          </a:fontRef>
+        </p:style>
+      </p:cxnSp>
+      <mc:AlternateContent xmlns:mc="http://schemas.openxmlformats.org/markup-compatibility/2006">
+        <mc:Choice xmlns:a14="http://schemas.microsoft.com/office/drawing/2010/main" Requires="a14">
+          <p:sp>
+            <p:nvSpPr>
+              <p:cNvPr id="10" name="TextBox 9">
+                <a:extLst>
+                  <a:ext uri="{FF2B5EF4-FFF2-40B4-BE49-F238E27FC236}">
+                    <a16:creationId xmlns:a16="http://schemas.microsoft.com/office/drawing/2014/main" id="{570D2F0E-CE59-413F-AFCA-93D09185D680}"/>
+                  </a:ext>
+                </a:extLst>
+              </p:cNvPr>
+              <p:cNvSpPr txBox="1"/>
+              <p:nvPr/>
+            </p:nvSpPr>
+            <p:spPr>
+              <a:xfrm>
+                <a:off x="3889804" y="3254957"/>
+                <a:ext cx="177997" cy="230256"/>
+              </a:xfrm>
+              <a:prstGeom prst="rect">
+                <a:avLst/>
+              </a:prstGeom>
+              <a:noFill/>
+            </p:spPr>
+            <p:txBody>
+              <a:bodyPr wrap="square" lIns="0" rIns="0" rtlCol="0">
+                <a:spAutoFit/>
+              </a:bodyPr>
+              <a:lstStyle/>
+              <a:p>
+                <a14:m>
+                  <m:oMath xmlns:m="http://schemas.openxmlformats.org/officeDocument/2006/math">
+                    <m:acc>
+                      <m:accPr>
+                        <m:chr m:val="⃑"/>
+                        <m:ctrlPr>
+                          <a:rPr lang="en-US" altLang="zh-CN" sz="800" i="1" smtClean="0">
+                            <a:latin typeface="Cambria Math" panose="02040503050406030204" pitchFamily="18" charset="0"/>
+                          </a:rPr>
+                        </m:ctrlPr>
+                      </m:accPr>
+                      <m:e>
+                        <m:r>
+                          <a:rPr lang="en-US" altLang="zh-CN" sz="800" b="0" i="1" smtClean="0">
+                            <a:latin typeface="Cambria Math" panose="02040503050406030204" pitchFamily="18" charset="0"/>
+                          </a:rPr>
+                          <m:t>𝑉</m:t>
+                        </m:r>
+                      </m:e>
+                    </m:acc>
+                  </m:oMath>
+                </a14:m>
+                <a:r>
+                  <a:rPr lang="en-US" altLang="zh-CN" sz="800" baseline="-25000" dirty="0"/>
+                  <a:t>AP1</a:t>
+                </a:r>
+                <a:endParaRPr lang="zh-CN" altLang="en-US" sz="800" baseline="-25000" dirty="0"/>
+              </a:p>
+            </p:txBody>
+          </p:sp>
+        </mc:Choice>
+        <mc:Fallback>
+          <p:sp>
+            <p:nvSpPr>
+              <p:cNvPr id="10" name="TextBox 9">
+                <a:extLst>
+                  <a:ext uri="{FF2B5EF4-FFF2-40B4-BE49-F238E27FC236}">
+                    <a16:creationId xmlns:a16="http://schemas.microsoft.com/office/drawing/2014/main" id="{570D2F0E-CE59-413F-AFCA-93D09185D680}"/>
+                  </a:ext>
+                </a:extLst>
+              </p:cNvPr>
+              <p:cNvSpPr txBox="1">
+                <a:spLocks noRot="1" noChangeAspect="1" noMove="1" noResize="1" noEditPoints="1" noAdjustHandles="1" noChangeArrowheads="1" noChangeShapeType="1" noTextEdit="1"/>
+              </p:cNvSpPr>
+              <p:nvPr/>
+            </p:nvSpPr>
+            <p:spPr>
+              <a:xfrm>
+                <a:off x="3889804" y="3254957"/>
+                <a:ext cx="177997" cy="230256"/>
+              </a:xfrm>
+              <a:prstGeom prst="rect">
+                <a:avLst/>
+              </a:prstGeom>
+              <a:blipFill>
+                <a:blip r:embed="rId2"/>
+                <a:stretch>
+                  <a:fillRect l="-20690" r="-24138" b="-2632"/>
+                </a:stretch>
+              </a:blipFill>
+            </p:spPr>
+            <p:txBody>
+              <a:bodyPr/>
+              <a:lstStyle/>
+              <a:p>
+                <a:r>
+                  <a:rPr lang="en-US">
+                    <a:noFill/>
+                  </a:rPr>
+                  <a:t> </a:t>
+                </a:r>
+              </a:p>
+            </p:txBody>
+          </p:sp>
+        </mc:Fallback>
+      </mc:AlternateContent>
+      <p:sp>
+        <p:nvSpPr>
+          <p:cNvPr id="11" name="TextBox 10">
+            <a:extLst>
+              <a:ext uri="{FF2B5EF4-FFF2-40B4-BE49-F238E27FC236}">
+                <a16:creationId xmlns:a16="http://schemas.microsoft.com/office/drawing/2014/main" id="{B334A0D7-A29B-45E6-A97C-E7631230D1BF}"/>
+              </a:ext>
+            </a:extLst>
+          </p:cNvPr>
+          <p:cNvSpPr txBox="1">
+            <a:spLocks noChangeAspect="1"/>
+          </p:cNvSpPr>
+          <p:nvPr/>
+        </p:nvSpPr>
+        <p:spPr>
+          <a:xfrm>
+            <a:off x="3465141" y="2579654"/>
+            <a:ext cx="67326" cy="230832"/>
+          </a:xfrm>
+          <a:prstGeom prst="rect">
+            <a:avLst/>
+          </a:prstGeom>
+          <a:noFill/>
+        </p:spPr>
+        <p:txBody>
+          <a:bodyPr wrap="none" lIns="0" rIns="0" rtlCol="0">
+            <a:spAutoFit/>
+          </a:bodyPr>
+          <a:lstStyle/>
+          <a:p>
+            <a:r>
+              <a:rPr lang="en-US" altLang="zh-CN" sz="900" dirty="0"/>
+              <a:t>A</a:t>
+            </a:r>
+            <a:endParaRPr lang="zh-CN" altLang="en-US" sz="900" dirty="0"/>
+          </a:p>
+        </p:txBody>
+      </p:sp>
+      <mc:AlternateContent xmlns:mc="http://schemas.openxmlformats.org/markup-compatibility/2006">
+        <mc:Choice xmlns:a14="http://schemas.microsoft.com/office/drawing/2010/main" Requires="a14">
+          <p:sp>
+            <p:nvSpPr>
+              <p:cNvPr id="12" name="TextBox 11">
+                <a:extLst>
+                  <a:ext uri="{FF2B5EF4-FFF2-40B4-BE49-F238E27FC236}">
+                    <a16:creationId xmlns:a16="http://schemas.microsoft.com/office/drawing/2014/main" id="{D771A4BD-D487-42DA-B63D-0329675237C1}"/>
+                  </a:ext>
+                </a:extLst>
+              </p:cNvPr>
+              <p:cNvSpPr txBox="1"/>
+              <p:nvPr/>
+            </p:nvSpPr>
+            <p:spPr>
+              <a:xfrm>
+                <a:off x="4063969" y="2990780"/>
+                <a:ext cx="142731" cy="230256"/>
+              </a:xfrm>
+              <a:prstGeom prst="rect">
+                <a:avLst/>
+              </a:prstGeom>
+              <a:noFill/>
+            </p:spPr>
+            <p:txBody>
+              <a:bodyPr wrap="none" lIns="0" rIns="0" rtlCol="0">
+                <a:spAutoFit/>
+              </a:bodyPr>
+              <a:lstStyle/>
+              <a:p>
+                <a14:m>
+                  <m:oMath xmlns:m="http://schemas.openxmlformats.org/officeDocument/2006/math">
+                    <m:acc>
+                      <m:accPr>
+                        <m:chr m:val="⃑"/>
+                        <m:ctrlPr>
+                          <a:rPr lang="en-US" altLang="zh-CN" sz="800" i="1" smtClean="0">
+                            <a:latin typeface="Cambria Math" panose="02040503050406030204" pitchFamily="18" charset="0"/>
+                          </a:rPr>
+                        </m:ctrlPr>
+                      </m:accPr>
+                      <m:e>
+                        <m:r>
+                          <a:rPr lang="en-US" altLang="zh-CN" sz="800" b="0" i="1" smtClean="0">
+                            <a:latin typeface="Cambria Math" panose="02040503050406030204" pitchFamily="18" charset="0"/>
+                          </a:rPr>
+                          <m:t>𝑉</m:t>
+                        </m:r>
+                      </m:e>
+                    </m:acc>
+                  </m:oMath>
+                </a14:m>
+                <a:r>
+                  <a:rPr lang="en-US" altLang="zh-CN" sz="800" baseline="-25000" dirty="0"/>
+                  <a:t>A1</a:t>
+                </a:r>
+                <a:endParaRPr lang="zh-CN" altLang="en-US" sz="800" baseline="-25000" dirty="0"/>
+              </a:p>
+            </p:txBody>
+          </p:sp>
+        </mc:Choice>
+        <mc:Fallback>
+          <p:sp>
+            <p:nvSpPr>
+              <p:cNvPr id="12" name="TextBox 11">
+                <a:extLst>
+                  <a:ext uri="{FF2B5EF4-FFF2-40B4-BE49-F238E27FC236}">
+                    <a16:creationId xmlns:a16="http://schemas.microsoft.com/office/drawing/2014/main" id="{D771A4BD-D487-42DA-B63D-0329675237C1}"/>
+                  </a:ext>
+                </a:extLst>
+              </p:cNvPr>
+              <p:cNvSpPr txBox="1">
+                <a:spLocks noRot="1" noChangeAspect="1" noMove="1" noResize="1" noEditPoints="1" noAdjustHandles="1" noChangeArrowheads="1" noChangeShapeType="1" noTextEdit="1"/>
+              </p:cNvSpPr>
+              <p:nvPr/>
+            </p:nvSpPr>
+            <p:spPr>
+              <a:xfrm>
+                <a:off x="4063969" y="2990780"/>
+                <a:ext cx="142731" cy="230256"/>
+              </a:xfrm>
+              <a:prstGeom prst="rect">
+                <a:avLst/>
+              </a:prstGeom>
+              <a:blipFill>
+                <a:blip r:embed="rId3"/>
+                <a:stretch>
+                  <a:fillRect l="-26087" r="-30435" b="-5405"/>
+                </a:stretch>
+              </a:blipFill>
+            </p:spPr>
+            <p:txBody>
+              <a:bodyPr/>
+              <a:lstStyle/>
+              <a:p>
+                <a:r>
+                  <a:rPr lang="en-US">
+                    <a:noFill/>
+                  </a:rPr>
+                  <a:t> </a:t>
+                </a:r>
+              </a:p>
+            </p:txBody>
+          </p:sp>
+        </mc:Fallback>
+      </mc:AlternateContent>
+      <mc:AlternateContent xmlns:mc="http://schemas.openxmlformats.org/markup-compatibility/2006">
+        <mc:Choice xmlns:a14="http://schemas.microsoft.com/office/drawing/2010/main" Requires="a14">
+          <p:sp>
+            <p:nvSpPr>
+              <p:cNvPr id="13" name="TextBox 12">
+                <a:extLst>
+                  <a:ext uri="{FF2B5EF4-FFF2-40B4-BE49-F238E27FC236}">
+                    <a16:creationId xmlns:a16="http://schemas.microsoft.com/office/drawing/2014/main" id="{504A28D5-BE8D-4D58-85A2-6211339A5256}"/>
+                  </a:ext>
+                </a:extLst>
+              </p:cNvPr>
+              <p:cNvSpPr txBox="1"/>
+              <p:nvPr/>
+            </p:nvSpPr>
+            <p:spPr>
+              <a:xfrm>
+                <a:off x="3405335" y="3170419"/>
+                <a:ext cx="144078" cy="230256"/>
+              </a:xfrm>
+              <a:prstGeom prst="rect">
+                <a:avLst/>
+              </a:prstGeom>
+              <a:noFill/>
+            </p:spPr>
+            <p:txBody>
+              <a:bodyPr wrap="none" lIns="0" rIns="0" rtlCol="0">
+                <a:spAutoFit/>
+              </a:bodyPr>
+              <a:lstStyle/>
+              <a:p>
+                <a14:m>
+                  <m:oMath xmlns:m="http://schemas.openxmlformats.org/officeDocument/2006/math">
+                    <m:acc>
+                      <m:accPr>
+                        <m:chr m:val="⃑"/>
+                        <m:ctrlPr>
+                          <a:rPr lang="en-US" altLang="zh-CN" sz="800" i="1" smtClean="0">
+                            <a:latin typeface="Cambria Math" panose="02040503050406030204" pitchFamily="18" charset="0"/>
+                          </a:rPr>
+                        </m:ctrlPr>
+                      </m:accPr>
+                      <m:e>
+                        <m:r>
+                          <a:rPr lang="en-US" altLang="zh-CN" sz="800" b="0" i="1" smtClean="0">
+                            <a:latin typeface="Cambria Math" panose="02040503050406030204" pitchFamily="18" charset="0"/>
+                          </a:rPr>
+                          <m:t>𝑅</m:t>
+                        </m:r>
+                      </m:e>
+                    </m:acc>
+                  </m:oMath>
+                </a14:m>
+                <a:r>
+                  <a:rPr lang="en-US" altLang="zh-CN" sz="800" baseline="-25000" dirty="0"/>
+                  <a:t>AP</a:t>
+                </a:r>
+                <a:endParaRPr lang="zh-CN" altLang="en-US" sz="800" baseline="-25000" dirty="0"/>
+              </a:p>
+            </p:txBody>
+          </p:sp>
+        </mc:Choice>
+        <mc:Fallback>
+          <p:sp>
+            <p:nvSpPr>
+              <p:cNvPr id="13" name="TextBox 12">
+                <a:extLst>
+                  <a:ext uri="{FF2B5EF4-FFF2-40B4-BE49-F238E27FC236}">
+                    <a16:creationId xmlns:a16="http://schemas.microsoft.com/office/drawing/2014/main" id="{504A28D5-BE8D-4D58-85A2-6211339A5256}"/>
+                  </a:ext>
+                </a:extLst>
+              </p:cNvPr>
+              <p:cNvSpPr txBox="1">
+                <a:spLocks noRot="1" noChangeAspect="1" noMove="1" noResize="1" noEditPoints="1" noAdjustHandles="1" noChangeArrowheads="1" noChangeShapeType="1" noTextEdit="1"/>
+              </p:cNvSpPr>
+              <p:nvPr/>
+            </p:nvSpPr>
+            <p:spPr>
+              <a:xfrm>
+                <a:off x="3405335" y="3170419"/>
+                <a:ext cx="144078" cy="230256"/>
+              </a:xfrm>
+              <a:prstGeom prst="rect">
+                <a:avLst/>
+              </a:prstGeom>
+              <a:blipFill>
+                <a:blip r:embed="rId4"/>
+                <a:stretch>
+                  <a:fillRect l="-26087" r="-30435" b="-5263"/>
+                </a:stretch>
+              </a:blipFill>
+            </p:spPr>
+            <p:txBody>
+              <a:bodyPr/>
+              <a:lstStyle/>
+              <a:p>
+                <a:r>
+                  <a:rPr lang="en-US">
+                    <a:noFill/>
+                  </a:rPr>
+                  <a:t> </a:t>
+                </a:r>
+              </a:p>
+            </p:txBody>
+          </p:sp>
+        </mc:Fallback>
+      </mc:AlternateContent>
+      <p:sp>
+        <p:nvSpPr>
+          <p:cNvPr id="14" name="TextBox 13">
+            <a:extLst>
+              <a:ext uri="{FF2B5EF4-FFF2-40B4-BE49-F238E27FC236}">
+                <a16:creationId xmlns:a16="http://schemas.microsoft.com/office/drawing/2014/main" id="{8DD5D789-5C3B-4672-AFF3-AC99F0E0A56D}"/>
+              </a:ext>
+            </a:extLst>
+          </p:cNvPr>
+          <p:cNvSpPr txBox="1">
+            <a:spLocks noChangeAspect="1"/>
+          </p:cNvSpPr>
+          <p:nvPr/>
+        </p:nvSpPr>
+        <p:spPr>
+          <a:xfrm>
+            <a:off x="3168561" y="3267239"/>
+            <a:ext cx="52900" cy="215444"/>
+          </a:xfrm>
+          <a:prstGeom prst="rect">
+            <a:avLst/>
+          </a:prstGeom>
+          <a:noFill/>
+        </p:spPr>
+        <p:txBody>
+          <a:bodyPr wrap="none" lIns="0" rIns="0" rtlCol="0">
+            <a:spAutoFit/>
+          </a:bodyPr>
+          <a:lstStyle/>
+          <a:p>
+            <a:r>
+              <a:rPr lang="en-US" altLang="zh-CN" sz="800" dirty="0"/>
+              <a:t>P</a:t>
+            </a:r>
+            <a:endParaRPr lang="zh-CN" altLang="en-US" sz="800" dirty="0"/>
+          </a:p>
+        </p:txBody>
+      </p:sp>
+      <mc:AlternateContent xmlns:mc="http://schemas.openxmlformats.org/markup-compatibility/2006">
+        <mc:Choice xmlns:a14="http://schemas.microsoft.com/office/drawing/2010/main" Requires="a14">
+          <p:sp>
+            <p:nvSpPr>
+              <p:cNvPr id="15" name="TextBox 14">
+                <a:extLst>
+                  <a:ext uri="{FF2B5EF4-FFF2-40B4-BE49-F238E27FC236}">
+                    <a16:creationId xmlns:a16="http://schemas.microsoft.com/office/drawing/2014/main" id="{CF8713CB-839E-4ABF-8B48-009C4499D279}"/>
+                  </a:ext>
+                </a:extLst>
+              </p:cNvPr>
+              <p:cNvSpPr txBox="1"/>
+              <p:nvPr/>
+            </p:nvSpPr>
+            <p:spPr>
+              <a:xfrm>
+                <a:off x="3346771" y="3509133"/>
+                <a:ext cx="152286" cy="212622"/>
+              </a:xfrm>
+              <a:prstGeom prst="rect">
+                <a:avLst/>
+              </a:prstGeom>
+              <a:noFill/>
+            </p:spPr>
+            <p:txBody>
+              <a:bodyPr wrap="none" lIns="0" rIns="0" rtlCol="0">
+                <a:spAutoFit/>
+              </a:bodyPr>
+              <a:lstStyle/>
+              <a:p>
+                <a14:m>
+                  <m:oMath xmlns:m="http://schemas.openxmlformats.org/officeDocument/2006/math">
+                    <m:acc>
+                      <m:accPr>
+                        <m:chr m:val="⃑"/>
+                        <m:ctrlPr>
+                          <a:rPr lang="en-US" altLang="zh-CN" sz="800" i="1" smtClean="0">
+                            <a:latin typeface="Cambria Math" panose="02040503050406030204" pitchFamily="18" charset="0"/>
+                          </a:rPr>
+                        </m:ctrlPr>
+                      </m:accPr>
+                      <m:e>
+                        <m:r>
+                          <m:rPr>
+                            <m:sty m:val="p"/>
+                          </m:rPr>
+                          <a:rPr lang="el-GR" altLang="zh-CN" sz="800" i="1" smtClean="0">
+                            <a:latin typeface="Cambria Math" panose="02040503050406030204" pitchFamily="18" charset="0"/>
+                          </a:rPr>
+                          <m:t>ω</m:t>
+                        </m:r>
+                      </m:e>
+                    </m:acc>
+                  </m:oMath>
+                </a14:m>
+                <a:r>
+                  <a:rPr lang="en-US" altLang="zh-CN" sz="800" baseline="-25000" dirty="0"/>
+                  <a:t>A1</a:t>
+                </a:r>
+                <a:endParaRPr lang="zh-CN" altLang="en-US" sz="800" baseline="-25000" dirty="0"/>
+              </a:p>
+            </p:txBody>
+          </p:sp>
+        </mc:Choice>
+        <mc:Fallback>
+          <p:sp>
+            <p:nvSpPr>
+              <p:cNvPr id="15" name="TextBox 14">
+                <a:extLst>
+                  <a:ext uri="{FF2B5EF4-FFF2-40B4-BE49-F238E27FC236}">
+                    <a16:creationId xmlns:a16="http://schemas.microsoft.com/office/drawing/2014/main" id="{CF8713CB-839E-4ABF-8B48-009C4499D279}"/>
+                  </a:ext>
+                </a:extLst>
+              </p:cNvPr>
+              <p:cNvSpPr txBox="1">
+                <a:spLocks noRot="1" noChangeAspect="1" noMove="1" noResize="1" noEditPoints="1" noAdjustHandles="1" noChangeArrowheads="1" noChangeShapeType="1" noTextEdit="1"/>
+              </p:cNvSpPr>
+              <p:nvPr/>
+            </p:nvSpPr>
+            <p:spPr>
+              <a:xfrm>
+                <a:off x="3346771" y="3509133"/>
+                <a:ext cx="152286" cy="212622"/>
+              </a:xfrm>
+              <a:prstGeom prst="rect">
+                <a:avLst/>
+              </a:prstGeom>
+              <a:blipFill>
+                <a:blip r:embed="rId5"/>
+                <a:stretch>
+                  <a:fillRect l="-16000" r="-28000" b="-2857"/>
+                </a:stretch>
+              </a:blipFill>
+            </p:spPr>
+            <p:txBody>
+              <a:bodyPr/>
+              <a:lstStyle/>
+              <a:p>
+                <a:r>
+                  <a:rPr lang="en-US">
+                    <a:noFill/>
+                  </a:rPr>
+                  <a:t> </a:t>
+                </a:r>
+              </a:p>
+            </p:txBody>
+          </p:sp>
+        </mc:Fallback>
+      </mc:AlternateContent>
+      <p:sp>
+        <p:nvSpPr>
+          <p:cNvPr id="16" name="TextBox 15">
+            <a:extLst>
+              <a:ext uri="{FF2B5EF4-FFF2-40B4-BE49-F238E27FC236}">
+                <a16:creationId xmlns:a16="http://schemas.microsoft.com/office/drawing/2014/main" id="{5339EF5F-61BC-4043-9263-6E73E319C46E}"/>
+              </a:ext>
+            </a:extLst>
+          </p:cNvPr>
+          <p:cNvSpPr txBox="1">
+            <a:spLocks noChangeAspect="1"/>
+          </p:cNvSpPr>
+          <p:nvPr/>
+        </p:nvSpPr>
+        <p:spPr>
+          <a:xfrm>
+            <a:off x="3413785" y="2938993"/>
+            <a:ext cx="280526" cy="215444"/>
+          </a:xfrm>
+          <a:prstGeom prst="rect">
+            <a:avLst/>
+          </a:prstGeom>
+          <a:noFill/>
+        </p:spPr>
+        <p:txBody>
+          <a:bodyPr wrap="none" lIns="0" rIns="0" rtlCol="0">
+            <a:spAutoFit/>
+          </a:bodyPr>
+          <a:lstStyle/>
+          <a:p>
+            <a:r>
+              <a:rPr lang="en-US" altLang="zh-CN" sz="800" dirty="0"/>
+              <a:t>Center</a:t>
+            </a:r>
+            <a:endParaRPr lang="zh-CN" altLang="en-US" sz="800" dirty="0"/>
+          </a:p>
+        </p:txBody>
+      </p:sp>
+      <p:sp>
+        <p:nvSpPr>
+          <p:cNvPr id="17" name="Arc 16">
+            <a:extLst>
+              <a:ext uri="{FF2B5EF4-FFF2-40B4-BE49-F238E27FC236}">
+                <a16:creationId xmlns:a16="http://schemas.microsoft.com/office/drawing/2014/main" id="{8C16806E-4944-4E74-A8AD-A2E47788F59A}"/>
+              </a:ext>
+            </a:extLst>
+          </p:cNvPr>
+          <p:cNvSpPr>
+            <a:spLocks noChangeAspect="1"/>
+          </p:cNvSpPr>
+          <p:nvPr/>
+        </p:nvSpPr>
+        <p:spPr>
+          <a:xfrm rot="10800000">
+            <a:off x="3168560" y="3315686"/>
+            <a:ext cx="291983" cy="290391"/>
+          </a:xfrm>
+          <a:prstGeom prst="arc">
+            <a:avLst/>
+          </a:prstGeom>
+          <a:ln w="9525">
+            <a:solidFill>
+              <a:schemeClr val="tx1"/>
+            </a:solidFill>
+            <a:headEnd type="triangle" w="sm" len="sm"/>
+          </a:ln>
+        </p:spPr>
+        <p:style>
+          <a:lnRef idx="1">
+            <a:schemeClr val="accent1"/>
+          </a:lnRef>
+          <a:fillRef idx="0">
+            <a:schemeClr val="accent1"/>
+          </a:fillRef>
+          <a:effectRef idx="0">
+            <a:schemeClr val="accent1"/>
+          </a:effectRef>
+          <a:fontRef idx="minor">
+            <a:schemeClr val="tx1"/>
+          </a:fontRef>
+        </p:style>
+        <p:txBody>
+          <a:bodyPr rtlCol="0" anchor="ctr"/>
+          <a:lstStyle/>
+          <a:p>
+            <a:pPr algn="ctr"/>
+            <a:endParaRPr lang="en-US"/>
+          </a:p>
+        </p:txBody>
+      </p:sp>
+    </p:spTree>
+    <p:extLst>
+      <p:ext uri="{BB962C8B-B14F-4D97-AF65-F5344CB8AC3E}">
+        <p14:creationId xmlns:p14="http://schemas.microsoft.com/office/powerpoint/2010/main" val="1620025213"/>
+      </p:ext>
+    </p:extLst>
+  </p:cSld>
+  <p:clrMapOvr>
+    <a:masterClrMapping/>
+  </p:clrMapOvr>
+</p:sld>
+</file>
+
+<file path=ppt/slides/slide22.xml><?xml version="1.0" encoding="utf-8"?>
+<p:sld xmlns:a="http://schemas.openxmlformats.org/drawingml/2006/main" xmlns:r="http://schemas.openxmlformats.org/officeDocument/2006/relationships" xmlns:p="http://schemas.openxmlformats.org/presentationml/2006/main">
+  <p:cSld>
+    <p:spTree>
+      <p:nvGrpSpPr>
+        <p:cNvPr id="1" name=""/>
+        <p:cNvGrpSpPr/>
+        <p:nvPr/>
+      </p:nvGrpSpPr>
+      <p:grpSpPr>
+        <a:xfrm>
+          <a:off x="0" y="0"/>
+          <a:ext cx="0" cy="0"/>
+          <a:chOff x="0" y="0"/>
+          <a:chExt cx="0" cy="0"/>
+        </a:xfrm>
+      </p:grpSpPr>
+      <p:sp>
+        <p:nvSpPr>
+          <p:cNvPr id="2" name="Rectangle 1">
+            <a:extLst>
+              <a:ext uri="{FF2B5EF4-FFF2-40B4-BE49-F238E27FC236}">
+                <a16:creationId xmlns:a16="http://schemas.microsoft.com/office/drawing/2014/main" id="{77CA295F-440A-427E-83E0-334FE593271F}"/>
+              </a:ext>
+            </a:extLst>
+          </p:cNvPr>
+          <p:cNvSpPr/>
+          <p:nvPr/>
+        </p:nvSpPr>
+        <p:spPr>
+          <a:xfrm>
+            <a:off x="1652016" y="1829016"/>
+            <a:ext cx="4267200" cy="2324099"/>
+          </a:xfrm>
+          <a:prstGeom prst="rect">
+            <a:avLst/>
+          </a:prstGeom>
+          <a:noFill/>
+          <a:ln w="9525">
+            <a:prstDash val="sysDash"/>
+          </a:ln>
+        </p:spPr>
+        <p:style>
+          <a:lnRef idx="2">
+            <a:schemeClr val="accent1">
+              <a:shade val="50000"/>
+            </a:schemeClr>
+          </a:lnRef>
+          <a:fillRef idx="1">
+            <a:schemeClr val="accent1"/>
+          </a:fillRef>
+          <a:effectRef idx="0">
+            <a:schemeClr val="accent1"/>
+          </a:effectRef>
+          <a:fontRef idx="minor">
+            <a:schemeClr val="lt1"/>
+          </a:fontRef>
+        </p:style>
+        <p:txBody>
+          <a:bodyPr rtlCol="0" anchor="ctr"/>
+          <a:lstStyle/>
+          <a:p>
+            <a:pPr algn="ctr"/>
+            <a:endParaRPr lang="en-US" sz="800"/>
+          </a:p>
+        </p:txBody>
+      </p:sp>
+      <p:sp>
+        <p:nvSpPr>
+          <p:cNvPr id="3" name="TextBox 2">
+            <a:extLst>
+              <a:ext uri="{FF2B5EF4-FFF2-40B4-BE49-F238E27FC236}">
+                <a16:creationId xmlns:a16="http://schemas.microsoft.com/office/drawing/2014/main" id="{77D06B90-3B9E-44A3-AF6F-5C74F978533A}"/>
+              </a:ext>
+            </a:extLst>
+          </p:cNvPr>
+          <p:cNvSpPr txBox="1"/>
+          <p:nvPr/>
+        </p:nvSpPr>
+        <p:spPr>
+          <a:xfrm>
+            <a:off x="3067944" y="4301734"/>
+            <a:ext cx="2125158" cy="338554"/>
+          </a:xfrm>
+          <a:prstGeom prst="rect">
+            <a:avLst/>
+          </a:prstGeom>
+          <a:noFill/>
+          <a:ln>
+            <a:noFill/>
+          </a:ln>
+        </p:spPr>
+        <p:txBody>
+          <a:bodyPr wrap="square" lIns="0" rIns="0" rtlCol="0">
+            <a:spAutoFit/>
+          </a:bodyPr>
+          <a:lstStyle/>
+          <a:p>
+            <a:r>
+              <a:rPr lang="en-US" altLang="zh-TW" sz="1600"/>
+              <a:t>Figure 9-29</a:t>
+            </a:r>
+            <a:endParaRPr lang="zh-TW" altLang="en-US" sz="1600" baseline="-25000" dirty="0"/>
+          </a:p>
+        </p:txBody>
+      </p:sp>
+      <p:sp>
+        <p:nvSpPr>
+          <p:cNvPr id="4" name="Rectangle 3">
+            <a:extLst>
+              <a:ext uri="{FF2B5EF4-FFF2-40B4-BE49-F238E27FC236}">
+                <a16:creationId xmlns:a16="http://schemas.microsoft.com/office/drawing/2014/main" id="{CFC48D93-04D4-4CEA-A875-39CDCFA36248}"/>
+              </a:ext>
+            </a:extLst>
+          </p:cNvPr>
+          <p:cNvSpPr/>
+          <p:nvPr/>
+        </p:nvSpPr>
+        <p:spPr>
+          <a:xfrm>
+            <a:off x="3653579" y="2226628"/>
+            <a:ext cx="457200" cy="736387"/>
+          </a:xfrm>
+          <a:prstGeom prst="rect">
+            <a:avLst/>
+          </a:prstGeom>
+          <a:noFill/>
+          <a:ln w="12700">
+            <a:solidFill>
+              <a:schemeClr val="tx1"/>
+            </a:solidFill>
+          </a:ln>
+        </p:spPr>
+        <p:style>
+          <a:lnRef idx="2">
+            <a:schemeClr val="accent1">
+              <a:shade val="50000"/>
+            </a:schemeClr>
+          </a:lnRef>
+          <a:fillRef idx="1">
+            <a:schemeClr val="accent1"/>
+          </a:fillRef>
+          <a:effectRef idx="0">
+            <a:schemeClr val="accent1"/>
+          </a:effectRef>
+          <a:fontRef idx="minor">
+            <a:schemeClr val="lt1"/>
+          </a:fontRef>
+        </p:style>
+        <p:txBody>
+          <a:bodyPr rtlCol="0" anchor="ctr"/>
+          <a:lstStyle/>
+          <a:p>
+            <a:pPr algn="ctr"/>
+            <a:endParaRPr lang="en-US"/>
+          </a:p>
+        </p:txBody>
+      </p:sp>
+      <p:sp>
+        <p:nvSpPr>
+          <p:cNvPr id="5" name="椭圆 35">
+            <a:extLst>
+              <a:ext uri="{FF2B5EF4-FFF2-40B4-BE49-F238E27FC236}">
+                <a16:creationId xmlns:a16="http://schemas.microsoft.com/office/drawing/2014/main" id="{01E8C49D-3379-40B4-B7A6-E3F1FE83CC90}"/>
+              </a:ext>
+            </a:extLst>
+          </p:cNvPr>
+          <p:cNvSpPr/>
+          <p:nvPr/>
+        </p:nvSpPr>
+        <p:spPr>
+          <a:xfrm>
+            <a:off x="3864179" y="2576821"/>
+            <a:ext cx="36000" cy="36000"/>
+          </a:xfrm>
+          <a:prstGeom prst="ellipse">
+            <a:avLst/>
+          </a:prstGeom>
+          <a:solidFill>
+            <a:schemeClr val="tx1"/>
+          </a:solidFill>
+          <a:ln>
+            <a:noFill/>
+          </a:ln>
+        </p:spPr>
+        <p:style>
+          <a:lnRef idx="2">
+            <a:schemeClr val="accent1">
+              <a:shade val="50000"/>
+            </a:schemeClr>
+          </a:lnRef>
+          <a:fillRef idx="1">
+            <a:schemeClr val="accent1"/>
+          </a:fillRef>
+          <a:effectRef idx="0">
+            <a:schemeClr val="accent1"/>
+          </a:effectRef>
+          <a:fontRef idx="minor">
+            <a:schemeClr val="lt1"/>
+          </a:fontRef>
+        </p:style>
+        <p:txBody>
+          <a:bodyPr rtlCol="0" anchor="ctr"/>
+          <a:lstStyle/>
+          <a:p>
+            <a:pPr algn="ctr"/>
+            <a:endParaRPr lang="zh-CN" altLang="en-US"/>
+          </a:p>
+        </p:txBody>
+      </p:sp>
+      <p:sp>
+        <p:nvSpPr>
+          <p:cNvPr id="6" name="椭圆 35">
+            <a:extLst>
+              <a:ext uri="{FF2B5EF4-FFF2-40B4-BE49-F238E27FC236}">
+                <a16:creationId xmlns:a16="http://schemas.microsoft.com/office/drawing/2014/main" id="{B982A18C-544E-46D3-BD7D-A28FC9D465E1}"/>
+              </a:ext>
+            </a:extLst>
+          </p:cNvPr>
+          <p:cNvSpPr/>
+          <p:nvPr/>
+        </p:nvSpPr>
+        <p:spPr>
+          <a:xfrm>
+            <a:off x="3633867" y="2840998"/>
+            <a:ext cx="36000" cy="36000"/>
+          </a:xfrm>
+          <a:prstGeom prst="ellipse">
+            <a:avLst/>
+          </a:prstGeom>
+          <a:solidFill>
+            <a:schemeClr val="tx1"/>
+          </a:solidFill>
+          <a:ln>
+            <a:noFill/>
+          </a:ln>
+        </p:spPr>
+        <p:style>
+          <a:lnRef idx="2">
+            <a:schemeClr val="accent1">
+              <a:shade val="50000"/>
+            </a:schemeClr>
+          </a:lnRef>
+          <a:fillRef idx="1">
+            <a:schemeClr val="accent1"/>
+          </a:fillRef>
+          <a:effectRef idx="0">
+            <a:schemeClr val="accent1"/>
+          </a:effectRef>
+          <a:fontRef idx="minor">
+            <a:schemeClr val="lt1"/>
+          </a:fontRef>
+        </p:style>
+        <p:txBody>
+          <a:bodyPr rtlCol="0" anchor="ctr"/>
+          <a:lstStyle/>
+          <a:p>
+            <a:pPr algn="ctr"/>
+            <a:endParaRPr lang="zh-CN" altLang="en-US"/>
+          </a:p>
+        </p:txBody>
+      </p:sp>
+      <p:cxnSp>
+        <p:nvCxnSpPr>
+          <p:cNvPr id="7" name="Straight Connector 6">
+            <a:extLst>
+              <a:ext uri="{FF2B5EF4-FFF2-40B4-BE49-F238E27FC236}">
+                <a16:creationId xmlns:a16="http://schemas.microsoft.com/office/drawing/2014/main" id="{9A9FE2BC-16E8-46FE-95E7-00AE3A718748}"/>
+              </a:ext>
+            </a:extLst>
+          </p:cNvPr>
+          <p:cNvCxnSpPr>
+            <a:stCxn id="5" idx="3"/>
+            <a:endCxn id="6" idx="7"/>
+          </p:cNvCxnSpPr>
+          <p:nvPr/>
+        </p:nvCxnSpPr>
+        <p:spPr>
+          <a:xfrm flipH="1">
+            <a:off x="3664595" y="2607549"/>
+            <a:ext cx="204856" cy="238721"/>
+          </a:xfrm>
+          <a:prstGeom prst="line">
+            <a:avLst/>
+          </a:prstGeom>
+          <a:ln w="9525">
+            <a:solidFill>
+              <a:schemeClr val="tx1"/>
+            </a:solidFill>
+            <a:tailEnd type="triangle" w="sm" len="sm"/>
+          </a:ln>
+        </p:spPr>
+        <p:style>
+          <a:lnRef idx="1">
+            <a:schemeClr val="accent1"/>
+          </a:lnRef>
+          <a:fillRef idx="0">
+            <a:schemeClr val="accent1"/>
+          </a:fillRef>
+          <a:effectRef idx="0">
+            <a:schemeClr val="accent1"/>
+          </a:effectRef>
+          <a:fontRef idx="minor">
+            <a:schemeClr val="tx1"/>
+          </a:fontRef>
+        </p:style>
+      </p:cxnSp>
+      <p:sp>
+        <p:nvSpPr>
+          <p:cNvPr id="8" name="TextBox 7">
+            <a:extLst>
+              <a:ext uri="{FF2B5EF4-FFF2-40B4-BE49-F238E27FC236}">
+                <a16:creationId xmlns:a16="http://schemas.microsoft.com/office/drawing/2014/main" id="{C7BB1D4E-27F2-4268-873A-22CFEC72CA94}"/>
+              </a:ext>
+            </a:extLst>
+          </p:cNvPr>
+          <p:cNvSpPr txBox="1">
+            <a:spLocks noChangeAspect="1"/>
+          </p:cNvSpPr>
+          <p:nvPr/>
+        </p:nvSpPr>
+        <p:spPr>
+          <a:xfrm>
+            <a:off x="3850455" y="2050567"/>
+            <a:ext cx="67326" cy="230832"/>
+          </a:xfrm>
+          <a:prstGeom prst="rect">
+            <a:avLst/>
+          </a:prstGeom>
+          <a:noFill/>
+        </p:spPr>
+        <p:txBody>
+          <a:bodyPr wrap="none" lIns="0" rIns="0" rtlCol="0">
+            <a:spAutoFit/>
+          </a:bodyPr>
+          <a:lstStyle/>
+          <a:p>
+            <a:r>
+              <a:rPr lang="en-US" altLang="zh-CN" sz="900" dirty="0"/>
+              <a:t>A</a:t>
+            </a:r>
+            <a:endParaRPr lang="zh-CN" altLang="en-US" sz="900" dirty="0"/>
+          </a:p>
+        </p:txBody>
+      </p:sp>
+      <mc:AlternateContent xmlns:mc="http://schemas.openxmlformats.org/markup-compatibility/2006">
+        <mc:Choice xmlns:a14="http://schemas.microsoft.com/office/drawing/2010/main" Requires="a14">
+          <p:sp>
+            <p:nvSpPr>
+              <p:cNvPr id="9" name="TextBox 8">
+                <a:extLst>
+                  <a:ext uri="{FF2B5EF4-FFF2-40B4-BE49-F238E27FC236}">
+                    <a16:creationId xmlns:a16="http://schemas.microsoft.com/office/drawing/2014/main" id="{A6EF90FC-1978-4DCF-9332-637F85CC7130}"/>
+                  </a:ext>
+                </a:extLst>
+              </p:cNvPr>
+              <p:cNvSpPr txBox="1"/>
+              <p:nvPr/>
+            </p:nvSpPr>
+            <p:spPr>
+              <a:xfrm>
+                <a:off x="3812079" y="2628178"/>
+                <a:ext cx="144078" cy="230256"/>
+              </a:xfrm>
+              <a:prstGeom prst="rect">
+                <a:avLst/>
+              </a:prstGeom>
+              <a:noFill/>
+            </p:spPr>
+            <p:txBody>
+              <a:bodyPr wrap="none" lIns="0" rIns="0" rtlCol="0">
+                <a:spAutoFit/>
+              </a:bodyPr>
+              <a:lstStyle/>
+              <a:p>
+                <a14:m>
+                  <m:oMath xmlns:m="http://schemas.openxmlformats.org/officeDocument/2006/math">
+                    <m:acc>
+                      <m:accPr>
+                        <m:chr m:val="⃑"/>
+                        <m:ctrlPr>
+                          <a:rPr lang="en-US" altLang="zh-CN" sz="800" i="1" smtClean="0">
+                            <a:latin typeface="Cambria Math" panose="02040503050406030204" pitchFamily="18" charset="0"/>
+                          </a:rPr>
+                        </m:ctrlPr>
+                      </m:accPr>
+                      <m:e>
+                        <m:r>
+                          <a:rPr lang="en-US" altLang="zh-CN" sz="800" b="0" i="1" smtClean="0">
+                            <a:latin typeface="Cambria Math" panose="02040503050406030204" pitchFamily="18" charset="0"/>
+                          </a:rPr>
+                          <m:t>𝑅</m:t>
+                        </m:r>
+                      </m:e>
+                    </m:acc>
+                  </m:oMath>
+                </a14:m>
+                <a:r>
+                  <a:rPr lang="en-US" altLang="zh-CN" sz="800" baseline="-25000" dirty="0"/>
+                  <a:t>AP</a:t>
+                </a:r>
+                <a:endParaRPr lang="zh-CN" altLang="en-US" sz="800" baseline="-25000" dirty="0"/>
+              </a:p>
+            </p:txBody>
+          </p:sp>
+        </mc:Choice>
+        <mc:Fallback>
+          <p:sp>
+            <p:nvSpPr>
+              <p:cNvPr id="9" name="TextBox 8">
+                <a:extLst>
+                  <a:ext uri="{FF2B5EF4-FFF2-40B4-BE49-F238E27FC236}">
+                    <a16:creationId xmlns:a16="http://schemas.microsoft.com/office/drawing/2014/main" id="{A6EF90FC-1978-4DCF-9332-637F85CC7130}"/>
+                  </a:ext>
+                </a:extLst>
+              </p:cNvPr>
+              <p:cNvSpPr txBox="1">
+                <a:spLocks noRot="1" noChangeAspect="1" noMove="1" noResize="1" noEditPoints="1" noAdjustHandles="1" noChangeArrowheads="1" noChangeShapeType="1" noTextEdit="1"/>
+              </p:cNvSpPr>
+              <p:nvPr/>
+            </p:nvSpPr>
+            <p:spPr>
+              <a:xfrm>
+                <a:off x="3812079" y="2628178"/>
+                <a:ext cx="144078" cy="230256"/>
+              </a:xfrm>
+              <a:prstGeom prst="rect">
+                <a:avLst/>
+              </a:prstGeom>
+              <a:blipFill>
+                <a:blip r:embed="rId2"/>
+                <a:stretch>
+                  <a:fillRect l="-25000" r="-25000" b="-5263"/>
+                </a:stretch>
+              </a:blipFill>
+            </p:spPr>
+            <p:txBody>
+              <a:bodyPr/>
+              <a:lstStyle/>
+              <a:p>
+                <a:r>
+                  <a:rPr lang="en-US">
+                    <a:noFill/>
+                  </a:rPr>
+                  <a:t> </a:t>
+                </a:r>
+              </a:p>
+            </p:txBody>
+          </p:sp>
+        </mc:Fallback>
+      </mc:AlternateContent>
+      <p:sp>
+        <p:nvSpPr>
+          <p:cNvPr id="10" name="TextBox 9">
+            <a:extLst>
+              <a:ext uri="{FF2B5EF4-FFF2-40B4-BE49-F238E27FC236}">
+                <a16:creationId xmlns:a16="http://schemas.microsoft.com/office/drawing/2014/main" id="{95E6097E-9229-45F8-A548-D3D1E12FCD8A}"/>
+              </a:ext>
+            </a:extLst>
+          </p:cNvPr>
+          <p:cNvSpPr txBox="1">
+            <a:spLocks noChangeAspect="1"/>
+          </p:cNvSpPr>
+          <p:nvPr/>
+        </p:nvSpPr>
+        <p:spPr>
+          <a:xfrm>
+            <a:off x="3585623" y="2628178"/>
+            <a:ext cx="52900" cy="215444"/>
+          </a:xfrm>
+          <a:prstGeom prst="rect">
+            <a:avLst/>
+          </a:prstGeom>
+          <a:noFill/>
+        </p:spPr>
+        <p:txBody>
+          <a:bodyPr wrap="none" lIns="0" rIns="0" rtlCol="0">
+            <a:spAutoFit/>
+          </a:bodyPr>
+          <a:lstStyle/>
+          <a:p>
+            <a:r>
+              <a:rPr lang="en-US" altLang="zh-CN" sz="800" dirty="0"/>
+              <a:t>P</a:t>
+            </a:r>
+            <a:endParaRPr lang="zh-CN" altLang="en-US" sz="800" dirty="0"/>
+          </a:p>
+        </p:txBody>
+      </p:sp>
+      <mc:AlternateContent xmlns:mc="http://schemas.openxmlformats.org/markup-compatibility/2006">
+        <mc:Choice xmlns:a14="http://schemas.microsoft.com/office/drawing/2010/main" Requires="a14">
+          <p:sp>
+            <p:nvSpPr>
+              <p:cNvPr id="11" name="TextBox 10">
+                <a:extLst>
+                  <a:ext uri="{FF2B5EF4-FFF2-40B4-BE49-F238E27FC236}">
+                    <a16:creationId xmlns:a16="http://schemas.microsoft.com/office/drawing/2014/main" id="{610072D9-525C-4811-ABB3-AAECCCA47946}"/>
+                  </a:ext>
+                </a:extLst>
+              </p:cNvPr>
+              <p:cNvSpPr txBox="1"/>
+              <p:nvPr/>
+            </p:nvSpPr>
+            <p:spPr>
+              <a:xfrm>
+                <a:off x="3743407" y="3041243"/>
+                <a:ext cx="152286" cy="212622"/>
+              </a:xfrm>
+              <a:prstGeom prst="rect">
+                <a:avLst/>
+              </a:prstGeom>
+              <a:noFill/>
+            </p:spPr>
+            <p:txBody>
+              <a:bodyPr wrap="none" lIns="0" rIns="0" rtlCol="0">
+                <a:spAutoFit/>
+              </a:bodyPr>
+              <a:lstStyle/>
+              <a:p>
+                <a14:m>
+                  <m:oMath xmlns:m="http://schemas.openxmlformats.org/officeDocument/2006/math">
+                    <m:acc>
+                      <m:accPr>
+                        <m:chr m:val="⃑"/>
+                        <m:ctrlPr>
+                          <a:rPr lang="en-US" altLang="zh-CN" sz="800" i="1" smtClean="0">
+                            <a:latin typeface="Cambria Math" panose="02040503050406030204" pitchFamily="18" charset="0"/>
+                          </a:rPr>
+                        </m:ctrlPr>
+                      </m:accPr>
+                      <m:e>
+                        <m:r>
+                          <m:rPr>
+                            <m:sty m:val="p"/>
+                          </m:rPr>
+                          <a:rPr lang="el-GR" altLang="zh-CN" sz="800" i="1" smtClean="0">
+                            <a:latin typeface="Cambria Math" panose="02040503050406030204" pitchFamily="18" charset="0"/>
+                          </a:rPr>
+                          <m:t>ω</m:t>
+                        </m:r>
+                      </m:e>
+                    </m:acc>
+                  </m:oMath>
+                </a14:m>
+                <a:r>
+                  <a:rPr lang="en-US" altLang="zh-CN" sz="800" baseline="-25000" dirty="0"/>
+                  <a:t>A1</a:t>
+                </a:r>
+                <a:endParaRPr lang="zh-CN" altLang="en-US" sz="800" baseline="-25000" dirty="0"/>
+              </a:p>
+            </p:txBody>
+          </p:sp>
+        </mc:Choice>
+        <mc:Fallback>
+          <p:sp>
+            <p:nvSpPr>
+              <p:cNvPr id="11" name="TextBox 10">
+                <a:extLst>
+                  <a:ext uri="{FF2B5EF4-FFF2-40B4-BE49-F238E27FC236}">
+                    <a16:creationId xmlns:a16="http://schemas.microsoft.com/office/drawing/2014/main" id="{610072D9-525C-4811-ABB3-AAECCCA47946}"/>
+                  </a:ext>
+                </a:extLst>
+              </p:cNvPr>
+              <p:cNvSpPr txBox="1">
+                <a:spLocks noRot="1" noChangeAspect="1" noMove="1" noResize="1" noEditPoints="1" noAdjustHandles="1" noChangeArrowheads="1" noChangeShapeType="1" noTextEdit="1"/>
+              </p:cNvSpPr>
+              <p:nvPr/>
+            </p:nvSpPr>
+            <p:spPr>
+              <a:xfrm>
+                <a:off x="3743407" y="3041243"/>
+                <a:ext cx="152286" cy="212622"/>
+              </a:xfrm>
+              <a:prstGeom prst="rect">
+                <a:avLst/>
+              </a:prstGeom>
+              <a:blipFill>
+                <a:blip r:embed="rId3"/>
+                <a:stretch>
+                  <a:fillRect l="-16000" r="-28000" b="-2857"/>
+                </a:stretch>
+              </a:blipFill>
+            </p:spPr>
+            <p:txBody>
+              <a:bodyPr/>
+              <a:lstStyle/>
+              <a:p>
+                <a:r>
+                  <a:rPr lang="en-US">
+                    <a:noFill/>
+                  </a:rPr>
+                  <a:t> </a:t>
+                </a:r>
+              </a:p>
+            </p:txBody>
+          </p:sp>
+        </mc:Fallback>
+      </mc:AlternateContent>
+      <p:sp>
+        <p:nvSpPr>
+          <p:cNvPr id="12" name="Arc 11">
+            <a:extLst>
+              <a:ext uri="{FF2B5EF4-FFF2-40B4-BE49-F238E27FC236}">
+                <a16:creationId xmlns:a16="http://schemas.microsoft.com/office/drawing/2014/main" id="{3A2F6725-B86C-4F52-AF51-2EEA8F3E0F95}"/>
+              </a:ext>
+            </a:extLst>
+          </p:cNvPr>
+          <p:cNvSpPr>
+            <a:spLocks noChangeAspect="1"/>
+          </p:cNvSpPr>
+          <p:nvPr/>
+        </p:nvSpPr>
+        <p:spPr>
+          <a:xfrm rot="10800000">
+            <a:off x="3565196" y="2847796"/>
+            <a:ext cx="291983" cy="290391"/>
+          </a:xfrm>
+          <a:prstGeom prst="arc">
+            <a:avLst/>
+          </a:prstGeom>
+          <a:ln w="9525">
+            <a:solidFill>
+              <a:schemeClr val="tx1"/>
+            </a:solidFill>
+            <a:headEnd type="triangle" w="sm" len="sm"/>
+          </a:ln>
+        </p:spPr>
+        <p:style>
+          <a:lnRef idx="1">
+            <a:schemeClr val="accent1"/>
+          </a:lnRef>
+          <a:fillRef idx="0">
+            <a:schemeClr val="accent1"/>
+          </a:fillRef>
+          <a:effectRef idx="0">
+            <a:schemeClr val="accent1"/>
+          </a:effectRef>
+          <a:fontRef idx="minor">
+            <a:schemeClr val="tx1"/>
+          </a:fontRef>
+        </p:style>
+        <p:txBody>
+          <a:bodyPr rtlCol="0" anchor="ctr"/>
+          <a:lstStyle/>
+          <a:p>
+            <a:pPr algn="ctr"/>
+            <a:endParaRPr lang="en-US"/>
+          </a:p>
+        </p:txBody>
+      </p:sp>
+      <mc:AlternateContent xmlns:mc="http://schemas.openxmlformats.org/markup-compatibility/2006">
+        <mc:Choice xmlns:a14="http://schemas.microsoft.com/office/drawing/2010/main" Requires="a14">
+          <p:sp>
+            <p:nvSpPr>
+              <p:cNvPr id="13" name="TextBox 12">
+                <a:extLst>
+                  <a:ext uri="{FF2B5EF4-FFF2-40B4-BE49-F238E27FC236}">
+                    <a16:creationId xmlns:a16="http://schemas.microsoft.com/office/drawing/2014/main" id="{BC06FF15-70A2-4BBF-B544-6AEC989FDEEA}"/>
+                  </a:ext>
+                </a:extLst>
+              </p:cNvPr>
+              <p:cNvSpPr txBox="1"/>
+              <p:nvPr/>
+            </p:nvSpPr>
+            <p:spPr>
+              <a:xfrm>
+                <a:off x="2557713" y="3041243"/>
+                <a:ext cx="152286" cy="212622"/>
+              </a:xfrm>
+              <a:prstGeom prst="rect">
+                <a:avLst/>
+              </a:prstGeom>
+              <a:noFill/>
+            </p:spPr>
+            <p:txBody>
+              <a:bodyPr wrap="none" lIns="0" rIns="0" rtlCol="0">
+                <a:spAutoFit/>
+              </a:bodyPr>
+              <a:lstStyle/>
+              <a:p>
+                <a14:m>
+                  <m:oMath xmlns:m="http://schemas.openxmlformats.org/officeDocument/2006/math">
+                    <m:acc>
+                      <m:accPr>
+                        <m:chr m:val="⃑"/>
+                        <m:ctrlPr>
+                          <a:rPr lang="en-US" altLang="zh-CN" sz="800" i="1" smtClean="0">
+                            <a:latin typeface="Cambria Math" panose="02040503050406030204" pitchFamily="18" charset="0"/>
+                          </a:rPr>
+                        </m:ctrlPr>
+                      </m:accPr>
+                      <m:e>
+                        <m:r>
+                          <m:rPr>
+                            <m:sty m:val="p"/>
+                          </m:rPr>
+                          <a:rPr lang="el-GR" altLang="zh-CN" sz="800" i="1" smtClean="0">
+                            <a:latin typeface="Cambria Math" panose="02040503050406030204" pitchFamily="18" charset="0"/>
+                          </a:rPr>
+                          <m:t>ω</m:t>
+                        </m:r>
+                      </m:e>
+                    </m:acc>
+                  </m:oMath>
+                </a14:m>
+                <a:r>
+                  <a:rPr lang="en-US" altLang="zh-CN" sz="800" baseline="-25000" dirty="0"/>
+                  <a:t>B1</a:t>
+                </a:r>
+                <a:endParaRPr lang="zh-CN" altLang="en-US" sz="800" baseline="-25000" dirty="0"/>
+              </a:p>
+            </p:txBody>
+          </p:sp>
+        </mc:Choice>
+        <mc:Fallback>
+          <p:sp>
+            <p:nvSpPr>
+              <p:cNvPr id="13" name="TextBox 12">
+                <a:extLst>
+                  <a:ext uri="{FF2B5EF4-FFF2-40B4-BE49-F238E27FC236}">
+                    <a16:creationId xmlns:a16="http://schemas.microsoft.com/office/drawing/2014/main" id="{BC06FF15-70A2-4BBF-B544-6AEC989FDEEA}"/>
+                  </a:ext>
+                </a:extLst>
+              </p:cNvPr>
+              <p:cNvSpPr txBox="1">
+                <a:spLocks noRot="1" noChangeAspect="1" noMove="1" noResize="1" noEditPoints="1" noAdjustHandles="1" noChangeArrowheads="1" noChangeShapeType="1" noTextEdit="1"/>
+              </p:cNvSpPr>
+              <p:nvPr/>
+            </p:nvSpPr>
+            <p:spPr>
+              <a:xfrm>
+                <a:off x="2557713" y="3041243"/>
+                <a:ext cx="152286" cy="212622"/>
+              </a:xfrm>
+              <a:prstGeom prst="rect">
+                <a:avLst/>
+              </a:prstGeom>
+              <a:blipFill>
+                <a:blip r:embed="rId4"/>
+                <a:stretch>
+                  <a:fillRect l="-20000" r="-28000" b="-2857"/>
+                </a:stretch>
+              </a:blipFill>
+            </p:spPr>
+            <p:txBody>
+              <a:bodyPr/>
+              <a:lstStyle/>
+              <a:p>
+                <a:r>
+                  <a:rPr lang="en-US">
+                    <a:noFill/>
+                  </a:rPr>
+                  <a:t> </a:t>
+                </a:r>
+              </a:p>
+            </p:txBody>
+          </p:sp>
+        </mc:Fallback>
+      </mc:AlternateContent>
+      <p:sp>
+        <p:nvSpPr>
+          <p:cNvPr id="14" name="Arc 13">
+            <a:extLst>
+              <a:ext uri="{FF2B5EF4-FFF2-40B4-BE49-F238E27FC236}">
+                <a16:creationId xmlns:a16="http://schemas.microsoft.com/office/drawing/2014/main" id="{E53B9E23-31A8-432C-B6AE-5F77482C6D20}"/>
+              </a:ext>
+            </a:extLst>
+          </p:cNvPr>
+          <p:cNvSpPr>
+            <a:spLocks noChangeAspect="1"/>
+          </p:cNvSpPr>
+          <p:nvPr/>
+        </p:nvSpPr>
+        <p:spPr>
+          <a:xfrm rot="10800000">
+            <a:off x="2698766" y="2876998"/>
+            <a:ext cx="291983" cy="290391"/>
+          </a:xfrm>
+          <a:prstGeom prst="arc">
+            <a:avLst>
+              <a:gd name="adj1" fmla="val 17533225"/>
+              <a:gd name="adj2" fmla="val 3370763"/>
+            </a:avLst>
+          </a:prstGeom>
+          <a:ln w="9525">
+            <a:solidFill>
+              <a:schemeClr val="tx1"/>
+            </a:solidFill>
+            <a:headEnd type="triangle" w="sm" len="sm"/>
+          </a:ln>
+        </p:spPr>
+        <p:style>
+          <a:lnRef idx="1">
+            <a:schemeClr val="accent1"/>
+          </a:lnRef>
+          <a:fillRef idx="0">
+            <a:schemeClr val="accent1"/>
+          </a:fillRef>
+          <a:effectRef idx="0">
+            <a:schemeClr val="accent1"/>
+          </a:effectRef>
+          <a:fontRef idx="minor">
+            <a:schemeClr val="tx1"/>
+          </a:fontRef>
+        </p:style>
+        <p:txBody>
+          <a:bodyPr rtlCol="0" anchor="ctr"/>
+          <a:lstStyle/>
+          <a:p>
+            <a:pPr algn="ctr"/>
+            <a:endParaRPr lang="en-US"/>
+          </a:p>
+        </p:txBody>
+      </p:sp>
+      <p:sp>
+        <p:nvSpPr>
+          <p:cNvPr id="15" name="TextBox 14">
+            <a:extLst>
+              <a:ext uri="{FF2B5EF4-FFF2-40B4-BE49-F238E27FC236}">
+                <a16:creationId xmlns:a16="http://schemas.microsoft.com/office/drawing/2014/main" id="{236B7F34-9F72-4016-B9B6-2712AD8ABEAD}"/>
+              </a:ext>
+            </a:extLst>
+          </p:cNvPr>
+          <p:cNvSpPr txBox="1">
+            <a:spLocks noChangeAspect="1"/>
+          </p:cNvSpPr>
+          <p:nvPr/>
+        </p:nvSpPr>
+        <p:spPr>
+          <a:xfrm>
+            <a:off x="3181324" y="2409906"/>
+            <a:ext cx="62518" cy="230832"/>
+          </a:xfrm>
+          <a:prstGeom prst="rect">
+            <a:avLst/>
+          </a:prstGeom>
+          <a:noFill/>
+        </p:spPr>
+        <p:txBody>
+          <a:bodyPr wrap="none" lIns="0" rIns="0" rtlCol="0">
+            <a:spAutoFit/>
+          </a:bodyPr>
+          <a:lstStyle/>
+          <a:p>
+            <a:r>
+              <a:rPr lang="en-US" altLang="zh-CN" sz="900" dirty="0"/>
+              <a:t>B</a:t>
+            </a:r>
+            <a:endParaRPr lang="zh-CN" altLang="en-US" sz="900" dirty="0"/>
+          </a:p>
+        </p:txBody>
+      </p:sp>
+      <mc:AlternateContent xmlns:mc="http://schemas.openxmlformats.org/markup-compatibility/2006">
+        <mc:Choice xmlns:a14="http://schemas.microsoft.com/office/drawing/2010/main" Requires="a14">
+          <p:sp>
+            <p:nvSpPr>
+              <p:cNvPr id="16" name="TextBox 15">
+                <a:extLst>
+                  <a:ext uri="{FF2B5EF4-FFF2-40B4-BE49-F238E27FC236}">
+                    <a16:creationId xmlns:a16="http://schemas.microsoft.com/office/drawing/2014/main" id="{E070E230-B56F-4089-A284-793A0CF5BEB0}"/>
+                  </a:ext>
+                </a:extLst>
+              </p:cNvPr>
+              <p:cNvSpPr txBox="1"/>
+              <p:nvPr/>
+            </p:nvSpPr>
+            <p:spPr>
+              <a:xfrm>
+                <a:off x="3277890" y="2720436"/>
+                <a:ext cx="144078" cy="230256"/>
+              </a:xfrm>
+              <a:prstGeom prst="rect">
+                <a:avLst/>
+              </a:prstGeom>
+              <a:noFill/>
+            </p:spPr>
+            <p:txBody>
+              <a:bodyPr wrap="none" lIns="0" rIns="0" rtlCol="0">
+                <a:spAutoFit/>
+              </a:bodyPr>
+              <a:lstStyle/>
+              <a:p>
+                <a14:m>
+                  <m:oMath xmlns:m="http://schemas.openxmlformats.org/officeDocument/2006/math">
+                    <m:acc>
+                      <m:accPr>
+                        <m:chr m:val="⃑"/>
+                        <m:ctrlPr>
+                          <a:rPr lang="en-US" altLang="zh-CN" sz="800" i="1" smtClean="0">
+                            <a:latin typeface="Cambria Math" panose="02040503050406030204" pitchFamily="18" charset="0"/>
+                          </a:rPr>
+                        </m:ctrlPr>
+                      </m:accPr>
+                      <m:e>
+                        <m:r>
+                          <a:rPr lang="en-US" altLang="zh-CN" sz="800" b="0" i="1" smtClean="0">
+                            <a:latin typeface="Cambria Math" panose="02040503050406030204" pitchFamily="18" charset="0"/>
+                          </a:rPr>
+                          <m:t>𝑅</m:t>
+                        </m:r>
+                      </m:e>
+                    </m:acc>
+                  </m:oMath>
+                </a14:m>
+                <a:r>
+                  <a:rPr lang="en-US" altLang="zh-CN" sz="800" baseline="-25000" dirty="0"/>
+                  <a:t>BP</a:t>
+                </a:r>
+                <a:endParaRPr lang="zh-CN" altLang="en-US" sz="800" baseline="-25000" dirty="0"/>
+              </a:p>
+            </p:txBody>
+          </p:sp>
+        </mc:Choice>
+        <mc:Fallback>
+          <p:sp>
+            <p:nvSpPr>
+              <p:cNvPr id="16" name="TextBox 15">
+                <a:extLst>
+                  <a:ext uri="{FF2B5EF4-FFF2-40B4-BE49-F238E27FC236}">
+                    <a16:creationId xmlns:a16="http://schemas.microsoft.com/office/drawing/2014/main" id="{E070E230-B56F-4089-A284-793A0CF5BEB0}"/>
+                  </a:ext>
+                </a:extLst>
+              </p:cNvPr>
+              <p:cNvSpPr txBox="1">
+                <a:spLocks noRot="1" noChangeAspect="1" noMove="1" noResize="1" noEditPoints="1" noAdjustHandles="1" noChangeArrowheads="1" noChangeShapeType="1" noTextEdit="1"/>
+              </p:cNvSpPr>
+              <p:nvPr/>
+            </p:nvSpPr>
+            <p:spPr>
+              <a:xfrm>
+                <a:off x="3277890" y="2720436"/>
+                <a:ext cx="144078" cy="230256"/>
+              </a:xfrm>
+              <a:prstGeom prst="rect">
+                <a:avLst/>
+              </a:prstGeom>
+              <a:blipFill>
+                <a:blip r:embed="rId5"/>
+                <a:stretch>
+                  <a:fillRect l="-26087" r="-30435" b="-5263"/>
+                </a:stretch>
+              </a:blipFill>
+            </p:spPr>
+            <p:txBody>
+              <a:bodyPr/>
+              <a:lstStyle/>
+              <a:p>
+                <a:r>
+                  <a:rPr lang="en-US">
+                    <a:noFill/>
+                  </a:rPr>
+                  <a:t> </a:t>
+                </a:r>
+              </a:p>
+            </p:txBody>
+          </p:sp>
+        </mc:Fallback>
+      </mc:AlternateContent>
+      <p:sp>
+        <p:nvSpPr>
+          <p:cNvPr id="17" name="Rectangle 16">
+            <a:extLst>
+              <a:ext uri="{FF2B5EF4-FFF2-40B4-BE49-F238E27FC236}">
+                <a16:creationId xmlns:a16="http://schemas.microsoft.com/office/drawing/2014/main" id="{C4322D16-F101-4414-AA62-C7562438ECC8}"/>
+              </a:ext>
+            </a:extLst>
+          </p:cNvPr>
+          <p:cNvSpPr/>
+          <p:nvPr/>
+        </p:nvSpPr>
+        <p:spPr>
+          <a:xfrm rot="2700000">
+            <a:off x="3001728" y="2585401"/>
+            <a:ext cx="457200" cy="736387"/>
+          </a:xfrm>
+          <a:prstGeom prst="rect">
+            <a:avLst/>
+          </a:prstGeom>
+          <a:noFill/>
+          <a:ln w="12700">
+            <a:solidFill>
+              <a:schemeClr val="tx1"/>
+            </a:solidFill>
+          </a:ln>
+        </p:spPr>
+        <p:style>
+          <a:lnRef idx="2">
+            <a:schemeClr val="accent1">
+              <a:shade val="50000"/>
+            </a:schemeClr>
+          </a:lnRef>
+          <a:fillRef idx="1">
+            <a:schemeClr val="accent1"/>
+          </a:fillRef>
+          <a:effectRef idx="0">
+            <a:schemeClr val="accent1"/>
+          </a:effectRef>
+          <a:fontRef idx="minor">
+            <a:schemeClr val="lt1"/>
+          </a:fontRef>
+        </p:style>
+        <p:txBody>
+          <a:bodyPr rtlCol="0" anchor="ctr"/>
+          <a:lstStyle/>
+          <a:p>
+            <a:pPr algn="ctr"/>
+            <a:endParaRPr lang="en-US"/>
+          </a:p>
+        </p:txBody>
+      </p:sp>
+      <p:sp>
+        <p:nvSpPr>
+          <p:cNvPr id="18" name="椭圆 35">
+            <a:extLst>
+              <a:ext uri="{FF2B5EF4-FFF2-40B4-BE49-F238E27FC236}">
+                <a16:creationId xmlns:a16="http://schemas.microsoft.com/office/drawing/2014/main" id="{BE818111-44AB-4A02-9E88-C857A3BB444D}"/>
+              </a:ext>
+            </a:extLst>
+          </p:cNvPr>
+          <p:cNvSpPr/>
+          <p:nvPr/>
+        </p:nvSpPr>
+        <p:spPr>
+          <a:xfrm rot="2700000">
+            <a:off x="3212328" y="2935594"/>
+            <a:ext cx="36000" cy="36000"/>
+          </a:xfrm>
+          <a:prstGeom prst="ellipse">
+            <a:avLst/>
+          </a:prstGeom>
+          <a:solidFill>
+            <a:schemeClr val="tx1"/>
+          </a:solidFill>
+          <a:ln>
+            <a:noFill/>
+          </a:ln>
+        </p:spPr>
+        <p:style>
+          <a:lnRef idx="2">
+            <a:schemeClr val="accent1">
+              <a:shade val="50000"/>
+            </a:schemeClr>
+          </a:lnRef>
+          <a:fillRef idx="1">
+            <a:schemeClr val="accent1"/>
+          </a:fillRef>
+          <a:effectRef idx="0">
+            <a:schemeClr val="accent1"/>
+          </a:effectRef>
+          <a:fontRef idx="minor">
+            <a:schemeClr val="lt1"/>
+          </a:fontRef>
+        </p:style>
+        <p:txBody>
+          <a:bodyPr rtlCol="0" anchor="ctr"/>
+          <a:lstStyle/>
+          <a:p>
+            <a:pPr algn="ctr"/>
+            <a:endParaRPr lang="zh-CN" altLang="en-US"/>
+          </a:p>
+        </p:txBody>
+      </p:sp>
+      <p:cxnSp>
+        <p:nvCxnSpPr>
+          <p:cNvPr id="19" name="Straight Connector 18">
+            <a:extLst>
+              <a:ext uri="{FF2B5EF4-FFF2-40B4-BE49-F238E27FC236}">
+                <a16:creationId xmlns:a16="http://schemas.microsoft.com/office/drawing/2014/main" id="{FACE3F74-F5BA-4A7F-B226-30FE5482B364}"/>
+              </a:ext>
+            </a:extLst>
+          </p:cNvPr>
+          <p:cNvCxnSpPr>
+            <a:stCxn id="6" idx="2"/>
+            <a:endCxn id="18" idx="7"/>
+          </p:cNvCxnSpPr>
+          <p:nvPr/>
+        </p:nvCxnSpPr>
+        <p:spPr>
+          <a:xfrm flipH="1">
+            <a:off x="3248328" y="2858998"/>
+            <a:ext cx="385539" cy="94596"/>
+          </a:xfrm>
+          <a:prstGeom prst="line">
+            <a:avLst/>
+          </a:prstGeom>
+          <a:ln w="9525">
+            <a:solidFill>
+              <a:schemeClr val="tx1"/>
+            </a:solidFill>
+            <a:headEnd type="triangle" w="sm" len="sm"/>
+            <a:tailEnd type="none" w="sm" len="sm"/>
+          </a:ln>
+        </p:spPr>
+        <p:style>
+          <a:lnRef idx="1">
+            <a:schemeClr val="accent1"/>
+          </a:lnRef>
+          <a:fillRef idx="0">
+            <a:schemeClr val="accent1"/>
+          </a:fillRef>
+          <a:effectRef idx="0">
+            <a:schemeClr val="accent1"/>
+          </a:effectRef>
+          <a:fontRef idx="minor">
+            <a:schemeClr val="tx1"/>
+          </a:fontRef>
+        </p:style>
+      </p:cxnSp>
+    </p:spTree>
+    <p:extLst>
+      <p:ext uri="{BB962C8B-B14F-4D97-AF65-F5344CB8AC3E}">
+        <p14:creationId xmlns:p14="http://schemas.microsoft.com/office/powerpoint/2010/main" val="1786192035"/>
       </p:ext>
     </p:extLst>
   </p:cSld>

</xml_diff>

<commit_message>
9-1 to 9-4 done.
</commit_message>
<xml_diff>
--- a/Word/Diagrams/chapter9/chap 9.figures.pptx
+++ b/Word/Diagrams/chapter9/chap 9.figures.pptx
@@ -230,7 +230,7 @@
             <a:fld id="{9CCF083D-F2BC-4786-8C77-844DFCD3515B}" type="datetimeFigureOut">
               <a:rPr lang="zh-TW" altLang="en-US" smtClean="0"/>
               <a:pPr/>
-              <a:t>2021/6/28</a:t>
+              <a:t>2021/7/1</a:t>
             </a:fld>
             <a:endParaRPr lang="zh-TW" altLang="en-US"/>
           </a:p>
@@ -694,7 +694,7 @@
             <a:fld id="{E3D07B0C-BD95-41BE-BB3E-AC75822DF381}" type="datetimeFigureOut">
               <a:rPr lang="en-US" smtClean="0"/>
               <a:pPr/>
-              <a:t>6/28/2021</a:t>
+              <a:t>7/1/2021</a:t>
             </a:fld>
             <a:endParaRPr lang="en-US" dirty="0"/>
           </a:p>
@@ -859,7 +859,7 @@
             <a:fld id="{E3D07B0C-BD95-41BE-BB3E-AC75822DF381}" type="datetimeFigureOut">
               <a:rPr lang="en-US" smtClean="0"/>
               <a:pPr/>
-              <a:t>6/28/2021</a:t>
+              <a:t>7/1/2021</a:t>
             </a:fld>
             <a:endParaRPr lang="en-US" dirty="0"/>
           </a:p>
@@ -1035,7 +1035,7 @@
             <a:fld id="{E3D07B0C-BD95-41BE-BB3E-AC75822DF381}" type="datetimeFigureOut">
               <a:rPr lang="en-US" smtClean="0"/>
               <a:pPr/>
-              <a:t>6/28/2021</a:t>
+              <a:t>7/1/2021</a:t>
             </a:fld>
             <a:endParaRPr lang="en-US" dirty="0"/>
           </a:p>
@@ -1200,7 +1200,7 @@
             <a:fld id="{E3D07B0C-BD95-41BE-BB3E-AC75822DF381}" type="datetimeFigureOut">
               <a:rPr lang="en-US" smtClean="0"/>
               <a:pPr/>
-              <a:t>6/28/2021</a:t>
+              <a:t>7/1/2021</a:t>
             </a:fld>
             <a:endParaRPr lang="en-US" dirty="0"/>
           </a:p>
@@ -1443,7 +1443,7 @@
             <a:fld id="{E3D07B0C-BD95-41BE-BB3E-AC75822DF381}" type="datetimeFigureOut">
               <a:rPr lang="en-US" smtClean="0"/>
               <a:pPr/>
-              <a:t>6/28/2021</a:t>
+              <a:t>7/1/2021</a:t>
             </a:fld>
             <a:endParaRPr lang="en-US" dirty="0"/>
           </a:p>
@@ -1727,7 +1727,7 @@
             <a:fld id="{E3D07B0C-BD95-41BE-BB3E-AC75822DF381}" type="datetimeFigureOut">
               <a:rPr lang="en-US" smtClean="0"/>
               <a:pPr/>
-              <a:t>6/28/2021</a:t>
+              <a:t>7/1/2021</a:t>
             </a:fld>
             <a:endParaRPr lang="en-US" dirty="0"/>
           </a:p>
@@ -2156,7 +2156,7 @@
             <a:fld id="{E3D07B0C-BD95-41BE-BB3E-AC75822DF381}" type="datetimeFigureOut">
               <a:rPr lang="en-US" smtClean="0"/>
               <a:pPr/>
-              <a:t>6/28/2021</a:t>
+              <a:t>7/1/2021</a:t>
             </a:fld>
             <a:endParaRPr lang="en-US" dirty="0"/>
           </a:p>
@@ -2270,7 +2270,7 @@
             <a:fld id="{E3D07B0C-BD95-41BE-BB3E-AC75822DF381}" type="datetimeFigureOut">
               <a:rPr lang="en-US" smtClean="0"/>
               <a:pPr/>
-              <a:t>6/28/2021</a:t>
+              <a:t>7/1/2021</a:t>
             </a:fld>
             <a:endParaRPr lang="en-US" dirty="0"/>
           </a:p>
@@ -2362,7 +2362,7 @@
             <a:fld id="{E3D07B0C-BD95-41BE-BB3E-AC75822DF381}" type="datetimeFigureOut">
               <a:rPr lang="en-US" smtClean="0"/>
               <a:pPr/>
-              <a:t>6/28/2021</a:t>
+              <a:t>7/1/2021</a:t>
             </a:fld>
             <a:endParaRPr lang="en-US" dirty="0"/>
           </a:p>
@@ -2553,7 +2553,7 @@
             <a:fld id="{E3D07B0C-BD95-41BE-BB3E-AC75822DF381}" type="datetimeFigureOut">
               <a:rPr lang="en-US" smtClean="0"/>
               <a:pPr/>
-              <a:t>6/28/2021</a:t>
+              <a:t>7/1/2021</a:t>
             </a:fld>
             <a:endParaRPr lang="en-US" dirty="0"/>
           </a:p>
@@ -2871,7 +2871,7 @@
             <a:fld id="{E3D07B0C-BD95-41BE-BB3E-AC75822DF381}" type="datetimeFigureOut">
               <a:rPr lang="en-US" smtClean="0"/>
               <a:pPr/>
-              <a:t>6/28/2021</a:t>
+              <a:t>7/1/2021</a:t>
             </a:fld>
             <a:endParaRPr lang="en-US" dirty="0"/>
           </a:p>
@@ -3253,7 +3253,7 @@
             <a:fld id="{E3D07B0C-BD95-41BE-BB3E-AC75822DF381}" type="datetimeFigureOut">
               <a:rPr lang="en-US" smtClean="0"/>
               <a:pPr/>
-              <a:t>6/28/2021</a:t>
+              <a:t>7/1/2021</a:t>
             </a:fld>
             <a:endParaRPr lang="en-US" dirty="0"/>
           </a:p>
@@ -9630,7 +9630,7 @@
         <p:spPr>
           <a:xfrm>
             <a:off x="2852825" y="2286000"/>
-            <a:ext cx="107402" cy="215444"/>
+            <a:ext cx="171522" cy="215444"/>
           </a:xfrm>
           <a:prstGeom prst="rect">
             <a:avLst/>
@@ -9645,7 +9645,7 @@
           <a:p>
             <a:r>
               <a:rPr lang="en-US" altLang="zh-TW" sz="800" dirty="0"/>
-              <a:t>R1</a:t>
+              <a:t>RG1</a:t>
             </a:r>
             <a:endParaRPr lang="zh-TW" altLang="en-US" sz="800" baseline="-25000" dirty="0"/>
           </a:p>
@@ -9666,7 +9666,7 @@
         <p:spPr>
           <a:xfrm>
             <a:off x="3208763" y="2598660"/>
-            <a:ext cx="107402" cy="215444"/>
+            <a:ext cx="171522" cy="215444"/>
           </a:xfrm>
           <a:prstGeom prst="rect">
             <a:avLst/>
@@ -9681,7 +9681,7 @@
           <a:p>
             <a:r>
               <a:rPr lang="en-US" altLang="zh-TW" sz="800" dirty="0"/>
-              <a:t>R3</a:t>
+              <a:t>RG3</a:t>
             </a:r>
             <a:endParaRPr lang="zh-TW" altLang="en-US" sz="800" baseline="-25000" dirty="0"/>
           </a:p>
@@ -9702,7 +9702,7 @@
         <p:spPr>
           <a:xfrm>
             <a:off x="3563675" y="2964386"/>
-            <a:ext cx="107402" cy="215444"/>
+            <a:ext cx="171522" cy="215444"/>
           </a:xfrm>
           <a:prstGeom prst="rect">
             <a:avLst/>
@@ -9717,7 +9717,7 @@
           <a:p>
             <a:r>
               <a:rPr lang="en-US" altLang="zh-TW" sz="800" dirty="0"/>
-              <a:t>R2</a:t>
+              <a:t>RG2</a:t>
             </a:r>
             <a:endParaRPr lang="zh-TW" altLang="en-US" sz="800" baseline="-25000" dirty="0"/>
           </a:p>
@@ -22868,8 +22868,8 @@
           </a:fontRef>
         </p:style>
       </p:cxnSp>
-      <mc:AlternateContent xmlns:mc="http://schemas.openxmlformats.org/markup-compatibility/2006">
-        <mc:Choice xmlns:a14="http://schemas.microsoft.com/office/drawing/2010/main" Requires="a14">
+      <mc:AlternateContent xmlns:mc="http://schemas.openxmlformats.org/markup-compatibility/2006" xmlns:a14="http://schemas.microsoft.com/office/drawing/2010/main">
+        <mc:Choice Requires="a14">
           <p:sp>
             <p:nvSpPr>
               <p:cNvPr id="10" name="TextBox 9">
@@ -22929,7 +22929,7 @@
             </p:txBody>
           </p:sp>
         </mc:Choice>
-        <mc:Fallback>
+        <mc:Fallback xmlns="">
           <p:sp>
             <p:nvSpPr>
               <p:cNvPr id="10" name="TextBox 9">
@@ -23118,8 +23118,8 @@
           </p:sp>
         </mc:Fallback>
       </mc:AlternateContent>
-      <mc:AlternateContent xmlns:mc="http://schemas.openxmlformats.org/markup-compatibility/2006">
-        <mc:Choice xmlns:a14="http://schemas.microsoft.com/office/drawing/2010/main" Requires="a14">
+      <mc:AlternateContent xmlns:mc="http://schemas.openxmlformats.org/markup-compatibility/2006" xmlns:a14="http://schemas.microsoft.com/office/drawing/2010/main">
+        <mc:Choice Requires="a14">
           <p:sp>
             <p:nvSpPr>
               <p:cNvPr id="13" name="TextBox 12">
@@ -23179,7 +23179,7 @@
             </p:txBody>
           </p:sp>
         </mc:Choice>
-        <mc:Fallback>
+        <mc:Fallback xmlns="">
           <p:sp>
             <p:nvSpPr>
               <p:cNvPr id="13" name="TextBox 12">
@@ -23262,8 +23262,8 @@
           </a:p>
         </p:txBody>
       </p:sp>
-      <mc:AlternateContent xmlns:mc="http://schemas.openxmlformats.org/markup-compatibility/2006">
-        <mc:Choice xmlns:a14="http://schemas.microsoft.com/office/drawing/2010/main" Requires="a14">
+      <mc:AlternateContent xmlns:mc="http://schemas.openxmlformats.org/markup-compatibility/2006" xmlns:a14="http://schemas.microsoft.com/office/drawing/2010/main">
+        <mc:Choice Requires="a14">
           <p:sp>
             <p:nvSpPr>
               <p:cNvPr id="15" name="TextBox 14">
@@ -23326,7 +23326,7 @@
             </p:txBody>
           </p:sp>
         </mc:Choice>
-        <mc:Fallback>
+        <mc:Fallback xmlns="">
           <p:sp>
             <p:nvSpPr>
               <p:cNvPr id="15" name="TextBox 14">
@@ -23550,8 +23550,8 @@
           </a:fontRef>
         </p:style>
       </p:cxnSp>
-      <mc:AlternateContent xmlns:mc="http://schemas.openxmlformats.org/markup-compatibility/2006">
-        <mc:Choice xmlns:a14="http://schemas.microsoft.com/office/drawing/2010/main" Requires="a14">
+      <mc:AlternateContent xmlns:mc="http://schemas.openxmlformats.org/markup-compatibility/2006" xmlns:a14="http://schemas.microsoft.com/office/drawing/2010/main">
+        <mc:Choice Requires="a14">
           <p:sp>
             <p:nvSpPr>
               <p:cNvPr id="23" name="TextBox 22">
@@ -23611,7 +23611,7 @@
             </p:txBody>
           </p:sp>
         </mc:Choice>
-        <mc:Fallback>
+        <mc:Fallback xmlns="">
           <p:sp>
             <p:nvSpPr>
               <p:cNvPr id="23" name="TextBox 22">
@@ -23656,8 +23656,8 @@
           </p:sp>
         </mc:Fallback>
       </mc:AlternateContent>
-      <mc:AlternateContent xmlns:mc="http://schemas.openxmlformats.org/markup-compatibility/2006">
-        <mc:Choice xmlns:a14="http://schemas.microsoft.com/office/drawing/2010/main" Requires="a14">
+      <mc:AlternateContent xmlns:mc="http://schemas.openxmlformats.org/markup-compatibility/2006" xmlns:a14="http://schemas.microsoft.com/office/drawing/2010/main">
+        <mc:Choice Requires="a14">
           <p:sp>
             <p:nvSpPr>
               <p:cNvPr id="24" name="TextBox 23">
@@ -23757,7 +23757,7 @@
             </p:txBody>
           </p:sp>
         </mc:Choice>
-        <mc:Fallback>
+        <mc:Fallback xmlns="">
           <p:sp>
             <p:nvSpPr>
               <p:cNvPr id="24" name="TextBox 23">
@@ -24360,8 +24360,8 @@
           </a:p>
         </p:txBody>
       </p:sp>
-      <mc:AlternateContent xmlns:mc="http://schemas.openxmlformats.org/markup-compatibility/2006">
-        <mc:Choice xmlns:a14="http://schemas.microsoft.com/office/drawing/2010/main" Requires="a14">
+      <mc:AlternateContent xmlns:mc="http://schemas.openxmlformats.org/markup-compatibility/2006" xmlns:a14="http://schemas.microsoft.com/office/drawing/2010/main">
+        <mc:Choice Requires="a14">
           <p:sp>
             <p:nvSpPr>
               <p:cNvPr id="9" name="TextBox 8">
@@ -24421,7 +24421,7 @@
             </p:txBody>
           </p:sp>
         </mc:Choice>
-        <mc:Fallback>
+        <mc:Fallback xmlns="">
           <p:sp>
             <p:nvSpPr>
               <p:cNvPr id="9" name="TextBox 8">
@@ -25005,8 +25005,8 @@
           </a:fontRef>
         </p:style>
       </p:cxnSp>
-      <mc:AlternateContent xmlns:mc="http://schemas.openxmlformats.org/markup-compatibility/2006">
-        <mc:Choice xmlns:a14="http://schemas.microsoft.com/office/drawing/2010/main" Requires="a14">
+      <mc:AlternateContent xmlns:mc="http://schemas.openxmlformats.org/markup-compatibility/2006" xmlns:a14="http://schemas.microsoft.com/office/drawing/2010/main">
+        <mc:Choice Requires="a14">
           <p:sp>
             <p:nvSpPr>
               <p:cNvPr id="21" name="TextBox 20">
@@ -25066,7 +25066,7 @@
             </p:txBody>
           </p:sp>
         </mc:Choice>
-        <mc:Fallback>
+        <mc:Fallback xmlns="">
           <p:sp>
             <p:nvSpPr>
               <p:cNvPr id="21" name="TextBox 20">
@@ -25111,8 +25111,8 @@
           </p:sp>
         </mc:Fallback>
       </mc:AlternateContent>
-      <mc:AlternateContent xmlns:mc="http://schemas.openxmlformats.org/markup-compatibility/2006">
-        <mc:Choice xmlns:a14="http://schemas.microsoft.com/office/drawing/2010/main" Requires="a14">
+      <mc:AlternateContent xmlns:mc="http://schemas.openxmlformats.org/markup-compatibility/2006" xmlns:a14="http://schemas.microsoft.com/office/drawing/2010/main">
+        <mc:Choice Requires="a14">
           <p:sp>
             <p:nvSpPr>
               <p:cNvPr id="22" name="TextBox 21">
@@ -25175,7 +25175,7 @@
             </p:txBody>
           </p:sp>
         </mc:Choice>
-        <mc:Fallback>
+        <mc:Fallback xmlns="">
           <p:sp>
             <p:nvSpPr>
               <p:cNvPr id="22" name="TextBox 21">
@@ -25273,8 +25273,8 @@
           </a:p>
         </p:txBody>
       </p:sp>
-      <mc:AlternateContent xmlns:mc="http://schemas.openxmlformats.org/markup-compatibility/2006">
-        <mc:Choice xmlns:a14="http://schemas.microsoft.com/office/drawing/2010/main" Requires="a14">
+      <mc:AlternateContent xmlns:mc="http://schemas.openxmlformats.org/markup-compatibility/2006" xmlns:a14="http://schemas.microsoft.com/office/drawing/2010/main">
+        <mc:Choice Requires="a14">
           <p:sp>
             <p:nvSpPr>
               <p:cNvPr id="25" name="TextBox 24">
@@ -25334,7 +25334,7 @@
             </p:txBody>
           </p:sp>
         </mc:Choice>
-        <mc:Fallback>
+        <mc:Fallback xmlns="">
           <p:sp>
             <p:nvSpPr>
               <p:cNvPr id="25" name="TextBox 24">
@@ -25423,8 +25423,8 @@
           </a:fontRef>
         </p:style>
       </p:cxnSp>
-      <mc:AlternateContent xmlns:mc="http://schemas.openxmlformats.org/markup-compatibility/2006">
-        <mc:Choice xmlns:a14="http://schemas.microsoft.com/office/drawing/2010/main" Requires="a14">
+      <mc:AlternateContent xmlns:mc="http://schemas.openxmlformats.org/markup-compatibility/2006" xmlns:a14="http://schemas.microsoft.com/office/drawing/2010/main">
+        <mc:Choice Requires="a14">
           <p:sp>
             <p:nvSpPr>
               <p:cNvPr id="27" name="TextBox 26">
@@ -25484,7 +25484,7 @@
             </p:txBody>
           </p:sp>
         </mc:Choice>
-        <mc:Fallback>
+        <mc:Fallback xmlns="">
           <p:sp>
             <p:nvSpPr>
               <p:cNvPr id="27" name="TextBox 26">
@@ -25573,8 +25573,8 @@
           </a:fontRef>
         </p:style>
       </p:cxnSp>
-      <mc:AlternateContent xmlns:mc="http://schemas.openxmlformats.org/markup-compatibility/2006">
-        <mc:Choice xmlns:a14="http://schemas.microsoft.com/office/drawing/2010/main" Requires="a14">
+      <mc:AlternateContent xmlns:mc="http://schemas.openxmlformats.org/markup-compatibility/2006" xmlns:a14="http://schemas.microsoft.com/office/drawing/2010/main">
+        <mc:Choice Requires="a14">
           <p:sp>
             <p:nvSpPr>
               <p:cNvPr id="30" name="TextBox 29">
@@ -25634,7 +25634,7 @@
             </p:txBody>
           </p:sp>
         </mc:Choice>
-        <mc:Fallback>
+        <mc:Fallback xmlns="">
           <p:sp>
             <p:nvSpPr>
               <p:cNvPr id="30" name="TextBox 29">
@@ -25901,8 +25901,8 @@
           </a:fontRef>
         </p:style>
       </p:cxnSp>
-      <mc:AlternateContent xmlns:mc="http://schemas.openxmlformats.org/markup-compatibility/2006">
-        <mc:Choice xmlns:a14="http://schemas.microsoft.com/office/drawing/2010/main" Requires="a14">
+      <mc:AlternateContent xmlns:mc="http://schemas.openxmlformats.org/markup-compatibility/2006" xmlns:a14="http://schemas.microsoft.com/office/drawing/2010/main">
+        <mc:Choice Requires="a14">
           <p:sp>
             <p:nvSpPr>
               <p:cNvPr id="45" name="TextBox 44">
@@ -25962,7 +25962,7 @@
             </p:txBody>
           </p:sp>
         </mc:Choice>
-        <mc:Fallback>
+        <mc:Fallback xmlns="">
           <p:sp>
             <p:nvSpPr>
               <p:cNvPr id="45" name="TextBox 44">
@@ -26007,8 +26007,8 @@
           </p:sp>
         </mc:Fallback>
       </mc:AlternateContent>
-      <mc:AlternateContent xmlns:mc="http://schemas.openxmlformats.org/markup-compatibility/2006">
-        <mc:Choice xmlns:a14="http://schemas.microsoft.com/office/drawing/2010/main" Requires="a14">
+      <mc:AlternateContent xmlns:mc="http://schemas.openxmlformats.org/markup-compatibility/2006" xmlns:a14="http://schemas.microsoft.com/office/drawing/2010/main">
+        <mc:Choice Requires="a14">
           <p:sp>
             <p:nvSpPr>
               <p:cNvPr id="46" name="TextBox 45">
@@ -26108,7 +26108,7 @@
             </p:txBody>
           </p:sp>
         </mc:Choice>
-        <mc:Fallback>
+        <mc:Fallback xmlns="">
           <p:sp>
             <p:nvSpPr>
               <p:cNvPr id="46" name="TextBox 45">
@@ -26352,8 +26352,8 @@
           </a:p>
         </p:txBody>
       </p:sp>
-      <mc:AlternateContent xmlns:mc="http://schemas.openxmlformats.org/markup-compatibility/2006">
-        <mc:Choice xmlns:a14="http://schemas.microsoft.com/office/drawing/2010/main" Requires="a14">
+      <mc:AlternateContent xmlns:mc="http://schemas.openxmlformats.org/markup-compatibility/2006" xmlns:a14="http://schemas.microsoft.com/office/drawing/2010/main">
+        <mc:Choice Requires="a14">
           <p:sp>
             <p:nvSpPr>
               <p:cNvPr id="48" name="TextBox 47">
@@ -26453,7 +26453,7 @@
             </p:txBody>
           </p:sp>
         </mc:Choice>
-        <mc:Fallback>
+        <mc:Fallback xmlns="">
           <p:sp>
             <p:nvSpPr>
               <p:cNvPr id="48" name="TextBox 47">

</xml_diff>